<commit_message>
Updated diagram of course topics
</commit_message>
<xml_diff>
--- a/slides/1_Introduction.pptx
+++ b/slides/1_Introduction.pptx
@@ -263,7 +263,7 @@
           <a:p>
             <a:fld id="{2F3ABF1A-8818-4472-8518-E71DC7B5D2F7}" type="datetimeFigureOut">
               <a:rPr lang="en-US" smtClean="0"/>
-              <a:t>6/23/2025</a:t>
+              <a:t>7/30/2025</a:t>
             </a:fld>
             <a:endParaRPr lang="en-US"/>
           </a:p>
@@ -1283,7 +1283,7 @@
           <a:p>
             <a:fld id="{6E4A31BF-7266-4BEB-918B-ADC21C630A6F}" type="datetimeFigureOut">
               <a:rPr lang="en-US" smtClean="0"/>
-              <a:t>6/23/2025</a:t>
+              <a:t>7/30/2025</a:t>
             </a:fld>
             <a:endParaRPr lang="en-US"/>
           </a:p>
@@ -1481,7 +1481,7 @@
           <a:p>
             <a:fld id="{6E4A31BF-7266-4BEB-918B-ADC21C630A6F}" type="datetimeFigureOut">
               <a:rPr lang="en-US" smtClean="0"/>
-              <a:t>6/23/2025</a:t>
+              <a:t>7/30/2025</a:t>
             </a:fld>
             <a:endParaRPr lang="en-US"/>
           </a:p>
@@ -1689,7 +1689,7 @@
           <a:p>
             <a:fld id="{6E4A31BF-7266-4BEB-918B-ADC21C630A6F}" type="datetimeFigureOut">
               <a:rPr lang="en-US" smtClean="0"/>
-              <a:t>6/23/2025</a:t>
+              <a:t>7/30/2025</a:t>
             </a:fld>
             <a:endParaRPr lang="en-US"/>
           </a:p>
@@ -1887,7 +1887,7 @@
           <a:p>
             <a:fld id="{6E4A31BF-7266-4BEB-918B-ADC21C630A6F}" type="datetimeFigureOut">
               <a:rPr lang="en-US" smtClean="0"/>
-              <a:t>6/23/2025</a:t>
+              <a:t>7/30/2025</a:t>
             </a:fld>
             <a:endParaRPr lang="en-US"/>
           </a:p>
@@ -2162,7 +2162,7 @@
           <a:p>
             <a:fld id="{6E4A31BF-7266-4BEB-918B-ADC21C630A6F}" type="datetimeFigureOut">
               <a:rPr lang="en-US" smtClean="0"/>
-              <a:t>6/23/2025</a:t>
+              <a:t>7/30/2025</a:t>
             </a:fld>
             <a:endParaRPr lang="en-US"/>
           </a:p>
@@ -2427,7 +2427,7 @@
           <a:p>
             <a:fld id="{6E4A31BF-7266-4BEB-918B-ADC21C630A6F}" type="datetimeFigureOut">
               <a:rPr lang="en-US" smtClean="0"/>
-              <a:t>6/23/2025</a:t>
+              <a:t>7/30/2025</a:t>
             </a:fld>
             <a:endParaRPr lang="en-US"/>
           </a:p>
@@ -2839,7 +2839,7 @@
           <a:p>
             <a:fld id="{6E4A31BF-7266-4BEB-918B-ADC21C630A6F}" type="datetimeFigureOut">
               <a:rPr lang="en-US" smtClean="0"/>
-              <a:t>6/23/2025</a:t>
+              <a:t>7/30/2025</a:t>
             </a:fld>
             <a:endParaRPr lang="en-US"/>
           </a:p>
@@ -2980,7 +2980,7 @@
           <a:p>
             <a:fld id="{6E4A31BF-7266-4BEB-918B-ADC21C630A6F}" type="datetimeFigureOut">
               <a:rPr lang="en-US" smtClean="0"/>
-              <a:t>6/23/2025</a:t>
+              <a:t>7/30/2025</a:t>
             </a:fld>
             <a:endParaRPr lang="en-US"/>
           </a:p>
@@ -3093,7 +3093,7 @@
           <a:p>
             <a:fld id="{6E4A31BF-7266-4BEB-918B-ADC21C630A6F}" type="datetimeFigureOut">
               <a:rPr lang="en-US" smtClean="0"/>
-              <a:t>6/23/2025</a:t>
+              <a:t>7/30/2025</a:t>
             </a:fld>
             <a:endParaRPr lang="en-US"/>
           </a:p>
@@ -3404,7 +3404,7 @@
           <a:p>
             <a:fld id="{6E4A31BF-7266-4BEB-918B-ADC21C630A6F}" type="datetimeFigureOut">
               <a:rPr lang="en-US" smtClean="0"/>
-              <a:t>6/23/2025</a:t>
+              <a:t>7/30/2025</a:t>
             </a:fld>
             <a:endParaRPr lang="en-US"/>
           </a:p>
@@ -3692,7 +3692,7 @@
           <a:p>
             <a:fld id="{6E4A31BF-7266-4BEB-918B-ADC21C630A6F}" type="datetimeFigureOut">
               <a:rPr lang="en-US" smtClean="0"/>
-              <a:t>6/23/2025</a:t>
+              <a:t>7/30/2025</a:t>
             </a:fld>
             <a:endParaRPr lang="en-US"/>
           </a:p>
@@ -3933,7 +3933,7 @@
           <a:p>
             <a:fld id="{6E4A31BF-7266-4BEB-918B-ADC21C630A6F}" type="datetimeFigureOut">
               <a:rPr lang="en-US" smtClean="0"/>
-              <a:t>6/23/2025</a:t>
+              <a:t>7/30/2025</a:t>
             </a:fld>
             <a:endParaRPr lang="en-US"/>
           </a:p>
@@ -8686,7 +8686,15 @@
             <a:pPr algn="ctr"/>
             <a:r>
               <a:rPr lang="en-US" sz="2000" dirty="0"/>
-              <a:t>Solution Algorithms</a:t>
+              <a:t>Taks </a:t>
+            </a:r>
+            <a:r>
+              <a:rPr lang="en-US" sz="2000"/>
+              <a:t>Speific </a:t>
+            </a:r>
+            <a:r>
+              <a:rPr lang="en-US" sz="2000" dirty="0"/>
+              <a:t>Algorithms</a:t>
             </a:r>
           </a:p>
         </p:txBody>
@@ -13439,8 +13447,8 @@
           <a:chExt cx="0" cy="0"/>
         </a:xfrm>
       </p:grpSpPr>
-      <mc:AlternateContent xmlns:mc="http://schemas.openxmlformats.org/markup-compatibility/2006">
-        <mc:Choice xmlns:a14="http://schemas.microsoft.com/office/drawing/2010/main" Requires="a14">
+      <mc:AlternateContent xmlns:mc="http://schemas.openxmlformats.org/markup-compatibility/2006" xmlns:a14="http://schemas.microsoft.com/office/drawing/2010/main">
+        <mc:Choice Requires="a14">
           <p:sp>
             <p:nvSpPr>
               <p:cNvPr id="3" name="Content Placeholder 2">
@@ -13616,7 +13624,7 @@
             </p:txBody>
           </p:sp>
         </mc:Choice>
-        <mc:Fallback>
+        <mc:Fallback xmlns="">
           <p:sp>
             <p:nvSpPr>
               <p:cNvPr id="3" name="Content Placeholder 2">
@@ -15744,8 +15752,8 @@
           <a:chExt cx="0" cy="0"/>
         </a:xfrm>
       </p:grpSpPr>
-      <mc:AlternateContent xmlns:mc="http://schemas.openxmlformats.org/markup-compatibility/2006">
-        <mc:Choice xmlns:a14="http://schemas.microsoft.com/office/drawing/2010/main" Requires="a14">
+      <mc:AlternateContent xmlns:mc="http://schemas.openxmlformats.org/markup-compatibility/2006" xmlns:a14="http://schemas.microsoft.com/office/drawing/2010/main">
+        <mc:Choice Requires="a14">
           <p:sp>
             <p:nvSpPr>
               <p:cNvPr id="3" name="Content Placeholder 2">
@@ -15862,7 +15870,7 @@
             </p:txBody>
           </p:sp>
         </mc:Choice>
-        <mc:Fallback>
+        <mc:Fallback xmlns="">
           <p:sp>
             <p:nvSpPr>
               <p:cNvPr id="3" name="Content Placeholder 2">
@@ -16237,8 +16245,8 @@
           <a:chExt cx="0" cy="0"/>
         </a:xfrm>
       </p:grpSpPr>
-      <mc:AlternateContent xmlns:mc="http://schemas.openxmlformats.org/markup-compatibility/2006">
-        <mc:Choice xmlns:a14="http://schemas.microsoft.com/office/drawing/2010/main" Requires="a14">
+      <mc:AlternateContent xmlns:mc="http://schemas.openxmlformats.org/markup-compatibility/2006" xmlns:a14="http://schemas.microsoft.com/office/drawing/2010/main">
+        <mc:Choice Requires="a14">
           <p:sp>
             <p:nvSpPr>
               <p:cNvPr id="3" name="Content Placeholder 2">
@@ -16488,7 +16496,7 @@
             </p:txBody>
           </p:sp>
         </mc:Choice>
-        <mc:Fallback>
+        <mc:Fallback xmlns="">
           <p:sp>
             <p:nvSpPr>
               <p:cNvPr id="3" name="Content Placeholder 2">
@@ -19240,8 +19248,8 @@
           <a:chExt cx="0" cy="0"/>
         </a:xfrm>
       </p:grpSpPr>
-      <mc:AlternateContent xmlns:mc="http://schemas.openxmlformats.org/markup-compatibility/2006">
-        <mc:Choice xmlns:a14="http://schemas.microsoft.com/office/drawing/2010/main" Requires="a14">
+      <mc:AlternateContent xmlns:mc="http://schemas.openxmlformats.org/markup-compatibility/2006" xmlns:a14="http://schemas.microsoft.com/office/drawing/2010/main">
+        <mc:Choice Requires="a14">
           <p:sp>
             <p:nvSpPr>
               <p:cNvPr id="3" name="Content Placeholder 2">
@@ -19459,7 +19467,7 @@
             </p:txBody>
           </p:sp>
         </mc:Choice>
-        <mc:Fallback>
+        <mc:Fallback xmlns="">
           <p:sp>
             <p:nvSpPr>
               <p:cNvPr id="3" name="Content Placeholder 2">
@@ -21209,8 +21217,8 @@
           </a:p>
         </p:txBody>
       </p:sp>
-      <mc:AlternateContent xmlns:mc="http://schemas.openxmlformats.org/markup-compatibility/2006">
-        <mc:Choice xmlns:a14="http://schemas.microsoft.com/office/drawing/2010/main" Requires="a14">
+      <mc:AlternateContent xmlns:mc="http://schemas.openxmlformats.org/markup-compatibility/2006" xmlns:a14="http://schemas.microsoft.com/office/drawing/2010/main">
+        <mc:Choice Requires="a14">
           <p:sp>
             <p:nvSpPr>
               <p:cNvPr id="42" name="Content Placeholder 2">
@@ -21493,7 +21501,7 @@
             </p:txBody>
           </p:sp>
         </mc:Choice>
-        <mc:Fallback>
+        <mc:Fallback xmlns="">
           <p:sp>
             <p:nvSpPr>
               <p:cNvPr id="42" name="Content Placeholder 2">
@@ -25669,8 +25677,8 @@
           <a:chExt cx="0" cy="0"/>
         </a:xfrm>
       </p:grpSpPr>
-      <mc:AlternateContent xmlns:mc="http://schemas.openxmlformats.org/markup-compatibility/2006">
-        <mc:Choice xmlns:a14="http://schemas.microsoft.com/office/drawing/2010/main" Requires="a14">
+      <mc:AlternateContent xmlns:mc="http://schemas.openxmlformats.org/markup-compatibility/2006" xmlns:a14="http://schemas.microsoft.com/office/drawing/2010/main">
+        <mc:Choice Requires="a14">
           <p:sp>
             <p:nvSpPr>
               <p:cNvPr id="3" name="Content Placeholder 2">
@@ -25940,7 +25948,7 @@
             </p:txBody>
           </p:sp>
         </mc:Choice>
-        <mc:Fallback>
+        <mc:Fallback xmlns="">
           <p:sp>
             <p:nvSpPr>
               <p:cNvPr id="3" name="Content Placeholder 2">
@@ -26953,8 +26961,8 @@
           <a:chExt cx="0" cy="0"/>
         </a:xfrm>
       </p:grpSpPr>
-      <mc:AlternateContent xmlns:mc="http://schemas.openxmlformats.org/markup-compatibility/2006">
-        <mc:Choice xmlns:a14="http://schemas.microsoft.com/office/drawing/2010/main" Requires="a14">
+      <mc:AlternateContent xmlns:mc="http://schemas.openxmlformats.org/markup-compatibility/2006" xmlns:a14="http://schemas.microsoft.com/office/drawing/2010/main">
+        <mc:Choice Requires="a14">
           <p:sp>
             <p:nvSpPr>
               <p:cNvPr id="3" name="Content Placeholder 2">
@@ -27280,7 +27288,7 @@
             </p:txBody>
           </p:sp>
         </mc:Choice>
-        <mc:Fallback>
+        <mc:Fallback xmlns="">
           <p:sp>
             <p:nvSpPr>
               <p:cNvPr id="3" name="Content Placeholder 2">
@@ -27804,8 +27812,8 @@
           <a:chExt cx="0" cy="0"/>
         </a:xfrm>
       </p:grpSpPr>
-      <mc:AlternateContent xmlns:mc="http://schemas.openxmlformats.org/markup-compatibility/2006">
-        <mc:Choice xmlns:a14="http://schemas.microsoft.com/office/drawing/2010/main" Requires="a14">
+      <mc:AlternateContent xmlns:mc="http://schemas.openxmlformats.org/markup-compatibility/2006" xmlns:a14="http://schemas.microsoft.com/office/drawing/2010/main">
+        <mc:Choice Requires="a14">
           <p:sp>
             <p:nvSpPr>
               <p:cNvPr id="3" name="Content Placeholder 2">
@@ -28104,7 +28112,7 @@
             </p:txBody>
           </p:sp>
         </mc:Choice>
-        <mc:Fallback>
+        <mc:Fallback xmlns="">
           <p:sp>
             <p:nvSpPr>
               <p:cNvPr id="3" name="Content Placeholder 2">
@@ -30589,8 +30597,8 @@
           <a:chExt cx="0" cy="0"/>
         </a:xfrm>
       </p:grpSpPr>
-      <mc:AlternateContent xmlns:mc="http://schemas.openxmlformats.org/markup-compatibility/2006">
-        <mc:Choice xmlns:a14="http://schemas.microsoft.com/office/drawing/2010/main" Requires="a14">
+      <mc:AlternateContent xmlns:mc="http://schemas.openxmlformats.org/markup-compatibility/2006" xmlns:a14="http://schemas.microsoft.com/office/drawing/2010/main">
+        <mc:Choice Requires="a14">
           <p:sp>
             <p:nvSpPr>
               <p:cNvPr id="3" name="Content Placeholder 2">
@@ -31013,7 +31021,7 @@
             </p:txBody>
           </p:sp>
         </mc:Choice>
-        <mc:Fallback>
+        <mc:Fallback xmlns="">
           <p:sp>
             <p:nvSpPr>
               <p:cNvPr id="3" name="Content Placeholder 2">

</xml_diff>

<commit_message>
Updated intro and hashing slides
</commit_message>
<xml_diff>
--- a/slides/1_Introduction.pptx
+++ b/slides/1_Introduction.pptx
@@ -34502,14 +34502,14 @@
               <a:t>p-value is the probability that the evidence this extreme or greater </a:t>
             </a:r>
             <a:r>
-              <a:rPr lang="en-US" b="1">
+              <a:rPr lang="en-US" b="1" dirty="0" err="1">
                 <a:solidFill>
                   <a:schemeClr val="tx1">
                     <a:lumMod val="50000"/>
                   </a:schemeClr>
                 </a:solidFill>
               </a:rPr>
-              <a:t>arrises </a:t>
+              <a:t>arrises</a:t>
             </a:r>
             <a:r>
               <a:rPr lang="en-US" b="1" dirty="0">
@@ -34519,7 +34519,7 @@
                   </a:schemeClr>
                 </a:solidFill>
               </a:rPr>
-              <a:t>simply from random variation (random sampling) of the null distribution</a:t>
+              <a:t> simply from random variation (random sampling) of the null distribution</a:t>
             </a:r>
           </a:p>
         </p:txBody>
@@ -34880,7 +34880,7 @@
                   </a:schemeClr>
                 </a:solidFill>
               </a:rPr>
-              <a:t>order statistic,</a:t>
+              <a:t>order statistic;</a:t>
             </a:r>
             <a:r>
               <a:rPr lang="en-US" dirty="0">

</xml_diff>

<commit_message>
Added slide on hashing vector valaued keys
</commit_message>
<xml_diff>
--- a/slides/1_Introduction.pptx
+++ b/slides/1_Introduction.pptx
@@ -5,7 +5,7 @@
     <p:sldMasterId id="2147483648" r:id="rId1"/>
   </p:sldMasterIdLst>
   <p:notesMasterIdLst>
-    <p:notesMasterId r:id="rId71"/>
+    <p:notesMasterId r:id="rId72"/>
   </p:notesMasterIdLst>
   <p:sldIdLst>
     <p:sldId id="256" r:id="rId2"/>
@@ -50,33 +50,34 @@
     <p:sldId id="728" r:id="rId41"/>
     <p:sldId id="377" r:id="rId42"/>
     <p:sldId id="729" r:id="rId43"/>
-    <p:sldId id="378" r:id="rId44"/>
-    <p:sldId id="379" r:id="rId45"/>
-    <p:sldId id="380" r:id="rId46"/>
-    <p:sldId id="715" r:id="rId47"/>
-    <p:sldId id="362" r:id="rId48"/>
-    <p:sldId id="364" r:id="rId49"/>
-    <p:sldId id="366" r:id="rId50"/>
-    <p:sldId id="365" r:id="rId51"/>
-    <p:sldId id="726" r:id="rId52"/>
-    <p:sldId id="363" r:id="rId53"/>
-    <p:sldId id="372" r:id="rId54"/>
-    <p:sldId id="716" r:id="rId55"/>
-    <p:sldId id="361" r:id="rId56"/>
-    <p:sldId id="368" r:id="rId57"/>
-    <p:sldId id="390" r:id="rId58"/>
-    <p:sldId id="391" r:id="rId59"/>
-    <p:sldId id="392" r:id="rId60"/>
-    <p:sldId id="393" r:id="rId61"/>
-    <p:sldId id="394" r:id="rId62"/>
-    <p:sldId id="717" r:id="rId63"/>
-    <p:sldId id="371" r:id="rId64"/>
-    <p:sldId id="369" r:id="rId65"/>
-    <p:sldId id="373" r:id="rId66"/>
-    <p:sldId id="399" r:id="rId67"/>
-    <p:sldId id="370" r:id="rId68"/>
-    <p:sldId id="398" r:id="rId69"/>
-    <p:sldId id="384" r:id="rId70"/>
+    <p:sldId id="730" r:id="rId44"/>
+    <p:sldId id="378" r:id="rId45"/>
+    <p:sldId id="379" r:id="rId46"/>
+    <p:sldId id="380" r:id="rId47"/>
+    <p:sldId id="715" r:id="rId48"/>
+    <p:sldId id="362" r:id="rId49"/>
+    <p:sldId id="364" r:id="rId50"/>
+    <p:sldId id="366" r:id="rId51"/>
+    <p:sldId id="365" r:id="rId52"/>
+    <p:sldId id="726" r:id="rId53"/>
+    <p:sldId id="363" r:id="rId54"/>
+    <p:sldId id="372" r:id="rId55"/>
+    <p:sldId id="716" r:id="rId56"/>
+    <p:sldId id="361" r:id="rId57"/>
+    <p:sldId id="368" r:id="rId58"/>
+    <p:sldId id="390" r:id="rId59"/>
+    <p:sldId id="391" r:id="rId60"/>
+    <p:sldId id="392" r:id="rId61"/>
+    <p:sldId id="393" r:id="rId62"/>
+    <p:sldId id="394" r:id="rId63"/>
+    <p:sldId id="717" r:id="rId64"/>
+    <p:sldId id="371" r:id="rId65"/>
+    <p:sldId id="369" r:id="rId66"/>
+    <p:sldId id="373" r:id="rId67"/>
+    <p:sldId id="399" r:id="rId68"/>
+    <p:sldId id="370" r:id="rId69"/>
+    <p:sldId id="398" r:id="rId70"/>
+    <p:sldId id="384" r:id="rId71"/>
   </p:sldIdLst>
   <p:sldSz cx="12192000" cy="6858000"/>
   <p:notesSz cx="6858000" cy="9144000"/>
@@ -265,7 +266,7 @@
           <a:p>
             <a:fld id="{2F3ABF1A-8818-4472-8518-E71DC7B5D2F7}" type="datetimeFigureOut">
               <a:rPr lang="en-US" smtClean="0"/>
-              <a:t>8/20/2025</a:t>
+              <a:t>8/21/2025</a:t>
             </a:fld>
             <a:endParaRPr lang="en-US"/>
           </a:p>
@@ -597,7 +598,7 @@
           <a:p>
             <a:fld id="{F33E01E3-981B-4CB5-81ED-65C622C255CB}" type="slidenum">
               <a:rPr lang="en-US" smtClean="0"/>
-              <a:t>49</a:t>
+              <a:t>50</a:t>
             </a:fld>
             <a:endParaRPr lang="en-US"/>
           </a:p>
@@ -684,7 +685,7 @@
           <a:p>
             <a:fld id="{F33E01E3-981B-4CB5-81ED-65C622C255CB}" type="slidenum">
               <a:rPr lang="en-US" smtClean="0"/>
-              <a:t>63</a:t>
+              <a:t>64</a:t>
             </a:fld>
             <a:endParaRPr lang="en-US"/>
           </a:p>
@@ -771,7 +772,7 @@
           <a:p>
             <a:fld id="{F33E01E3-981B-4CB5-81ED-65C622C255CB}" type="slidenum">
               <a:rPr lang="en-US" smtClean="0"/>
-              <a:t>64</a:t>
+              <a:t>65</a:t>
             </a:fld>
             <a:endParaRPr lang="en-US"/>
           </a:p>
@@ -858,7 +859,7 @@
           <a:p>
             <a:fld id="{F33E01E3-981B-4CB5-81ED-65C622C255CB}" type="slidenum">
               <a:rPr lang="en-US" smtClean="0"/>
-              <a:t>65</a:t>
+              <a:t>66</a:t>
             </a:fld>
             <a:endParaRPr lang="en-US"/>
           </a:p>
@@ -945,7 +946,7 @@
           <a:p>
             <a:fld id="{F33E01E3-981B-4CB5-81ED-65C622C255CB}" type="slidenum">
               <a:rPr lang="en-US" smtClean="0"/>
-              <a:t>66</a:t>
+              <a:t>67</a:t>
             </a:fld>
             <a:endParaRPr lang="en-US"/>
           </a:p>
@@ -1032,7 +1033,7 @@
           <a:p>
             <a:fld id="{F33E01E3-981B-4CB5-81ED-65C622C255CB}" type="slidenum">
               <a:rPr lang="en-US" smtClean="0"/>
-              <a:t>67</a:t>
+              <a:t>68</a:t>
             </a:fld>
             <a:endParaRPr lang="en-US"/>
           </a:p>
@@ -1119,7 +1120,7 @@
           <a:p>
             <a:fld id="{F33E01E3-981B-4CB5-81ED-65C622C255CB}" type="slidenum">
               <a:rPr lang="en-US" smtClean="0"/>
-              <a:t>68</a:t>
+              <a:t>69</a:t>
             </a:fld>
             <a:endParaRPr lang="en-US"/>
           </a:p>
@@ -1285,7 +1286,7 @@
           <a:p>
             <a:fld id="{6E4A31BF-7266-4BEB-918B-ADC21C630A6F}" type="datetimeFigureOut">
               <a:rPr lang="en-US" smtClean="0"/>
-              <a:t>8/20/2025</a:t>
+              <a:t>8/21/2025</a:t>
             </a:fld>
             <a:endParaRPr lang="en-US"/>
           </a:p>
@@ -1483,7 +1484,7 @@
           <a:p>
             <a:fld id="{6E4A31BF-7266-4BEB-918B-ADC21C630A6F}" type="datetimeFigureOut">
               <a:rPr lang="en-US" smtClean="0"/>
-              <a:t>8/20/2025</a:t>
+              <a:t>8/21/2025</a:t>
             </a:fld>
             <a:endParaRPr lang="en-US"/>
           </a:p>
@@ -1691,7 +1692,7 @@
           <a:p>
             <a:fld id="{6E4A31BF-7266-4BEB-918B-ADC21C630A6F}" type="datetimeFigureOut">
               <a:rPr lang="en-US" smtClean="0"/>
-              <a:t>8/20/2025</a:t>
+              <a:t>8/21/2025</a:t>
             </a:fld>
             <a:endParaRPr lang="en-US"/>
           </a:p>
@@ -1889,7 +1890,7 @@
           <a:p>
             <a:fld id="{6E4A31BF-7266-4BEB-918B-ADC21C630A6F}" type="datetimeFigureOut">
               <a:rPr lang="en-US" smtClean="0"/>
-              <a:t>8/20/2025</a:t>
+              <a:t>8/21/2025</a:t>
             </a:fld>
             <a:endParaRPr lang="en-US"/>
           </a:p>
@@ -2164,7 +2165,7 @@
           <a:p>
             <a:fld id="{6E4A31BF-7266-4BEB-918B-ADC21C630A6F}" type="datetimeFigureOut">
               <a:rPr lang="en-US" smtClean="0"/>
-              <a:t>8/20/2025</a:t>
+              <a:t>8/21/2025</a:t>
             </a:fld>
             <a:endParaRPr lang="en-US"/>
           </a:p>
@@ -2429,7 +2430,7 @@
           <a:p>
             <a:fld id="{6E4A31BF-7266-4BEB-918B-ADC21C630A6F}" type="datetimeFigureOut">
               <a:rPr lang="en-US" smtClean="0"/>
-              <a:t>8/20/2025</a:t>
+              <a:t>8/21/2025</a:t>
             </a:fld>
             <a:endParaRPr lang="en-US"/>
           </a:p>
@@ -2841,7 +2842,7 @@
           <a:p>
             <a:fld id="{6E4A31BF-7266-4BEB-918B-ADC21C630A6F}" type="datetimeFigureOut">
               <a:rPr lang="en-US" smtClean="0"/>
-              <a:t>8/20/2025</a:t>
+              <a:t>8/21/2025</a:t>
             </a:fld>
             <a:endParaRPr lang="en-US"/>
           </a:p>
@@ -2982,7 +2983,7 @@
           <a:p>
             <a:fld id="{6E4A31BF-7266-4BEB-918B-ADC21C630A6F}" type="datetimeFigureOut">
               <a:rPr lang="en-US" smtClean="0"/>
-              <a:t>8/20/2025</a:t>
+              <a:t>8/21/2025</a:t>
             </a:fld>
             <a:endParaRPr lang="en-US"/>
           </a:p>
@@ -3095,7 +3096,7 @@
           <a:p>
             <a:fld id="{6E4A31BF-7266-4BEB-918B-ADC21C630A6F}" type="datetimeFigureOut">
               <a:rPr lang="en-US" smtClean="0"/>
-              <a:t>8/20/2025</a:t>
+              <a:t>8/21/2025</a:t>
             </a:fld>
             <a:endParaRPr lang="en-US"/>
           </a:p>
@@ -3406,7 +3407,7 @@
           <a:p>
             <a:fld id="{6E4A31BF-7266-4BEB-918B-ADC21C630A6F}" type="datetimeFigureOut">
               <a:rPr lang="en-US" smtClean="0"/>
-              <a:t>8/20/2025</a:t>
+              <a:t>8/21/2025</a:t>
             </a:fld>
             <a:endParaRPr lang="en-US"/>
           </a:p>
@@ -3694,7 +3695,7 @@
           <a:p>
             <a:fld id="{6E4A31BF-7266-4BEB-918B-ADC21C630A6F}" type="datetimeFigureOut">
               <a:rPr lang="en-US" smtClean="0"/>
-              <a:t>8/20/2025</a:t>
+              <a:t>8/21/2025</a:t>
             </a:fld>
             <a:endParaRPr lang="en-US"/>
           </a:p>
@@ -3935,7 +3936,7 @@
           <a:p>
             <a:fld id="{6E4A31BF-7266-4BEB-918B-ADC21C630A6F}" type="datetimeFigureOut">
               <a:rPr lang="en-US" smtClean="0"/>
-              <a:t>8/20/2025</a:t>
+              <a:t>8/21/2025</a:t>
             </a:fld>
             <a:endParaRPr lang="en-US"/>
           </a:p>
@@ -14789,8 +14790,8 @@
           <a:chExt cx="0" cy="0"/>
         </a:xfrm>
       </p:grpSpPr>
-      <mc:AlternateContent xmlns:mc="http://schemas.openxmlformats.org/markup-compatibility/2006">
-        <mc:Choice xmlns:a14="http://schemas.microsoft.com/office/drawing/2010/main" Requires="a14">
+      <mc:AlternateContent xmlns:mc="http://schemas.openxmlformats.org/markup-compatibility/2006" xmlns:a14="http://schemas.microsoft.com/office/drawing/2010/main">
+        <mc:Choice Requires="a14">
           <p:sp>
             <p:nvSpPr>
               <p:cNvPr id="3" name="Content Placeholder 2">
@@ -14955,7 +14956,7 @@
             </p:txBody>
           </p:sp>
         </mc:Choice>
-        <mc:Fallback>
+        <mc:Fallback xmlns="">
           <p:sp>
             <p:nvSpPr>
               <p:cNvPr id="3" name="Content Placeholder 2">
@@ -19387,8 +19388,8 @@
           <a:chExt cx="0" cy="0"/>
         </a:xfrm>
       </p:grpSpPr>
-      <mc:AlternateContent xmlns:mc="http://schemas.openxmlformats.org/markup-compatibility/2006" xmlns:a14="http://schemas.microsoft.com/office/drawing/2010/main">
-        <mc:Choice Requires="a14">
+      <mc:AlternateContent xmlns:mc="http://schemas.openxmlformats.org/markup-compatibility/2006">
+        <mc:Choice xmlns:a14="http://schemas.microsoft.com/office/drawing/2010/main" Requires="a14">
           <p:sp>
             <p:nvSpPr>
               <p:cNvPr id="3" name="Content Placeholder 2">
@@ -19504,7 +19505,7 @@
                         <m:t>=</m:t>
                       </m:r>
                       <m:r>
-                        <a:rPr lang="en-US" i="1">
+                        <a:rPr lang="en-US" b="0" i="1" smtClean="0">
                           <a:latin typeface="Cambria Math" panose="02040503050406030204" pitchFamily="18" charset="0"/>
                         </a:rPr>
                         <m:t>𝑓</m:t>
@@ -19606,7 +19607,7 @@
             </p:txBody>
           </p:sp>
         </mc:Choice>
-        <mc:Fallback xmlns="">
+        <mc:Fallback>
           <p:sp>
             <p:nvSpPr>
               <p:cNvPr id="3" name="Content Placeholder 2">
@@ -19716,294 +19717,6 @@
   <p:clrMapOvr>
     <a:masterClrMapping/>
   </p:clrMapOvr>
-  <p:timing>
-    <p:tnLst>
-      <p:par>
-        <p:cTn id="1" dur="indefinite" restart="never" nodeType="tmRoot">
-          <p:childTnLst>
-            <p:seq concurrent="1" nextAc="seek">
-              <p:cTn id="2" dur="indefinite" nodeType="mainSeq">
-                <p:childTnLst>
-                  <p:par>
-                    <p:cTn id="3" fill="hold">
-                      <p:stCondLst>
-                        <p:cond delay="indefinite"/>
-                      </p:stCondLst>
-                      <p:childTnLst>
-                        <p:par>
-                          <p:cTn id="4" fill="hold">
-                            <p:stCondLst>
-                              <p:cond delay="0"/>
-                            </p:stCondLst>
-                            <p:childTnLst>
-                              <p:par>
-                                <p:cTn id="5" presetID="1" presetClass="entr" presetSubtype="0" fill="hold" nodeType="clickEffect">
-                                  <p:stCondLst>
-                                    <p:cond delay="0"/>
-                                  </p:stCondLst>
-                                  <p:childTnLst>
-                                    <p:set>
-                                      <p:cBhvr>
-                                        <p:cTn id="6" dur="1" fill="hold">
-                                          <p:stCondLst>
-                                            <p:cond delay="0"/>
-                                          </p:stCondLst>
-                                        </p:cTn>
-                                        <p:tgtEl>
-                                          <p:spTgt spid="3">
-                                            <p:txEl>
-                                              <p:pRg st="1" end="1"/>
-                                            </p:txEl>
-                                          </p:spTgt>
-                                        </p:tgtEl>
-                                        <p:attrNameLst>
-                                          <p:attrName>style.visibility</p:attrName>
-                                        </p:attrNameLst>
-                                      </p:cBhvr>
-                                      <p:to>
-                                        <p:strVal val="visible"/>
-                                      </p:to>
-                                    </p:set>
-                                  </p:childTnLst>
-                                </p:cTn>
-                              </p:par>
-                            </p:childTnLst>
-                          </p:cTn>
-                        </p:par>
-                      </p:childTnLst>
-                    </p:cTn>
-                  </p:par>
-                  <p:par>
-                    <p:cTn id="7" fill="hold">
-                      <p:stCondLst>
-                        <p:cond delay="indefinite"/>
-                      </p:stCondLst>
-                      <p:childTnLst>
-                        <p:par>
-                          <p:cTn id="8" fill="hold">
-                            <p:stCondLst>
-                              <p:cond delay="0"/>
-                            </p:stCondLst>
-                            <p:childTnLst>
-                              <p:par>
-                                <p:cTn id="9" presetID="1" presetClass="entr" presetSubtype="0" fill="hold" nodeType="clickEffect">
-                                  <p:stCondLst>
-                                    <p:cond delay="0"/>
-                                  </p:stCondLst>
-                                  <p:childTnLst>
-                                    <p:set>
-                                      <p:cBhvr>
-                                        <p:cTn id="10" dur="1" fill="hold">
-                                          <p:stCondLst>
-                                            <p:cond delay="0"/>
-                                          </p:stCondLst>
-                                        </p:cTn>
-                                        <p:tgtEl>
-                                          <p:spTgt spid="3">
-                                            <p:txEl>
-                                              <p:pRg st="2" end="2"/>
-                                            </p:txEl>
-                                          </p:spTgt>
-                                        </p:tgtEl>
-                                        <p:attrNameLst>
-                                          <p:attrName>style.visibility</p:attrName>
-                                        </p:attrNameLst>
-                                      </p:cBhvr>
-                                      <p:to>
-                                        <p:strVal val="visible"/>
-                                      </p:to>
-                                    </p:set>
-                                  </p:childTnLst>
-                                </p:cTn>
-                              </p:par>
-                              <p:par>
-                                <p:cTn id="11" presetID="1" presetClass="entr" presetSubtype="0" fill="hold" nodeType="withEffect">
-                                  <p:stCondLst>
-                                    <p:cond delay="0"/>
-                                  </p:stCondLst>
-                                  <p:childTnLst>
-                                    <p:set>
-                                      <p:cBhvr>
-                                        <p:cTn id="12" dur="1" fill="hold">
-                                          <p:stCondLst>
-                                            <p:cond delay="0"/>
-                                          </p:stCondLst>
-                                        </p:cTn>
-                                        <p:tgtEl>
-                                          <p:spTgt spid="3">
-                                            <p:txEl>
-                                              <p:pRg st="3" end="3"/>
-                                            </p:txEl>
-                                          </p:spTgt>
-                                        </p:tgtEl>
-                                        <p:attrNameLst>
-                                          <p:attrName>style.visibility</p:attrName>
-                                        </p:attrNameLst>
-                                      </p:cBhvr>
-                                      <p:to>
-                                        <p:strVal val="visible"/>
-                                      </p:to>
-                                    </p:set>
-                                  </p:childTnLst>
-                                </p:cTn>
-                              </p:par>
-                            </p:childTnLst>
-                          </p:cTn>
-                        </p:par>
-                      </p:childTnLst>
-                    </p:cTn>
-                  </p:par>
-                  <p:par>
-                    <p:cTn id="13" fill="hold">
-                      <p:stCondLst>
-                        <p:cond delay="indefinite"/>
-                      </p:stCondLst>
-                      <p:childTnLst>
-                        <p:par>
-                          <p:cTn id="14" fill="hold">
-                            <p:stCondLst>
-                              <p:cond delay="0"/>
-                            </p:stCondLst>
-                            <p:childTnLst>
-                              <p:par>
-                                <p:cTn id="15" presetID="1" presetClass="entr" presetSubtype="0" fill="hold" nodeType="clickEffect">
-                                  <p:stCondLst>
-                                    <p:cond delay="0"/>
-                                  </p:stCondLst>
-                                  <p:childTnLst>
-                                    <p:set>
-                                      <p:cBhvr>
-                                        <p:cTn id="16" dur="1" fill="hold">
-                                          <p:stCondLst>
-                                            <p:cond delay="0"/>
-                                          </p:stCondLst>
-                                        </p:cTn>
-                                        <p:tgtEl>
-                                          <p:spTgt spid="3">
-                                            <p:txEl>
-                                              <p:pRg st="4" end="4"/>
-                                            </p:txEl>
-                                          </p:spTgt>
-                                        </p:tgtEl>
-                                        <p:attrNameLst>
-                                          <p:attrName>style.visibility</p:attrName>
-                                        </p:attrNameLst>
-                                      </p:cBhvr>
-                                      <p:to>
-                                        <p:strVal val="visible"/>
-                                      </p:to>
-                                    </p:set>
-                                  </p:childTnLst>
-                                </p:cTn>
-                              </p:par>
-                            </p:childTnLst>
-                          </p:cTn>
-                        </p:par>
-                      </p:childTnLst>
-                    </p:cTn>
-                  </p:par>
-                  <p:par>
-                    <p:cTn id="17" fill="hold">
-                      <p:stCondLst>
-                        <p:cond delay="indefinite"/>
-                      </p:stCondLst>
-                      <p:childTnLst>
-                        <p:par>
-                          <p:cTn id="18" fill="hold">
-                            <p:stCondLst>
-                              <p:cond delay="0"/>
-                            </p:stCondLst>
-                            <p:childTnLst>
-                              <p:par>
-                                <p:cTn id="19" presetID="1" presetClass="entr" presetSubtype="0" fill="hold" nodeType="clickEffect">
-                                  <p:stCondLst>
-                                    <p:cond delay="0"/>
-                                  </p:stCondLst>
-                                  <p:childTnLst>
-                                    <p:set>
-                                      <p:cBhvr>
-                                        <p:cTn id="20" dur="1" fill="hold">
-                                          <p:stCondLst>
-                                            <p:cond delay="0"/>
-                                          </p:stCondLst>
-                                        </p:cTn>
-                                        <p:tgtEl>
-                                          <p:spTgt spid="3">
-                                            <p:txEl>
-                                              <p:pRg st="5" end="5"/>
-                                            </p:txEl>
-                                          </p:spTgt>
-                                        </p:tgtEl>
-                                        <p:attrNameLst>
-                                          <p:attrName>style.visibility</p:attrName>
-                                        </p:attrNameLst>
-                                      </p:cBhvr>
-                                      <p:to>
-                                        <p:strVal val="visible"/>
-                                      </p:to>
-                                    </p:set>
-                                  </p:childTnLst>
-                                </p:cTn>
-                              </p:par>
-                              <p:par>
-                                <p:cTn id="21" presetID="1" presetClass="entr" presetSubtype="0" fill="hold" nodeType="withEffect">
-                                  <p:stCondLst>
-                                    <p:cond delay="0"/>
-                                  </p:stCondLst>
-                                  <p:childTnLst>
-                                    <p:set>
-                                      <p:cBhvr>
-                                        <p:cTn id="22" dur="1" fill="hold">
-                                          <p:stCondLst>
-                                            <p:cond delay="0"/>
-                                          </p:stCondLst>
-                                        </p:cTn>
-                                        <p:tgtEl>
-                                          <p:spTgt spid="3">
-                                            <p:txEl>
-                                              <p:pRg st="7" end="7"/>
-                                            </p:txEl>
-                                          </p:spTgt>
-                                        </p:tgtEl>
-                                        <p:attrNameLst>
-                                          <p:attrName>style.visibility</p:attrName>
-                                        </p:attrNameLst>
-                                      </p:cBhvr>
-                                      <p:to>
-                                        <p:strVal val="visible"/>
-                                      </p:to>
-                                    </p:set>
-                                  </p:childTnLst>
-                                </p:cTn>
-                              </p:par>
-                            </p:childTnLst>
-                          </p:cTn>
-                        </p:par>
-                      </p:childTnLst>
-                    </p:cTn>
-                  </p:par>
-                </p:childTnLst>
-              </p:cTn>
-              <p:prevCondLst>
-                <p:cond evt="onPrev" delay="0">
-                  <p:tgtEl>
-                    <p:sldTgt/>
-                  </p:tgtEl>
-                </p:cond>
-              </p:prevCondLst>
-              <p:nextCondLst>
-                <p:cond evt="onNext" delay="0">
-                  <p:tgtEl>
-                    <p:sldTgt/>
-                  </p:tgtEl>
-                </p:cond>
-              </p:nextCondLst>
-            </p:seq>
-          </p:childTnLst>
-        </p:cTn>
-      </p:par>
-    </p:tnLst>
-  </p:timing>
 </p:sld>
 </file>
 
@@ -25816,8 +25529,8 @@
           <a:chExt cx="0" cy="0"/>
         </a:xfrm>
       </p:grpSpPr>
-      <mc:AlternateContent xmlns:mc="http://schemas.openxmlformats.org/markup-compatibility/2006">
-        <mc:Choice xmlns:a14="http://schemas.microsoft.com/office/drawing/2010/main" Requires="a14">
+      <mc:AlternateContent xmlns:mc="http://schemas.openxmlformats.org/markup-compatibility/2006" xmlns:a14="http://schemas.microsoft.com/office/drawing/2010/main">
+        <mc:Choice Requires="a14">
           <p:sp>
             <p:nvSpPr>
               <p:cNvPr id="3" name="Content Placeholder 2">
@@ -26182,7 +25895,7 @@
             </p:txBody>
           </p:sp>
         </mc:Choice>
-        <mc:Fallback>
+        <mc:Fallback xmlns="">
           <p:sp>
             <p:nvSpPr>
               <p:cNvPr id="3" name="Content Placeholder 2">
@@ -27986,6 +27699,24 @@
                   </a:rPr>
                   <a:t>Universal hash function</a:t>
                 </a:r>
+                <a:r>
+                  <a:rPr lang="en-US" sz="3000" b="1" dirty="0"/>
+                  <a:t> </a:t>
+                </a:r>
+                <a:r>
+                  <a:rPr lang="en-US" sz="3000" dirty="0"/>
+                  <a:t>for integer key, </a:t>
+                </a:r>
+                <a14:m>
+                  <m:oMath xmlns:m="http://schemas.openxmlformats.org/officeDocument/2006/math">
+                    <m:r>
+                      <a:rPr lang="en-US" sz="3000" i="1">
+                        <a:latin typeface="Cambria Math" panose="02040503050406030204" pitchFamily="18" charset="0"/>
+                      </a:rPr>
+                      <m:t>𝑘</m:t>
+                    </m:r>
+                  </m:oMath>
+                </a14:m>
                 <a:endParaRPr lang="en-US" sz="3000" dirty="0"/>
               </a:p>
               <a:p>
@@ -28066,7 +27797,7 @@
                                 <a:rPr lang="en-US" sz="3000" b="0" i="1" smtClean="0">
                                   <a:latin typeface="Cambria Math" panose="02040503050406030204" pitchFamily="18" charset="0"/>
                                 </a:rPr>
-                                <m:t>𝑖</m:t>
+                                <m:t>𝑘</m:t>
                               </m:r>
                               <m:r>
                                 <a:rPr lang="en-US" sz="3000" b="0" i="1" smtClean="0">
@@ -28255,17 +27986,23 @@
                 <a14:m>
                   <m:oMath xmlns:m="http://schemas.openxmlformats.org/officeDocument/2006/math">
                     <m:r>
-                      <a:rPr lang="en-US" sz="2600" b="0" i="1" smtClean="0"/>
+                      <a:rPr lang="en-US" sz="2600" b="0" i="1" smtClean="0">
+                        <a:latin typeface="Cambria Math" panose="02040503050406030204" pitchFamily="18" charset="0"/>
+                      </a:rPr>
                       <m:t>𝑚</m:t>
                     </m:r>
                     <m:r>
-                      <a:rPr lang="en-US" sz="2600" b="0" i="1" smtClean="0"/>
+                      <a:rPr lang="en-US" sz="2600" b="0" i="1" smtClean="0">
+                        <a:latin typeface="Cambria Math" panose="02040503050406030204" pitchFamily="18" charset="0"/>
+                      </a:rPr>
                       <m:t>=</m:t>
                     </m:r>
                     <m:sSup>
                       <m:sSupPr>
                         <m:ctrlPr>
-                          <a:rPr lang="en-US" sz="2600" b="0" i="1" smtClean="0"/>
+                          <a:rPr lang="en-US" sz="2600" b="0" i="1" smtClean="0">
+                            <a:latin typeface="Cambria Math" panose="02040503050406030204" pitchFamily="18" charset="0"/>
+                          </a:rPr>
                         </m:ctrlPr>
                       </m:sSupPr>
                       <m:e>
@@ -28279,6 +28016,7 @@
                       <m:sup>
                         <m:r>
                           <a:rPr lang="en-US" sz="2600" b="0" i="1" smtClean="0">
+                            <a:latin typeface="Cambria Math" panose="02040503050406030204" pitchFamily="18" charset="0"/>
                             <a:ea typeface="Cambria Math" panose="02040503050406030204" pitchFamily="18" charset="0"/>
                           </a:rPr>
                           <m:t>𝛼</m:t>
@@ -28410,7 +28148,13 @@
   <p:cSld>
     <p:spTree>
       <p:nvGrpSpPr>
-        <p:cNvPr id="1" name=""/>
+        <p:cNvPr id="1" name="">
+          <a:extLst>
+            <a:ext uri="{FF2B5EF4-FFF2-40B4-BE49-F238E27FC236}">
+              <a16:creationId xmlns:a16="http://schemas.microsoft.com/office/drawing/2014/main" id="{4E45231A-D19F-C328-7E94-6A71FE891064}"/>
+            </a:ext>
+          </a:extLst>
+        </p:cNvPr>
         <p:cNvGrpSpPr/>
         <p:nvPr/>
       </p:nvGrpSpPr>
@@ -28424,6 +28168,1055 @@
       </p:grpSpPr>
       <mc:AlternateContent xmlns:mc="http://schemas.openxmlformats.org/markup-compatibility/2006">
         <mc:Choice xmlns:a14="http://schemas.microsoft.com/office/drawing/2010/main" Requires="a14">
+          <p:sp>
+            <p:nvSpPr>
+              <p:cNvPr id="3" name="Content Placeholder 2">
+                <a:extLst>
+                  <a:ext uri="{FF2B5EF4-FFF2-40B4-BE49-F238E27FC236}">
+                    <a16:creationId xmlns:a16="http://schemas.microsoft.com/office/drawing/2014/main" id="{D104C4A7-4785-6851-D918-50EAE50F970D}"/>
+                  </a:ext>
+                </a:extLst>
+              </p:cNvPr>
+              <p:cNvSpPr>
+                <a:spLocks noGrp="1"/>
+              </p:cNvSpPr>
+              <p:nvPr>
+                <p:ph idx="1"/>
+              </p:nvPr>
+            </p:nvSpPr>
+            <p:spPr>
+              <a:xfrm>
+                <a:off x="838200" y="1201783"/>
+                <a:ext cx="10515600" cy="5496849"/>
+              </a:xfrm>
+            </p:spPr>
+            <p:txBody>
+              <a:bodyPr>
+                <a:normAutofit/>
+              </a:bodyPr>
+              <a:lstStyle/>
+              <a:p>
+                <a:pPr marL="0" indent="0">
+                  <a:buNone/>
+                </a:pPr>
+                <a:r>
+                  <a:rPr lang="en-US" sz="3200" dirty="0"/>
+                  <a:t>Commonly used </a:t>
+                </a:r>
+                <a:r>
+                  <a:rPr lang="en-US" sz="3200" b="1" dirty="0"/>
+                  <a:t>hash functions</a:t>
+                </a:r>
+                <a:r>
+                  <a:rPr lang="en-US" sz="3200" dirty="0"/>
+                  <a:t>  </a:t>
+                </a:r>
+                <a:endParaRPr lang="en-US" sz="3000" dirty="0"/>
+              </a:p>
+              <a:p>
+                <a:r>
+                  <a:rPr lang="en-US" sz="3000" dirty="0">
+                    <a:hlinkClick r:id="rId2"/>
+                  </a:rPr>
+                  <a:t>Universal hash function</a:t>
+                </a:r>
+                <a:r>
+                  <a:rPr lang="en-US" sz="3000" dirty="0"/>
+                  <a:t> is applied to a </a:t>
+                </a:r>
+                <a:r>
+                  <a:rPr lang="en-US" sz="3000" b="1" dirty="0"/>
+                  <a:t>scalar key, </a:t>
+                </a:r>
+                <a14:m>
+                  <m:oMath xmlns:m="http://schemas.openxmlformats.org/officeDocument/2006/math">
+                    <m:r>
+                      <a:rPr lang="en-US" sz="3000" b="1" i="1">
+                        <a:latin typeface="Cambria Math" panose="02040503050406030204" pitchFamily="18" charset="0"/>
+                      </a:rPr>
+                      <m:t>𝒊</m:t>
+                    </m:r>
+                  </m:oMath>
+                </a14:m>
+                <a:r>
+                  <a:rPr lang="en-US" sz="3000" b="1" dirty="0"/>
+                  <a:t> </a:t>
+                </a:r>
+              </a:p>
+              <a:p>
+                <a:pPr marL="0" indent="0">
+                  <a:buNone/>
+                </a:pPr>
+                <a14:m>
+                  <m:oMathPara xmlns:m="http://schemas.openxmlformats.org/officeDocument/2006/math">
+                    <m:oMathParaPr>
+                      <m:jc m:val="centerGroup"/>
+                    </m:oMathParaPr>
+                    <m:oMath xmlns:m="http://schemas.openxmlformats.org/officeDocument/2006/math">
+                      <m:r>
+                        <m:rPr>
+                          <m:sty m:val="p"/>
+                        </m:rPr>
+                        <a:rPr lang="en-US" sz="3000" i="1" smtClean="0">
+                          <a:latin typeface="Cambria Math" panose="02040503050406030204" pitchFamily="18" charset="0"/>
+                        </a:rPr>
+                        <m:t>f</m:t>
+                      </m:r>
+                      <m:d>
+                        <m:dPr>
+                          <m:ctrlPr>
+                            <a:rPr lang="en-US" sz="3000" i="1">
+                              <a:latin typeface="Cambria Math" panose="02040503050406030204" pitchFamily="18" charset="0"/>
+                            </a:rPr>
+                          </m:ctrlPr>
+                        </m:dPr>
+                        <m:e>
+                          <m:r>
+                            <a:rPr lang="en-US" sz="3000" i="1" smtClean="0">
+                              <a:latin typeface="Cambria Math" panose="02040503050406030204" pitchFamily="18" charset="0"/>
+                            </a:rPr>
+                            <m:t>𝑘</m:t>
+                          </m:r>
+                        </m:e>
+                      </m:d>
+                      <m:r>
+                        <a:rPr lang="en-US" sz="3000" i="1" smtClean="0">
+                          <a:latin typeface="Cambria Math" panose="02040503050406030204" pitchFamily="18" charset="0"/>
+                        </a:rPr>
+                        <m:t>=</m:t>
+                      </m:r>
+                      <m:d>
+                        <m:dPr>
+                          <m:begChr m:val="["/>
+                          <m:endChr m:val="]"/>
+                          <m:ctrlPr>
+                            <a:rPr lang="en-US" sz="3000" i="1" smtClean="0">
+                              <a:latin typeface="Cambria Math" panose="02040503050406030204" pitchFamily="18" charset="0"/>
+                            </a:rPr>
+                          </m:ctrlPr>
+                        </m:dPr>
+                        <m:e>
+                          <m:d>
+                            <m:dPr>
+                              <m:ctrlPr>
+                                <a:rPr lang="en-US" sz="3000" i="1" smtClean="0">
+                                  <a:latin typeface="Cambria Math" panose="02040503050406030204" pitchFamily="18" charset="0"/>
+                                </a:rPr>
+                              </m:ctrlPr>
+                            </m:dPr>
+                            <m:e>
+                              <m:r>
+                                <a:rPr lang="en-US" sz="3000" b="0" i="1" smtClean="0">
+                                  <a:latin typeface="Cambria Math" panose="02040503050406030204" pitchFamily="18" charset="0"/>
+                                </a:rPr>
+                                <m:t>𝑎</m:t>
+                              </m:r>
+                              <m:r>
+                                <a:rPr lang="en-US" sz="3000" b="0" i="1" smtClean="0">
+                                  <a:latin typeface="Cambria Math" panose="02040503050406030204" pitchFamily="18" charset="0"/>
+                                </a:rPr>
+                                <m:t> </m:t>
+                              </m:r>
+                              <m:r>
+                                <a:rPr lang="en-US" sz="3000" b="0" i="1" smtClean="0">
+                                  <a:latin typeface="Cambria Math" panose="02040503050406030204" pitchFamily="18" charset="0"/>
+                                </a:rPr>
+                                <m:t>𝑖</m:t>
+                              </m:r>
+                              <m:r>
+                                <a:rPr lang="en-US" sz="3000" b="0" i="1" smtClean="0">
+                                  <a:latin typeface="Cambria Math" panose="02040503050406030204" pitchFamily="18" charset="0"/>
+                                </a:rPr>
+                                <m:t>+</m:t>
+                              </m:r>
+                              <m:r>
+                                <a:rPr lang="en-US" sz="3000" b="0" i="1" smtClean="0">
+                                  <a:latin typeface="Cambria Math" panose="02040503050406030204" pitchFamily="18" charset="0"/>
+                                </a:rPr>
+                                <m:t>𝑏</m:t>
+                              </m:r>
+                            </m:e>
+                          </m:d>
+                          <m:r>
+                            <a:rPr lang="en-US" sz="3000" b="0" i="1" smtClean="0">
+                              <a:latin typeface="Cambria Math" panose="02040503050406030204" pitchFamily="18" charset="0"/>
+                            </a:rPr>
+                            <m:t> </m:t>
+                          </m:r>
+                          <m:r>
+                            <a:rPr lang="en-US" sz="3000" b="0" i="1" smtClean="0">
+                              <a:latin typeface="Cambria Math" panose="02040503050406030204" pitchFamily="18" charset="0"/>
+                            </a:rPr>
+                            <m:t>𝑚𝑜𝑑</m:t>
+                          </m:r>
+                          <m:r>
+                            <a:rPr lang="en-US" sz="3000" b="0" i="1" smtClean="0">
+                              <a:latin typeface="Cambria Math" panose="02040503050406030204" pitchFamily="18" charset="0"/>
+                            </a:rPr>
+                            <m:t> </m:t>
+                          </m:r>
+                          <m:r>
+                            <a:rPr lang="en-US" sz="3000" b="0" i="1" smtClean="0">
+                              <a:latin typeface="Cambria Math" panose="02040503050406030204" pitchFamily="18" charset="0"/>
+                            </a:rPr>
+                            <m:t>𝑝</m:t>
+                          </m:r>
+                        </m:e>
+                      </m:d>
+                      <m:r>
+                        <a:rPr lang="en-US" sz="3000" i="1" smtClean="0">
+                          <a:latin typeface="Cambria Math" panose="02040503050406030204" pitchFamily="18" charset="0"/>
+                        </a:rPr>
+                        <m:t>𝑚𝑜𝑑</m:t>
+                      </m:r>
+                      <m:r>
+                        <a:rPr lang="en-US" sz="3000" i="1" smtClean="0">
+                          <a:latin typeface="Cambria Math" panose="02040503050406030204" pitchFamily="18" charset="0"/>
+                        </a:rPr>
+                        <m:t> </m:t>
+                      </m:r>
+                      <m:r>
+                        <a:rPr lang="en-US" sz="3000" b="0" i="1" smtClean="0">
+                          <a:latin typeface="Cambria Math" panose="02040503050406030204" pitchFamily="18" charset="0"/>
+                        </a:rPr>
+                        <m:t>𝑚</m:t>
+                      </m:r>
+                      <m:r>
+                        <a:rPr lang="en-US" sz="3000" i="1" smtClean="0">
+                          <a:latin typeface="Cambria Math" panose="02040503050406030204" pitchFamily="18" charset="0"/>
+                        </a:rPr>
+                        <m:t> </m:t>
+                      </m:r>
+                    </m:oMath>
+                  </m:oMathPara>
+                </a14:m>
+                <a:endParaRPr lang="en-US" sz="3000" dirty="0"/>
+              </a:p>
+              <a:p>
+                <a:r>
+                  <a:rPr lang="en-US" sz="3000" dirty="0"/>
+                  <a:t>How do we handle vector (multi) valued keys?</a:t>
+                </a:r>
+              </a:p>
+              <a:p>
+                <a:pPr marL="0" indent="0">
+                  <a:buNone/>
+                </a:pPr>
+                <a14:m>
+                  <m:oMathPara xmlns:m="http://schemas.openxmlformats.org/officeDocument/2006/math">
+                    <m:oMathParaPr>
+                      <m:jc m:val="centerGroup"/>
+                    </m:oMathParaPr>
+                    <m:oMath xmlns:m="http://schemas.openxmlformats.org/officeDocument/2006/math">
+                      <m:r>
+                        <m:rPr>
+                          <m:sty m:val="p"/>
+                        </m:rPr>
+                        <a:rPr lang="en-US" sz="3000" b="0" i="0" smtClean="0">
+                          <a:latin typeface="Cambria Math" panose="02040503050406030204" pitchFamily="18" charset="0"/>
+                        </a:rPr>
+                        <m:t>K</m:t>
+                      </m:r>
+                      <m:r>
+                        <a:rPr lang="en-US" sz="3000" b="0" i="0" smtClean="0">
+                          <a:latin typeface="Cambria Math" panose="02040503050406030204" pitchFamily="18" charset="0"/>
+                        </a:rPr>
+                        <m:t>=</m:t>
+                      </m:r>
+                      <m:d>
+                        <m:dPr>
+                          <m:begChr m:val="["/>
+                          <m:endChr m:val="]"/>
+                          <m:ctrlPr>
+                            <a:rPr lang="en-US" sz="3000" b="0" i="1" smtClean="0">
+                              <a:latin typeface="Cambria Math" panose="02040503050406030204" pitchFamily="18" charset="0"/>
+                            </a:rPr>
+                          </m:ctrlPr>
+                        </m:dPr>
+                        <m:e>
+                          <m:sSub>
+                            <m:sSubPr>
+                              <m:ctrlPr>
+                                <a:rPr lang="en-US" sz="3000" b="0" i="1" smtClean="0">
+                                  <a:latin typeface="Cambria Math" panose="02040503050406030204" pitchFamily="18" charset="0"/>
+                                </a:rPr>
+                              </m:ctrlPr>
+                            </m:sSubPr>
+                            <m:e>
+                              <m:r>
+                                <a:rPr lang="en-US" sz="3000" b="0" i="1" smtClean="0">
+                                  <a:latin typeface="Cambria Math" panose="02040503050406030204" pitchFamily="18" charset="0"/>
+                                </a:rPr>
+                                <m:t>𝑘</m:t>
+                              </m:r>
+                            </m:e>
+                            <m:sub>
+                              <m:r>
+                                <a:rPr lang="en-US" sz="3000" b="0" i="1" smtClean="0">
+                                  <a:latin typeface="Cambria Math" panose="02040503050406030204" pitchFamily="18" charset="0"/>
+                                </a:rPr>
+                                <m:t>1</m:t>
+                              </m:r>
+                            </m:sub>
+                          </m:sSub>
+                          <m:r>
+                            <a:rPr lang="en-US" sz="3000" b="0" i="1" smtClean="0">
+                              <a:latin typeface="Cambria Math" panose="02040503050406030204" pitchFamily="18" charset="0"/>
+                            </a:rPr>
+                            <m:t>,</m:t>
+                          </m:r>
+                          <m:sSub>
+                            <m:sSubPr>
+                              <m:ctrlPr>
+                                <a:rPr lang="en-US" sz="3000" i="1">
+                                  <a:latin typeface="Cambria Math" panose="02040503050406030204" pitchFamily="18" charset="0"/>
+                                </a:rPr>
+                              </m:ctrlPr>
+                            </m:sSubPr>
+                            <m:e>
+                              <m:r>
+                                <a:rPr lang="en-US" sz="3000" i="1">
+                                  <a:latin typeface="Cambria Math" panose="02040503050406030204" pitchFamily="18" charset="0"/>
+                                </a:rPr>
+                                <m:t>𝑘</m:t>
+                              </m:r>
+                            </m:e>
+                            <m:sub>
+                              <m:r>
+                                <a:rPr lang="en-US" sz="3000" b="0" i="1" smtClean="0">
+                                  <a:latin typeface="Cambria Math" panose="02040503050406030204" pitchFamily="18" charset="0"/>
+                                </a:rPr>
+                                <m:t>2</m:t>
+                              </m:r>
+                            </m:sub>
+                          </m:sSub>
+                          <m:r>
+                            <a:rPr lang="en-US" sz="3000" b="0" i="1" smtClean="0">
+                              <a:latin typeface="Cambria Math" panose="02040503050406030204" pitchFamily="18" charset="0"/>
+                            </a:rPr>
+                            <m:t>,…,</m:t>
+                          </m:r>
+                          <m:sSub>
+                            <m:sSubPr>
+                              <m:ctrlPr>
+                                <a:rPr lang="en-US" sz="3000" i="1">
+                                  <a:latin typeface="Cambria Math" panose="02040503050406030204" pitchFamily="18" charset="0"/>
+                                </a:rPr>
+                              </m:ctrlPr>
+                            </m:sSubPr>
+                            <m:e>
+                              <m:r>
+                                <a:rPr lang="en-US" sz="3000" i="1">
+                                  <a:latin typeface="Cambria Math" panose="02040503050406030204" pitchFamily="18" charset="0"/>
+                                </a:rPr>
+                                <m:t>𝑘</m:t>
+                              </m:r>
+                            </m:e>
+                            <m:sub>
+                              <m:r>
+                                <a:rPr lang="en-US" sz="3000" b="0" i="1" smtClean="0">
+                                  <a:latin typeface="Cambria Math" panose="02040503050406030204" pitchFamily="18" charset="0"/>
+                                </a:rPr>
+                                <m:t>𝑛</m:t>
+                              </m:r>
+                            </m:sub>
+                          </m:sSub>
+                        </m:e>
+                      </m:d>
+                    </m:oMath>
+                  </m:oMathPara>
+                </a14:m>
+                <a:endParaRPr lang="en-US" sz="3000" dirty="0"/>
+              </a:p>
+              <a:p>
+                <a:r>
+                  <a:rPr lang="en-US" sz="3000" dirty="0"/>
+                  <a:t>We can sum the hashes, </a:t>
+                </a:r>
+                <a14:m>
+                  <m:oMath xmlns:m="http://schemas.openxmlformats.org/officeDocument/2006/math">
+                    <m:sSub>
+                      <m:sSubPr>
+                        <m:ctrlPr>
+                          <a:rPr lang="en-US" sz="3000" i="1" smtClean="0">
+                            <a:latin typeface="Cambria Math" panose="02040503050406030204" pitchFamily="18" charset="0"/>
+                          </a:rPr>
+                        </m:ctrlPr>
+                      </m:sSubPr>
+                      <m:e>
+                        <m:r>
+                          <a:rPr lang="en-US" sz="3000" b="0" i="1" smtClean="0">
+                            <a:latin typeface="Cambria Math" panose="02040503050406030204" pitchFamily="18" charset="0"/>
+                          </a:rPr>
+                          <m:t>h</m:t>
+                        </m:r>
+                      </m:e>
+                      <m:sub>
+                        <m:r>
+                          <a:rPr lang="en-US" sz="3000" b="0" i="1" smtClean="0">
+                            <a:latin typeface="Cambria Math" panose="02040503050406030204" pitchFamily="18" charset="0"/>
+                          </a:rPr>
+                          <m:t>𝑖</m:t>
+                        </m:r>
+                      </m:sub>
+                    </m:sSub>
+                    <m:d>
+                      <m:dPr>
+                        <m:ctrlPr>
+                          <a:rPr lang="en-US" sz="3000" i="1">
+                            <a:latin typeface="Cambria Math" panose="02040503050406030204" pitchFamily="18" charset="0"/>
+                          </a:rPr>
+                        </m:ctrlPr>
+                      </m:dPr>
+                      <m:e>
+                        <m:sSub>
+                          <m:sSubPr>
+                            <m:ctrlPr>
+                              <a:rPr lang="en-US" sz="3000" i="1">
+                                <a:latin typeface="Cambria Math" panose="02040503050406030204" pitchFamily="18" charset="0"/>
+                              </a:rPr>
+                            </m:ctrlPr>
+                          </m:sSubPr>
+                          <m:e>
+                            <m:r>
+                              <a:rPr lang="en-US" sz="3000" i="1">
+                                <a:latin typeface="Cambria Math" panose="02040503050406030204" pitchFamily="18" charset="0"/>
+                              </a:rPr>
+                              <m:t>𝑘</m:t>
+                            </m:r>
+                          </m:e>
+                          <m:sub>
+                            <m:r>
+                              <a:rPr lang="en-US" sz="3000" b="0" i="1" smtClean="0">
+                                <a:latin typeface="Cambria Math" panose="02040503050406030204" pitchFamily="18" charset="0"/>
+                              </a:rPr>
+                              <m:t>𝑖</m:t>
+                            </m:r>
+                          </m:sub>
+                        </m:sSub>
+                      </m:e>
+                    </m:d>
+                  </m:oMath>
+                </a14:m>
+                <a:r>
+                  <a:rPr lang="en-US" sz="3000" dirty="0"/>
+                  <a:t>, modulo the table length</a:t>
+                </a:r>
+              </a:p>
+              <a:p>
+                <a:pPr lvl="2"/>
+                <a:endParaRPr lang="en-US" sz="2200" dirty="0"/>
+              </a:p>
+              <a:p>
+                <a:pPr marL="0" indent="0">
+                  <a:buNone/>
+                </a:pPr>
+                <a14:m>
+                  <m:oMathPara xmlns:m="http://schemas.openxmlformats.org/officeDocument/2006/math">
+                    <m:oMathParaPr>
+                      <m:jc m:val="centerGroup"/>
+                    </m:oMathParaPr>
+                    <m:oMath xmlns:m="http://schemas.openxmlformats.org/officeDocument/2006/math">
+                      <m:r>
+                        <a:rPr lang="en-US" sz="3000" b="0" i="1" smtClean="0">
+                          <a:latin typeface="Cambria Math" panose="02040503050406030204" pitchFamily="18" charset="0"/>
+                        </a:rPr>
+                        <m:t>h</m:t>
+                      </m:r>
+                      <m:d>
+                        <m:dPr>
+                          <m:ctrlPr>
+                            <a:rPr lang="en-US" sz="3000" b="0" i="1" smtClean="0">
+                              <a:latin typeface="Cambria Math" panose="02040503050406030204" pitchFamily="18" charset="0"/>
+                            </a:rPr>
+                          </m:ctrlPr>
+                        </m:dPr>
+                        <m:e>
+                          <m:r>
+                            <a:rPr lang="en-US" sz="3000" b="0" i="1" smtClean="0">
+                              <a:latin typeface="Cambria Math" panose="02040503050406030204" pitchFamily="18" charset="0"/>
+                            </a:rPr>
+                            <m:t>𝐾</m:t>
+                          </m:r>
+                        </m:e>
+                      </m:d>
+                      <m:r>
+                        <a:rPr lang="en-US" sz="3000" b="0" i="1" smtClean="0">
+                          <a:latin typeface="Cambria Math" panose="02040503050406030204" pitchFamily="18" charset="0"/>
+                        </a:rPr>
+                        <m:t>=</m:t>
+                      </m:r>
+                      <m:d>
+                        <m:dPr>
+                          <m:begChr m:val="["/>
+                          <m:endChr m:val="]"/>
+                          <m:ctrlPr>
+                            <a:rPr lang="en-US" sz="3000" b="0" i="1" smtClean="0">
+                              <a:latin typeface="Cambria Math" panose="02040503050406030204" pitchFamily="18" charset="0"/>
+                            </a:rPr>
+                          </m:ctrlPr>
+                        </m:dPr>
+                        <m:e>
+                          <m:nary>
+                            <m:naryPr>
+                              <m:chr m:val="∑"/>
+                              <m:ctrlPr>
+                                <a:rPr lang="en-US" sz="3000" b="0" i="1" smtClean="0">
+                                  <a:latin typeface="Cambria Math" panose="02040503050406030204" pitchFamily="18" charset="0"/>
+                                </a:rPr>
+                              </m:ctrlPr>
+                            </m:naryPr>
+                            <m:sub>
+                              <m:r>
+                                <m:rPr>
+                                  <m:brk m:alnAt="23"/>
+                                </m:rPr>
+                                <a:rPr lang="en-US" sz="3000" b="0" i="1" smtClean="0">
+                                  <a:latin typeface="Cambria Math" panose="02040503050406030204" pitchFamily="18" charset="0"/>
+                                </a:rPr>
+                                <m:t>𝑖</m:t>
+                              </m:r>
+                              <m:r>
+                                <a:rPr lang="en-US" sz="3000" b="0" i="1" smtClean="0">
+                                  <a:latin typeface="Cambria Math" panose="02040503050406030204" pitchFamily="18" charset="0"/>
+                                </a:rPr>
+                                <m:t>=1</m:t>
+                              </m:r>
+                            </m:sub>
+                            <m:sup>
+                              <m:r>
+                                <a:rPr lang="en-US" sz="3000" b="0" i="1" smtClean="0">
+                                  <a:latin typeface="Cambria Math" panose="02040503050406030204" pitchFamily="18" charset="0"/>
+                                </a:rPr>
+                                <m:t>𝑛</m:t>
+                              </m:r>
+                            </m:sup>
+                            <m:e>
+                              <m:sSub>
+                                <m:sSubPr>
+                                  <m:ctrlPr>
+                                    <a:rPr lang="en-US" sz="3000" i="1">
+                                      <a:latin typeface="Cambria Math" panose="02040503050406030204" pitchFamily="18" charset="0"/>
+                                    </a:rPr>
+                                  </m:ctrlPr>
+                                </m:sSubPr>
+                                <m:e>
+                                  <m:r>
+                                    <a:rPr lang="en-US" sz="3000" b="0" i="1" smtClean="0">
+                                      <a:latin typeface="Cambria Math" panose="02040503050406030204" pitchFamily="18" charset="0"/>
+                                    </a:rPr>
+                                    <m:t>h</m:t>
+                                  </m:r>
+                                </m:e>
+                                <m:sub>
+                                  <m:r>
+                                    <a:rPr lang="en-US" sz="3000" i="1">
+                                      <a:latin typeface="Cambria Math" panose="02040503050406030204" pitchFamily="18" charset="0"/>
+                                    </a:rPr>
+                                    <m:t>𝑖</m:t>
+                                  </m:r>
+                                </m:sub>
+                              </m:sSub>
+                              <m:d>
+                                <m:dPr>
+                                  <m:ctrlPr>
+                                    <a:rPr lang="en-US" sz="3000" i="1">
+                                      <a:latin typeface="Cambria Math" panose="02040503050406030204" pitchFamily="18" charset="0"/>
+                                    </a:rPr>
+                                  </m:ctrlPr>
+                                </m:dPr>
+                                <m:e>
+                                  <m:sSub>
+                                    <m:sSubPr>
+                                      <m:ctrlPr>
+                                        <a:rPr lang="en-US" sz="3000" i="1">
+                                          <a:latin typeface="Cambria Math" panose="02040503050406030204" pitchFamily="18" charset="0"/>
+                                        </a:rPr>
+                                      </m:ctrlPr>
+                                    </m:sSubPr>
+                                    <m:e>
+                                      <m:r>
+                                        <a:rPr lang="en-US" sz="3000" i="1">
+                                          <a:latin typeface="Cambria Math" panose="02040503050406030204" pitchFamily="18" charset="0"/>
+                                        </a:rPr>
+                                        <m:t>𝑘</m:t>
+                                      </m:r>
+                                    </m:e>
+                                    <m:sub>
+                                      <m:r>
+                                        <a:rPr lang="en-US" sz="3000" i="1">
+                                          <a:latin typeface="Cambria Math" panose="02040503050406030204" pitchFamily="18" charset="0"/>
+                                        </a:rPr>
+                                        <m:t>𝑖</m:t>
+                                      </m:r>
+                                    </m:sub>
+                                  </m:sSub>
+                                </m:e>
+                              </m:d>
+                            </m:e>
+                          </m:nary>
+                        </m:e>
+                      </m:d>
+                      <m:r>
+                        <a:rPr lang="en-US" sz="3000" b="0" i="1" smtClean="0">
+                          <a:latin typeface="Cambria Math" panose="02040503050406030204" pitchFamily="18" charset="0"/>
+                        </a:rPr>
+                        <m:t>𝑚𝑜𝑑</m:t>
+                      </m:r>
+                      <m:r>
+                        <a:rPr lang="en-US" sz="3000" b="0" i="1" smtClean="0">
+                          <a:latin typeface="Cambria Math" panose="02040503050406030204" pitchFamily="18" charset="0"/>
+                        </a:rPr>
+                        <m:t> </m:t>
+                      </m:r>
+                      <m:r>
+                        <a:rPr lang="en-US" sz="3000" b="0" i="1" smtClean="0">
+                          <a:latin typeface="Cambria Math" panose="02040503050406030204" pitchFamily="18" charset="0"/>
+                        </a:rPr>
+                        <m:t>𝑚</m:t>
+                      </m:r>
+                    </m:oMath>
+                  </m:oMathPara>
+                </a14:m>
+                <a:endParaRPr lang="en-US" sz="3000" dirty="0"/>
+              </a:p>
+              <a:p>
+                <a:pPr marL="457200" lvl="1" indent="0">
+                  <a:buNone/>
+                </a:pPr>
+                <a:r>
+                  <a:rPr lang="en-US" sz="2600" dirty="0"/>
+                  <a:t>Where each </a:t>
+                </a:r>
+                <a14:m>
+                  <m:oMath xmlns:m="http://schemas.openxmlformats.org/officeDocument/2006/math">
+                    <m:sSub>
+                      <m:sSubPr>
+                        <m:ctrlPr>
+                          <a:rPr lang="en-US" sz="2800" i="1">
+                            <a:latin typeface="Cambria Math" panose="02040503050406030204" pitchFamily="18" charset="0"/>
+                          </a:rPr>
+                        </m:ctrlPr>
+                      </m:sSubPr>
+                      <m:e>
+                        <m:r>
+                          <a:rPr lang="en-US" sz="2800" i="1">
+                            <a:latin typeface="Cambria Math" panose="02040503050406030204" pitchFamily="18" charset="0"/>
+                          </a:rPr>
+                          <m:t>h</m:t>
+                        </m:r>
+                      </m:e>
+                      <m:sub>
+                        <m:r>
+                          <a:rPr lang="en-US" sz="2800" i="1">
+                            <a:latin typeface="Cambria Math" panose="02040503050406030204" pitchFamily="18" charset="0"/>
+                          </a:rPr>
+                          <m:t>𝑖</m:t>
+                        </m:r>
+                      </m:sub>
+                    </m:sSub>
+                    <m:d>
+                      <m:dPr>
+                        <m:ctrlPr>
+                          <a:rPr lang="en-US" sz="2800" i="1">
+                            <a:latin typeface="Cambria Math" panose="02040503050406030204" pitchFamily="18" charset="0"/>
+                          </a:rPr>
+                        </m:ctrlPr>
+                      </m:dPr>
+                      <m:e>
+                        <m:sSub>
+                          <m:sSubPr>
+                            <m:ctrlPr>
+                              <a:rPr lang="en-US" sz="2800" i="1">
+                                <a:latin typeface="Cambria Math" panose="02040503050406030204" pitchFamily="18" charset="0"/>
+                              </a:rPr>
+                            </m:ctrlPr>
+                          </m:sSubPr>
+                          <m:e>
+                            <m:r>
+                              <a:rPr lang="en-US" sz="2800" i="1">
+                                <a:latin typeface="Cambria Math" panose="02040503050406030204" pitchFamily="18" charset="0"/>
+                              </a:rPr>
+                              <m:t>𝑘</m:t>
+                            </m:r>
+                          </m:e>
+                          <m:sub>
+                            <m:r>
+                              <a:rPr lang="en-US" sz="2800" i="1">
+                                <a:latin typeface="Cambria Math" panose="02040503050406030204" pitchFamily="18" charset="0"/>
+                              </a:rPr>
+                              <m:t>𝑖</m:t>
+                            </m:r>
+                          </m:sub>
+                        </m:sSub>
+                      </m:e>
+                    </m:d>
+                  </m:oMath>
+                </a14:m>
+                <a:r>
+                  <a:rPr lang="en-US" sz="2600" dirty="0"/>
+                  <a:t> is a unique or independent hash function  </a:t>
+                </a:r>
+              </a:p>
+              <a:p>
+                <a:endParaRPr lang="en-US" sz="3000" dirty="0"/>
+              </a:p>
+            </p:txBody>
+          </p:sp>
+        </mc:Choice>
+        <mc:Fallback>
+          <p:sp>
+            <p:nvSpPr>
+              <p:cNvPr id="3" name="Content Placeholder 2">
+                <a:extLst>
+                  <a:ext uri="{FF2B5EF4-FFF2-40B4-BE49-F238E27FC236}">
+                    <a16:creationId xmlns:a16="http://schemas.microsoft.com/office/drawing/2014/main" id="{D104C4A7-4785-6851-D918-50EAE50F970D}"/>
+                  </a:ext>
+                </a:extLst>
+              </p:cNvPr>
+              <p:cNvSpPr>
+                <a:spLocks noGrp="1" noRot="1" noChangeAspect="1" noMove="1" noResize="1" noEditPoints="1" noAdjustHandles="1" noChangeArrowheads="1" noChangeShapeType="1" noTextEdit="1"/>
+              </p:cNvSpPr>
+              <p:nvPr>
+                <p:ph idx="1"/>
+              </p:nvPr>
+            </p:nvSpPr>
+            <p:spPr>
+              <a:xfrm>
+                <a:off x="838200" y="1201783"/>
+                <a:ext cx="10515600" cy="5496849"/>
+              </a:xfrm>
+              <a:blipFill>
+                <a:blip r:embed="rId3"/>
+                <a:stretch>
+                  <a:fillRect l="-1507" t="-2328"/>
+                </a:stretch>
+              </a:blipFill>
+            </p:spPr>
+            <p:txBody>
+              <a:bodyPr/>
+              <a:lstStyle/>
+              <a:p>
+                <a:r>
+                  <a:rPr lang="en-US">
+                    <a:noFill/>
+                  </a:rPr>
+                  <a:t> </a:t>
+                </a:r>
+              </a:p>
+            </p:txBody>
+          </p:sp>
+        </mc:Fallback>
+      </mc:AlternateContent>
+      <p:sp>
+        <p:nvSpPr>
+          <p:cNvPr id="6" name="Title 1">
+            <a:extLst>
+              <a:ext uri="{FF2B5EF4-FFF2-40B4-BE49-F238E27FC236}">
+                <a16:creationId xmlns:a16="http://schemas.microsoft.com/office/drawing/2014/main" id="{29BFFD6E-8309-3B28-4A70-4F5373832514}"/>
+              </a:ext>
+            </a:extLst>
+          </p:cNvPr>
+          <p:cNvSpPr txBox="1">
+            <a:spLocks/>
+          </p:cNvSpPr>
+          <p:nvPr/>
+        </p:nvSpPr>
+        <p:spPr>
+          <a:xfrm>
+            <a:off x="838200" y="-635"/>
+            <a:ext cx="10515600" cy="1325563"/>
+          </a:xfrm>
+          <a:prstGeom prst="rect">
+            <a:avLst/>
+          </a:prstGeom>
+        </p:spPr>
+        <p:txBody>
+          <a:bodyPr vert="horz" lIns="91440" tIns="45720" rIns="91440" bIns="45720" rtlCol="0" anchor="ctr">
+            <a:normAutofit/>
+          </a:bodyPr>
+          <a:lstStyle>
+            <a:lvl1pPr algn="l" defTabSz="914400" rtl="0" eaLnBrk="1" latinLnBrk="0" hangingPunct="1">
+              <a:lnSpc>
+                <a:spcPct val="90000"/>
+              </a:lnSpc>
+              <a:spcBef>
+                <a:spcPct val="0"/>
+              </a:spcBef>
+              <a:buNone/>
+              <a:defRPr sz="4400" kern="1200">
+                <a:solidFill>
+                  <a:schemeClr val="tx1"/>
+                </a:solidFill>
+                <a:latin typeface="+mj-lt"/>
+                <a:ea typeface="+mj-ea"/>
+                <a:cs typeface="+mj-cs"/>
+              </a:defRPr>
+            </a:lvl1pPr>
+          </a:lstStyle>
+          <a:p>
+            <a:r>
+              <a:rPr lang="en-US" dirty="0">
+                <a:latin typeface="+mn-lt"/>
+              </a:rPr>
+              <a:t>Introduction to Hashing</a:t>
+            </a:r>
+          </a:p>
+        </p:txBody>
+      </p:sp>
+    </p:spTree>
+    <p:extLst>
+      <p:ext uri="{BB962C8B-B14F-4D97-AF65-F5344CB8AC3E}">
+        <p14:creationId xmlns:p14="http://schemas.microsoft.com/office/powerpoint/2010/main" val="2666730937"/>
+      </p:ext>
+    </p:extLst>
+  </p:cSld>
+  <p:clrMapOvr>
+    <a:masterClrMapping/>
+  </p:clrMapOvr>
+  <p:timing>
+    <p:tnLst>
+      <p:par>
+        <p:cTn id="1" dur="indefinite" restart="never" nodeType="tmRoot">
+          <p:childTnLst>
+            <p:seq concurrent="1" nextAc="seek">
+              <p:cTn id="2" dur="indefinite" nodeType="mainSeq">
+                <p:childTnLst>
+                  <p:par>
+                    <p:cTn id="3" fill="hold">
+                      <p:stCondLst>
+                        <p:cond delay="indefinite"/>
+                      </p:stCondLst>
+                      <p:childTnLst>
+                        <p:par>
+                          <p:cTn id="4" fill="hold">
+                            <p:stCondLst>
+                              <p:cond delay="0"/>
+                            </p:stCondLst>
+                            <p:childTnLst>
+                              <p:par>
+                                <p:cTn id="5" presetID="1" presetClass="entr" presetSubtype="0" fill="hold" nodeType="clickEffect">
+                                  <p:stCondLst>
+                                    <p:cond delay="0"/>
+                                  </p:stCondLst>
+                                  <p:childTnLst>
+                                    <p:set>
+                                      <p:cBhvr>
+                                        <p:cTn id="6" dur="1" fill="hold">
+                                          <p:stCondLst>
+                                            <p:cond delay="0"/>
+                                          </p:stCondLst>
+                                        </p:cTn>
+                                        <p:tgtEl>
+                                          <p:spTgt spid="3">
+                                            <p:txEl>
+                                              <p:pRg st="3" end="3"/>
+                                            </p:txEl>
+                                          </p:spTgt>
+                                        </p:tgtEl>
+                                        <p:attrNameLst>
+                                          <p:attrName>style.visibility</p:attrName>
+                                        </p:attrNameLst>
+                                      </p:cBhvr>
+                                      <p:to>
+                                        <p:strVal val="visible"/>
+                                      </p:to>
+                                    </p:set>
+                                  </p:childTnLst>
+                                </p:cTn>
+                              </p:par>
+                              <p:par>
+                                <p:cTn id="7" presetID="1" presetClass="entr" presetSubtype="0" fill="hold" nodeType="withEffect">
+                                  <p:stCondLst>
+                                    <p:cond delay="0"/>
+                                  </p:stCondLst>
+                                  <p:childTnLst>
+                                    <p:set>
+                                      <p:cBhvr>
+                                        <p:cTn id="8" dur="1" fill="hold">
+                                          <p:stCondLst>
+                                            <p:cond delay="0"/>
+                                          </p:stCondLst>
+                                        </p:cTn>
+                                        <p:tgtEl>
+                                          <p:spTgt spid="3">
+                                            <p:txEl>
+                                              <p:pRg st="4" end="4"/>
+                                            </p:txEl>
+                                          </p:spTgt>
+                                        </p:tgtEl>
+                                        <p:attrNameLst>
+                                          <p:attrName>style.visibility</p:attrName>
+                                        </p:attrNameLst>
+                                      </p:cBhvr>
+                                      <p:to>
+                                        <p:strVal val="visible"/>
+                                      </p:to>
+                                    </p:set>
+                                  </p:childTnLst>
+                                </p:cTn>
+                              </p:par>
+                            </p:childTnLst>
+                          </p:cTn>
+                        </p:par>
+                      </p:childTnLst>
+                    </p:cTn>
+                  </p:par>
+                  <p:par>
+                    <p:cTn id="9" fill="hold">
+                      <p:stCondLst>
+                        <p:cond delay="indefinite"/>
+                      </p:stCondLst>
+                      <p:childTnLst>
+                        <p:par>
+                          <p:cTn id="10" fill="hold">
+                            <p:stCondLst>
+                              <p:cond delay="0"/>
+                            </p:stCondLst>
+                            <p:childTnLst>
+                              <p:par>
+                                <p:cTn id="11" presetID="1" presetClass="entr" presetSubtype="0" fill="hold" nodeType="clickEffect">
+                                  <p:stCondLst>
+                                    <p:cond delay="0"/>
+                                  </p:stCondLst>
+                                  <p:childTnLst>
+                                    <p:set>
+                                      <p:cBhvr>
+                                        <p:cTn id="12" dur="1" fill="hold">
+                                          <p:stCondLst>
+                                            <p:cond delay="0"/>
+                                          </p:stCondLst>
+                                        </p:cTn>
+                                        <p:tgtEl>
+                                          <p:spTgt spid="3">
+                                            <p:txEl>
+                                              <p:pRg st="5" end="5"/>
+                                            </p:txEl>
+                                          </p:spTgt>
+                                        </p:tgtEl>
+                                        <p:attrNameLst>
+                                          <p:attrName>style.visibility</p:attrName>
+                                        </p:attrNameLst>
+                                      </p:cBhvr>
+                                      <p:to>
+                                        <p:strVal val="visible"/>
+                                      </p:to>
+                                    </p:set>
+                                  </p:childTnLst>
+                                </p:cTn>
+                              </p:par>
+                              <p:par>
+                                <p:cTn id="13" presetID="1" presetClass="entr" presetSubtype="0" fill="hold" nodeType="withEffect">
+                                  <p:stCondLst>
+                                    <p:cond delay="0"/>
+                                  </p:stCondLst>
+                                  <p:childTnLst>
+                                    <p:set>
+                                      <p:cBhvr>
+                                        <p:cTn id="14" dur="1" fill="hold">
+                                          <p:stCondLst>
+                                            <p:cond delay="0"/>
+                                          </p:stCondLst>
+                                        </p:cTn>
+                                        <p:tgtEl>
+                                          <p:spTgt spid="3">
+                                            <p:txEl>
+                                              <p:pRg st="7" end="7"/>
+                                            </p:txEl>
+                                          </p:spTgt>
+                                        </p:tgtEl>
+                                        <p:attrNameLst>
+                                          <p:attrName>style.visibility</p:attrName>
+                                        </p:attrNameLst>
+                                      </p:cBhvr>
+                                      <p:to>
+                                        <p:strVal val="visible"/>
+                                      </p:to>
+                                    </p:set>
+                                  </p:childTnLst>
+                                </p:cTn>
+                              </p:par>
+                              <p:par>
+                                <p:cTn id="15" presetID="1" presetClass="entr" presetSubtype="0" fill="hold" nodeType="withEffect">
+                                  <p:stCondLst>
+                                    <p:cond delay="0"/>
+                                  </p:stCondLst>
+                                  <p:childTnLst>
+                                    <p:set>
+                                      <p:cBhvr>
+                                        <p:cTn id="16" dur="1" fill="hold">
+                                          <p:stCondLst>
+                                            <p:cond delay="0"/>
+                                          </p:stCondLst>
+                                        </p:cTn>
+                                        <p:tgtEl>
+                                          <p:spTgt spid="3">
+                                            <p:txEl>
+                                              <p:pRg st="8" end="8"/>
+                                            </p:txEl>
+                                          </p:spTgt>
+                                        </p:tgtEl>
+                                        <p:attrNameLst>
+                                          <p:attrName>style.visibility</p:attrName>
+                                        </p:attrNameLst>
+                                      </p:cBhvr>
+                                      <p:to>
+                                        <p:strVal val="visible"/>
+                                      </p:to>
+                                    </p:set>
+                                  </p:childTnLst>
+                                </p:cTn>
+                              </p:par>
+                            </p:childTnLst>
+                          </p:cTn>
+                        </p:par>
+                      </p:childTnLst>
+                    </p:cTn>
+                  </p:par>
+                </p:childTnLst>
+              </p:cTn>
+              <p:prevCondLst>
+                <p:cond evt="onPrev" delay="0">
+                  <p:tgtEl>
+                    <p:sldTgt/>
+                  </p:tgtEl>
+                </p:cond>
+              </p:prevCondLst>
+              <p:nextCondLst>
+                <p:cond evt="onNext" delay="0">
+                  <p:tgtEl>
+                    <p:sldTgt/>
+                  </p:tgtEl>
+                </p:cond>
+              </p:nextCondLst>
+            </p:seq>
+          </p:childTnLst>
+        </p:cTn>
+      </p:par>
+    </p:tnLst>
+  </p:timing>
+</p:sld>
+</file>
+
+<file path=ppt/slides/slide44.xml><?xml version="1.0" encoding="utf-8"?>
+<p:sld xmlns:a="http://schemas.openxmlformats.org/drawingml/2006/main" xmlns:r="http://schemas.openxmlformats.org/officeDocument/2006/relationships" xmlns:p="http://schemas.openxmlformats.org/presentationml/2006/main">
+  <p:cSld>
+    <p:spTree>
+      <p:nvGrpSpPr>
+        <p:cNvPr id="1" name=""/>
+        <p:cNvGrpSpPr/>
+        <p:nvPr/>
+      </p:nvGrpSpPr>
+      <p:grpSpPr>
+        <a:xfrm>
+          <a:off x="0" y="0"/>
+          <a:ext cx="0" cy="0"/>
+          <a:chOff x="0" y="0"/>
+          <a:chExt cx="0" cy="0"/>
+        </a:xfrm>
+      </p:grpSpPr>
+      <mc:AlternateContent xmlns:mc="http://schemas.openxmlformats.org/markup-compatibility/2006" xmlns:a14="http://schemas.microsoft.com/office/drawing/2010/main">
+        <mc:Choice Requires="a14">
           <p:sp>
             <p:nvSpPr>
               <p:cNvPr id="3" name="Content Placeholder 2">
@@ -28782,7 +29575,7 @@
             </p:txBody>
           </p:sp>
         </mc:Choice>
-        <mc:Fallback>
+        <mc:Fallback xmlns="">
           <p:sp>
             <p:nvSpPr>
               <p:cNvPr id="3" name="Content Placeholder 2">
@@ -28895,7 +29688,7 @@
 </p:sld>
 </file>
 
-<file path=ppt/slides/slide44.xml><?xml version="1.0" encoding="utf-8"?>
+<file path=ppt/slides/slide45.xml><?xml version="1.0" encoding="utf-8"?>
 <p:sld xmlns:a="http://schemas.openxmlformats.org/drawingml/2006/main" xmlns:r="http://schemas.openxmlformats.org/officeDocument/2006/relationships" xmlns:p="http://schemas.openxmlformats.org/presentationml/2006/main">
   <p:cSld>
     <p:spTree>
@@ -29464,7 +30257,7 @@
 </p:sld>
 </file>
 
-<file path=ppt/slides/slide45.xml><?xml version="1.0" encoding="utf-8"?>
+<file path=ppt/slides/slide46.xml><?xml version="1.0" encoding="utf-8"?>
 <p:sld xmlns:a="http://schemas.openxmlformats.org/drawingml/2006/main" xmlns:r="http://schemas.openxmlformats.org/officeDocument/2006/relationships" xmlns:p="http://schemas.openxmlformats.org/presentationml/2006/main">
   <p:cSld>
     <p:spTree>
@@ -30053,7 +30846,7 @@
 </p:sld>
 </file>
 
-<file path=ppt/slides/slide46.xml><?xml version="1.0" encoding="utf-8"?>
+<file path=ppt/slides/slide47.xml><?xml version="1.0" encoding="utf-8"?>
 <p:sld xmlns:a="http://schemas.openxmlformats.org/drawingml/2006/main" xmlns:r="http://schemas.openxmlformats.org/officeDocument/2006/relationships" xmlns:p="http://schemas.openxmlformats.org/presentationml/2006/main">
   <p:cSld>
     <p:spTree>
@@ -30113,7 +30906,7 @@
 </p:sld>
 </file>
 
-<file path=ppt/slides/slide47.xml><?xml version="1.0" encoding="utf-8"?>
+<file path=ppt/slides/slide48.xml><?xml version="1.0" encoding="utf-8"?>
 <p:sld xmlns:a="http://schemas.openxmlformats.org/drawingml/2006/main" xmlns:r="http://schemas.openxmlformats.org/officeDocument/2006/relationships" xmlns:p="http://schemas.openxmlformats.org/presentationml/2006/main">
   <p:cSld>
     <p:spTree>
@@ -30789,7 +31582,7 @@
 </p:sld>
 </file>
 
-<file path=ppt/slides/slide48.xml><?xml version="1.0" encoding="utf-8"?>
+<file path=ppt/slides/slide49.xml><?xml version="1.0" encoding="utf-8"?>
 <p:sld xmlns:a="http://schemas.openxmlformats.org/drawingml/2006/main" xmlns:r="http://schemas.openxmlformats.org/officeDocument/2006/relationships" xmlns:p="http://schemas.openxmlformats.org/presentationml/2006/main">
   <p:cSld>
     <p:spTree>
@@ -31693,7 +32486,401 @@
 </p:sld>
 </file>
 
-<file path=ppt/slides/slide49.xml><?xml version="1.0" encoding="utf-8"?>
+<file path=ppt/slides/slide5.xml><?xml version="1.0" encoding="utf-8"?>
+<p:sld xmlns:a="http://schemas.openxmlformats.org/drawingml/2006/main" xmlns:r="http://schemas.openxmlformats.org/officeDocument/2006/relationships" xmlns:p="http://schemas.openxmlformats.org/presentationml/2006/main">
+  <p:cSld>
+    <p:spTree>
+      <p:nvGrpSpPr>
+        <p:cNvPr id="1" name=""/>
+        <p:cNvGrpSpPr/>
+        <p:nvPr/>
+      </p:nvGrpSpPr>
+      <p:grpSpPr>
+        <a:xfrm>
+          <a:off x="0" y="0"/>
+          <a:ext cx="0" cy="0"/>
+          <a:chOff x="0" y="0"/>
+          <a:chExt cx="0" cy="0"/>
+        </a:xfrm>
+      </p:grpSpPr>
+      <p:sp>
+        <p:nvSpPr>
+          <p:cNvPr id="3" name="Content Placeholder 2">
+            <a:extLst>
+              <a:ext uri="{FF2B5EF4-FFF2-40B4-BE49-F238E27FC236}">
+                <a16:creationId xmlns:a16="http://schemas.microsoft.com/office/drawing/2014/main" id="{258E6AF3-7615-4BD1-878E-A94C93E98F90}"/>
+              </a:ext>
+            </a:extLst>
+          </p:cNvPr>
+          <p:cNvSpPr>
+            <a:spLocks noGrp="1"/>
+          </p:cNvSpPr>
+          <p:nvPr>
+            <p:ph idx="1"/>
+          </p:nvPr>
+        </p:nvSpPr>
+        <p:spPr>
+          <a:xfrm>
+            <a:off x="838200" y="1217458"/>
+            <a:ext cx="10515600" cy="5640542"/>
+          </a:xfrm>
+        </p:spPr>
+        <p:txBody>
+          <a:bodyPr>
+            <a:normAutofit fontScale="92500" lnSpcReduction="10000"/>
+          </a:bodyPr>
+          <a:lstStyle/>
+          <a:p>
+            <a:pPr marL="0" indent="0">
+              <a:buNone/>
+            </a:pPr>
+            <a:r>
+              <a:rPr lang="en-US" sz="3200" dirty="0"/>
+              <a:t>What is the KDD process?   </a:t>
+            </a:r>
+          </a:p>
+          <a:p>
+            <a:pPr marL="0" indent="0">
+              <a:buNone/>
+            </a:pPr>
+            <a:endParaRPr lang="en-US" dirty="0"/>
+          </a:p>
+          <a:p>
+            <a:pPr marL="0" indent="0">
+              <a:buNone/>
+            </a:pPr>
+            <a:endParaRPr lang="en-US" dirty="0"/>
+          </a:p>
+          <a:p>
+            <a:pPr marL="0" indent="0">
+              <a:buNone/>
+            </a:pPr>
+            <a:endParaRPr lang="en-US" dirty="0"/>
+          </a:p>
+          <a:p>
+            <a:pPr marL="0" indent="0">
+              <a:buNone/>
+            </a:pPr>
+            <a:endParaRPr lang="en-US" dirty="0"/>
+          </a:p>
+          <a:p>
+            <a:pPr marL="0" indent="0">
+              <a:buNone/>
+            </a:pPr>
+            <a:endParaRPr lang="en-US" dirty="0"/>
+          </a:p>
+          <a:p>
+            <a:pPr marL="0" indent="0">
+              <a:buNone/>
+            </a:pPr>
+            <a:endParaRPr lang="en-US" dirty="0"/>
+          </a:p>
+          <a:p>
+            <a:pPr marL="0" indent="0">
+              <a:buNone/>
+            </a:pPr>
+            <a:endParaRPr lang="en-US" dirty="0"/>
+          </a:p>
+          <a:p>
+            <a:pPr marL="0" indent="0">
+              <a:buNone/>
+            </a:pPr>
+            <a:endParaRPr lang="en-US" dirty="0">
+              <a:solidFill>
+                <a:schemeClr val="accent1"/>
+              </a:solidFill>
+            </a:endParaRPr>
+          </a:p>
+          <a:p>
+            <a:pPr marL="0" indent="0">
+              <a:buNone/>
+            </a:pPr>
+            <a:endParaRPr lang="en-US" dirty="0">
+              <a:solidFill>
+                <a:schemeClr val="accent1"/>
+              </a:solidFill>
+            </a:endParaRPr>
+          </a:p>
+          <a:p>
+            <a:pPr marL="0" indent="0">
+              <a:buNone/>
+            </a:pPr>
+            <a:endParaRPr lang="en-US" dirty="0">
+              <a:solidFill>
+                <a:schemeClr val="accent1"/>
+              </a:solidFill>
+            </a:endParaRPr>
+          </a:p>
+          <a:p>
+            <a:pPr marL="0" indent="0">
+              <a:buNone/>
+            </a:pPr>
+            <a:r>
+              <a:rPr lang="en-US" dirty="0">
+                <a:solidFill>
+                  <a:schemeClr val="accent1"/>
+                </a:solidFill>
+              </a:rPr>
+              <a:t>Is this old diagram representative?  - e.g. Fayyad et.al. 1996 </a:t>
+            </a:r>
+          </a:p>
+        </p:txBody>
+      </p:sp>
+      <p:sp>
+        <p:nvSpPr>
+          <p:cNvPr id="6" name="Title 1">
+            <a:extLst>
+              <a:ext uri="{FF2B5EF4-FFF2-40B4-BE49-F238E27FC236}">
+                <a16:creationId xmlns:a16="http://schemas.microsoft.com/office/drawing/2014/main" id="{CD29F70F-B868-451B-A65D-8721F4C7A2D9}"/>
+              </a:ext>
+            </a:extLst>
+          </p:cNvPr>
+          <p:cNvSpPr txBox="1">
+            <a:spLocks/>
+          </p:cNvSpPr>
+          <p:nvPr/>
+        </p:nvSpPr>
+        <p:spPr>
+          <a:xfrm>
+            <a:off x="838200" y="-635"/>
+            <a:ext cx="10515600" cy="1325563"/>
+          </a:xfrm>
+          <a:prstGeom prst="rect">
+            <a:avLst/>
+          </a:prstGeom>
+        </p:spPr>
+        <p:txBody>
+          <a:bodyPr vert="horz" lIns="91440" tIns="45720" rIns="91440" bIns="45720" rtlCol="0" anchor="ctr">
+            <a:normAutofit/>
+          </a:bodyPr>
+          <a:lstStyle>
+            <a:lvl1pPr algn="l" defTabSz="914400" rtl="0" eaLnBrk="1" latinLnBrk="0" hangingPunct="1">
+              <a:lnSpc>
+                <a:spcPct val="90000"/>
+              </a:lnSpc>
+              <a:spcBef>
+                <a:spcPct val="0"/>
+              </a:spcBef>
+              <a:buNone/>
+              <a:defRPr sz="4400" kern="1200">
+                <a:solidFill>
+                  <a:schemeClr val="tx1"/>
+                </a:solidFill>
+                <a:latin typeface="+mj-lt"/>
+                <a:ea typeface="+mj-ea"/>
+                <a:cs typeface="+mj-cs"/>
+              </a:defRPr>
+            </a:lvl1pPr>
+          </a:lstStyle>
+          <a:p>
+            <a:r>
+              <a:rPr lang="en-US" dirty="0">
+                <a:latin typeface="+mn-lt"/>
+              </a:rPr>
+              <a:t>KDD process</a:t>
+            </a:r>
+          </a:p>
+        </p:txBody>
+      </p:sp>
+      <p:pic>
+        <p:nvPicPr>
+          <p:cNvPr id="4" name="Picture 3">
+            <a:extLst>
+              <a:ext uri="{FF2B5EF4-FFF2-40B4-BE49-F238E27FC236}">
+                <a16:creationId xmlns:a16="http://schemas.microsoft.com/office/drawing/2014/main" id="{41A10601-345E-4A04-878A-28FFF71506B5}"/>
+              </a:ext>
+            </a:extLst>
+          </p:cNvPr>
+          <p:cNvPicPr>
+            <a:picLocks noChangeAspect="1"/>
+          </p:cNvPicPr>
+          <p:nvPr/>
+        </p:nvPicPr>
+        <p:blipFill>
+          <a:blip r:embed="rId2"/>
+          <a:stretch>
+            <a:fillRect/>
+          </a:stretch>
+        </p:blipFill>
+        <p:spPr>
+          <a:xfrm>
+            <a:off x="951375" y="1651145"/>
+            <a:ext cx="8488232" cy="4404795"/>
+          </a:xfrm>
+          <a:prstGeom prst="rect">
+            <a:avLst/>
+          </a:prstGeom>
+        </p:spPr>
+      </p:pic>
+    </p:spTree>
+    <p:extLst>
+      <p:ext uri="{BB962C8B-B14F-4D97-AF65-F5344CB8AC3E}">
+        <p14:creationId xmlns:p14="http://schemas.microsoft.com/office/powerpoint/2010/main" val="2011350768"/>
+      </p:ext>
+    </p:extLst>
+  </p:cSld>
+  <p:clrMapOvr>
+    <a:masterClrMapping/>
+  </p:clrMapOvr>
+  <p:timing>
+    <p:tnLst>
+      <p:par>
+        <p:cTn id="1" dur="indefinite" restart="never" nodeType="tmRoot">
+          <p:childTnLst>
+            <p:seq concurrent="1" nextAc="seek">
+              <p:cTn id="2" dur="indefinite" nodeType="mainSeq">
+                <p:childTnLst>
+                  <p:par>
+                    <p:cTn id="3" fill="hold">
+                      <p:stCondLst>
+                        <p:cond delay="indefinite"/>
+                      </p:stCondLst>
+                      <p:childTnLst>
+                        <p:par>
+                          <p:cTn id="4" fill="hold">
+                            <p:stCondLst>
+                              <p:cond delay="0"/>
+                            </p:stCondLst>
+                            <p:childTnLst>
+                              <p:par>
+                                <p:cTn id="5" presetID="1" presetClass="entr" presetSubtype="0" fill="hold" nodeType="clickEffect">
+                                  <p:stCondLst>
+                                    <p:cond delay="0"/>
+                                  </p:stCondLst>
+                                  <p:childTnLst>
+                                    <p:set>
+                                      <p:cBhvr>
+                                        <p:cTn id="6" dur="1" fill="hold">
+                                          <p:stCondLst>
+                                            <p:cond delay="0"/>
+                                          </p:stCondLst>
+                                        </p:cTn>
+                                        <p:tgtEl>
+                                          <p:spTgt spid="3">
+                                            <p:txEl>
+                                              <p:pRg st="0" end="0"/>
+                                            </p:txEl>
+                                          </p:spTgt>
+                                        </p:tgtEl>
+                                        <p:attrNameLst>
+                                          <p:attrName>style.visibility</p:attrName>
+                                        </p:attrNameLst>
+                                      </p:cBhvr>
+                                      <p:to>
+                                        <p:strVal val="visible"/>
+                                      </p:to>
+                                    </p:set>
+                                  </p:childTnLst>
+                                </p:cTn>
+                              </p:par>
+                            </p:childTnLst>
+                          </p:cTn>
+                        </p:par>
+                      </p:childTnLst>
+                    </p:cTn>
+                  </p:par>
+                  <p:par>
+                    <p:cTn id="7" fill="hold">
+                      <p:stCondLst>
+                        <p:cond delay="indefinite"/>
+                      </p:stCondLst>
+                      <p:childTnLst>
+                        <p:par>
+                          <p:cTn id="8" fill="hold">
+                            <p:stCondLst>
+                              <p:cond delay="0"/>
+                            </p:stCondLst>
+                            <p:childTnLst>
+                              <p:par>
+                                <p:cTn id="9" presetID="1" presetClass="entr" presetSubtype="0" fill="hold" nodeType="clickEffect">
+                                  <p:stCondLst>
+                                    <p:cond delay="0"/>
+                                  </p:stCondLst>
+                                  <p:childTnLst>
+                                    <p:set>
+                                      <p:cBhvr>
+                                        <p:cTn id="10" dur="1" fill="hold">
+                                          <p:stCondLst>
+                                            <p:cond delay="0"/>
+                                          </p:stCondLst>
+                                        </p:cTn>
+                                        <p:tgtEl>
+                                          <p:spTgt spid="3">
+                                            <p:txEl>
+                                              <p:pRg st="11" end="11"/>
+                                            </p:txEl>
+                                          </p:spTgt>
+                                        </p:tgtEl>
+                                        <p:attrNameLst>
+                                          <p:attrName>style.visibility</p:attrName>
+                                        </p:attrNameLst>
+                                      </p:cBhvr>
+                                      <p:to>
+                                        <p:strVal val="visible"/>
+                                      </p:to>
+                                    </p:set>
+                                  </p:childTnLst>
+                                </p:cTn>
+                              </p:par>
+                              <p:par>
+                                <p:cTn id="11" presetID="1" presetClass="entr" presetSubtype="0" fill="hold" nodeType="withEffect">
+                                  <p:stCondLst>
+                                    <p:cond delay="0"/>
+                                  </p:stCondLst>
+                                  <p:childTnLst>
+                                    <p:set>
+                                      <p:cBhvr>
+                                        <p:cTn id="12" dur="1" fill="hold">
+                                          <p:stCondLst>
+                                            <p:cond delay="0"/>
+                                          </p:stCondLst>
+                                        </p:cTn>
+                                        <p:tgtEl>
+                                          <p:spTgt spid="4"/>
+                                        </p:tgtEl>
+                                        <p:attrNameLst>
+                                          <p:attrName>style.visibility</p:attrName>
+                                        </p:attrNameLst>
+                                      </p:cBhvr>
+                                      <p:to>
+                                        <p:strVal val="visible"/>
+                                      </p:to>
+                                    </p:set>
+                                  </p:childTnLst>
+                                </p:cTn>
+                              </p:par>
+                            </p:childTnLst>
+                          </p:cTn>
+                        </p:par>
+                      </p:childTnLst>
+                    </p:cTn>
+                  </p:par>
+                </p:childTnLst>
+              </p:cTn>
+              <p:prevCondLst>
+                <p:cond evt="onPrev" delay="0">
+                  <p:tgtEl>
+                    <p:sldTgt/>
+                  </p:tgtEl>
+                </p:cond>
+              </p:prevCondLst>
+              <p:nextCondLst>
+                <p:cond evt="onNext" delay="0">
+                  <p:tgtEl>
+                    <p:sldTgt/>
+                  </p:tgtEl>
+                </p:cond>
+              </p:nextCondLst>
+            </p:seq>
+          </p:childTnLst>
+        </p:cTn>
+      </p:par>
+    </p:tnLst>
+  </p:timing>
+</p:sld>
+</file>
+
+<file path=ppt/slides/slide50.xml><?xml version="1.0" encoding="utf-8"?>
 <p:sld xmlns:a="http://schemas.openxmlformats.org/drawingml/2006/main" xmlns:r="http://schemas.openxmlformats.org/officeDocument/2006/relationships" xmlns:p="http://schemas.openxmlformats.org/presentationml/2006/main">
   <p:cSld>
     <p:spTree>
@@ -33988,401 +35175,7 @@
 </p:sld>
 </file>
 
-<file path=ppt/slides/slide5.xml><?xml version="1.0" encoding="utf-8"?>
-<p:sld xmlns:a="http://schemas.openxmlformats.org/drawingml/2006/main" xmlns:r="http://schemas.openxmlformats.org/officeDocument/2006/relationships" xmlns:p="http://schemas.openxmlformats.org/presentationml/2006/main">
-  <p:cSld>
-    <p:spTree>
-      <p:nvGrpSpPr>
-        <p:cNvPr id="1" name=""/>
-        <p:cNvGrpSpPr/>
-        <p:nvPr/>
-      </p:nvGrpSpPr>
-      <p:grpSpPr>
-        <a:xfrm>
-          <a:off x="0" y="0"/>
-          <a:ext cx="0" cy="0"/>
-          <a:chOff x="0" y="0"/>
-          <a:chExt cx="0" cy="0"/>
-        </a:xfrm>
-      </p:grpSpPr>
-      <p:sp>
-        <p:nvSpPr>
-          <p:cNvPr id="3" name="Content Placeholder 2">
-            <a:extLst>
-              <a:ext uri="{FF2B5EF4-FFF2-40B4-BE49-F238E27FC236}">
-                <a16:creationId xmlns:a16="http://schemas.microsoft.com/office/drawing/2014/main" id="{258E6AF3-7615-4BD1-878E-A94C93E98F90}"/>
-              </a:ext>
-            </a:extLst>
-          </p:cNvPr>
-          <p:cNvSpPr>
-            <a:spLocks noGrp="1"/>
-          </p:cNvSpPr>
-          <p:nvPr>
-            <p:ph idx="1"/>
-          </p:nvPr>
-        </p:nvSpPr>
-        <p:spPr>
-          <a:xfrm>
-            <a:off x="838200" y="1217458"/>
-            <a:ext cx="10515600" cy="5640542"/>
-          </a:xfrm>
-        </p:spPr>
-        <p:txBody>
-          <a:bodyPr>
-            <a:normAutofit fontScale="92500" lnSpcReduction="10000"/>
-          </a:bodyPr>
-          <a:lstStyle/>
-          <a:p>
-            <a:pPr marL="0" indent="0">
-              <a:buNone/>
-            </a:pPr>
-            <a:r>
-              <a:rPr lang="en-US" sz="3200" dirty="0"/>
-              <a:t>What is the KDD process?   </a:t>
-            </a:r>
-          </a:p>
-          <a:p>
-            <a:pPr marL="0" indent="0">
-              <a:buNone/>
-            </a:pPr>
-            <a:endParaRPr lang="en-US" dirty="0"/>
-          </a:p>
-          <a:p>
-            <a:pPr marL="0" indent="0">
-              <a:buNone/>
-            </a:pPr>
-            <a:endParaRPr lang="en-US" dirty="0"/>
-          </a:p>
-          <a:p>
-            <a:pPr marL="0" indent="0">
-              <a:buNone/>
-            </a:pPr>
-            <a:endParaRPr lang="en-US" dirty="0"/>
-          </a:p>
-          <a:p>
-            <a:pPr marL="0" indent="0">
-              <a:buNone/>
-            </a:pPr>
-            <a:endParaRPr lang="en-US" dirty="0"/>
-          </a:p>
-          <a:p>
-            <a:pPr marL="0" indent="0">
-              <a:buNone/>
-            </a:pPr>
-            <a:endParaRPr lang="en-US" dirty="0"/>
-          </a:p>
-          <a:p>
-            <a:pPr marL="0" indent="0">
-              <a:buNone/>
-            </a:pPr>
-            <a:endParaRPr lang="en-US" dirty="0"/>
-          </a:p>
-          <a:p>
-            <a:pPr marL="0" indent="0">
-              <a:buNone/>
-            </a:pPr>
-            <a:endParaRPr lang="en-US" dirty="0"/>
-          </a:p>
-          <a:p>
-            <a:pPr marL="0" indent="0">
-              <a:buNone/>
-            </a:pPr>
-            <a:endParaRPr lang="en-US" dirty="0">
-              <a:solidFill>
-                <a:schemeClr val="accent1"/>
-              </a:solidFill>
-            </a:endParaRPr>
-          </a:p>
-          <a:p>
-            <a:pPr marL="0" indent="0">
-              <a:buNone/>
-            </a:pPr>
-            <a:endParaRPr lang="en-US" dirty="0">
-              <a:solidFill>
-                <a:schemeClr val="accent1"/>
-              </a:solidFill>
-            </a:endParaRPr>
-          </a:p>
-          <a:p>
-            <a:pPr marL="0" indent="0">
-              <a:buNone/>
-            </a:pPr>
-            <a:endParaRPr lang="en-US" dirty="0">
-              <a:solidFill>
-                <a:schemeClr val="accent1"/>
-              </a:solidFill>
-            </a:endParaRPr>
-          </a:p>
-          <a:p>
-            <a:pPr marL="0" indent="0">
-              <a:buNone/>
-            </a:pPr>
-            <a:r>
-              <a:rPr lang="en-US" dirty="0">
-                <a:solidFill>
-                  <a:schemeClr val="accent1"/>
-                </a:solidFill>
-              </a:rPr>
-              <a:t>Is this old diagram representative?  - e.g. Fayyad et.al. 1996 </a:t>
-            </a:r>
-          </a:p>
-        </p:txBody>
-      </p:sp>
-      <p:sp>
-        <p:nvSpPr>
-          <p:cNvPr id="6" name="Title 1">
-            <a:extLst>
-              <a:ext uri="{FF2B5EF4-FFF2-40B4-BE49-F238E27FC236}">
-                <a16:creationId xmlns:a16="http://schemas.microsoft.com/office/drawing/2014/main" id="{CD29F70F-B868-451B-A65D-8721F4C7A2D9}"/>
-              </a:ext>
-            </a:extLst>
-          </p:cNvPr>
-          <p:cNvSpPr txBox="1">
-            <a:spLocks/>
-          </p:cNvSpPr>
-          <p:nvPr/>
-        </p:nvSpPr>
-        <p:spPr>
-          <a:xfrm>
-            <a:off x="838200" y="-635"/>
-            <a:ext cx="10515600" cy="1325563"/>
-          </a:xfrm>
-          <a:prstGeom prst="rect">
-            <a:avLst/>
-          </a:prstGeom>
-        </p:spPr>
-        <p:txBody>
-          <a:bodyPr vert="horz" lIns="91440" tIns="45720" rIns="91440" bIns="45720" rtlCol="0" anchor="ctr">
-            <a:normAutofit/>
-          </a:bodyPr>
-          <a:lstStyle>
-            <a:lvl1pPr algn="l" defTabSz="914400" rtl="0" eaLnBrk="1" latinLnBrk="0" hangingPunct="1">
-              <a:lnSpc>
-                <a:spcPct val="90000"/>
-              </a:lnSpc>
-              <a:spcBef>
-                <a:spcPct val="0"/>
-              </a:spcBef>
-              <a:buNone/>
-              <a:defRPr sz="4400" kern="1200">
-                <a:solidFill>
-                  <a:schemeClr val="tx1"/>
-                </a:solidFill>
-                <a:latin typeface="+mj-lt"/>
-                <a:ea typeface="+mj-ea"/>
-                <a:cs typeface="+mj-cs"/>
-              </a:defRPr>
-            </a:lvl1pPr>
-          </a:lstStyle>
-          <a:p>
-            <a:r>
-              <a:rPr lang="en-US" dirty="0">
-                <a:latin typeface="+mn-lt"/>
-              </a:rPr>
-              <a:t>KDD process</a:t>
-            </a:r>
-          </a:p>
-        </p:txBody>
-      </p:sp>
-      <p:pic>
-        <p:nvPicPr>
-          <p:cNvPr id="4" name="Picture 3">
-            <a:extLst>
-              <a:ext uri="{FF2B5EF4-FFF2-40B4-BE49-F238E27FC236}">
-                <a16:creationId xmlns:a16="http://schemas.microsoft.com/office/drawing/2014/main" id="{41A10601-345E-4A04-878A-28FFF71506B5}"/>
-              </a:ext>
-            </a:extLst>
-          </p:cNvPr>
-          <p:cNvPicPr>
-            <a:picLocks noChangeAspect="1"/>
-          </p:cNvPicPr>
-          <p:nvPr/>
-        </p:nvPicPr>
-        <p:blipFill>
-          <a:blip r:embed="rId2"/>
-          <a:stretch>
-            <a:fillRect/>
-          </a:stretch>
-        </p:blipFill>
-        <p:spPr>
-          <a:xfrm>
-            <a:off x="951375" y="1651145"/>
-            <a:ext cx="8488232" cy="4404795"/>
-          </a:xfrm>
-          <a:prstGeom prst="rect">
-            <a:avLst/>
-          </a:prstGeom>
-        </p:spPr>
-      </p:pic>
-    </p:spTree>
-    <p:extLst>
-      <p:ext uri="{BB962C8B-B14F-4D97-AF65-F5344CB8AC3E}">
-        <p14:creationId xmlns:p14="http://schemas.microsoft.com/office/powerpoint/2010/main" val="2011350768"/>
-      </p:ext>
-    </p:extLst>
-  </p:cSld>
-  <p:clrMapOvr>
-    <a:masterClrMapping/>
-  </p:clrMapOvr>
-  <p:timing>
-    <p:tnLst>
-      <p:par>
-        <p:cTn id="1" dur="indefinite" restart="never" nodeType="tmRoot">
-          <p:childTnLst>
-            <p:seq concurrent="1" nextAc="seek">
-              <p:cTn id="2" dur="indefinite" nodeType="mainSeq">
-                <p:childTnLst>
-                  <p:par>
-                    <p:cTn id="3" fill="hold">
-                      <p:stCondLst>
-                        <p:cond delay="indefinite"/>
-                      </p:stCondLst>
-                      <p:childTnLst>
-                        <p:par>
-                          <p:cTn id="4" fill="hold">
-                            <p:stCondLst>
-                              <p:cond delay="0"/>
-                            </p:stCondLst>
-                            <p:childTnLst>
-                              <p:par>
-                                <p:cTn id="5" presetID="1" presetClass="entr" presetSubtype="0" fill="hold" nodeType="clickEffect">
-                                  <p:stCondLst>
-                                    <p:cond delay="0"/>
-                                  </p:stCondLst>
-                                  <p:childTnLst>
-                                    <p:set>
-                                      <p:cBhvr>
-                                        <p:cTn id="6" dur="1" fill="hold">
-                                          <p:stCondLst>
-                                            <p:cond delay="0"/>
-                                          </p:stCondLst>
-                                        </p:cTn>
-                                        <p:tgtEl>
-                                          <p:spTgt spid="3">
-                                            <p:txEl>
-                                              <p:pRg st="0" end="0"/>
-                                            </p:txEl>
-                                          </p:spTgt>
-                                        </p:tgtEl>
-                                        <p:attrNameLst>
-                                          <p:attrName>style.visibility</p:attrName>
-                                        </p:attrNameLst>
-                                      </p:cBhvr>
-                                      <p:to>
-                                        <p:strVal val="visible"/>
-                                      </p:to>
-                                    </p:set>
-                                  </p:childTnLst>
-                                </p:cTn>
-                              </p:par>
-                            </p:childTnLst>
-                          </p:cTn>
-                        </p:par>
-                      </p:childTnLst>
-                    </p:cTn>
-                  </p:par>
-                  <p:par>
-                    <p:cTn id="7" fill="hold">
-                      <p:stCondLst>
-                        <p:cond delay="indefinite"/>
-                      </p:stCondLst>
-                      <p:childTnLst>
-                        <p:par>
-                          <p:cTn id="8" fill="hold">
-                            <p:stCondLst>
-                              <p:cond delay="0"/>
-                            </p:stCondLst>
-                            <p:childTnLst>
-                              <p:par>
-                                <p:cTn id="9" presetID="1" presetClass="entr" presetSubtype="0" fill="hold" nodeType="clickEffect">
-                                  <p:stCondLst>
-                                    <p:cond delay="0"/>
-                                  </p:stCondLst>
-                                  <p:childTnLst>
-                                    <p:set>
-                                      <p:cBhvr>
-                                        <p:cTn id="10" dur="1" fill="hold">
-                                          <p:stCondLst>
-                                            <p:cond delay="0"/>
-                                          </p:stCondLst>
-                                        </p:cTn>
-                                        <p:tgtEl>
-                                          <p:spTgt spid="3">
-                                            <p:txEl>
-                                              <p:pRg st="11" end="11"/>
-                                            </p:txEl>
-                                          </p:spTgt>
-                                        </p:tgtEl>
-                                        <p:attrNameLst>
-                                          <p:attrName>style.visibility</p:attrName>
-                                        </p:attrNameLst>
-                                      </p:cBhvr>
-                                      <p:to>
-                                        <p:strVal val="visible"/>
-                                      </p:to>
-                                    </p:set>
-                                  </p:childTnLst>
-                                </p:cTn>
-                              </p:par>
-                              <p:par>
-                                <p:cTn id="11" presetID="1" presetClass="entr" presetSubtype="0" fill="hold" nodeType="withEffect">
-                                  <p:stCondLst>
-                                    <p:cond delay="0"/>
-                                  </p:stCondLst>
-                                  <p:childTnLst>
-                                    <p:set>
-                                      <p:cBhvr>
-                                        <p:cTn id="12" dur="1" fill="hold">
-                                          <p:stCondLst>
-                                            <p:cond delay="0"/>
-                                          </p:stCondLst>
-                                        </p:cTn>
-                                        <p:tgtEl>
-                                          <p:spTgt spid="4"/>
-                                        </p:tgtEl>
-                                        <p:attrNameLst>
-                                          <p:attrName>style.visibility</p:attrName>
-                                        </p:attrNameLst>
-                                      </p:cBhvr>
-                                      <p:to>
-                                        <p:strVal val="visible"/>
-                                      </p:to>
-                                    </p:set>
-                                  </p:childTnLst>
-                                </p:cTn>
-                              </p:par>
-                            </p:childTnLst>
-                          </p:cTn>
-                        </p:par>
-                      </p:childTnLst>
-                    </p:cTn>
-                  </p:par>
-                </p:childTnLst>
-              </p:cTn>
-              <p:prevCondLst>
-                <p:cond evt="onPrev" delay="0">
-                  <p:tgtEl>
-                    <p:sldTgt/>
-                  </p:tgtEl>
-                </p:cond>
-              </p:prevCondLst>
-              <p:nextCondLst>
-                <p:cond evt="onNext" delay="0">
-                  <p:tgtEl>
-                    <p:sldTgt/>
-                  </p:tgtEl>
-                </p:cond>
-              </p:nextCondLst>
-            </p:seq>
-          </p:childTnLst>
-        </p:cTn>
-      </p:par>
-    </p:tnLst>
-  </p:timing>
-</p:sld>
-</file>
-
-<file path=ppt/slides/slide50.xml><?xml version="1.0" encoding="utf-8"?>
+<file path=ppt/slides/slide51.xml><?xml version="1.0" encoding="utf-8"?>
 <p:sld xmlns:a="http://schemas.openxmlformats.org/drawingml/2006/main" xmlns:r="http://schemas.openxmlformats.org/officeDocument/2006/relationships" xmlns:p="http://schemas.openxmlformats.org/presentationml/2006/main">
   <p:cSld>
     <p:spTree>
@@ -34721,7 +35514,7 @@
 </p:sld>
 </file>
 
-<file path=ppt/slides/slide51.xml><?xml version="1.0" encoding="utf-8"?>
+<file path=ppt/slides/slide52.xml><?xml version="1.0" encoding="utf-8"?>
 <p:sld xmlns:a="http://schemas.openxmlformats.org/drawingml/2006/main" xmlns:r="http://schemas.openxmlformats.org/officeDocument/2006/relationships" xmlns:p="http://schemas.openxmlformats.org/presentationml/2006/main">
   <p:cSld>
     <p:spTree>
@@ -35222,7 +36015,7 @@
 </p:sld>
 </file>
 
-<file path=ppt/slides/slide52.xml><?xml version="1.0" encoding="utf-8"?>
+<file path=ppt/slides/slide53.xml><?xml version="1.0" encoding="utf-8"?>
 <p:sld xmlns:a="http://schemas.openxmlformats.org/drawingml/2006/main" xmlns:r="http://schemas.openxmlformats.org/officeDocument/2006/relationships" xmlns:p="http://schemas.openxmlformats.org/presentationml/2006/main">
   <p:cSld>
     <p:spTree>
@@ -35930,7 +36723,7 @@
 </p:sld>
 </file>
 
-<file path=ppt/slides/slide53.xml><?xml version="1.0" encoding="utf-8"?>
+<file path=ppt/slides/slide54.xml><?xml version="1.0" encoding="utf-8"?>
 <p:sld xmlns:a="http://schemas.openxmlformats.org/drawingml/2006/main" xmlns:r="http://schemas.openxmlformats.org/officeDocument/2006/relationships" xmlns:p="http://schemas.openxmlformats.org/presentationml/2006/main">
   <p:cSld>
     <p:spTree>
@@ -36045,8 +36838,8 @@
           </a:p>
         </p:txBody>
       </p:sp>
-      <mc:AlternateContent xmlns:mc="http://schemas.openxmlformats.org/markup-compatibility/2006" xmlns:a14="http://schemas.microsoft.com/office/drawing/2010/main">
-        <mc:Choice Requires="a14">
+      <mc:AlternateContent xmlns:mc="http://schemas.openxmlformats.org/markup-compatibility/2006">
+        <mc:Choice xmlns:a14="http://schemas.microsoft.com/office/drawing/2010/main" Requires="a14">
           <p:graphicFrame>
             <p:nvGraphicFramePr>
               <p:cNvPr id="2" name="Table 3">
@@ -36062,7 +36855,7 @@
               <p:nvPr>
                 <p:extLst>
                   <p:ext uri="{D42A27DB-BD31-4B8C-83A1-F6EECF244321}">
-                    <p14:modId xmlns:p14="http://schemas.microsoft.com/office/powerpoint/2010/main" val="1493759359"/>
+                    <p14:modId xmlns:p14="http://schemas.microsoft.com/office/powerpoint/2010/main" val="2950466987"/>
                   </p:ext>
                 </p:extLst>
               </p:nvPr>
@@ -36330,7 +37123,11 @@
                         <a:lstStyle/>
                         <a:p>
                           <a:r>
-                            <a:rPr lang="en-US" sz="2400" dirty="0"/>
+                            <a:rPr lang="en-US" sz="2400" b="1" dirty="0">
+                              <a:solidFill>
+                                <a:srgbClr val="C00000"/>
+                              </a:solidFill>
+                            </a:rPr>
                             <a:t>False discovery</a:t>
                           </a:r>
                         </a:p>
@@ -36415,7 +37212,11 @@
                         <a:lstStyle/>
                         <a:p>
                           <a:r>
-                            <a:rPr lang="en-US" sz="2400" dirty="0"/>
+                            <a:rPr lang="en-US" sz="2400" b="1" dirty="0">
+                              <a:solidFill>
+                                <a:srgbClr val="C00000"/>
+                              </a:solidFill>
+                            </a:rPr>
                             <a:t>Undetected discovery</a:t>
                           </a:r>
                         </a:p>
@@ -36456,7 +37257,7 @@
             </a:graphic>
           </p:graphicFrame>
         </mc:Choice>
-        <mc:Fallback xmlns="">
+        <mc:Fallback>
           <p:graphicFrame>
             <p:nvGraphicFramePr>
               <p:cNvPr id="2" name="Table 3">
@@ -36472,7 +37273,7 @@
               <p:nvPr>
                 <p:extLst>
                   <p:ext uri="{D42A27DB-BD31-4B8C-83A1-F6EECF244321}">
-                    <p14:modId xmlns:p14="http://schemas.microsoft.com/office/powerpoint/2010/main" val="1493759359"/>
+                    <p14:modId xmlns:p14="http://schemas.microsoft.com/office/powerpoint/2010/main" val="2950466987"/>
                   </p:ext>
                 </p:extLst>
               </p:nvPr>
@@ -36603,7 +37404,11 @@
                         <a:lstStyle/>
                         <a:p>
                           <a:r>
-                            <a:rPr lang="en-US" sz="2400" dirty="0"/>
+                            <a:rPr lang="en-US" sz="2400" b="1" dirty="0">
+                              <a:solidFill>
+                                <a:srgbClr val="C00000"/>
+                              </a:solidFill>
+                            </a:rPr>
                             <a:t>False discovery</a:t>
                           </a:r>
                         </a:p>
@@ -36646,7 +37451,11 @@
                         <a:lstStyle/>
                         <a:p>
                           <a:r>
-                            <a:rPr lang="en-US" sz="2400" dirty="0"/>
+                            <a:rPr lang="en-US" sz="2400" b="1" dirty="0">
+                              <a:solidFill>
+                                <a:srgbClr val="C00000"/>
+                              </a:solidFill>
+                            </a:rPr>
                             <a:t>Undetected discovery</a:t>
                           </a:r>
                         </a:p>
@@ -37201,7 +38010,7 @@
 </p:sld>
 </file>
 
-<file path=ppt/slides/slide54.xml><?xml version="1.0" encoding="utf-8"?>
+<file path=ppt/slides/slide55.xml><?xml version="1.0" encoding="utf-8"?>
 <p:sld xmlns:a="http://schemas.openxmlformats.org/drawingml/2006/main" xmlns:r="http://schemas.openxmlformats.org/officeDocument/2006/relationships" xmlns:p="http://schemas.openxmlformats.org/presentationml/2006/main">
   <p:cSld>
     <p:spTree>
@@ -37271,7 +38080,7 @@
 </p:sld>
 </file>
 
-<file path=ppt/slides/slide55.xml><?xml version="1.0" encoding="utf-8"?>
+<file path=ppt/slides/slide56.xml><?xml version="1.0" encoding="utf-8"?>
 <p:sld xmlns:a="http://schemas.openxmlformats.org/drawingml/2006/main" xmlns:r="http://schemas.openxmlformats.org/officeDocument/2006/relationships" xmlns:p="http://schemas.openxmlformats.org/presentationml/2006/main">
   <p:cSld>
     <p:spTree>
@@ -37818,7 +38627,7 @@
 </p:sld>
 </file>
 
-<file path=ppt/slides/slide56.xml><?xml version="1.0" encoding="utf-8"?>
+<file path=ppt/slides/slide57.xml><?xml version="1.0" encoding="utf-8"?>
 <p:sld xmlns:a="http://schemas.openxmlformats.org/drawingml/2006/main" xmlns:r="http://schemas.openxmlformats.org/officeDocument/2006/relationships" xmlns:p="http://schemas.openxmlformats.org/presentationml/2006/main">
   <p:cSld>
     <p:spTree>
@@ -38361,7 +39170,7 @@
 </p:sld>
 </file>
 
-<file path=ppt/slides/slide57.xml><?xml version="1.0" encoding="utf-8"?>
+<file path=ppt/slides/slide58.xml><?xml version="1.0" encoding="utf-8"?>
 <p:sld xmlns:a="http://schemas.openxmlformats.org/drawingml/2006/main" xmlns:r="http://schemas.openxmlformats.org/officeDocument/2006/relationships" xmlns:p="http://schemas.openxmlformats.org/presentationml/2006/main">
   <p:cSld>
     <p:spTree>
@@ -38698,7 +39507,7 @@
 </p:sld>
 </file>
 
-<file path=ppt/slides/slide58.xml><?xml version="1.0" encoding="utf-8"?>
+<file path=ppt/slides/slide59.xml><?xml version="1.0" encoding="utf-8"?>
 <p:sld xmlns:a="http://schemas.openxmlformats.org/drawingml/2006/main" xmlns:r="http://schemas.openxmlformats.org/officeDocument/2006/relationships" xmlns:p="http://schemas.openxmlformats.org/presentationml/2006/main">
   <p:cSld>
     <p:spTree>
@@ -38780,7 +39589,15 @@
           <a:p>
             <a:r>
               <a:rPr lang="en-US" dirty="0"/>
-              <a:t>Results in false positive! </a:t>
+              <a:t>Results in </a:t>
+            </a:r>
+            <a:r>
+              <a:rPr lang="en-US" b="1" dirty="0"/>
+              <a:t>false positive!</a:t>
+            </a:r>
+            <a:r>
+              <a:rPr lang="en-US" dirty="0"/>
+              <a:t> </a:t>
             </a:r>
           </a:p>
           <a:p>
@@ -39286,439 +40103,6 @@
 </p:sld>
 </file>
 
-<file path=ppt/slides/slide59.xml><?xml version="1.0" encoding="utf-8"?>
-<p:sld xmlns:a="http://schemas.openxmlformats.org/drawingml/2006/main" xmlns:r="http://schemas.openxmlformats.org/officeDocument/2006/relationships" xmlns:p="http://schemas.openxmlformats.org/presentationml/2006/main">
-  <p:cSld>
-    <p:spTree>
-      <p:nvGrpSpPr>
-        <p:cNvPr id="1" name=""/>
-        <p:cNvGrpSpPr/>
-        <p:nvPr/>
-      </p:nvGrpSpPr>
-      <p:grpSpPr>
-        <a:xfrm>
-          <a:off x="0" y="0"/>
-          <a:ext cx="0" cy="0"/>
-          <a:chOff x="0" y="0"/>
-          <a:chExt cx="0" cy="0"/>
-        </a:xfrm>
-      </p:grpSpPr>
-      <p:sp>
-        <p:nvSpPr>
-          <p:cNvPr id="3" name="Content Placeholder 2">
-            <a:extLst>
-              <a:ext uri="{FF2B5EF4-FFF2-40B4-BE49-F238E27FC236}">
-                <a16:creationId xmlns:a16="http://schemas.microsoft.com/office/drawing/2014/main" id="{258E6AF3-7615-4BD1-878E-A94C93E98F90}"/>
-              </a:ext>
-            </a:extLst>
-          </p:cNvPr>
-          <p:cNvSpPr>
-            <a:spLocks noGrp="1"/>
-          </p:cNvSpPr>
-          <p:nvPr>
-            <p:ph idx="1"/>
-          </p:nvPr>
-        </p:nvSpPr>
-        <p:spPr>
-          <a:xfrm>
-            <a:off x="640237" y="1154757"/>
-            <a:ext cx="5128967" cy="5436747"/>
-          </a:xfrm>
-        </p:spPr>
-        <p:txBody>
-          <a:bodyPr>
-            <a:normAutofit/>
-          </a:bodyPr>
-          <a:lstStyle/>
-          <a:p>
-            <a:pPr marL="0" indent="0">
-              <a:buNone/>
-            </a:pPr>
-            <a:r>
-              <a:rPr lang="en-US" dirty="0"/>
-              <a:t>Correlations alone can be misleading</a:t>
-            </a:r>
-          </a:p>
-          <a:p>
-            <a:r>
-              <a:rPr lang="en-US" dirty="0"/>
-              <a:t>Can eating chocolate help you win a Nobel prize?</a:t>
-            </a:r>
-          </a:p>
-          <a:p>
-            <a:r>
-              <a:rPr lang="en-US" dirty="0"/>
-              <a:t>Consider log chocolate consumption and log Nobel prizes for 18 countries  </a:t>
-            </a:r>
-          </a:p>
-          <a:p>
-            <a:r>
-              <a:rPr lang="en-US" dirty="0"/>
-              <a:t>The high correlation between these variables looks promising!</a:t>
-            </a:r>
-          </a:p>
-        </p:txBody>
-      </p:sp>
-      <p:sp>
-        <p:nvSpPr>
-          <p:cNvPr id="6" name="Title 1">
-            <a:extLst>
-              <a:ext uri="{FF2B5EF4-FFF2-40B4-BE49-F238E27FC236}">
-                <a16:creationId xmlns:a16="http://schemas.microsoft.com/office/drawing/2014/main" id="{CD29F70F-B868-451B-A65D-8721F4C7A2D9}"/>
-              </a:ext>
-            </a:extLst>
-          </p:cNvPr>
-          <p:cNvSpPr txBox="1">
-            <a:spLocks/>
-          </p:cNvSpPr>
-          <p:nvPr/>
-        </p:nvSpPr>
-        <p:spPr>
-          <a:xfrm>
-            <a:off x="838200" y="-635"/>
-            <a:ext cx="10515600" cy="1325563"/>
-          </a:xfrm>
-          <a:prstGeom prst="rect">
-            <a:avLst/>
-          </a:prstGeom>
-        </p:spPr>
-        <p:txBody>
-          <a:bodyPr vert="horz" lIns="91440" tIns="45720" rIns="91440" bIns="45720" rtlCol="0" anchor="ctr">
-            <a:normAutofit/>
-          </a:bodyPr>
-          <a:lstStyle>
-            <a:lvl1pPr algn="l" defTabSz="914400" rtl="0" eaLnBrk="1" latinLnBrk="0" hangingPunct="1">
-              <a:lnSpc>
-                <a:spcPct val="90000"/>
-              </a:lnSpc>
-              <a:spcBef>
-                <a:spcPct val="0"/>
-              </a:spcBef>
-              <a:buNone/>
-              <a:defRPr sz="4400" kern="1200">
-                <a:solidFill>
-                  <a:schemeClr val="tx1"/>
-                </a:solidFill>
-                <a:latin typeface="+mj-lt"/>
-                <a:ea typeface="+mj-ea"/>
-                <a:cs typeface="+mj-cs"/>
-              </a:defRPr>
-            </a:lvl1pPr>
-          </a:lstStyle>
-          <a:p>
-            <a:r>
-              <a:rPr lang="en-US" dirty="0">
-                <a:latin typeface="+mn-lt"/>
-              </a:rPr>
-              <a:t>Pitfalls of Data Mining </a:t>
-            </a:r>
-          </a:p>
-        </p:txBody>
-      </p:sp>
-      <p:pic>
-        <p:nvPicPr>
-          <p:cNvPr id="5" name="Picture 4">
-            <a:extLst>
-              <a:ext uri="{FF2B5EF4-FFF2-40B4-BE49-F238E27FC236}">
-                <a16:creationId xmlns:a16="http://schemas.microsoft.com/office/drawing/2014/main" id="{8C9B9E92-634C-5E76-1042-2328B2EE110F}"/>
-              </a:ext>
-            </a:extLst>
-          </p:cNvPr>
-          <p:cNvPicPr>
-            <a:picLocks noChangeAspect="1"/>
-          </p:cNvPicPr>
-          <p:nvPr/>
-        </p:nvPicPr>
-        <p:blipFill>
-          <a:blip r:embed="rId2"/>
-          <a:stretch>
-            <a:fillRect/>
-          </a:stretch>
-        </p:blipFill>
-        <p:spPr>
-          <a:xfrm>
-            <a:off x="5557101" y="947184"/>
-            <a:ext cx="6523348" cy="5800645"/>
-          </a:xfrm>
-          <a:prstGeom prst="rect">
-            <a:avLst/>
-          </a:prstGeom>
-        </p:spPr>
-      </p:pic>
-      <p:pic>
-        <p:nvPicPr>
-          <p:cNvPr id="8" name="Picture 7">
-            <a:extLst>
-              <a:ext uri="{FF2B5EF4-FFF2-40B4-BE49-F238E27FC236}">
-                <a16:creationId xmlns:a16="http://schemas.microsoft.com/office/drawing/2014/main" id="{9B2BF97A-70C9-E5C8-51F8-B2FDF82ABF0D}"/>
-              </a:ext>
-            </a:extLst>
-          </p:cNvPr>
-          <p:cNvPicPr>
-            <a:picLocks noChangeAspect="1"/>
-          </p:cNvPicPr>
-          <p:nvPr/>
-        </p:nvPicPr>
-        <p:blipFill>
-          <a:blip r:embed="rId3"/>
-          <a:stretch>
-            <a:fillRect/>
-          </a:stretch>
-        </p:blipFill>
-        <p:spPr>
-          <a:xfrm>
-            <a:off x="8305880" y="4849291"/>
-            <a:ext cx="3290728" cy="1061525"/>
-          </a:xfrm>
-          <a:prstGeom prst="rect">
-            <a:avLst/>
-          </a:prstGeom>
-        </p:spPr>
-      </p:pic>
-    </p:spTree>
-    <p:extLst>
-      <p:ext uri="{BB962C8B-B14F-4D97-AF65-F5344CB8AC3E}">
-        <p14:creationId xmlns:p14="http://schemas.microsoft.com/office/powerpoint/2010/main" val="2245637609"/>
-      </p:ext>
-    </p:extLst>
-  </p:cSld>
-  <p:clrMapOvr>
-    <a:masterClrMapping/>
-  </p:clrMapOvr>
-  <p:timing>
-    <p:tnLst>
-      <p:par>
-        <p:cTn id="1" dur="indefinite" restart="never" nodeType="tmRoot">
-          <p:childTnLst>
-            <p:seq concurrent="1" nextAc="seek">
-              <p:cTn id="2" dur="indefinite" nodeType="mainSeq">
-                <p:childTnLst>
-                  <p:par>
-                    <p:cTn id="3" fill="hold">
-                      <p:stCondLst>
-                        <p:cond delay="indefinite"/>
-                      </p:stCondLst>
-                      <p:childTnLst>
-                        <p:par>
-                          <p:cTn id="4" fill="hold">
-                            <p:stCondLst>
-                              <p:cond delay="0"/>
-                            </p:stCondLst>
-                            <p:childTnLst>
-                              <p:par>
-                                <p:cTn id="5" presetID="1" presetClass="entr" presetSubtype="0" fill="hold" nodeType="clickEffect">
-                                  <p:stCondLst>
-                                    <p:cond delay="0"/>
-                                  </p:stCondLst>
-                                  <p:childTnLst>
-                                    <p:set>
-                                      <p:cBhvr>
-                                        <p:cTn id="6" dur="1" fill="hold">
-                                          <p:stCondLst>
-                                            <p:cond delay="0"/>
-                                          </p:stCondLst>
-                                        </p:cTn>
-                                        <p:tgtEl>
-                                          <p:spTgt spid="3">
-                                            <p:txEl>
-                                              <p:pRg st="1" end="1"/>
-                                            </p:txEl>
-                                          </p:spTgt>
-                                        </p:tgtEl>
-                                        <p:attrNameLst>
-                                          <p:attrName>style.visibility</p:attrName>
-                                        </p:attrNameLst>
-                                      </p:cBhvr>
-                                      <p:to>
-                                        <p:strVal val="visible"/>
-                                      </p:to>
-                                    </p:set>
-                                  </p:childTnLst>
-                                </p:cTn>
-                              </p:par>
-                            </p:childTnLst>
-                          </p:cTn>
-                        </p:par>
-                      </p:childTnLst>
-                    </p:cTn>
-                  </p:par>
-                  <p:par>
-                    <p:cTn id="7" fill="hold">
-                      <p:stCondLst>
-                        <p:cond delay="indefinite"/>
-                      </p:stCondLst>
-                      <p:childTnLst>
-                        <p:par>
-                          <p:cTn id="8" fill="hold">
-                            <p:stCondLst>
-                              <p:cond delay="0"/>
-                            </p:stCondLst>
-                            <p:childTnLst>
-                              <p:par>
-                                <p:cTn id="9" presetID="1" presetClass="entr" presetSubtype="0" fill="hold" nodeType="clickEffect">
-                                  <p:stCondLst>
-                                    <p:cond delay="0"/>
-                                  </p:stCondLst>
-                                  <p:childTnLst>
-                                    <p:set>
-                                      <p:cBhvr>
-                                        <p:cTn id="10" dur="1" fill="hold">
-                                          <p:stCondLst>
-                                            <p:cond delay="0"/>
-                                          </p:stCondLst>
-                                        </p:cTn>
-                                        <p:tgtEl>
-                                          <p:spTgt spid="3">
-                                            <p:txEl>
-                                              <p:pRg st="2" end="2"/>
-                                            </p:txEl>
-                                          </p:spTgt>
-                                        </p:tgtEl>
-                                        <p:attrNameLst>
-                                          <p:attrName>style.visibility</p:attrName>
-                                        </p:attrNameLst>
-                                      </p:cBhvr>
-                                      <p:to>
-                                        <p:strVal val="visible"/>
-                                      </p:to>
-                                    </p:set>
-                                  </p:childTnLst>
-                                </p:cTn>
-                              </p:par>
-                              <p:par>
-                                <p:cTn id="11" presetID="1" presetClass="entr" presetSubtype="0" fill="hold" nodeType="withEffect">
-                                  <p:stCondLst>
-                                    <p:cond delay="0"/>
-                                  </p:stCondLst>
-                                  <p:childTnLst>
-                                    <p:set>
-                                      <p:cBhvr>
-                                        <p:cTn id="12" dur="1" fill="hold">
-                                          <p:stCondLst>
-                                            <p:cond delay="0"/>
-                                          </p:stCondLst>
-                                        </p:cTn>
-                                        <p:tgtEl>
-                                          <p:spTgt spid="5"/>
-                                        </p:tgtEl>
-                                        <p:attrNameLst>
-                                          <p:attrName>style.visibility</p:attrName>
-                                        </p:attrNameLst>
-                                      </p:cBhvr>
-                                      <p:to>
-                                        <p:strVal val="visible"/>
-                                      </p:to>
-                                    </p:set>
-                                  </p:childTnLst>
-                                </p:cTn>
-                              </p:par>
-                            </p:childTnLst>
-                          </p:cTn>
-                        </p:par>
-                      </p:childTnLst>
-                    </p:cTn>
-                  </p:par>
-                  <p:par>
-                    <p:cTn id="13" fill="hold">
-                      <p:stCondLst>
-                        <p:cond delay="indefinite"/>
-                      </p:stCondLst>
-                      <p:childTnLst>
-                        <p:par>
-                          <p:cTn id="14" fill="hold">
-                            <p:stCondLst>
-                              <p:cond delay="0"/>
-                            </p:stCondLst>
-                            <p:childTnLst>
-                              <p:par>
-                                <p:cTn id="15" presetID="1" presetClass="entr" presetSubtype="0" fill="hold" nodeType="clickEffect">
-                                  <p:stCondLst>
-                                    <p:cond delay="0"/>
-                                  </p:stCondLst>
-                                  <p:childTnLst>
-                                    <p:set>
-                                      <p:cBhvr>
-                                        <p:cTn id="16" dur="1" fill="hold">
-                                          <p:stCondLst>
-                                            <p:cond delay="0"/>
-                                          </p:stCondLst>
-                                        </p:cTn>
-                                        <p:tgtEl>
-                                          <p:spTgt spid="3">
-                                            <p:txEl>
-                                              <p:pRg st="3" end="3"/>
-                                            </p:txEl>
-                                          </p:spTgt>
-                                        </p:tgtEl>
-                                        <p:attrNameLst>
-                                          <p:attrName>style.visibility</p:attrName>
-                                        </p:attrNameLst>
-                                      </p:cBhvr>
-                                      <p:to>
-                                        <p:strVal val="visible"/>
-                                      </p:to>
-                                    </p:set>
-                                  </p:childTnLst>
-                                </p:cTn>
-                              </p:par>
-                              <p:par>
-                                <p:cTn id="17" presetID="1" presetClass="entr" presetSubtype="0" fill="hold" nodeType="withEffect">
-                                  <p:stCondLst>
-                                    <p:cond delay="0"/>
-                                  </p:stCondLst>
-                                  <p:childTnLst>
-                                    <p:set>
-                                      <p:cBhvr>
-                                        <p:cTn id="18" dur="1" fill="hold">
-                                          <p:stCondLst>
-                                            <p:cond delay="0"/>
-                                          </p:stCondLst>
-                                        </p:cTn>
-                                        <p:tgtEl>
-                                          <p:spTgt spid="8"/>
-                                        </p:tgtEl>
-                                        <p:attrNameLst>
-                                          <p:attrName>style.visibility</p:attrName>
-                                        </p:attrNameLst>
-                                      </p:cBhvr>
-                                      <p:to>
-                                        <p:strVal val="visible"/>
-                                      </p:to>
-                                    </p:set>
-                                  </p:childTnLst>
-                                </p:cTn>
-                              </p:par>
-                            </p:childTnLst>
-                          </p:cTn>
-                        </p:par>
-                      </p:childTnLst>
-                    </p:cTn>
-                  </p:par>
-                </p:childTnLst>
-              </p:cTn>
-              <p:prevCondLst>
-                <p:cond evt="onPrev" delay="0">
-                  <p:tgtEl>
-                    <p:sldTgt/>
-                  </p:tgtEl>
-                </p:cond>
-              </p:prevCondLst>
-              <p:nextCondLst>
-                <p:cond evt="onNext" delay="0">
-                  <p:tgtEl>
-                    <p:sldTgt/>
-                  </p:tgtEl>
-                </p:cond>
-              </p:nextCondLst>
-            </p:seq>
-          </p:childTnLst>
-        </p:cTn>
-      </p:par>
-    </p:tnLst>
-  </p:timing>
-</p:sld>
-</file>
-
 <file path=ppt/slides/slide6.xml><?xml version="1.0" encoding="utf-8"?>
 <p:sld xmlns:a="http://schemas.openxmlformats.org/drawingml/2006/main" xmlns:r="http://schemas.openxmlformats.org/officeDocument/2006/relationships" xmlns:p="http://schemas.openxmlformats.org/presentationml/2006/main">
   <p:cSld>
@@ -40525,6 +40909,439 @@
           <a:p>
             <a:r>
               <a:rPr lang="en-US" dirty="0"/>
+              <a:t>Can eating chocolate help you win a Nobel prize?</a:t>
+            </a:r>
+          </a:p>
+          <a:p>
+            <a:r>
+              <a:rPr lang="en-US" dirty="0"/>
+              <a:t>Consider log chocolate consumption and log Nobel prizes for 18 countries  </a:t>
+            </a:r>
+          </a:p>
+          <a:p>
+            <a:r>
+              <a:rPr lang="en-US" dirty="0"/>
+              <a:t>The high correlation between these variables looks promising!</a:t>
+            </a:r>
+          </a:p>
+        </p:txBody>
+      </p:sp>
+      <p:sp>
+        <p:nvSpPr>
+          <p:cNvPr id="6" name="Title 1">
+            <a:extLst>
+              <a:ext uri="{FF2B5EF4-FFF2-40B4-BE49-F238E27FC236}">
+                <a16:creationId xmlns:a16="http://schemas.microsoft.com/office/drawing/2014/main" id="{CD29F70F-B868-451B-A65D-8721F4C7A2D9}"/>
+              </a:ext>
+            </a:extLst>
+          </p:cNvPr>
+          <p:cNvSpPr txBox="1">
+            <a:spLocks/>
+          </p:cNvSpPr>
+          <p:nvPr/>
+        </p:nvSpPr>
+        <p:spPr>
+          <a:xfrm>
+            <a:off x="838200" y="-635"/>
+            <a:ext cx="10515600" cy="1325563"/>
+          </a:xfrm>
+          <a:prstGeom prst="rect">
+            <a:avLst/>
+          </a:prstGeom>
+        </p:spPr>
+        <p:txBody>
+          <a:bodyPr vert="horz" lIns="91440" tIns="45720" rIns="91440" bIns="45720" rtlCol="0" anchor="ctr">
+            <a:normAutofit/>
+          </a:bodyPr>
+          <a:lstStyle>
+            <a:lvl1pPr algn="l" defTabSz="914400" rtl="0" eaLnBrk="1" latinLnBrk="0" hangingPunct="1">
+              <a:lnSpc>
+                <a:spcPct val="90000"/>
+              </a:lnSpc>
+              <a:spcBef>
+                <a:spcPct val="0"/>
+              </a:spcBef>
+              <a:buNone/>
+              <a:defRPr sz="4400" kern="1200">
+                <a:solidFill>
+                  <a:schemeClr val="tx1"/>
+                </a:solidFill>
+                <a:latin typeface="+mj-lt"/>
+                <a:ea typeface="+mj-ea"/>
+                <a:cs typeface="+mj-cs"/>
+              </a:defRPr>
+            </a:lvl1pPr>
+          </a:lstStyle>
+          <a:p>
+            <a:r>
+              <a:rPr lang="en-US" dirty="0">
+                <a:latin typeface="+mn-lt"/>
+              </a:rPr>
+              <a:t>Pitfalls of Data Mining </a:t>
+            </a:r>
+          </a:p>
+        </p:txBody>
+      </p:sp>
+      <p:pic>
+        <p:nvPicPr>
+          <p:cNvPr id="5" name="Picture 4">
+            <a:extLst>
+              <a:ext uri="{FF2B5EF4-FFF2-40B4-BE49-F238E27FC236}">
+                <a16:creationId xmlns:a16="http://schemas.microsoft.com/office/drawing/2014/main" id="{8C9B9E92-634C-5E76-1042-2328B2EE110F}"/>
+              </a:ext>
+            </a:extLst>
+          </p:cNvPr>
+          <p:cNvPicPr>
+            <a:picLocks noChangeAspect="1"/>
+          </p:cNvPicPr>
+          <p:nvPr/>
+        </p:nvPicPr>
+        <p:blipFill>
+          <a:blip r:embed="rId2"/>
+          <a:stretch>
+            <a:fillRect/>
+          </a:stretch>
+        </p:blipFill>
+        <p:spPr>
+          <a:xfrm>
+            <a:off x="5557101" y="947184"/>
+            <a:ext cx="6523348" cy="5800645"/>
+          </a:xfrm>
+          <a:prstGeom prst="rect">
+            <a:avLst/>
+          </a:prstGeom>
+        </p:spPr>
+      </p:pic>
+      <p:pic>
+        <p:nvPicPr>
+          <p:cNvPr id="8" name="Picture 7">
+            <a:extLst>
+              <a:ext uri="{FF2B5EF4-FFF2-40B4-BE49-F238E27FC236}">
+                <a16:creationId xmlns:a16="http://schemas.microsoft.com/office/drawing/2014/main" id="{9B2BF97A-70C9-E5C8-51F8-B2FDF82ABF0D}"/>
+              </a:ext>
+            </a:extLst>
+          </p:cNvPr>
+          <p:cNvPicPr>
+            <a:picLocks noChangeAspect="1"/>
+          </p:cNvPicPr>
+          <p:nvPr/>
+        </p:nvPicPr>
+        <p:blipFill>
+          <a:blip r:embed="rId3"/>
+          <a:stretch>
+            <a:fillRect/>
+          </a:stretch>
+        </p:blipFill>
+        <p:spPr>
+          <a:xfrm>
+            <a:off x="8305880" y="4849291"/>
+            <a:ext cx="3290728" cy="1061525"/>
+          </a:xfrm>
+          <a:prstGeom prst="rect">
+            <a:avLst/>
+          </a:prstGeom>
+        </p:spPr>
+      </p:pic>
+    </p:spTree>
+    <p:extLst>
+      <p:ext uri="{BB962C8B-B14F-4D97-AF65-F5344CB8AC3E}">
+        <p14:creationId xmlns:p14="http://schemas.microsoft.com/office/powerpoint/2010/main" val="2245637609"/>
+      </p:ext>
+    </p:extLst>
+  </p:cSld>
+  <p:clrMapOvr>
+    <a:masterClrMapping/>
+  </p:clrMapOvr>
+  <p:timing>
+    <p:tnLst>
+      <p:par>
+        <p:cTn id="1" dur="indefinite" restart="never" nodeType="tmRoot">
+          <p:childTnLst>
+            <p:seq concurrent="1" nextAc="seek">
+              <p:cTn id="2" dur="indefinite" nodeType="mainSeq">
+                <p:childTnLst>
+                  <p:par>
+                    <p:cTn id="3" fill="hold">
+                      <p:stCondLst>
+                        <p:cond delay="indefinite"/>
+                      </p:stCondLst>
+                      <p:childTnLst>
+                        <p:par>
+                          <p:cTn id="4" fill="hold">
+                            <p:stCondLst>
+                              <p:cond delay="0"/>
+                            </p:stCondLst>
+                            <p:childTnLst>
+                              <p:par>
+                                <p:cTn id="5" presetID="1" presetClass="entr" presetSubtype="0" fill="hold" nodeType="clickEffect">
+                                  <p:stCondLst>
+                                    <p:cond delay="0"/>
+                                  </p:stCondLst>
+                                  <p:childTnLst>
+                                    <p:set>
+                                      <p:cBhvr>
+                                        <p:cTn id="6" dur="1" fill="hold">
+                                          <p:stCondLst>
+                                            <p:cond delay="0"/>
+                                          </p:stCondLst>
+                                        </p:cTn>
+                                        <p:tgtEl>
+                                          <p:spTgt spid="3">
+                                            <p:txEl>
+                                              <p:pRg st="1" end="1"/>
+                                            </p:txEl>
+                                          </p:spTgt>
+                                        </p:tgtEl>
+                                        <p:attrNameLst>
+                                          <p:attrName>style.visibility</p:attrName>
+                                        </p:attrNameLst>
+                                      </p:cBhvr>
+                                      <p:to>
+                                        <p:strVal val="visible"/>
+                                      </p:to>
+                                    </p:set>
+                                  </p:childTnLst>
+                                </p:cTn>
+                              </p:par>
+                            </p:childTnLst>
+                          </p:cTn>
+                        </p:par>
+                      </p:childTnLst>
+                    </p:cTn>
+                  </p:par>
+                  <p:par>
+                    <p:cTn id="7" fill="hold">
+                      <p:stCondLst>
+                        <p:cond delay="indefinite"/>
+                      </p:stCondLst>
+                      <p:childTnLst>
+                        <p:par>
+                          <p:cTn id="8" fill="hold">
+                            <p:stCondLst>
+                              <p:cond delay="0"/>
+                            </p:stCondLst>
+                            <p:childTnLst>
+                              <p:par>
+                                <p:cTn id="9" presetID="1" presetClass="entr" presetSubtype="0" fill="hold" nodeType="clickEffect">
+                                  <p:stCondLst>
+                                    <p:cond delay="0"/>
+                                  </p:stCondLst>
+                                  <p:childTnLst>
+                                    <p:set>
+                                      <p:cBhvr>
+                                        <p:cTn id="10" dur="1" fill="hold">
+                                          <p:stCondLst>
+                                            <p:cond delay="0"/>
+                                          </p:stCondLst>
+                                        </p:cTn>
+                                        <p:tgtEl>
+                                          <p:spTgt spid="3">
+                                            <p:txEl>
+                                              <p:pRg st="2" end="2"/>
+                                            </p:txEl>
+                                          </p:spTgt>
+                                        </p:tgtEl>
+                                        <p:attrNameLst>
+                                          <p:attrName>style.visibility</p:attrName>
+                                        </p:attrNameLst>
+                                      </p:cBhvr>
+                                      <p:to>
+                                        <p:strVal val="visible"/>
+                                      </p:to>
+                                    </p:set>
+                                  </p:childTnLst>
+                                </p:cTn>
+                              </p:par>
+                              <p:par>
+                                <p:cTn id="11" presetID="1" presetClass="entr" presetSubtype="0" fill="hold" nodeType="withEffect">
+                                  <p:stCondLst>
+                                    <p:cond delay="0"/>
+                                  </p:stCondLst>
+                                  <p:childTnLst>
+                                    <p:set>
+                                      <p:cBhvr>
+                                        <p:cTn id="12" dur="1" fill="hold">
+                                          <p:stCondLst>
+                                            <p:cond delay="0"/>
+                                          </p:stCondLst>
+                                        </p:cTn>
+                                        <p:tgtEl>
+                                          <p:spTgt spid="5"/>
+                                        </p:tgtEl>
+                                        <p:attrNameLst>
+                                          <p:attrName>style.visibility</p:attrName>
+                                        </p:attrNameLst>
+                                      </p:cBhvr>
+                                      <p:to>
+                                        <p:strVal val="visible"/>
+                                      </p:to>
+                                    </p:set>
+                                  </p:childTnLst>
+                                </p:cTn>
+                              </p:par>
+                            </p:childTnLst>
+                          </p:cTn>
+                        </p:par>
+                      </p:childTnLst>
+                    </p:cTn>
+                  </p:par>
+                  <p:par>
+                    <p:cTn id="13" fill="hold">
+                      <p:stCondLst>
+                        <p:cond delay="indefinite"/>
+                      </p:stCondLst>
+                      <p:childTnLst>
+                        <p:par>
+                          <p:cTn id="14" fill="hold">
+                            <p:stCondLst>
+                              <p:cond delay="0"/>
+                            </p:stCondLst>
+                            <p:childTnLst>
+                              <p:par>
+                                <p:cTn id="15" presetID="1" presetClass="entr" presetSubtype="0" fill="hold" nodeType="clickEffect">
+                                  <p:stCondLst>
+                                    <p:cond delay="0"/>
+                                  </p:stCondLst>
+                                  <p:childTnLst>
+                                    <p:set>
+                                      <p:cBhvr>
+                                        <p:cTn id="16" dur="1" fill="hold">
+                                          <p:stCondLst>
+                                            <p:cond delay="0"/>
+                                          </p:stCondLst>
+                                        </p:cTn>
+                                        <p:tgtEl>
+                                          <p:spTgt spid="3">
+                                            <p:txEl>
+                                              <p:pRg st="3" end="3"/>
+                                            </p:txEl>
+                                          </p:spTgt>
+                                        </p:tgtEl>
+                                        <p:attrNameLst>
+                                          <p:attrName>style.visibility</p:attrName>
+                                        </p:attrNameLst>
+                                      </p:cBhvr>
+                                      <p:to>
+                                        <p:strVal val="visible"/>
+                                      </p:to>
+                                    </p:set>
+                                  </p:childTnLst>
+                                </p:cTn>
+                              </p:par>
+                              <p:par>
+                                <p:cTn id="17" presetID="1" presetClass="entr" presetSubtype="0" fill="hold" nodeType="withEffect">
+                                  <p:stCondLst>
+                                    <p:cond delay="0"/>
+                                  </p:stCondLst>
+                                  <p:childTnLst>
+                                    <p:set>
+                                      <p:cBhvr>
+                                        <p:cTn id="18" dur="1" fill="hold">
+                                          <p:stCondLst>
+                                            <p:cond delay="0"/>
+                                          </p:stCondLst>
+                                        </p:cTn>
+                                        <p:tgtEl>
+                                          <p:spTgt spid="8"/>
+                                        </p:tgtEl>
+                                        <p:attrNameLst>
+                                          <p:attrName>style.visibility</p:attrName>
+                                        </p:attrNameLst>
+                                      </p:cBhvr>
+                                      <p:to>
+                                        <p:strVal val="visible"/>
+                                      </p:to>
+                                    </p:set>
+                                  </p:childTnLst>
+                                </p:cTn>
+                              </p:par>
+                            </p:childTnLst>
+                          </p:cTn>
+                        </p:par>
+                      </p:childTnLst>
+                    </p:cTn>
+                  </p:par>
+                </p:childTnLst>
+              </p:cTn>
+              <p:prevCondLst>
+                <p:cond evt="onPrev" delay="0">
+                  <p:tgtEl>
+                    <p:sldTgt/>
+                  </p:tgtEl>
+                </p:cond>
+              </p:prevCondLst>
+              <p:nextCondLst>
+                <p:cond evt="onNext" delay="0">
+                  <p:tgtEl>
+                    <p:sldTgt/>
+                  </p:tgtEl>
+                </p:cond>
+              </p:nextCondLst>
+            </p:seq>
+          </p:childTnLst>
+        </p:cTn>
+      </p:par>
+    </p:tnLst>
+  </p:timing>
+</p:sld>
+</file>
+
+<file path=ppt/slides/slide61.xml><?xml version="1.0" encoding="utf-8"?>
+<p:sld xmlns:a="http://schemas.openxmlformats.org/drawingml/2006/main" xmlns:r="http://schemas.openxmlformats.org/officeDocument/2006/relationships" xmlns:p="http://schemas.openxmlformats.org/presentationml/2006/main">
+  <p:cSld>
+    <p:spTree>
+      <p:nvGrpSpPr>
+        <p:cNvPr id="1" name=""/>
+        <p:cNvGrpSpPr/>
+        <p:nvPr/>
+      </p:nvGrpSpPr>
+      <p:grpSpPr>
+        <a:xfrm>
+          <a:off x="0" y="0"/>
+          <a:ext cx="0" cy="0"/>
+          <a:chOff x="0" y="0"/>
+          <a:chExt cx="0" cy="0"/>
+        </a:xfrm>
+      </p:grpSpPr>
+      <p:sp>
+        <p:nvSpPr>
+          <p:cNvPr id="3" name="Content Placeholder 2">
+            <a:extLst>
+              <a:ext uri="{FF2B5EF4-FFF2-40B4-BE49-F238E27FC236}">
+                <a16:creationId xmlns:a16="http://schemas.microsoft.com/office/drawing/2014/main" id="{258E6AF3-7615-4BD1-878E-A94C93E98F90}"/>
+              </a:ext>
+            </a:extLst>
+          </p:cNvPr>
+          <p:cNvSpPr>
+            <a:spLocks noGrp="1"/>
+          </p:cNvSpPr>
+          <p:nvPr>
+            <p:ph idx="1"/>
+          </p:nvPr>
+        </p:nvSpPr>
+        <p:spPr>
+          <a:xfrm>
+            <a:off x="640237" y="1154757"/>
+            <a:ext cx="5128967" cy="5436747"/>
+          </a:xfrm>
+        </p:spPr>
+        <p:txBody>
+          <a:bodyPr>
+            <a:normAutofit/>
+          </a:bodyPr>
+          <a:lstStyle/>
+          <a:p>
+            <a:pPr marL="0" indent="0">
+              <a:buNone/>
+            </a:pPr>
+            <a:r>
+              <a:rPr lang="en-US" dirty="0"/>
+              <a:t>Correlations alone can be misleading</a:t>
+            </a:r>
+          </a:p>
+          <a:p>
+            <a:r>
+              <a:rPr lang="en-US" dirty="0"/>
               <a:t>Log of GDP is also a good predictor of  winning Nobel prizes    </a:t>
             </a:r>
           </a:p>
@@ -40847,7 +41664,7 @@
 </p:sld>
 </file>
 
-<file path=ppt/slides/slide61.xml><?xml version="1.0" encoding="utf-8"?>
+<file path=ppt/slides/slide62.xml><?xml version="1.0" encoding="utf-8"?>
 <p:sld xmlns:a="http://schemas.openxmlformats.org/drawingml/2006/main" xmlns:r="http://schemas.openxmlformats.org/officeDocument/2006/relationships" xmlns:p="http://schemas.openxmlformats.org/presentationml/2006/main">
   <p:cSld>
     <p:spTree>
@@ -41377,7 +42194,7 @@
 </p:sld>
 </file>
 
-<file path=ppt/slides/slide62.xml><?xml version="1.0" encoding="utf-8"?>
+<file path=ppt/slides/slide63.xml><?xml version="1.0" encoding="utf-8"?>
 <p:sld xmlns:a="http://schemas.openxmlformats.org/drawingml/2006/main" xmlns:r="http://schemas.openxmlformats.org/officeDocument/2006/relationships" xmlns:p="http://schemas.openxmlformats.org/presentationml/2006/main">
   <p:cSld>
     <p:spTree>
@@ -41437,7 +42254,7 @@
 </p:sld>
 </file>
 
-<file path=ppt/slides/slide63.xml><?xml version="1.0" encoding="utf-8"?>
+<file path=ppt/slides/slide64.xml><?xml version="1.0" encoding="utf-8"?>
 <p:sld xmlns:a="http://schemas.openxmlformats.org/drawingml/2006/main" xmlns:r="http://schemas.openxmlformats.org/officeDocument/2006/relationships" xmlns:p="http://schemas.openxmlformats.org/presentationml/2006/main">
   <p:cSld>
     <p:spTree>
@@ -41857,7 +42674,7 @@
 </p:sld>
 </file>
 
-<file path=ppt/slides/slide64.xml><?xml version="1.0" encoding="utf-8"?>
+<file path=ppt/slides/slide65.xml><?xml version="1.0" encoding="utf-8"?>
 <p:sld xmlns:a="http://schemas.openxmlformats.org/drawingml/2006/main" xmlns:r="http://schemas.openxmlformats.org/officeDocument/2006/relationships" xmlns:p="http://schemas.openxmlformats.org/presentationml/2006/main">
   <p:cSld>
     <p:spTree>
@@ -41874,8 +42691,8 @@
           <a:chExt cx="0" cy="0"/>
         </a:xfrm>
       </p:grpSpPr>
-      <mc:AlternateContent xmlns:mc="http://schemas.openxmlformats.org/markup-compatibility/2006" xmlns:a14="http://schemas.microsoft.com/office/drawing/2010/main">
-        <mc:Choice Requires="a14">
+      <mc:AlternateContent xmlns:mc="http://schemas.openxmlformats.org/markup-compatibility/2006">
+        <mc:Choice xmlns:a14="http://schemas.microsoft.com/office/drawing/2010/main" Requires="a14">
           <p:sp>
             <p:nvSpPr>
               <p:cNvPr id="3" name="Content Placeholder 2">
@@ -41995,14 +42812,22 @@
               <a:p>
                 <a:r>
                   <a:rPr lang="en-US" dirty="0"/>
-                  <a:t>Correction is very conservative  </a:t>
+                  <a:t>Correction is </a:t>
+                </a:r>
+                <a:r>
+                  <a:rPr lang="en-US" b="1" dirty="0"/>
+                  <a:t>very conservative  </a:t>
                 </a:r>
               </a:p>
               <a:p>
                 <a:pPr lvl="1"/>
                 <a:r>
                   <a:rPr lang="en-US" dirty="0"/>
-                  <a:t>Greatly reduces detection probability  </a:t>
+                  <a:t>Greatly </a:t>
+                </a:r>
+                <a:r>
+                  <a:rPr lang="en-US" b="1" dirty="0"/>
+                  <a:t>reduces detection probability  </a:t>
                 </a:r>
               </a:p>
               <a:p>
@@ -42241,7 +43066,7 @@
             </p:txBody>
           </p:sp>
         </mc:Choice>
-        <mc:Fallback xmlns="">
+        <mc:Fallback>
           <p:sp>
             <p:nvSpPr>
               <p:cNvPr id="3" name="Content Placeholder 2">
@@ -42655,7 +43480,7 @@
 </p:sld>
 </file>
 
-<file path=ppt/slides/slide65.xml><?xml version="1.0" encoding="utf-8"?>
+<file path=ppt/slides/slide66.xml><?xml version="1.0" encoding="utf-8"?>
 <p:sld xmlns:a="http://schemas.openxmlformats.org/drawingml/2006/main" xmlns:r="http://schemas.openxmlformats.org/officeDocument/2006/relationships" xmlns:p="http://schemas.openxmlformats.org/presentationml/2006/main">
   <p:cSld>
     <p:spTree>
@@ -43737,7 +44562,7 @@
 </p:sld>
 </file>
 
-<file path=ppt/slides/slide66.xml><?xml version="1.0" encoding="utf-8"?>
+<file path=ppt/slides/slide67.xml><?xml version="1.0" encoding="utf-8"?>
 <p:sld xmlns:a="http://schemas.openxmlformats.org/drawingml/2006/main" xmlns:r="http://schemas.openxmlformats.org/officeDocument/2006/relationships" xmlns:p="http://schemas.openxmlformats.org/presentationml/2006/main">
   <p:cSld>
     <p:spTree>
@@ -43891,7 +44716,7 @@
 </p:sld>
 </file>
 
-<file path=ppt/slides/slide67.xml><?xml version="1.0" encoding="utf-8"?>
+<file path=ppt/slides/slide68.xml><?xml version="1.0" encoding="utf-8"?>
 <p:sld xmlns:a="http://schemas.openxmlformats.org/drawingml/2006/main" xmlns:r="http://schemas.openxmlformats.org/officeDocument/2006/relationships" xmlns:p="http://schemas.openxmlformats.org/presentationml/2006/main">
   <p:cSld>
     <p:spTree>
@@ -44953,7 +45778,7 @@
 </p:sld>
 </file>
 
-<file path=ppt/slides/slide68.xml><?xml version="1.0" encoding="utf-8"?>
+<file path=ppt/slides/slide69.xml><?xml version="1.0" encoding="utf-8"?>
 <p:sld xmlns:a="http://schemas.openxmlformats.org/drawingml/2006/main" xmlns:r="http://schemas.openxmlformats.org/officeDocument/2006/relationships" xmlns:p="http://schemas.openxmlformats.org/presentationml/2006/main">
   <p:cSld>
     <p:spTree>
@@ -45111,7 +45936,67 @@
 </p:sld>
 </file>
 
-<file path=ppt/slides/slide69.xml><?xml version="1.0" encoding="utf-8"?>
+<file path=ppt/slides/slide7.xml><?xml version="1.0" encoding="utf-8"?>
+<p:sld xmlns:a="http://schemas.openxmlformats.org/drawingml/2006/main" xmlns:r="http://schemas.openxmlformats.org/officeDocument/2006/relationships" xmlns:p="http://schemas.openxmlformats.org/presentationml/2006/main">
+  <p:cSld>
+    <p:spTree>
+      <p:nvGrpSpPr>
+        <p:cNvPr id="1" name=""/>
+        <p:cNvGrpSpPr/>
+        <p:nvPr/>
+      </p:nvGrpSpPr>
+      <p:grpSpPr>
+        <a:xfrm>
+          <a:off x="0" y="0"/>
+          <a:ext cx="0" cy="0"/>
+          <a:chOff x="0" y="0"/>
+          <a:chExt cx="0" cy="0"/>
+        </a:xfrm>
+      </p:grpSpPr>
+      <p:sp>
+        <p:nvSpPr>
+          <p:cNvPr id="2" name="Title 1">
+            <a:extLst>
+              <a:ext uri="{FF2B5EF4-FFF2-40B4-BE49-F238E27FC236}">
+                <a16:creationId xmlns:a16="http://schemas.microsoft.com/office/drawing/2014/main" id="{F8A33362-6456-0F5B-5570-FA2A30C5C24B}"/>
+              </a:ext>
+            </a:extLst>
+          </p:cNvPr>
+          <p:cNvSpPr>
+            <a:spLocks noGrp="1"/>
+          </p:cNvSpPr>
+          <p:nvPr>
+            <p:ph type="ctrTitle"/>
+          </p:nvPr>
+        </p:nvSpPr>
+        <p:spPr/>
+        <p:txBody>
+          <a:bodyPr>
+            <a:normAutofit/>
+          </a:bodyPr>
+          <a:lstStyle/>
+          <a:p>
+            <a:r>
+              <a:rPr lang="en-US" sz="4400" dirty="0"/>
+              <a:t>About This Course</a:t>
+            </a:r>
+          </a:p>
+        </p:txBody>
+      </p:sp>
+    </p:spTree>
+    <p:extLst>
+      <p:ext uri="{BB962C8B-B14F-4D97-AF65-F5344CB8AC3E}">
+        <p14:creationId xmlns:p14="http://schemas.microsoft.com/office/powerpoint/2010/main" val="88229346"/>
+      </p:ext>
+    </p:extLst>
+  </p:cSld>
+  <p:clrMapOvr>
+    <a:masterClrMapping/>
+  </p:clrMapOvr>
+</p:sld>
+</file>
+
+<file path=ppt/slides/slide70.xml><?xml version="1.0" encoding="utf-8"?>
 <p:sld xmlns:a="http://schemas.openxmlformats.org/drawingml/2006/main" xmlns:r="http://schemas.openxmlformats.org/officeDocument/2006/relationships" xmlns:p="http://schemas.openxmlformats.org/presentationml/2006/main">
   <p:cSld>
     <p:spTree>
@@ -45276,66 +46161,6 @@
     <p:extLst>
       <p:ext uri="{BB962C8B-B14F-4D97-AF65-F5344CB8AC3E}">
         <p14:creationId xmlns:p14="http://schemas.microsoft.com/office/powerpoint/2010/main" val="3053435228"/>
-      </p:ext>
-    </p:extLst>
-  </p:cSld>
-  <p:clrMapOvr>
-    <a:masterClrMapping/>
-  </p:clrMapOvr>
-</p:sld>
-</file>
-
-<file path=ppt/slides/slide7.xml><?xml version="1.0" encoding="utf-8"?>
-<p:sld xmlns:a="http://schemas.openxmlformats.org/drawingml/2006/main" xmlns:r="http://schemas.openxmlformats.org/officeDocument/2006/relationships" xmlns:p="http://schemas.openxmlformats.org/presentationml/2006/main">
-  <p:cSld>
-    <p:spTree>
-      <p:nvGrpSpPr>
-        <p:cNvPr id="1" name=""/>
-        <p:cNvGrpSpPr/>
-        <p:nvPr/>
-      </p:nvGrpSpPr>
-      <p:grpSpPr>
-        <a:xfrm>
-          <a:off x="0" y="0"/>
-          <a:ext cx="0" cy="0"/>
-          <a:chOff x="0" y="0"/>
-          <a:chExt cx="0" cy="0"/>
-        </a:xfrm>
-      </p:grpSpPr>
-      <p:sp>
-        <p:nvSpPr>
-          <p:cNvPr id="2" name="Title 1">
-            <a:extLst>
-              <a:ext uri="{FF2B5EF4-FFF2-40B4-BE49-F238E27FC236}">
-                <a16:creationId xmlns:a16="http://schemas.microsoft.com/office/drawing/2014/main" id="{F8A33362-6456-0F5B-5570-FA2A30C5C24B}"/>
-              </a:ext>
-            </a:extLst>
-          </p:cNvPr>
-          <p:cNvSpPr>
-            <a:spLocks noGrp="1"/>
-          </p:cNvSpPr>
-          <p:nvPr>
-            <p:ph type="ctrTitle"/>
-          </p:nvPr>
-        </p:nvSpPr>
-        <p:spPr/>
-        <p:txBody>
-          <a:bodyPr>
-            <a:normAutofit/>
-          </a:bodyPr>
-          <a:lstStyle/>
-          <a:p>
-            <a:r>
-              <a:rPr lang="en-US" sz="4400" dirty="0"/>
-              <a:t>About This Course</a:t>
-            </a:r>
-          </a:p>
-        </p:txBody>
-      </p:sp>
-    </p:spTree>
-    <p:extLst>
-      <p:ext uri="{BB962C8B-B14F-4D97-AF65-F5344CB8AC3E}">
-        <p14:creationId xmlns:p14="http://schemas.microsoft.com/office/powerpoint/2010/main" val="88229346"/>
       </p:ext>
     </p:extLst>
   </p:cSld>

</xml_diff>

<commit_message>
Renumbered slide desks to match lesson order
</commit_message>
<xml_diff>
--- a/slides/1_Introduction.pptx
+++ b/slides/1_Introduction.pptx
@@ -5,7 +5,7 @@
     <p:sldMasterId id="2147483648" r:id="rId1"/>
   </p:sldMasterIdLst>
   <p:notesMasterIdLst>
-    <p:notesMasterId r:id="rId72"/>
+    <p:notesMasterId r:id="rId73"/>
   </p:notesMasterIdLst>
   <p:sldIdLst>
     <p:sldId id="256" r:id="rId2"/>
@@ -44,40 +44,41 @@
     <p:sldId id="386" r:id="rId35"/>
     <p:sldId id="714" r:id="rId36"/>
     <p:sldId id="360" r:id="rId37"/>
-    <p:sldId id="374" r:id="rId38"/>
-    <p:sldId id="375" r:id="rId39"/>
-    <p:sldId id="376" r:id="rId40"/>
-    <p:sldId id="728" r:id="rId41"/>
-    <p:sldId id="377" r:id="rId42"/>
-    <p:sldId id="729" r:id="rId43"/>
-    <p:sldId id="730" r:id="rId44"/>
-    <p:sldId id="378" r:id="rId45"/>
-    <p:sldId id="379" r:id="rId46"/>
-    <p:sldId id="380" r:id="rId47"/>
-    <p:sldId id="715" r:id="rId48"/>
-    <p:sldId id="362" r:id="rId49"/>
-    <p:sldId id="364" r:id="rId50"/>
-    <p:sldId id="366" r:id="rId51"/>
-    <p:sldId id="365" r:id="rId52"/>
-    <p:sldId id="726" r:id="rId53"/>
-    <p:sldId id="363" r:id="rId54"/>
-    <p:sldId id="372" r:id="rId55"/>
-    <p:sldId id="716" r:id="rId56"/>
-    <p:sldId id="361" r:id="rId57"/>
-    <p:sldId id="368" r:id="rId58"/>
-    <p:sldId id="390" r:id="rId59"/>
-    <p:sldId id="391" r:id="rId60"/>
-    <p:sldId id="392" r:id="rId61"/>
-    <p:sldId id="393" r:id="rId62"/>
-    <p:sldId id="394" r:id="rId63"/>
-    <p:sldId id="717" r:id="rId64"/>
-    <p:sldId id="371" r:id="rId65"/>
-    <p:sldId id="369" r:id="rId66"/>
-    <p:sldId id="373" r:id="rId67"/>
-    <p:sldId id="399" r:id="rId68"/>
-    <p:sldId id="370" r:id="rId69"/>
-    <p:sldId id="398" r:id="rId70"/>
-    <p:sldId id="384" r:id="rId71"/>
+    <p:sldId id="731" r:id="rId38"/>
+    <p:sldId id="374" r:id="rId39"/>
+    <p:sldId id="375" r:id="rId40"/>
+    <p:sldId id="376" r:id="rId41"/>
+    <p:sldId id="728" r:id="rId42"/>
+    <p:sldId id="377" r:id="rId43"/>
+    <p:sldId id="729" r:id="rId44"/>
+    <p:sldId id="730" r:id="rId45"/>
+    <p:sldId id="378" r:id="rId46"/>
+    <p:sldId id="379" r:id="rId47"/>
+    <p:sldId id="380" r:id="rId48"/>
+    <p:sldId id="715" r:id="rId49"/>
+    <p:sldId id="362" r:id="rId50"/>
+    <p:sldId id="364" r:id="rId51"/>
+    <p:sldId id="366" r:id="rId52"/>
+    <p:sldId id="365" r:id="rId53"/>
+    <p:sldId id="726" r:id="rId54"/>
+    <p:sldId id="363" r:id="rId55"/>
+    <p:sldId id="372" r:id="rId56"/>
+    <p:sldId id="716" r:id="rId57"/>
+    <p:sldId id="361" r:id="rId58"/>
+    <p:sldId id="368" r:id="rId59"/>
+    <p:sldId id="390" r:id="rId60"/>
+    <p:sldId id="391" r:id="rId61"/>
+    <p:sldId id="392" r:id="rId62"/>
+    <p:sldId id="393" r:id="rId63"/>
+    <p:sldId id="394" r:id="rId64"/>
+    <p:sldId id="717" r:id="rId65"/>
+    <p:sldId id="371" r:id="rId66"/>
+    <p:sldId id="369" r:id="rId67"/>
+    <p:sldId id="373" r:id="rId68"/>
+    <p:sldId id="399" r:id="rId69"/>
+    <p:sldId id="370" r:id="rId70"/>
+    <p:sldId id="398" r:id="rId71"/>
+    <p:sldId id="384" r:id="rId72"/>
   </p:sldIdLst>
   <p:sldSz cx="12192000" cy="6858000"/>
   <p:notesSz cx="6858000" cy="9144000"/>
@@ -598,7 +599,7 @@
           <a:p>
             <a:fld id="{F33E01E3-981B-4CB5-81ED-65C622C255CB}" type="slidenum">
               <a:rPr lang="en-US" smtClean="0"/>
-              <a:t>50</a:t>
+              <a:t>51</a:t>
             </a:fld>
             <a:endParaRPr lang="en-US"/>
           </a:p>
@@ -685,7 +686,7 @@
           <a:p>
             <a:fld id="{F33E01E3-981B-4CB5-81ED-65C622C255CB}" type="slidenum">
               <a:rPr lang="en-US" smtClean="0"/>
-              <a:t>64</a:t>
+              <a:t>65</a:t>
             </a:fld>
             <a:endParaRPr lang="en-US"/>
           </a:p>
@@ -772,7 +773,7 @@
           <a:p>
             <a:fld id="{F33E01E3-981B-4CB5-81ED-65C622C255CB}" type="slidenum">
               <a:rPr lang="en-US" smtClean="0"/>
-              <a:t>65</a:t>
+              <a:t>66</a:t>
             </a:fld>
             <a:endParaRPr lang="en-US"/>
           </a:p>
@@ -859,7 +860,7 @@
           <a:p>
             <a:fld id="{F33E01E3-981B-4CB5-81ED-65C622C255CB}" type="slidenum">
               <a:rPr lang="en-US" smtClean="0"/>
-              <a:t>66</a:t>
+              <a:t>67</a:t>
             </a:fld>
             <a:endParaRPr lang="en-US"/>
           </a:p>
@@ -946,7 +947,7 @@
           <a:p>
             <a:fld id="{F33E01E3-981B-4CB5-81ED-65C622C255CB}" type="slidenum">
               <a:rPr lang="en-US" smtClean="0"/>
-              <a:t>67</a:t>
+              <a:t>68</a:t>
             </a:fld>
             <a:endParaRPr lang="en-US"/>
           </a:p>
@@ -1033,7 +1034,7 @@
           <a:p>
             <a:fld id="{F33E01E3-981B-4CB5-81ED-65C622C255CB}" type="slidenum">
               <a:rPr lang="en-US" smtClean="0"/>
-              <a:t>68</a:t>
+              <a:t>69</a:t>
             </a:fld>
             <a:endParaRPr lang="en-US"/>
           </a:p>
@@ -1120,7 +1121,7 @@
           <a:p>
             <a:fld id="{F33E01E3-981B-4CB5-81ED-65C622C255CB}" type="slidenum">
               <a:rPr lang="en-US" smtClean="0"/>
-              <a:t>69</a:t>
+              <a:t>70</a:t>
             </a:fld>
             <a:endParaRPr lang="en-US"/>
           </a:p>
@@ -19447,6 +19448,12 @@
               <a:p>
                 <a:r>
                   <a:rPr lang="en-US" dirty="0"/>
+                  <a:t>Hash function is a deterministic map from key to a memory address</a:t>
+                </a:r>
+              </a:p>
+              <a:p>
+                <a:r>
+                  <a:rPr lang="en-US" dirty="0"/>
                   <a:t>Hash address index, </a:t>
                 </a:r>
                 <a14:m>
@@ -19531,12 +19538,6 @@
                   </m:oMathPara>
                 </a14:m>
                 <a:endParaRPr lang="en-US" dirty="0"/>
-              </a:p>
-              <a:p>
-                <a:r>
-                  <a:rPr lang="en-US" dirty="0"/>
-                  <a:t>Hash function is a deterministic map from key to a memory address</a:t>
-                </a:r>
               </a:p>
               <a:p>
                 <a:r>
@@ -19721,6 +19722,185 @@
 </file>
 
 <file path=ppt/slides/slide37.xml><?xml version="1.0" encoding="utf-8"?>
+<p:sld xmlns:a="http://schemas.openxmlformats.org/drawingml/2006/main" xmlns:r="http://schemas.openxmlformats.org/officeDocument/2006/relationships" xmlns:p="http://schemas.openxmlformats.org/presentationml/2006/main">
+  <p:cSld>
+    <p:spTree>
+      <p:nvGrpSpPr>
+        <p:cNvPr id="1" name="">
+          <a:extLst>
+            <a:ext uri="{FF2B5EF4-FFF2-40B4-BE49-F238E27FC236}">
+              <a16:creationId xmlns:a16="http://schemas.microsoft.com/office/drawing/2014/main" id="{FF456253-7795-52CD-DC89-671E47B62558}"/>
+            </a:ext>
+          </a:extLst>
+        </p:cNvPr>
+        <p:cNvGrpSpPr/>
+        <p:nvPr/>
+      </p:nvGrpSpPr>
+      <p:grpSpPr>
+        <a:xfrm>
+          <a:off x="0" y="0"/>
+          <a:ext cx="0" cy="0"/>
+          <a:chOff x="0" y="0"/>
+          <a:chExt cx="0" cy="0"/>
+        </a:xfrm>
+      </p:grpSpPr>
+      <p:sp>
+        <p:nvSpPr>
+          <p:cNvPr id="3" name="Content Placeholder 2">
+            <a:extLst>
+              <a:ext uri="{FF2B5EF4-FFF2-40B4-BE49-F238E27FC236}">
+                <a16:creationId xmlns:a16="http://schemas.microsoft.com/office/drawing/2014/main" id="{9E6F3064-C916-6D77-2E17-FC76AE5BB95F}"/>
+              </a:ext>
+            </a:extLst>
+          </p:cNvPr>
+          <p:cNvSpPr>
+            <a:spLocks noGrp="1"/>
+          </p:cNvSpPr>
+          <p:nvPr>
+            <p:ph idx="1"/>
+          </p:nvPr>
+        </p:nvSpPr>
+        <p:spPr>
+          <a:xfrm>
+            <a:off x="838200" y="1324928"/>
+            <a:ext cx="10515600" cy="5133349"/>
+          </a:xfrm>
+        </p:spPr>
+        <p:txBody>
+          <a:bodyPr>
+            <a:normAutofit/>
+          </a:bodyPr>
+          <a:lstStyle/>
+          <a:p>
+            <a:pPr marL="0" indent="0">
+              <a:buNone/>
+            </a:pPr>
+            <a:r>
+              <a:rPr lang="en-US" dirty="0"/>
+              <a:t>Generally speaking, there are two major types of hash functions </a:t>
+            </a:r>
+          </a:p>
+          <a:p>
+            <a:r>
+              <a:rPr lang="en-US" b="1" dirty="0"/>
+              <a:t>Cryptographic hash functions </a:t>
+            </a:r>
+            <a:r>
+              <a:rPr lang="en-US" dirty="0"/>
+              <a:t>are investable encodings used to prevent unauthorized access. </a:t>
+            </a:r>
+          </a:p>
+          <a:p>
+            <a:r>
+              <a:rPr lang="en-US" b="1" dirty="0"/>
+              <a:t>Address hash functions </a:t>
+            </a:r>
+            <a:r>
+              <a:rPr lang="en-US" dirty="0"/>
+              <a:t>compute a sequence of address values for access </a:t>
+            </a:r>
+            <a:r>
+              <a:rPr lang="en-US"/>
+              <a:t>to buckets of </a:t>
+            </a:r>
+            <a:r>
+              <a:rPr lang="en-US" dirty="0"/>
+              <a:t>data tables. </a:t>
+            </a:r>
+          </a:p>
+          <a:p>
+            <a:r>
+              <a:rPr lang="en-US" dirty="0"/>
+              <a:t>There is a body of theory underlying both types of hashes   </a:t>
+            </a:r>
+          </a:p>
+          <a:p>
+            <a:r>
+              <a:rPr lang="en-US" dirty="0"/>
+              <a:t>For data mining we apply address hashes to manage massive datasets</a:t>
+            </a:r>
+          </a:p>
+          <a:p>
+            <a:endParaRPr lang="en-US" dirty="0"/>
+          </a:p>
+          <a:p>
+            <a:pPr marL="0" indent="0">
+              <a:buNone/>
+            </a:pPr>
+            <a:endParaRPr lang="en-US" dirty="0"/>
+          </a:p>
+        </p:txBody>
+      </p:sp>
+      <p:sp>
+        <p:nvSpPr>
+          <p:cNvPr id="6" name="Title 1">
+            <a:extLst>
+              <a:ext uri="{FF2B5EF4-FFF2-40B4-BE49-F238E27FC236}">
+                <a16:creationId xmlns:a16="http://schemas.microsoft.com/office/drawing/2014/main" id="{CE66018C-A4DB-87C6-4869-5EAC4E862118}"/>
+              </a:ext>
+            </a:extLst>
+          </p:cNvPr>
+          <p:cNvSpPr txBox="1">
+            <a:spLocks/>
+          </p:cNvSpPr>
+          <p:nvPr/>
+        </p:nvSpPr>
+        <p:spPr>
+          <a:xfrm>
+            <a:off x="838200" y="-635"/>
+            <a:ext cx="10515600" cy="1325563"/>
+          </a:xfrm>
+          <a:prstGeom prst="rect">
+            <a:avLst/>
+          </a:prstGeom>
+        </p:spPr>
+        <p:txBody>
+          <a:bodyPr vert="horz" lIns="91440" tIns="45720" rIns="91440" bIns="45720" rtlCol="0" anchor="ctr">
+            <a:normAutofit/>
+          </a:bodyPr>
+          <a:lstStyle>
+            <a:lvl1pPr algn="l" defTabSz="914400" rtl="0" eaLnBrk="1" latinLnBrk="0" hangingPunct="1">
+              <a:lnSpc>
+                <a:spcPct val="90000"/>
+              </a:lnSpc>
+              <a:spcBef>
+                <a:spcPct val="0"/>
+              </a:spcBef>
+              <a:buNone/>
+              <a:defRPr sz="4400" kern="1200">
+                <a:solidFill>
+                  <a:schemeClr val="tx1"/>
+                </a:solidFill>
+                <a:latin typeface="+mj-lt"/>
+                <a:ea typeface="+mj-ea"/>
+                <a:cs typeface="+mj-cs"/>
+              </a:defRPr>
+            </a:lvl1pPr>
+          </a:lstStyle>
+          <a:p>
+            <a:r>
+              <a:rPr lang="en-US" dirty="0">
+                <a:latin typeface="+mn-lt"/>
+              </a:rPr>
+              <a:t>Introduction to Hashing</a:t>
+            </a:r>
+          </a:p>
+        </p:txBody>
+      </p:sp>
+    </p:spTree>
+    <p:extLst>
+      <p:ext uri="{BB962C8B-B14F-4D97-AF65-F5344CB8AC3E}">
+        <p14:creationId xmlns:p14="http://schemas.microsoft.com/office/powerpoint/2010/main" val="586682500"/>
+      </p:ext>
+    </p:extLst>
+  </p:cSld>
+  <p:clrMapOvr>
+    <a:masterClrMapping/>
+  </p:clrMapOvr>
+</p:sld>
+</file>
+
+<file path=ppt/slides/slide38.xml><?xml version="1.0" encoding="utf-8"?>
 <p:sld xmlns:a="http://schemas.openxmlformats.org/drawingml/2006/main" xmlns:r="http://schemas.openxmlformats.org/officeDocument/2006/relationships" xmlns:p="http://schemas.openxmlformats.org/presentationml/2006/main">
   <p:cSld>
     <p:spTree>
@@ -22637,7 +22817,7 @@
 </p:sld>
 </file>
 
-<file path=ppt/slides/slide38.xml><?xml version="1.0" encoding="utf-8"?>
+<file path=ppt/slides/slide39.xml><?xml version="1.0" encoding="utf-8"?>
 <p:sld xmlns:a="http://schemas.openxmlformats.org/drawingml/2006/main" xmlns:r="http://schemas.openxmlformats.org/officeDocument/2006/relationships" xmlns:p="http://schemas.openxmlformats.org/presentationml/2006/main">
   <p:cSld>
     <p:spTree>
@@ -25512,7 +25692,496 @@
 </p:sld>
 </file>
 
-<file path=ppt/slides/slide39.xml><?xml version="1.0" encoding="utf-8"?>
+<file path=ppt/slides/slide4.xml><?xml version="1.0" encoding="utf-8"?>
+<p:sld xmlns:a="http://schemas.openxmlformats.org/drawingml/2006/main" xmlns:r="http://schemas.openxmlformats.org/officeDocument/2006/relationships" xmlns:p="http://schemas.openxmlformats.org/presentationml/2006/main">
+  <p:cSld>
+    <p:spTree>
+      <p:nvGrpSpPr>
+        <p:cNvPr id="1" name=""/>
+        <p:cNvGrpSpPr/>
+        <p:nvPr/>
+      </p:nvGrpSpPr>
+      <p:grpSpPr>
+        <a:xfrm>
+          <a:off x="0" y="0"/>
+          <a:ext cx="0" cy="0"/>
+          <a:chOff x="0" y="0"/>
+          <a:chExt cx="0" cy="0"/>
+        </a:xfrm>
+      </p:grpSpPr>
+      <p:sp>
+        <p:nvSpPr>
+          <p:cNvPr id="3" name="Content Placeholder 2">
+            <a:extLst>
+              <a:ext uri="{FF2B5EF4-FFF2-40B4-BE49-F238E27FC236}">
+                <a16:creationId xmlns:a16="http://schemas.microsoft.com/office/drawing/2014/main" id="{258E6AF3-7615-4BD1-878E-A94C93E98F90}"/>
+              </a:ext>
+            </a:extLst>
+          </p:cNvPr>
+          <p:cNvSpPr>
+            <a:spLocks noGrp="1"/>
+          </p:cNvSpPr>
+          <p:nvPr>
+            <p:ph idx="1"/>
+          </p:nvPr>
+        </p:nvSpPr>
+        <p:spPr/>
+        <p:txBody>
+          <a:bodyPr/>
+          <a:lstStyle/>
+          <a:p>
+            <a:pPr marL="0" indent="0">
+              <a:buNone/>
+            </a:pPr>
+            <a:r>
+              <a:rPr lang="en-US" dirty="0"/>
+              <a:t>Data mining (KDD) is generally performed at </a:t>
+            </a:r>
+            <a:r>
+              <a:rPr lang="en-US" b="1" dirty="0"/>
+              <a:t>large scale </a:t>
+            </a:r>
+          </a:p>
+          <a:p>
+            <a:r>
+              <a:rPr lang="en-US" dirty="0"/>
+              <a:t>Dataset size has grown nearly exponentially  </a:t>
+            </a:r>
+          </a:p>
+          <a:p>
+            <a:r>
+              <a:rPr lang="en-US" dirty="0"/>
+              <a:t>More importantly, </a:t>
+            </a:r>
+            <a:r>
+              <a:rPr lang="en-US" b="1" dirty="0"/>
+              <a:t>dataset and problem complexity has grown</a:t>
+            </a:r>
+          </a:p>
+          <a:p>
+            <a:r>
+              <a:rPr lang="en-US" dirty="0"/>
+              <a:t>Data mining is at the intersection of several subjects   </a:t>
+            </a:r>
+          </a:p>
+          <a:p>
+            <a:pPr lvl="1"/>
+            <a:r>
+              <a:rPr lang="en-US" b="1" dirty="0"/>
+              <a:t>Statistics:</a:t>
+            </a:r>
+            <a:r>
+              <a:rPr lang="en-US" dirty="0"/>
+              <a:t> What of significance can we learn from the data? </a:t>
+            </a:r>
+          </a:p>
+          <a:p>
+            <a:pPr lvl="1"/>
+            <a:r>
+              <a:rPr lang="en-US" b="1" dirty="0"/>
+              <a:t>Mathematics:</a:t>
+            </a:r>
+            <a:r>
+              <a:rPr lang="en-US" dirty="0"/>
+              <a:t> How do we represent a model of the data as, say, a graph?</a:t>
+            </a:r>
+          </a:p>
+          <a:p>
+            <a:pPr lvl="1"/>
+            <a:r>
+              <a:rPr lang="en-US" b="1" dirty="0"/>
+              <a:t>Algorithms: </a:t>
+            </a:r>
+            <a:r>
+              <a:rPr lang="en-US" dirty="0"/>
+              <a:t>How do we efficiently find important relationships in massive datasets? </a:t>
+            </a:r>
+          </a:p>
+          <a:p>
+            <a:pPr lvl="1"/>
+            <a:r>
+              <a:rPr lang="en-US" b="1" dirty="0"/>
+              <a:t>Technology:</a:t>
+            </a:r>
+            <a:r>
+              <a:rPr lang="en-US" dirty="0"/>
+              <a:t> How do we manage and process massive datasets? </a:t>
+            </a:r>
+            <a:endParaRPr lang="en-US" b="1" dirty="0"/>
+          </a:p>
+        </p:txBody>
+      </p:sp>
+      <p:sp>
+        <p:nvSpPr>
+          <p:cNvPr id="6" name="Title 1">
+            <a:extLst>
+              <a:ext uri="{FF2B5EF4-FFF2-40B4-BE49-F238E27FC236}">
+                <a16:creationId xmlns:a16="http://schemas.microsoft.com/office/drawing/2014/main" id="{CD29F70F-B868-451B-A65D-8721F4C7A2D9}"/>
+              </a:ext>
+            </a:extLst>
+          </p:cNvPr>
+          <p:cNvSpPr txBox="1">
+            <a:spLocks/>
+          </p:cNvSpPr>
+          <p:nvPr/>
+        </p:nvSpPr>
+        <p:spPr>
+          <a:xfrm>
+            <a:off x="838200" y="-635"/>
+            <a:ext cx="10515600" cy="1325563"/>
+          </a:xfrm>
+          <a:prstGeom prst="rect">
+            <a:avLst/>
+          </a:prstGeom>
+        </p:spPr>
+        <p:txBody>
+          <a:bodyPr vert="horz" lIns="91440" tIns="45720" rIns="91440" bIns="45720" rtlCol="0" anchor="ctr">
+            <a:normAutofit/>
+          </a:bodyPr>
+          <a:lstStyle>
+            <a:lvl1pPr algn="l" defTabSz="914400" rtl="0" eaLnBrk="1" latinLnBrk="0" hangingPunct="1">
+              <a:lnSpc>
+                <a:spcPct val="90000"/>
+              </a:lnSpc>
+              <a:spcBef>
+                <a:spcPct val="0"/>
+              </a:spcBef>
+              <a:buNone/>
+              <a:defRPr sz="4400" kern="1200">
+                <a:solidFill>
+                  <a:schemeClr val="tx1"/>
+                </a:solidFill>
+                <a:latin typeface="+mj-lt"/>
+                <a:ea typeface="+mj-ea"/>
+                <a:cs typeface="+mj-cs"/>
+              </a:defRPr>
+            </a:lvl1pPr>
+          </a:lstStyle>
+          <a:p>
+            <a:r>
+              <a:rPr lang="en-US" dirty="0">
+                <a:latin typeface="+mn-lt"/>
+              </a:rPr>
+              <a:t>What is data mining?</a:t>
+            </a:r>
+          </a:p>
+        </p:txBody>
+      </p:sp>
+    </p:spTree>
+    <p:extLst>
+      <p:ext uri="{BB962C8B-B14F-4D97-AF65-F5344CB8AC3E}">
+        <p14:creationId xmlns:p14="http://schemas.microsoft.com/office/powerpoint/2010/main" val="69986985"/>
+      </p:ext>
+    </p:extLst>
+  </p:cSld>
+  <p:clrMapOvr>
+    <a:masterClrMapping/>
+  </p:clrMapOvr>
+  <p:timing>
+    <p:tnLst>
+      <p:par>
+        <p:cTn id="1" dur="indefinite" restart="never" nodeType="tmRoot">
+          <p:childTnLst>
+            <p:seq concurrent="1" nextAc="seek">
+              <p:cTn id="2" dur="indefinite" nodeType="mainSeq">
+                <p:childTnLst>
+                  <p:par>
+                    <p:cTn id="3" fill="hold">
+                      <p:stCondLst>
+                        <p:cond delay="indefinite"/>
+                      </p:stCondLst>
+                      <p:childTnLst>
+                        <p:par>
+                          <p:cTn id="4" fill="hold">
+                            <p:stCondLst>
+                              <p:cond delay="0"/>
+                            </p:stCondLst>
+                            <p:childTnLst>
+                              <p:par>
+                                <p:cTn id="5" presetID="1" presetClass="entr" presetSubtype="0" fill="hold" nodeType="clickEffect">
+                                  <p:stCondLst>
+                                    <p:cond delay="0"/>
+                                  </p:stCondLst>
+                                  <p:childTnLst>
+                                    <p:set>
+                                      <p:cBhvr>
+                                        <p:cTn id="6" dur="1" fill="hold">
+                                          <p:stCondLst>
+                                            <p:cond delay="0"/>
+                                          </p:stCondLst>
+                                        </p:cTn>
+                                        <p:tgtEl>
+                                          <p:spTgt spid="3">
+                                            <p:txEl>
+                                              <p:pRg st="1" end="1"/>
+                                            </p:txEl>
+                                          </p:spTgt>
+                                        </p:tgtEl>
+                                        <p:attrNameLst>
+                                          <p:attrName>style.visibility</p:attrName>
+                                        </p:attrNameLst>
+                                      </p:cBhvr>
+                                      <p:to>
+                                        <p:strVal val="visible"/>
+                                      </p:to>
+                                    </p:set>
+                                  </p:childTnLst>
+                                </p:cTn>
+                              </p:par>
+                            </p:childTnLst>
+                          </p:cTn>
+                        </p:par>
+                      </p:childTnLst>
+                    </p:cTn>
+                  </p:par>
+                  <p:par>
+                    <p:cTn id="7" fill="hold">
+                      <p:stCondLst>
+                        <p:cond delay="indefinite"/>
+                      </p:stCondLst>
+                      <p:childTnLst>
+                        <p:par>
+                          <p:cTn id="8" fill="hold">
+                            <p:stCondLst>
+                              <p:cond delay="0"/>
+                            </p:stCondLst>
+                            <p:childTnLst>
+                              <p:par>
+                                <p:cTn id="9" presetID="1" presetClass="entr" presetSubtype="0" fill="hold" nodeType="clickEffect">
+                                  <p:stCondLst>
+                                    <p:cond delay="0"/>
+                                  </p:stCondLst>
+                                  <p:childTnLst>
+                                    <p:set>
+                                      <p:cBhvr>
+                                        <p:cTn id="10" dur="1" fill="hold">
+                                          <p:stCondLst>
+                                            <p:cond delay="0"/>
+                                          </p:stCondLst>
+                                        </p:cTn>
+                                        <p:tgtEl>
+                                          <p:spTgt spid="3">
+                                            <p:txEl>
+                                              <p:pRg st="2" end="2"/>
+                                            </p:txEl>
+                                          </p:spTgt>
+                                        </p:tgtEl>
+                                        <p:attrNameLst>
+                                          <p:attrName>style.visibility</p:attrName>
+                                        </p:attrNameLst>
+                                      </p:cBhvr>
+                                      <p:to>
+                                        <p:strVal val="visible"/>
+                                      </p:to>
+                                    </p:set>
+                                  </p:childTnLst>
+                                </p:cTn>
+                              </p:par>
+                            </p:childTnLst>
+                          </p:cTn>
+                        </p:par>
+                      </p:childTnLst>
+                    </p:cTn>
+                  </p:par>
+                  <p:par>
+                    <p:cTn id="11" fill="hold">
+                      <p:stCondLst>
+                        <p:cond delay="indefinite"/>
+                      </p:stCondLst>
+                      <p:childTnLst>
+                        <p:par>
+                          <p:cTn id="12" fill="hold">
+                            <p:stCondLst>
+                              <p:cond delay="0"/>
+                            </p:stCondLst>
+                            <p:childTnLst>
+                              <p:par>
+                                <p:cTn id="13" presetID="1" presetClass="entr" presetSubtype="0" fill="hold" nodeType="clickEffect">
+                                  <p:stCondLst>
+                                    <p:cond delay="0"/>
+                                  </p:stCondLst>
+                                  <p:childTnLst>
+                                    <p:set>
+                                      <p:cBhvr>
+                                        <p:cTn id="14" dur="1" fill="hold">
+                                          <p:stCondLst>
+                                            <p:cond delay="0"/>
+                                          </p:stCondLst>
+                                        </p:cTn>
+                                        <p:tgtEl>
+                                          <p:spTgt spid="3">
+                                            <p:txEl>
+                                              <p:pRg st="3" end="3"/>
+                                            </p:txEl>
+                                          </p:spTgt>
+                                        </p:tgtEl>
+                                        <p:attrNameLst>
+                                          <p:attrName>style.visibility</p:attrName>
+                                        </p:attrNameLst>
+                                      </p:cBhvr>
+                                      <p:to>
+                                        <p:strVal val="visible"/>
+                                      </p:to>
+                                    </p:set>
+                                  </p:childTnLst>
+                                </p:cTn>
+                              </p:par>
+                              <p:par>
+                                <p:cTn id="15" presetID="1" presetClass="entr" presetSubtype="0" fill="hold" nodeType="withEffect">
+                                  <p:stCondLst>
+                                    <p:cond delay="0"/>
+                                  </p:stCondLst>
+                                  <p:childTnLst>
+                                    <p:set>
+                                      <p:cBhvr>
+                                        <p:cTn id="16" dur="1" fill="hold">
+                                          <p:stCondLst>
+                                            <p:cond delay="0"/>
+                                          </p:stCondLst>
+                                        </p:cTn>
+                                        <p:tgtEl>
+                                          <p:spTgt spid="3">
+                                            <p:txEl>
+                                              <p:pRg st="4" end="4"/>
+                                            </p:txEl>
+                                          </p:spTgt>
+                                        </p:tgtEl>
+                                        <p:attrNameLst>
+                                          <p:attrName>style.visibility</p:attrName>
+                                        </p:attrNameLst>
+                                      </p:cBhvr>
+                                      <p:to>
+                                        <p:strVal val="visible"/>
+                                      </p:to>
+                                    </p:set>
+                                  </p:childTnLst>
+                                </p:cTn>
+                              </p:par>
+                              <p:par>
+                                <p:cTn id="17" presetID="1" presetClass="entr" presetSubtype="0" fill="hold" nodeType="withEffect">
+                                  <p:stCondLst>
+                                    <p:cond delay="0"/>
+                                  </p:stCondLst>
+                                  <p:childTnLst>
+                                    <p:set>
+                                      <p:cBhvr>
+                                        <p:cTn id="18" dur="1" fill="hold">
+                                          <p:stCondLst>
+                                            <p:cond delay="0"/>
+                                          </p:stCondLst>
+                                        </p:cTn>
+                                        <p:tgtEl>
+                                          <p:spTgt spid="3">
+                                            <p:txEl>
+                                              <p:pRg st="5" end="5"/>
+                                            </p:txEl>
+                                          </p:spTgt>
+                                        </p:tgtEl>
+                                        <p:attrNameLst>
+                                          <p:attrName>style.visibility</p:attrName>
+                                        </p:attrNameLst>
+                                      </p:cBhvr>
+                                      <p:to>
+                                        <p:strVal val="visible"/>
+                                      </p:to>
+                                    </p:set>
+                                  </p:childTnLst>
+                                </p:cTn>
+                              </p:par>
+                              <p:par>
+                                <p:cTn id="19" presetID="1" presetClass="entr" presetSubtype="0" fill="hold" nodeType="withEffect">
+                                  <p:stCondLst>
+                                    <p:cond delay="0"/>
+                                  </p:stCondLst>
+                                  <p:childTnLst>
+                                    <p:set>
+                                      <p:cBhvr>
+                                        <p:cTn id="20" dur="1" fill="hold">
+                                          <p:stCondLst>
+                                            <p:cond delay="0"/>
+                                          </p:stCondLst>
+                                        </p:cTn>
+                                        <p:tgtEl>
+                                          <p:spTgt spid="3">
+                                            <p:txEl>
+                                              <p:pRg st="6" end="6"/>
+                                            </p:txEl>
+                                          </p:spTgt>
+                                        </p:tgtEl>
+                                        <p:attrNameLst>
+                                          <p:attrName>style.visibility</p:attrName>
+                                        </p:attrNameLst>
+                                      </p:cBhvr>
+                                      <p:to>
+                                        <p:strVal val="visible"/>
+                                      </p:to>
+                                    </p:set>
+                                  </p:childTnLst>
+                                </p:cTn>
+                              </p:par>
+                              <p:par>
+                                <p:cTn id="21" presetID="1" presetClass="entr" presetSubtype="0" fill="hold" nodeType="withEffect">
+                                  <p:stCondLst>
+                                    <p:cond delay="0"/>
+                                  </p:stCondLst>
+                                  <p:childTnLst>
+                                    <p:set>
+                                      <p:cBhvr>
+                                        <p:cTn id="22" dur="1" fill="hold">
+                                          <p:stCondLst>
+                                            <p:cond delay="0"/>
+                                          </p:stCondLst>
+                                        </p:cTn>
+                                        <p:tgtEl>
+                                          <p:spTgt spid="3">
+                                            <p:txEl>
+                                              <p:pRg st="7" end="7"/>
+                                            </p:txEl>
+                                          </p:spTgt>
+                                        </p:tgtEl>
+                                        <p:attrNameLst>
+                                          <p:attrName>style.visibility</p:attrName>
+                                        </p:attrNameLst>
+                                      </p:cBhvr>
+                                      <p:to>
+                                        <p:strVal val="visible"/>
+                                      </p:to>
+                                    </p:set>
+                                  </p:childTnLst>
+                                </p:cTn>
+                              </p:par>
+                            </p:childTnLst>
+                          </p:cTn>
+                        </p:par>
+                      </p:childTnLst>
+                    </p:cTn>
+                  </p:par>
+                </p:childTnLst>
+              </p:cTn>
+              <p:prevCondLst>
+                <p:cond evt="onPrev" delay="0">
+                  <p:tgtEl>
+                    <p:sldTgt/>
+                  </p:tgtEl>
+                </p:cond>
+              </p:prevCondLst>
+              <p:nextCondLst>
+                <p:cond evt="onNext" delay="0">
+                  <p:tgtEl>
+                    <p:sldTgt/>
+                  </p:tgtEl>
+                </p:cond>
+              </p:nextCondLst>
+            </p:seq>
+          </p:childTnLst>
+        </p:cTn>
+      </p:par>
+    </p:tnLst>
+  </p:timing>
+</p:sld>
+</file>
+
+<file path=ppt/slides/slide40.xml><?xml version="1.0" encoding="utf-8"?>
 <p:sld xmlns:a="http://schemas.openxmlformats.org/drawingml/2006/main" xmlns:r="http://schemas.openxmlformats.org/officeDocument/2006/relationships" xmlns:p="http://schemas.openxmlformats.org/presentationml/2006/main">
   <p:cSld>
     <p:spTree>
@@ -26291,496 +26960,7 @@
 </p:sld>
 </file>
 
-<file path=ppt/slides/slide4.xml><?xml version="1.0" encoding="utf-8"?>
-<p:sld xmlns:a="http://schemas.openxmlformats.org/drawingml/2006/main" xmlns:r="http://schemas.openxmlformats.org/officeDocument/2006/relationships" xmlns:p="http://schemas.openxmlformats.org/presentationml/2006/main">
-  <p:cSld>
-    <p:spTree>
-      <p:nvGrpSpPr>
-        <p:cNvPr id="1" name=""/>
-        <p:cNvGrpSpPr/>
-        <p:nvPr/>
-      </p:nvGrpSpPr>
-      <p:grpSpPr>
-        <a:xfrm>
-          <a:off x="0" y="0"/>
-          <a:ext cx="0" cy="0"/>
-          <a:chOff x="0" y="0"/>
-          <a:chExt cx="0" cy="0"/>
-        </a:xfrm>
-      </p:grpSpPr>
-      <p:sp>
-        <p:nvSpPr>
-          <p:cNvPr id="3" name="Content Placeholder 2">
-            <a:extLst>
-              <a:ext uri="{FF2B5EF4-FFF2-40B4-BE49-F238E27FC236}">
-                <a16:creationId xmlns:a16="http://schemas.microsoft.com/office/drawing/2014/main" id="{258E6AF3-7615-4BD1-878E-A94C93E98F90}"/>
-              </a:ext>
-            </a:extLst>
-          </p:cNvPr>
-          <p:cNvSpPr>
-            <a:spLocks noGrp="1"/>
-          </p:cNvSpPr>
-          <p:nvPr>
-            <p:ph idx="1"/>
-          </p:nvPr>
-        </p:nvSpPr>
-        <p:spPr/>
-        <p:txBody>
-          <a:bodyPr/>
-          <a:lstStyle/>
-          <a:p>
-            <a:pPr marL="0" indent="0">
-              <a:buNone/>
-            </a:pPr>
-            <a:r>
-              <a:rPr lang="en-US" dirty="0"/>
-              <a:t>Data mining (KDD) is generally performed at </a:t>
-            </a:r>
-            <a:r>
-              <a:rPr lang="en-US" b="1" dirty="0"/>
-              <a:t>large scale </a:t>
-            </a:r>
-          </a:p>
-          <a:p>
-            <a:r>
-              <a:rPr lang="en-US" dirty="0"/>
-              <a:t>Dataset size has grown nearly exponentially  </a:t>
-            </a:r>
-          </a:p>
-          <a:p>
-            <a:r>
-              <a:rPr lang="en-US" dirty="0"/>
-              <a:t>More importantly, </a:t>
-            </a:r>
-            <a:r>
-              <a:rPr lang="en-US" b="1" dirty="0"/>
-              <a:t>dataset and problem complexity has grown</a:t>
-            </a:r>
-          </a:p>
-          <a:p>
-            <a:r>
-              <a:rPr lang="en-US" dirty="0"/>
-              <a:t>Data mining is at the intersection of several subjects   </a:t>
-            </a:r>
-          </a:p>
-          <a:p>
-            <a:pPr lvl="1"/>
-            <a:r>
-              <a:rPr lang="en-US" b="1" dirty="0"/>
-              <a:t>Statistics:</a:t>
-            </a:r>
-            <a:r>
-              <a:rPr lang="en-US" dirty="0"/>
-              <a:t> What of significance can we learn from the data? </a:t>
-            </a:r>
-          </a:p>
-          <a:p>
-            <a:pPr lvl="1"/>
-            <a:r>
-              <a:rPr lang="en-US" b="1" dirty="0"/>
-              <a:t>Mathematics:</a:t>
-            </a:r>
-            <a:r>
-              <a:rPr lang="en-US" dirty="0"/>
-              <a:t> How do we represent a model of the data as, say, a graph?</a:t>
-            </a:r>
-          </a:p>
-          <a:p>
-            <a:pPr lvl="1"/>
-            <a:r>
-              <a:rPr lang="en-US" b="1" dirty="0"/>
-              <a:t>Algorithms: </a:t>
-            </a:r>
-            <a:r>
-              <a:rPr lang="en-US" dirty="0"/>
-              <a:t>How do we efficiently find important relationships in massive datasets? </a:t>
-            </a:r>
-          </a:p>
-          <a:p>
-            <a:pPr lvl="1"/>
-            <a:r>
-              <a:rPr lang="en-US" b="1" dirty="0"/>
-              <a:t>Technology:</a:t>
-            </a:r>
-            <a:r>
-              <a:rPr lang="en-US" dirty="0"/>
-              <a:t> How do we manage and process massive datasets? </a:t>
-            </a:r>
-            <a:endParaRPr lang="en-US" b="1" dirty="0"/>
-          </a:p>
-        </p:txBody>
-      </p:sp>
-      <p:sp>
-        <p:nvSpPr>
-          <p:cNvPr id="6" name="Title 1">
-            <a:extLst>
-              <a:ext uri="{FF2B5EF4-FFF2-40B4-BE49-F238E27FC236}">
-                <a16:creationId xmlns:a16="http://schemas.microsoft.com/office/drawing/2014/main" id="{CD29F70F-B868-451B-A65D-8721F4C7A2D9}"/>
-              </a:ext>
-            </a:extLst>
-          </p:cNvPr>
-          <p:cNvSpPr txBox="1">
-            <a:spLocks/>
-          </p:cNvSpPr>
-          <p:nvPr/>
-        </p:nvSpPr>
-        <p:spPr>
-          <a:xfrm>
-            <a:off x="838200" y="-635"/>
-            <a:ext cx="10515600" cy="1325563"/>
-          </a:xfrm>
-          <a:prstGeom prst="rect">
-            <a:avLst/>
-          </a:prstGeom>
-        </p:spPr>
-        <p:txBody>
-          <a:bodyPr vert="horz" lIns="91440" tIns="45720" rIns="91440" bIns="45720" rtlCol="0" anchor="ctr">
-            <a:normAutofit/>
-          </a:bodyPr>
-          <a:lstStyle>
-            <a:lvl1pPr algn="l" defTabSz="914400" rtl="0" eaLnBrk="1" latinLnBrk="0" hangingPunct="1">
-              <a:lnSpc>
-                <a:spcPct val="90000"/>
-              </a:lnSpc>
-              <a:spcBef>
-                <a:spcPct val="0"/>
-              </a:spcBef>
-              <a:buNone/>
-              <a:defRPr sz="4400" kern="1200">
-                <a:solidFill>
-                  <a:schemeClr val="tx1"/>
-                </a:solidFill>
-                <a:latin typeface="+mj-lt"/>
-                <a:ea typeface="+mj-ea"/>
-                <a:cs typeface="+mj-cs"/>
-              </a:defRPr>
-            </a:lvl1pPr>
-          </a:lstStyle>
-          <a:p>
-            <a:r>
-              <a:rPr lang="en-US" dirty="0">
-                <a:latin typeface="+mn-lt"/>
-              </a:rPr>
-              <a:t>What is data mining?</a:t>
-            </a:r>
-          </a:p>
-        </p:txBody>
-      </p:sp>
-    </p:spTree>
-    <p:extLst>
-      <p:ext uri="{BB962C8B-B14F-4D97-AF65-F5344CB8AC3E}">
-        <p14:creationId xmlns:p14="http://schemas.microsoft.com/office/powerpoint/2010/main" val="69986985"/>
-      </p:ext>
-    </p:extLst>
-  </p:cSld>
-  <p:clrMapOvr>
-    <a:masterClrMapping/>
-  </p:clrMapOvr>
-  <p:timing>
-    <p:tnLst>
-      <p:par>
-        <p:cTn id="1" dur="indefinite" restart="never" nodeType="tmRoot">
-          <p:childTnLst>
-            <p:seq concurrent="1" nextAc="seek">
-              <p:cTn id="2" dur="indefinite" nodeType="mainSeq">
-                <p:childTnLst>
-                  <p:par>
-                    <p:cTn id="3" fill="hold">
-                      <p:stCondLst>
-                        <p:cond delay="indefinite"/>
-                      </p:stCondLst>
-                      <p:childTnLst>
-                        <p:par>
-                          <p:cTn id="4" fill="hold">
-                            <p:stCondLst>
-                              <p:cond delay="0"/>
-                            </p:stCondLst>
-                            <p:childTnLst>
-                              <p:par>
-                                <p:cTn id="5" presetID="1" presetClass="entr" presetSubtype="0" fill="hold" nodeType="clickEffect">
-                                  <p:stCondLst>
-                                    <p:cond delay="0"/>
-                                  </p:stCondLst>
-                                  <p:childTnLst>
-                                    <p:set>
-                                      <p:cBhvr>
-                                        <p:cTn id="6" dur="1" fill="hold">
-                                          <p:stCondLst>
-                                            <p:cond delay="0"/>
-                                          </p:stCondLst>
-                                        </p:cTn>
-                                        <p:tgtEl>
-                                          <p:spTgt spid="3">
-                                            <p:txEl>
-                                              <p:pRg st="1" end="1"/>
-                                            </p:txEl>
-                                          </p:spTgt>
-                                        </p:tgtEl>
-                                        <p:attrNameLst>
-                                          <p:attrName>style.visibility</p:attrName>
-                                        </p:attrNameLst>
-                                      </p:cBhvr>
-                                      <p:to>
-                                        <p:strVal val="visible"/>
-                                      </p:to>
-                                    </p:set>
-                                  </p:childTnLst>
-                                </p:cTn>
-                              </p:par>
-                            </p:childTnLst>
-                          </p:cTn>
-                        </p:par>
-                      </p:childTnLst>
-                    </p:cTn>
-                  </p:par>
-                  <p:par>
-                    <p:cTn id="7" fill="hold">
-                      <p:stCondLst>
-                        <p:cond delay="indefinite"/>
-                      </p:stCondLst>
-                      <p:childTnLst>
-                        <p:par>
-                          <p:cTn id="8" fill="hold">
-                            <p:stCondLst>
-                              <p:cond delay="0"/>
-                            </p:stCondLst>
-                            <p:childTnLst>
-                              <p:par>
-                                <p:cTn id="9" presetID="1" presetClass="entr" presetSubtype="0" fill="hold" nodeType="clickEffect">
-                                  <p:stCondLst>
-                                    <p:cond delay="0"/>
-                                  </p:stCondLst>
-                                  <p:childTnLst>
-                                    <p:set>
-                                      <p:cBhvr>
-                                        <p:cTn id="10" dur="1" fill="hold">
-                                          <p:stCondLst>
-                                            <p:cond delay="0"/>
-                                          </p:stCondLst>
-                                        </p:cTn>
-                                        <p:tgtEl>
-                                          <p:spTgt spid="3">
-                                            <p:txEl>
-                                              <p:pRg st="2" end="2"/>
-                                            </p:txEl>
-                                          </p:spTgt>
-                                        </p:tgtEl>
-                                        <p:attrNameLst>
-                                          <p:attrName>style.visibility</p:attrName>
-                                        </p:attrNameLst>
-                                      </p:cBhvr>
-                                      <p:to>
-                                        <p:strVal val="visible"/>
-                                      </p:to>
-                                    </p:set>
-                                  </p:childTnLst>
-                                </p:cTn>
-                              </p:par>
-                            </p:childTnLst>
-                          </p:cTn>
-                        </p:par>
-                      </p:childTnLst>
-                    </p:cTn>
-                  </p:par>
-                  <p:par>
-                    <p:cTn id="11" fill="hold">
-                      <p:stCondLst>
-                        <p:cond delay="indefinite"/>
-                      </p:stCondLst>
-                      <p:childTnLst>
-                        <p:par>
-                          <p:cTn id="12" fill="hold">
-                            <p:stCondLst>
-                              <p:cond delay="0"/>
-                            </p:stCondLst>
-                            <p:childTnLst>
-                              <p:par>
-                                <p:cTn id="13" presetID="1" presetClass="entr" presetSubtype="0" fill="hold" nodeType="clickEffect">
-                                  <p:stCondLst>
-                                    <p:cond delay="0"/>
-                                  </p:stCondLst>
-                                  <p:childTnLst>
-                                    <p:set>
-                                      <p:cBhvr>
-                                        <p:cTn id="14" dur="1" fill="hold">
-                                          <p:stCondLst>
-                                            <p:cond delay="0"/>
-                                          </p:stCondLst>
-                                        </p:cTn>
-                                        <p:tgtEl>
-                                          <p:spTgt spid="3">
-                                            <p:txEl>
-                                              <p:pRg st="3" end="3"/>
-                                            </p:txEl>
-                                          </p:spTgt>
-                                        </p:tgtEl>
-                                        <p:attrNameLst>
-                                          <p:attrName>style.visibility</p:attrName>
-                                        </p:attrNameLst>
-                                      </p:cBhvr>
-                                      <p:to>
-                                        <p:strVal val="visible"/>
-                                      </p:to>
-                                    </p:set>
-                                  </p:childTnLst>
-                                </p:cTn>
-                              </p:par>
-                              <p:par>
-                                <p:cTn id="15" presetID="1" presetClass="entr" presetSubtype="0" fill="hold" nodeType="withEffect">
-                                  <p:stCondLst>
-                                    <p:cond delay="0"/>
-                                  </p:stCondLst>
-                                  <p:childTnLst>
-                                    <p:set>
-                                      <p:cBhvr>
-                                        <p:cTn id="16" dur="1" fill="hold">
-                                          <p:stCondLst>
-                                            <p:cond delay="0"/>
-                                          </p:stCondLst>
-                                        </p:cTn>
-                                        <p:tgtEl>
-                                          <p:spTgt spid="3">
-                                            <p:txEl>
-                                              <p:pRg st="4" end="4"/>
-                                            </p:txEl>
-                                          </p:spTgt>
-                                        </p:tgtEl>
-                                        <p:attrNameLst>
-                                          <p:attrName>style.visibility</p:attrName>
-                                        </p:attrNameLst>
-                                      </p:cBhvr>
-                                      <p:to>
-                                        <p:strVal val="visible"/>
-                                      </p:to>
-                                    </p:set>
-                                  </p:childTnLst>
-                                </p:cTn>
-                              </p:par>
-                              <p:par>
-                                <p:cTn id="17" presetID="1" presetClass="entr" presetSubtype="0" fill="hold" nodeType="withEffect">
-                                  <p:stCondLst>
-                                    <p:cond delay="0"/>
-                                  </p:stCondLst>
-                                  <p:childTnLst>
-                                    <p:set>
-                                      <p:cBhvr>
-                                        <p:cTn id="18" dur="1" fill="hold">
-                                          <p:stCondLst>
-                                            <p:cond delay="0"/>
-                                          </p:stCondLst>
-                                        </p:cTn>
-                                        <p:tgtEl>
-                                          <p:spTgt spid="3">
-                                            <p:txEl>
-                                              <p:pRg st="5" end="5"/>
-                                            </p:txEl>
-                                          </p:spTgt>
-                                        </p:tgtEl>
-                                        <p:attrNameLst>
-                                          <p:attrName>style.visibility</p:attrName>
-                                        </p:attrNameLst>
-                                      </p:cBhvr>
-                                      <p:to>
-                                        <p:strVal val="visible"/>
-                                      </p:to>
-                                    </p:set>
-                                  </p:childTnLst>
-                                </p:cTn>
-                              </p:par>
-                              <p:par>
-                                <p:cTn id="19" presetID="1" presetClass="entr" presetSubtype="0" fill="hold" nodeType="withEffect">
-                                  <p:stCondLst>
-                                    <p:cond delay="0"/>
-                                  </p:stCondLst>
-                                  <p:childTnLst>
-                                    <p:set>
-                                      <p:cBhvr>
-                                        <p:cTn id="20" dur="1" fill="hold">
-                                          <p:stCondLst>
-                                            <p:cond delay="0"/>
-                                          </p:stCondLst>
-                                        </p:cTn>
-                                        <p:tgtEl>
-                                          <p:spTgt spid="3">
-                                            <p:txEl>
-                                              <p:pRg st="6" end="6"/>
-                                            </p:txEl>
-                                          </p:spTgt>
-                                        </p:tgtEl>
-                                        <p:attrNameLst>
-                                          <p:attrName>style.visibility</p:attrName>
-                                        </p:attrNameLst>
-                                      </p:cBhvr>
-                                      <p:to>
-                                        <p:strVal val="visible"/>
-                                      </p:to>
-                                    </p:set>
-                                  </p:childTnLst>
-                                </p:cTn>
-                              </p:par>
-                              <p:par>
-                                <p:cTn id="21" presetID="1" presetClass="entr" presetSubtype="0" fill="hold" nodeType="withEffect">
-                                  <p:stCondLst>
-                                    <p:cond delay="0"/>
-                                  </p:stCondLst>
-                                  <p:childTnLst>
-                                    <p:set>
-                                      <p:cBhvr>
-                                        <p:cTn id="22" dur="1" fill="hold">
-                                          <p:stCondLst>
-                                            <p:cond delay="0"/>
-                                          </p:stCondLst>
-                                        </p:cTn>
-                                        <p:tgtEl>
-                                          <p:spTgt spid="3">
-                                            <p:txEl>
-                                              <p:pRg st="7" end="7"/>
-                                            </p:txEl>
-                                          </p:spTgt>
-                                        </p:tgtEl>
-                                        <p:attrNameLst>
-                                          <p:attrName>style.visibility</p:attrName>
-                                        </p:attrNameLst>
-                                      </p:cBhvr>
-                                      <p:to>
-                                        <p:strVal val="visible"/>
-                                      </p:to>
-                                    </p:set>
-                                  </p:childTnLst>
-                                </p:cTn>
-                              </p:par>
-                            </p:childTnLst>
-                          </p:cTn>
-                        </p:par>
-                      </p:childTnLst>
-                    </p:cTn>
-                  </p:par>
-                </p:childTnLst>
-              </p:cTn>
-              <p:prevCondLst>
-                <p:cond evt="onPrev" delay="0">
-                  <p:tgtEl>
-                    <p:sldTgt/>
-                  </p:tgtEl>
-                </p:cond>
-              </p:prevCondLst>
-              <p:nextCondLst>
-                <p:cond evt="onNext" delay="0">
-                  <p:tgtEl>
-                    <p:sldTgt/>
-                  </p:tgtEl>
-                </p:cond>
-              </p:nextCondLst>
-            </p:seq>
-          </p:childTnLst>
-        </p:cTn>
-      </p:par>
-    </p:tnLst>
-  </p:timing>
-</p:sld>
-</file>
-
-<file path=ppt/slides/slide40.xml><?xml version="1.0" encoding="utf-8"?>
+<file path=ppt/slides/slide41.xml><?xml version="1.0" encoding="utf-8"?>
 <p:sld xmlns:a="http://schemas.openxmlformats.org/drawingml/2006/main" xmlns:r="http://schemas.openxmlformats.org/officeDocument/2006/relationships" xmlns:p="http://schemas.openxmlformats.org/presentationml/2006/main">
   <p:cSld>
     <p:spTree>
@@ -27213,7 +27393,7 @@
 </p:sld>
 </file>
 
-<file path=ppt/slides/slide41.xml><?xml version="1.0" encoding="utf-8"?>
+<file path=ppt/slides/slide42.xml><?xml version="1.0" encoding="utf-8"?>
 <p:sld xmlns:a="http://schemas.openxmlformats.org/drawingml/2006/main" xmlns:r="http://schemas.openxmlformats.org/officeDocument/2006/relationships" xmlns:p="http://schemas.openxmlformats.org/presentationml/2006/main">
   <p:cSld>
     <p:spTree>
@@ -27617,7 +27797,7 @@
 </p:sld>
 </file>
 
-<file path=ppt/slides/slide42.xml><?xml version="1.0" encoding="utf-8"?>
+<file path=ppt/slides/slide43.xml><?xml version="1.0" encoding="utf-8"?>
 <p:sld xmlns:a="http://schemas.openxmlformats.org/drawingml/2006/main" xmlns:r="http://schemas.openxmlformats.org/officeDocument/2006/relationships" xmlns:p="http://schemas.openxmlformats.org/presentationml/2006/main">
   <p:cSld>
     <p:spTree>
@@ -28143,7 +28323,7 @@
 </p:sld>
 </file>
 
-<file path=ppt/slides/slide43.xml><?xml version="1.0" encoding="utf-8"?>
+<file path=ppt/slides/slide44.xml><?xml version="1.0" encoding="utf-8"?>
 <p:sld xmlns:a="http://schemas.openxmlformats.org/drawingml/2006/main" xmlns:r="http://schemas.openxmlformats.org/officeDocument/2006/relationships" xmlns:p="http://schemas.openxmlformats.org/presentationml/2006/main">
   <p:cSld>
     <p:spTree>
@@ -29198,7 +29378,7 @@
 </p:sld>
 </file>
 
-<file path=ppt/slides/slide44.xml><?xml version="1.0" encoding="utf-8"?>
+<file path=ppt/slides/slide45.xml><?xml version="1.0" encoding="utf-8"?>
 <p:sld xmlns:a="http://schemas.openxmlformats.org/drawingml/2006/main" xmlns:r="http://schemas.openxmlformats.org/officeDocument/2006/relationships" xmlns:p="http://schemas.openxmlformats.org/presentationml/2006/main">
   <p:cSld>
     <p:spTree>
@@ -29688,7 +29868,7 @@
 </p:sld>
 </file>
 
-<file path=ppt/slides/slide45.xml><?xml version="1.0" encoding="utf-8"?>
+<file path=ppt/slides/slide46.xml><?xml version="1.0" encoding="utf-8"?>
 <p:sld xmlns:a="http://schemas.openxmlformats.org/drawingml/2006/main" xmlns:r="http://schemas.openxmlformats.org/officeDocument/2006/relationships" xmlns:p="http://schemas.openxmlformats.org/presentationml/2006/main">
   <p:cSld>
     <p:spTree>
@@ -30257,7 +30437,7 @@
 </p:sld>
 </file>
 
-<file path=ppt/slides/slide46.xml><?xml version="1.0" encoding="utf-8"?>
+<file path=ppt/slides/slide47.xml><?xml version="1.0" encoding="utf-8"?>
 <p:sld xmlns:a="http://schemas.openxmlformats.org/drawingml/2006/main" xmlns:r="http://schemas.openxmlformats.org/officeDocument/2006/relationships" xmlns:p="http://schemas.openxmlformats.org/presentationml/2006/main">
   <p:cSld>
     <p:spTree>
@@ -30846,7 +31026,7 @@
 </p:sld>
 </file>
 
-<file path=ppt/slides/slide47.xml><?xml version="1.0" encoding="utf-8"?>
+<file path=ppt/slides/slide48.xml><?xml version="1.0" encoding="utf-8"?>
 <p:sld xmlns:a="http://schemas.openxmlformats.org/drawingml/2006/main" xmlns:r="http://schemas.openxmlformats.org/officeDocument/2006/relationships" xmlns:p="http://schemas.openxmlformats.org/presentationml/2006/main">
   <p:cSld>
     <p:spTree>
@@ -30906,7 +31086,7 @@
 </p:sld>
 </file>
 
-<file path=ppt/slides/slide48.xml><?xml version="1.0" encoding="utf-8"?>
+<file path=ppt/slides/slide49.xml><?xml version="1.0" encoding="utf-8"?>
 <p:sld xmlns:a="http://schemas.openxmlformats.org/drawingml/2006/main" xmlns:r="http://schemas.openxmlformats.org/officeDocument/2006/relationships" xmlns:p="http://schemas.openxmlformats.org/presentationml/2006/main">
   <p:cSld>
     <p:spTree>
@@ -31582,7 +31762,401 @@
 </p:sld>
 </file>
 
-<file path=ppt/slides/slide49.xml><?xml version="1.0" encoding="utf-8"?>
+<file path=ppt/slides/slide5.xml><?xml version="1.0" encoding="utf-8"?>
+<p:sld xmlns:a="http://schemas.openxmlformats.org/drawingml/2006/main" xmlns:r="http://schemas.openxmlformats.org/officeDocument/2006/relationships" xmlns:p="http://schemas.openxmlformats.org/presentationml/2006/main">
+  <p:cSld>
+    <p:spTree>
+      <p:nvGrpSpPr>
+        <p:cNvPr id="1" name=""/>
+        <p:cNvGrpSpPr/>
+        <p:nvPr/>
+      </p:nvGrpSpPr>
+      <p:grpSpPr>
+        <a:xfrm>
+          <a:off x="0" y="0"/>
+          <a:ext cx="0" cy="0"/>
+          <a:chOff x="0" y="0"/>
+          <a:chExt cx="0" cy="0"/>
+        </a:xfrm>
+      </p:grpSpPr>
+      <p:sp>
+        <p:nvSpPr>
+          <p:cNvPr id="3" name="Content Placeholder 2">
+            <a:extLst>
+              <a:ext uri="{FF2B5EF4-FFF2-40B4-BE49-F238E27FC236}">
+                <a16:creationId xmlns:a16="http://schemas.microsoft.com/office/drawing/2014/main" id="{258E6AF3-7615-4BD1-878E-A94C93E98F90}"/>
+              </a:ext>
+            </a:extLst>
+          </p:cNvPr>
+          <p:cNvSpPr>
+            <a:spLocks noGrp="1"/>
+          </p:cNvSpPr>
+          <p:nvPr>
+            <p:ph idx="1"/>
+          </p:nvPr>
+        </p:nvSpPr>
+        <p:spPr>
+          <a:xfrm>
+            <a:off x="838200" y="1217458"/>
+            <a:ext cx="10515600" cy="5640542"/>
+          </a:xfrm>
+        </p:spPr>
+        <p:txBody>
+          <a:bodyPr>
+            <a:normAutofit fontScale="92500" lnSpcReduction="10000"/>
+          </a:bodyPr>
+          <a:lstStyle/>
+          <a:p>
+            <a:pPr marL="0" indent="0">
+              <a:buNone/>
+            </a:pPr>
+            <a:r>
+              <a:rPr lang="en-US" sz="3200" dirty="0"/>
+              <a:t>What is the KDD process?   </a:t>
+            </a:r>
+          </a:p>
+          <a:p>
+            <a:pPr marL="0" indent="0">
+              <a:buNone/>
+            </a:pPr>
+            <a:endParaRPr lang="en-US" dirty="0"/>
+          </a:p>
+          <a:p>
+            <a:pPr marL="0" indent="0">
+              <a:buNone/>
+            </a:pPr>
+            <a:endParaRPr lang="en-US" dirty="0"/>
+          </a:p>
+          <a:p>
+            <a:pPr marL="0" indent="0">
+              <a:buNone/>
+            </a:pPr>
+            <a:endParaRPr lang="en-US" dirty="0"/>
+          </a:p>
+          <a:p>
+            <a:pPr marL="0" indent="0">
+              <a:buNone/>
+            </a:pPr>
+            <a:endParaRPr lang="en-US" dirty="0"/>
+          </a:p>
+          <a:p>
+            <a:pPr marL="0" indent="0">
+              <a:buNone/>
+            </a:pPr>
+            <a:endParaRPr lang="en-US" dirty="0"/>
+          </a:p>
+          <a:p>
+            <a:pPr marL="0" indent="0">
+              <a:buNone/>
+            </a:pPr>
+            <a:endParaRPr lang="en-US" dirty="0"/>
+          </a:p>
+          <a:p>
+            <a:pPr marL="0" indent="0">
+              <a:buNone/>
+            </a:pPr>
+            <a:endParaRPr lang="en-US" dirty="0"/>
+          </a:p>
+          <a:p>
+            <a:pPr marL="0" indent="0">
+              <a:buNone/>
+            </a:pPr>
+            <a:endParaRPr lang="en-US" dirty="0">
+              <a:solidFill>
+                <a:schemeClr val="accent1"/>
+              </a:solidFill>
+            </a:endParaRPr>
+          </a:p>
+          <a:p>
+            <a:pPr marL="0" indent="0">
+              <a:buNone/>
+            </a:pPr>
+            <a:endParaRPr lang="en-US" dirty="0">
+              <a:solidFill>
+                <a:schemeClr val="accent1"/>
+              </a:solidFill>
+            </a:endParaRPr>
+          </a:p>
+          <a:p>
+            <a:pPr marL="0" indent="0">
+              <a:buNone/>
+            </a:pPr>
+            <a:endParaRPr lang="en-US" dirty="0">
+              <a:solidFill>
+                <a:schemeClr val="accent1"/>
+              </a:solidFill>
+            </a:endParaRPr>
+          </a:p>
+          <a:p>
+            <a:pPr marL="0" indent="0">
+              <a:buNone/>
+            </a:pPr>
+            <a:r>
+              <a:rPr lang="en-US" dirty="0">
+                <a:solidFill>
+                  <a:schemeClr val="accent1"/>
+                </a:solidFill>
+              </a:rPr>
+              <a:t>Is this old diagram representative?  - e.g. Fayyad et.al. 1996 </a:t>
+            </a:r>
+          </a:p>
+        </p:txBody>
+      </p:sp>
+      <p:sp>
+        <p:nvSpPr>
+          <p:cNvPr id="6" name="Title 1">
+            <a:extLst>
+              <a:ext uri="{FF2B5EF4-FFF2-40B4-BE49-F238E27FC236}">
+                <a16:creationId xmlns:a16="http://schemas.microsoft.com/office/drawing/2014/main" id="{CD29F70F-B868-451B-A65D-8721F4C7A2D9}"/>
+              </a:ext>
+            </a:extLst>
+          </p:cNvPr>
+          <p:cNvSpPr txBox="1">
+            <a:spLocks/>
+          </p:cNvSpPr>
+          <p:nvPr/>
+        </p:nvSpPr>
+        <p:spPr>
+          <a:xfrm>
+            <a:off x="838200" y="-635"/>
+            <a:ext cx="10515600" cy="1325563"/>
+          </a:xfrm>
+          <a:prstGeom prst="rect">
+            <a:avLst/>
+          </a:prstGeom>
+        </p:spPr>
+        <p:txBody>
+          <a:bodyPr vert="horz" lIns="91440" tIns="45720" rIns="91440" bIns="45720" rtlCol="0" anchor="ctr">
+            <a:normAutofit/>
+          </a:bodyPr>
+          <a:lstStyle>
+            <a:lvl1pPr algn="l" defTabSz="914400" rtl="0" eaLnBrk="1" latinLnBrk="0" hangingPunct="1">
+              <a:lnSpc>
+                <a:spcPct val="90000"/>
+              </a:lnSpc>
+              <a:spcBef>
+                <a:spcPct val="0"/>
+              </a:spcBef>
+              <a:buNone/>
+              <a:defRPr sz="4400" kern="1200">
+                <a:solidFill>
+                  <a:schemeClr val="tx1"/>
+                </a:solidFill>
+                <a:latin typeface="+mj-lt"/>
+                <a:ea typeface="+mj-ea"/>
+                <a:cs typeface="+mj-cs"/>
+              </a:defRPr>
+            </a:lvl1pPr>
+          </a:lstStyle>
+          <a:p>
+            <a:r>
+              <a:rPr lang="en-US" dirty="0">
+                <a:latin typeface="+mn-lt"/>
+              </a:rPr>
+              <a:t>KDD process</a:t>
+            </a:r>
+          </a:p>
+        </p:txBody>
+      </p:sp>
+      <p:pic>
+        <p:nvPicPr>
+          <p:cNvPr id="4" name="Picture 3">
+            <a:extLst>
+              <a:ext uri="{FF2B5EF4-FFF2-40B4-BE49-F238E27FC236}">
+                <a16:creationId xmlns:a16="http://schemas.microsoft.com/office/drawing/2014/main" id="{41A10601-345E-4A04-878A-28FFF71506B5}"/>
+              </a:ext>
+            </a:extLst>
+          </p:cNvPr>
+          <p:cNvPicPr>
+            <a:picLocks noChangeAspect="1"/>
+          </p:cNvPicPr>
+          <p:nvPr/>
+        </p:nvPicPr>
+        <p:blipFill>
+          <a:blip r:embed="rId2"/>
+          <a:stretch>
+            <a:fillRect/>
+          </a:stretch>
+        </p:blipFill>
+        <p:spPr>
+          <a:xfrm>
+            <a:off x="951375" y="1651145"/>
+            <a:ext cx="8488232" cy="4404795"/>
+          </a:xfrm>
+          <a:prstGeom prst="rect">
+            <a:avLst/>
+          </a:prstGeom>
+        </p:spPr>
+      </p:pic>
+    </p:spTree>
+    <p:extLst>
+      <p:ext uri="{BB962C8B-B14F-4D97-AF65-F5344CB8AC3E}">
+        <p14:creationId xmlns:p14="http://schemas.microsoft.com/office/powerpoint/2010/main" val="2011350768"/>
+      </p:ext>
+    </p:extLst>
+  </p:cSld>
+  <p:clrMapOvr>
+    <a:masterClrMapping/>
+  </p:clrMapOvr>
+  <p:timing>
+    <p:tnLst>
+      <p:par>
+        <p:cTn id="1" dur="indefinite" restart="never" nodeType="tmRoot">
+          <p:childTnLst>
+            <p:seq concurrent="1" nextAc="seek">
+              <p:cTn id="2" dur="indefinite" nodeType="mainSeq">
+                <p:childTnLst>
+                  <p:par>
+                    <p:cTn id="3" fill="hold">
+                      <p:stCondLst>
+                        <p:cond delay="indefinite"/>
+                      </p:stCondLst>
+                      <p:childTnLst>
+                        <p:par>
+                          <p:cTn id="4" fill="hold">
+                            <p:stCondLst>
+                              <p:cond delay="0"/>
+                            </p:stCondLst>
+                            <p:childTnLst>
+                              <p:par>
+                                <p:cTn id="5" presetID="1" presetClass="entr" presetSubtype="0" fill="hold" nodeType="clickEffect">
+                                  <p:stCondLst>
+                                    <p:cond delay="0"/>
+                                  </p:stCondLst>
+                                  <p:childTnLst>
+                                    <p:set>
+                                      <p:cBhvr>
+                                        <p:cTn id="6" dur="1" fill="hold">
+                                          <p:stCondLst>
+                                            <p:cond delay="0"/>
+                                          </p:stCondLst>
+                                        </p:cTn>
+                                        <p:tgtEl>
+                                          <p:spTgt spid="3">
+                                            <p:txEl>
+                                              <p:pRg st="0" end="0"/>
+                                            </p:txEl>
+                                          </p:spTgt>
+                                        </p:tgtEl>
+                                        <p:attrNameLst>
+                                          <p:attrName>style.visibility</p:attrName>
+                                        </p:attrNameLst>
+                                      </p:cBhvr>
+                                      <p:to>
+                                        <p:strVal val="visible"/>
+                                      </p:to>
+                                    </p:set>
+                                  </p:childTnLst>
+                                </p:cTn>
+                              </p:par>
+                            </p:childTnLst>
+                          </p:cTn>
+                        </p:par>
+                      </p:childTnLst>
+                    </p:cTn>
+                  </p:par>
+                  <p:par>
+                    <p:cTn id="7" fill="hold">
+                      <p:stCondLst>
+                        <p:cond delay="indefinite"/>
+                      </p:stCondLst>
+                      <p:childTnLst>
+                        <p:par>
+                          <p:cTn id="8" fill="hold">
+                            <p:stCondLst>
+                              <p:cond delay="0"/>
+                            </p:stCondLst>
+                            <p:childTnLst>
+                              <p:par>
+                                <p:cTn id="9" presetID="1" presetClass="entr" presetSubtype="0" fill="hold" nodeType="clickEffect">
+                                  <p:stCondLst>
+                                    <p:cond delay="0"/>
+                                  </p:stCondLst>
+                                  <p:childTnLst>
+                                    <p:set>
+                                      <p:cBhvr>
+                                        <p:cTn id="10" dur="1" fill="hold">
+                                          <p:stCondLst>
+                                            <p:cond delay="0"/>
+                                          </p:stCondLst>
+                                        </p:cTn>
+                                        <p:tgtEl>
+                                          <p:spTgt spid="3">
+                                            <p:txEl>
+                                              <p:pRg st="11" end="11"/>
+                                            </p:txEl>
+                                          </p:spTgt>
+                                        </p:tgtEl>
+                                        <p:attrNameLst>
+                                          <p:attrName>style.visibility</p:attrName>
+                                        </p:attrNameLst>
+                                      </p:cBhvr>
+                                      <p:to>
+                                        <p:strVal val="visible"/>
+                                      </p:to>
+                                    </p:set>
+                                  </p:childTnLst>
+                                </p:cTn>
+                              </p:par>
+                              <p:par>
+                                <p:cTn id="11" presetID="1" presetClass="entr" presetSubtype="0" fill="hold" nodeType="withEffect">
+                                  <p:stCondLst>
+                                    <p:cond delay="0"/>
+                                  </p:stCondLst>
+                                  <p:childTnLst>
+                                    <p:set>
+                                      <p:cBhvr>
+                                        <p:cTn id="12" dur="1" fill="hold">
+                                          <p:stCondLst>
+                                            <p:cond delay="0"/>
+                                          </p:stCondLst>
+                                        </p:cTn>
+                                        <p:tgtEl>
+                                          <p:spTgt spid="4"/>
+                                        </p:tgtEl>
+                                        <p:attrNameLst>
+                                          <p:attrName>style.visibility</p:attrName>
+                                        </p:attrNameLst>
+                                      </p:cBhvr>
+                                      <p:to>
+                                        <p:strVal val="visible"/>
+                                      </p:to>
+                                    </p:set>
+                                  </p:childTnLst>
+                                </p:cTn>
+                              </p:par>
+                            </p:childTnLst>
+                          </p:cTn>
+                        </p:par>
+                      </p:childTnLst>
+                    </p:cTn>
+                  </p:par>
+                </p:childTnLst>
+              </p:cTn>
+              <p:prevCondLst>
+                <p:cond evt="onPrev" delay="0">
+                  <p:tgtEl>
+                    <p:sldTgt/>
+                  </p:tgtEl>
+                </p:cond>
+              </p:prevCondLst>
+              <p:nextCondLst>
+                <p:cond evt="onNext" delay="0">
+                  <p:tgtEl>
+                    <p:sldTgt/>
+                  </p:tgtEl>
+                </p:cond>
+              </p:nextCondLst>
+            </p:seq>
+          </p:childTnLst>
+        </p:cTn>
+      </p:par>
+    </p:tnLst>
+  </p:timing>
+</p:sld>
+</file>
+
+<file path=ppt/slides/slide50.xml><?xml version="1.0" encoding="utf-8"?>
 <p:sld xmlns:a="http://schemas.openxmlformats.org/drawingml/2006/main" xmlns:r="http://schemas.openxmlformats.org/officeDocument/2006/relationships" xmlns:p="http://schemas.openxmlformats.org/presentationml/2006/main">
   <p:cSld>
     <p:spTree>
@@ -32486,401 +33060,7 @@
 </p:sld>
 </file>
 
-<file path=ppt/slides/slide5.xml><?xml version="1.0" encoding="utf-8"?>
-<p:sld xmlns:a="http://schemas.openxmlformats.org/drawingml/2006/main" xmlns:r="http://schemas.openxmlformats.org/officeDocument/2006/relationships" xmlns:p="http://schemas.openxmlformats.org/presentationml/2006/main">
-  <p:cSld>
-    <p:spTree>
-      <p:nvGrpSpPr>
-        <p:cNvPr id="1" name=""/>
-        <p:cNvGrpSpPr/>
-        <p:nvPr/>
-      </p:nvGrpSpPr>
-      <p:grpSpPr>
-        <a:xfrm>
-          <a:off x="0" y="0"/>
-          <a:ext cx="0" cy="0"/>
-          <a:chOff x="0" y="0"/>
-          <a:chExt cx="0" cy="0"/>
-        </a:xfrm>
-      </p:grpSpPr>
-      <p:sp>
-        <p:nvSpPr>
-          <p:cNvPr id="3" name="Content Placeholder 2">
-            <a:extLst>
-              <a:ext uri="{FF2B5EF4-FFF2-40B4-BE49-F238E27FC236}">
-                <a16:creationId xmlns:a16="http://schemas.microsoft.com/office/drawing/2014/main" id="{258E6AF3-7615-4BD1-878E-A94C93E98F90}"/>
-              </a:ext>
-            </a:extLst>
-          </p:cNvPr>
-          <p:cNvSpPr>
-            <a:spLocks noGrp="1"/>
-          </p:cNvSpPr>
-          <p:nvPr>
-            <p:ph idx="1"/>
-          </p:nvPr>
-        </p:nvSpPr>
-        <p:spPr>
-          <a:xfrm>
-            <a:off x="838200" y="1217458"/>
-            <a:ext cx="10515600" cy="5640542"/>
-          </a:xfrm>
-        </p:spPr>
-        <p:txBody>
-          <a:bodyPr>
-            <a:normAutofit fontScale="92500" lnSpcReduction="10000"/>
-          </a:bodyPr>
-          <a:lstStyle/>
-          <a:p>
-            <a:pPr marL="0" indent="0">
-              <a:buNone/>
-            </a:pPr>
-            <a:r>
-              <a:rPr lang="en-US" sz="3200" dirty="0"/>
-              <a:t>What is the KDD process?   </a:t>
-            </a:r>
-          </a:p>
-          <a:p>
-            <a:pPr marL="0" indent="0">
-              <a:buNone/>
-            </a:pPr>
-            <a:endParaRPr lang="en-US" dirty="0"/>
-          </a:p>
-          <a:p>
-            <a:pPr marL="0" indent="0">
-              <a:buNone/>
-            </a:pPr>
-            <a:endParaRPr lang="en-US" dirty="0"/>
-          </a:p>
-          <a:p>
-            <a:pPr marL="0" indent="0">
-              <a:buNone/>
-            </a:pPr>
-            <a:endParaRPr lang="en-US" dirty="0"/>
-          </a:p>
-          <a:p>
-            <a:pPr marL="0" indent="0">
-              <a:buNone/>
-            </a:pPr>
-            <a:endParaRPr lang="en-US" dirty="0"/>
-          </a:p>
-          <a:p>
-            <a:pPr marL="0" indent="0">
-              <a:buNone/>
-            </a:pPr>
-            <a:endParaRPr lang="en-US" dirty="0"/>
-          </a:p>
-          <a:p>
-            <a:pPr marL="0" indent="0">
-              <a:buNone/>
-            </a:pPr>
-            <a:endParaRPr lang="en-US" dirty="0"/>
-          </a:p>
-          <a:p>
-            <a:pPr marL="0" indent="0">
-              <a:buNone/>
-            </a:pPr>
-            <a:endParaRPr lang="en-US" dirty="0"/>
-          </a:p>
-          <a:p>
-            <a:pPr marL="0" indent="0">
-              <a:buNone/>
-            </a:pPr>
-            <a:endParaRPr lang="en-US" dirty="0">
-              <a:solidFill>
-                <a:schemeClr val="accent1"/>
-              </a:solidFill>
-            </a:endParaRPr>
-          </a:p>
-          <a:p>
-            <a:pPr marL="0" indent="0">
-              <a:buNone/>
-            </a:pPr>
-            <a:endParaRPr lang="en-US" dirty="0">
-              <a:solidFill>
-                <a:schemeClr val="accent1"/>
-              </a:solidFill>
-            </a:endParaRPr>
-          </a:p>
-          <a:p>
-            <a:pPr marL="0" indent="0">
-              <a:buNone/>
-            </a:pPr>
-            <a:endParaRPr lang="en-US" dirty="0">
-              <a:solidFill>
-                <a:schemeClr val="accent1"/>
-              </a:solidFill>
-            </a:endParaRPr>
-          </a:p>
-          <a:p>
-            <a:pPr marL="0" indent="0">
-              <a:buNone/>
-            </a:pPr>
-            <a:r>
-              <a:rPr lang="en-US" dirty="0">
-                <a:solidFill>
-                  <a:schemeClr val="accent1"/>
-                </a:solidFill>
-              </a:rPr>
-              <a:t>Is this old diagram representative?  - e.g. Fayyad et.al. 1996 </a:t>
-            </a:r>
-          </a:p>
-        </p:txBody>
-      </p:sp>
-      <p:sp>
-        <p:nvSpPr>
-          <p:cNvPr id="6" name="Title 1">
-            <a:extLst>
-              <a:ext uri="{FF2B5EF4-FFF2-40B4-BE49-F238E27FC236}">
-                <a16:creationId xmlns:a16="http://schemas.microsoft.com/office/drawing/2014/main" id="{CD29F70F-B868-451B-A65D-8721F4C7A2D9}"/>
-              </a:ext>
-            </a:extLst>
-          </p:cNvPr>
-          <p:cNvSpPr txBox="1">
-            <a:spLocks/>
-          </p:cNvSpPr>
-          <p:nvPr/>
-        </p:nvSpPr>
-        <p:spPr>
-          <a:xfrm>
-            <a:off x="838200" y="-635"/>
-            <a:ext cx="10515600" cy="1325563"/>
-          </a:xfrm>
-          <a:prstGeom prst="rect">
-            <a:avLst/>
-          </a:prstGeom>
-        </p:spPr>
-        <p:txBody>
-          <a:bodyPr vert="horz" lIns="91440" tIns="45720" rIns="91440" bIns="45720" rtlCol="0" anchor="ctr">
-            <a:normAutofit/>
-          </a:bodyPr>
-          <a:lstStyle>
-            <a:lvl1pPr algn="l" defTabSz="914400" rtl="0" eaLnBrk="1" latinLnBrk="0" hangingPunct="1">
-              <a:lnSpc>
-                <a:spcPct val="90000"/>
-              </a:lnSpc>
-              <a:spcBef>
-                <a:spcPct val="0"/>
-              </a:spcBef>
-              <a:buNone/>
-              <a:defRPr sz="4400" kern="1200">
-                <a:solidFill>
-                  <a:schemeClr val="tx1"/>
-                </a:solidFill>
-                <a:latin typeface="+mj-lt"/>
-                <a:ea typeface="+mj-ea"/>
-                <a:cs typeface="+mj-cs"/>
-              </a:defRPr>
-            </a:lvl1pPr>
-          </a:lstStyle>
-          <a:p>
-            <a:r>
-              <a:rPr lang="en-US" dirty="0">
-                <a:latin typeface="+mn-lt"/>
-              </a:rPr>
-              <a:t>KDD process</a:t>
-            </a:r>
-          </a:p>
-        </p:txBody>
-      </p:sp>
-      <p:pic>
-        <p:nvPicPr>
-          <p:cNvPr id="4" name="Picture 3">
-            <a:extLst>
-              <a:ext uri="{FF2B5EF4-FFF2-40B4-BE49-F238E27FC236}">
-                <a16:creationId xmlns:a16="http://schemas.microsoft.com/office/drawing/2014/main" id="{41A10601-345E-4A04-878A-28FFF71506B5}"/>
-              </a:ext>
-            </a:extLst>
-          </p:cNvPr>
-          <p:cNvPicPr>
-            <a:picLocks noChangeAspect="1"/>
-          </p:cNvPicPr>
-          <p:nvPr/>
-        </p:nvPicPr>
-        <p:blipFill>
-          <a:blip r:embed="rId2"/>
-          <a:stretch>
-            <a:fillRect/>
-          </a:stretch>
-        </p:blipFill>
-        <p:spPr>
-          <a:xfrm>
-            <a:off x="951375" y="1651145"/>
-            <a:ext cx="8488232" cy="4404795"/>
-          </a:xfrm>
-          <a:prstGeom prst="rect">
-            <a:avLst/>
-          </a:prstGeom>
-        </p:spPr>
-      </p:pic>
-    </p:spTree>
-    <p:extLst>
-      <p:ext uri="{BB962C8B-B14F-4D97-AF65-F5344CB8AC3E}">
-        <p14:creationId xmlns:p14="http://schemas.microsoft.com/office/powerpoint/2010/main" val="2011350768"/>
-      </p:ext>
-    </p:extLst>
-  </p:cSld>
-  <p:clrMapOvr>
-    <a:masterClrMapping/>
-  </p:clrMapOvr>
-  <p:timing>
-    <p:tnLst>
-      <p:par>
-        <p:cTn id="1" dur="indefinite" restart="never" nodeType="tmRoot">
-          <p:childTnLst>
-            <p:seq concurrent="1" nextAc="seek">
-              <p:cTn id="2" dur="indefinite" nodeType="mainSeq">
-                <p:childTnLst>
-                  <p:par>
-                    <p:cTn id="3" fill="hold">
-                      <p:stCondLst>
-                        <p:cond delay="indefinite"/>
-                      </p:stCondLst>
-                      <p:childTnLst>
-                        <p:par>
-                          <p:cTn id="4" fill="hold">
-                            <p:stCondLst>
-                              <p:cond delay="0"/>
-                            </p:stCondLst>
-                            <p:childTnLst>
-                              <p:par>
-                                <p:cTn id="5" presetID="1" presetClass="entr" presetSubtype="0" fill="hold" nodeType="clickEffect">
-                                  <p:stCondLst>
-                                    <p:cond delay="0"/>
-                                  </p:stCondLst>
-                                  <p:childTnLst>
-                                    <p:set>
-                                      <p:cBhvr>
-                                        <p:cTn id="6" dur="1" fill="hold">
-                                          <p:stCondLst>
-                                            <p:cond delay="0"/>
-                                          </p:stCondLst>
-                                        </p:cTn>
-                                        <p:tgtEl>
-                                          <p:spTgt spid="3">
-                                            <p:txEl>
-                                              <p:pRg st="0" end="0"/>
-                                            </p:txEl>
-                                          </p:spTgt>
-                                        </p:tgtEl>
-                                        <p:attrNameLst>
-                                          <p:attrName>style.visibility</p:attrName>
-                                        </p:attrNameLst>
-                                      </p:cBhvr>
-                                      <p:to>
-                                        <p:strVal val="visible"/>
-                                      </p:to>
-                                    </p:set>
-                                  </p:childTnLst>
-                                </p:cTn>
-                              </p:par>
-                            </p:childTnLst>
-                          </p:cTn>
-                        </p:par>
-                      </p:childTnLst>
-                    </p:cTn>
-                  </p:par>
-                  <p:par>
-                    <p:cTn id="7" fill="hold">
-                      <p:stCondLst>
-                        <p:cond delay="indefinite"/>
-                      </p:stCondLst>
-                      <p:childTnLst>
-                        <p:par>
-                          <p:cTn id="8" fill="hold">
-                            <p:stCondLst>
-                              <p:cond delay="0"/>
-                            </p:stCondLst>
-                            <p:childTnLst>
-                              <p:par>
-                                <p:cTn id="9" presetID="1" presetClass="entr" presetSubtype="0" fill="hold" nodeType="clickEffect">
-                                  <p:stCondLst>
-                                    <p:cond delay="0"/>
-                                  </p:stCondLst>
-                                  <p:childTnLst>
-                                    <p:set>
-                                      <p:cBhvr>
-                                        <p:cTn id="10" dur="1" fill="hold">
-                                          <p:stCondLst>
-                                            <p:cond delay="0"/>
-                                          </p:stCondLst>
-                                        </p:cTn>
-                                        <p:tgtEl>
-                                          <p:spTgt spid="3">
-                                            <p:txEl>
-                                              <p:pRg st="11" end="11"/>
-                                            </p:txEl>
-                                          </p:spTgt>
-                                        </p:tgtEl>
-                                        <p:attrNameLst>
-                                          <p:attrName>style.visibility</p:attrName>
-                                        </p:attrNameLst>
-                                      </p:cBhvr>
-                                      <p:to>
-                                        <p:strVal val="visible"/>
-                                      </p:to>
-                                    </p:set>
-                                  </p:childTnLst>
-                                </p:cTn>
-                              </p:par>
-                              <p:par>
-                                <p:cTn id="11" presetID="1" presetClass="entr" presetSubtype="0" fill="hold" nodeType="withEffect">
-                                  <p:stCondLst>
-                                    <p:cond delay="0"/>
-                                  </p:stCondLst>
-                                  <p:childTnLst>
-                                    <p:set>
-                                      <p:cBhvr>
-                                        <p:cTn id="12" dur="1" fill="hold">
-                                          <p:stCondLst>
-                                            <p:cond delay="0"/>
-                                          </p:stCondLst>
-                                        </p:cTn>
-                                        <p:tgtEl>
-                                          <p:spTgt spid="4"/>
-                                        </p:tgtEl>
-                                        <p:attrNameLst>
-                                          <p:attrName>style.visibility</p:attrName>
-                                        </p:attrNameLst>
-                                      </p:cBhvr>
-                                      <p:to>
-                                        <p:strVal val="visible"/>
-                                      </p:to>
-                                    </p:set>
-                                  </p:childTnLst>
-                                </p:cTn>
-                              </p:par>
-                            </p:childTnLst>
-                          </p:cTn>
-                        </p:par>
-                      </p:childTnLst>
-                    </p:cTn>
-                  </p:par>
-                </p:childTnLst>
-              </p:cTn>
-              <p:prevCondLst>
-                <p:cond evt="onPrev" delay="0">
-                  <p:tgtEl>
-                    <p:sldTgt/>
-                  </p:tgtEl>
-                </p:cond>
-              </p:prevCondLst>
-              <p:nextCondLst>
-                <p:cond evt="onNext" delay="0">
-                  <p:tgtEl>
-                    <p:sldTgt/>
-                  </p:tgtEl>
-                </p:cond>
-              </p:nextCondLst>
-            </p:seq>
-          </p:childTnLst>
-        </p:cTn>
-      </p:par>
-    </p:tnLst>
-  </p:timing>
-</p:sld>
-</file>
-
-<file path=ppt/slides/slide50.xml><?xml version="1.0" encoding="utf-8"?>
+<file path=ppt/slides/slide51.xml><?xml version="1.0" encoding="utf-8"?>
 <p:sld xmlns:a="http://schemas.openxmlformats.org/drawingml/2006/main" xmlns:r="http://schemas.openxmlformats.org/officeDocument/2006/relationships" xmlns:p="http://schemas.openxmlformats.org/presentationml/2006/main">
   <p:cSld>
     <p:spTree>
@@ -35175,7 +35355,7 @@
 </p:sld>
 </file>
 
-<file path=ppt/slides/slide51.xml><?xml version="1.0" encoding="utf-8"?>
+<file path=ppt/slides/slide52.xml><?xml version="1.0" encoding="utf-8"?>
 <p:sld xmlns:a="http://schemas.openxmlformats.org/drawingml/2006/main" xmlns:r="http://schemas.openxmlformats.org/officeDocument/2006/relationships" xmlns:p="http://schemas.openxmlformats.org/presentationml/2006/main">
   <p:cSld>
     <p:spTree>
@@ -35514,7 +35694,7 @@
 </p:sld>
 </file>
 
-<file path=ppt/slides/slide52.xml><?xml version="1.0" encoding="utf-8"?>
+<file path=ppt/slides/slide53.xml><?xml version="1.0" encoding="utf-8"?>
 <p:sld xmlns:a="http://schemas.openxmlformats.org/drawingml/2006/main" xmlns:r="http://schemas.openxmlformats.org/officeDocument/2006/relationships" xmlns:p="http://schemas.openxmlformats.org/presentationml/2006/main">
   <p:cSld>
     <p:spTree>
@@ -36015,7 +36195,7 @@
 </p:sld>
 </file>
 
-<file path=ppt/slides/slide53.xml><?xml version="1.0" encoding="utf-8"?>
+<file path=ppt/slides/slide54.xml><?xml version="1.0" encoding="utf-8"?>
 <p:sld xmlns:a="http://schemas.openxmlformats.org/drawingml/2006/main" xmlns:r="http://schemas.openxmlformats.org/officeDocument/2006/relationships" xmlns:p="http://schemas.openxmlformats.org/presentationml/2006/main">
   <p:cSld>
     <p:spTree>
@@ -36723,7 +36903,7 @@
 </p:sld>
 </file>
 
-<file path=ppt/slides/slide54.xml><?xml version="1.0" encoding="utf-8"?>
+<file path=ppt/slides/slide55.xml><?xml version="1.0" encoding="utf-8"?>
 <p:sld xmlns:a="http://schemas.openxmlformats.org/drawingml/2006/main" xmlns:r="http://schemas.openxmlformats.org/officeDocument/2006/relationships" xmlns:p="http://schemas.openxmlformats.org/presentationml/2006/main">
   <p:cSld>
     <p:spTree>
@@ -38010,7 +38190,7 @@
 </p:sld>
 </file>
 
-<file path=ppt/slides/slide55.xml><?xml version="1.0" encoding="utf-8"?>
+<file path=ppt/slides/slide56.xml><?xml version="1.0" encoding="utf-8"?>
 <p:sld xmlns:a="http://schemas.openxmlformats.org/drawingml/2006/main" xmlns:r="http://schemas.openxmlformats.org/officeDocument/2006/relationships" xmlns:p="http://schemas.openxmlformats.org/presentationml/2006/main">
   <p:cSld>
     <p:spTree>
@@ -38080,7 +38260,7 @@
 </p:sld>
 </file>
 
-<file path=ppt/slides/slide56.xml><?xml version="1.0" encoding="utf-8"?>
+<file path=ppt/slides/slide57.xml><?xml version="1.0" encoding="utf-8"?>
 <p:sld xmlns:a="http://schemas.openxmlformats.org/drawingml/2006/main" xmlns:r="http://schemas.openxmlformats.org/officeDocument/2006/relationships" xmlns:p="http://schemas.openxmlformats.org/presentationml/2006/main">
   <p:cSld>
     <p:spTree>
@@ -38627,7 +38807,7 @@
 </p:sld>
 </file>
 
-<file path=ppt/slides/slide57.xml><?xml version="1.0" encoding="utf-8"?>
+<file path=ppt/slides/slide58.xml><?xml version="1.0" encoding="utf-8"?>
 <p:sld xmlns:a="http://schemas.openxmlformats.org/drawingml/2006/main" xmlns:r="http://schemas.openxmlformats.org/officeDocument/2006/relationships" xmlns:p="http://schemas.openxmlformats.org/presentationml/2006/main">
   <p:cSld>
     <p:spTree>
@@ -39170,7 +39350,7 @@
 </p:sld>
 </file>
 
-<file path=ppt/slides/slide58.xml><?xml version="1.0" encoding="utf-8"?>
+<file path=ppt/slides/slide59.xml><?xml version="1.0" encoding="utf-8"?>
 <p:sld xmlns:a="http://schemas.openxmlformats.org/drawingml/2006/main" xmlns:r="http://schemas.openxmlformats.org/officeDocument/2006/relationships" xmlns:p="http://schemas.openxmlformats.org/presentationml/2006/main">
   <p:cSld>
     <p:spTree>
@@ -39507,7 +39687,757 @@
 </p:sld>
 </file>
 
-<file path=ppt/slides/slide59.xml><?xml version="1.0" encoding="utf-8"?>
+<file path=ppt/slides/slide6.xml><?xml version="1.0" encoding="utf-8"?>
+<p:sld xmlns:a="http://schemas.openxmlformats.org/drawingml/2006/main" xmlns:r="http://schemas.openxmlformats.org/officeDocument/2006/relationships" xmlns:p="http://schemas.openxmlformats.org/presentationml/2006/main">
+  <p:cSld>
+    <p:spTree>
+      <p:nvGrpSpPr>
+        <p:cNvPr id="1" name=""/>
+        <p:cNvGrpSpPr/>
+        <p:nvPr/>
+      </p:nvGrpSpPr>
+      <p:grpSpPr>
+        <a:xfrm>
+          <a:off x="0" y="0"/>
+          <a:ext cx="0" cy="0"/>
+          <a:chOff x="0" y="0"/>
+          <a:chExt cx="0" cy="0"/>
+        </a:xfrm>
+      </p:grpSpPr>
+      <p:sp>
+        <p:nvSpPr>
+          <p:cNvPr id="3" name="Content Placeholder 2">
+            <a:extLst>
+              <a:ext uri="{FF2B5EF4-FFF2-40B4-BE49-F238E27FC236}">
+                <a16:creationId xmlns:a16="http://schemas.microsoft.com/office/drawing/2014/main" id="{258E6AF3-7615-4BD1-878E-A94C93E98F90}"/>
+              </a:ext>
+            </a:extLst>
+          </p:cNvPr>
+          <p:cNvSpPr>
+            <a:spLocks noGrp="1"/>
+          </p:cNvSpPr>
+          <p:nvPr>
+            <p:ph idx="1"/>
+          </p:nvPr>
+        </p:nvSpPr>
+        <p:spPr>
+          <a:xfrm>
+            <a:off x="838200" y="1217458"/>
+            <a:ext cx="10515600" cy="485939"/>
+          </a:xfrm>
+        </p:spPr>
+        <p:txBody>
+          <a:bodyPr>
+            <a:normAutofit fontScale="92500" lnSpcReduction="10000"/>
+          </a:bodyPr>
+          <a:lstStyle/>
+          <a:p>
+            <a:pPr marL="0" indent="0">
+              <a:buNone/>
+            </a:pPr>
+            <a:r>
+              <a:rPr lang="en-US" sz="3200" dirty="0"/>
+              <a:t>What is the KDD process?   </a:t>
+            </a:r>
+          </a:p>
+        </p:txBody>
+      </p:sp>
+      <p:sp>
+        <p:nvSpPr>
+          <p:cNvPr id="6" name="Title 1">
+            <a:extLst>
+              <a:ext uri="{FF2B5EF4-FFF2-40B4-BE49-F238E27FC236}">
+                <a16:creationId xmlns:a16="http://schemas.microsoft.com/office/drawing/2014/main" id="{CD29F70F-B868-451B-A65D-8721F4C7A2D9}"/>
+              </a:ext>
+            </a:extLst>
+          </p:cNvPr>
+          <p:cNvSpPr txBox="1">
+            <a:spLocks/>
+          </p:cNvSpPr>
+          <p:nvPr/>
+        </p:nvSpPr>
+        <p:spPr>
+          <a:xfrm>
+            <a:off x="838200" y="-635"/>
+            <a:ext cx="10515600" cy="1325563"/>
+          </a:xfrm>
+          <a:prstGeom prst="rect">
+            <a:avLst/>
+          </a:prstGeom>
+        </p:spPr>
+        <p:txBody>
+          <a:bodyPr vert="horz" lIns="91440" tIns="45720" rIns="91440" bIns="45720" rtlCol="0" anchor="ctr">
+            <a:normAutofit/>
+          </a:bodyPr>
+          <a:lstStyle>
+            <a:lvl1pPr algn="l" defTabSz="914400" rtl="0" eaLnBrk="1" latinLnBrk="0" hangingPunct="1">
+              <a:lnSpc>
+                <a:spcPct val="90000"/>
+              </a:lnSpc>
+              <a:spcBef>
+                <a:spcPct val="0"/>
+              </a:spcBef>
+              <a:buNone/>
+              <a:defRPr sz="4400" kern="1200">
+                <a:solidFill>
+                  <a:schemeClr val="tx1"/>
+                </a:solidFill>
+                <a:latin typeface="+mj-lt"/>
+                <a:ea typeface="+mj-ea"/>
+                <a:cs typeface="+mj-cs"/>
+              </a:defRPr>
+            </a:lvl1pPr>
+          </a:lstStyle>
+          <a:p>
+            <a:r>
+              <a:rPr lang="en-US" dirty="0">
+                <a:latin typeface="+mn-lt"/>
+              </a:rPr>
+              <a:t>KDD process</a:t>
+            </a:r>
+          </a:p>
+        </p:txBody>
+      </p:sp>
+      <p:pic>
+        <p:nvPicPr>
+          <p:cNvPr id="4" name="Picture 3">
+            <a:extLst>
+              <a:ext uri="{FF2B5EF4-FFF2-40B4-BE49-F238E27FC236}">
+                <a16:creationId xmlns:a16="http://schemas.microsoft.com/office/drawing/2014/main" id="{41A10601-345E-4A04-878A-28FFF71506B5}"/>
+              </a:ext>
+            </a:extLst>
+          </p:cNvPr>
+          <p:cNvPicPr>
+            <a:picLocks noChangeAspect="1"/>
+          </p:cNvPicPr>
+          <p:nvPr/>
+        </p:nvPicPr>
+        <p:blipFill>
+          <a:blip r:embed="rId2"/>
+          <a:stretch>
+            <a:fillRect/>
+          </a:stretch>
+        </p:blipFill>
+        <p:spPr>
+          <a:xfrm>
+            <a:off x="376610" y="2168435"/>
+            <a:ext cx="6121998" cy="3176886"/>
+          </a:xfrm>
+          <a:prstGeom prst="rect">
+            <a:avLst/>
+          </a:prstGeom>
+        </p:spPr>
+      </p:pic>
+      <p:sp>
+        <p:nvSpPr>
+          <p:cNvPr id="5" name="Content Placeholder 2">
+            <a:extLst>
+              <a:ext uri="{FF2B5EF4-FFF2-40B4-BE49-F238E27FC236}">
+                <a16:creationId xmlns:a16="http://schemas.microsoft.com/office/drawing/2014/main" id="{DBC99F37-3CFD-4C3B-8CF6-AEDE11B202D2}"/>
+              </a:ext>
+            </a:extLst>
+          </p:cNvPr>
+          <p:cNvSpPr txBox="1">
+            <a:spLocks/>
+          </p:cNvSpPr>
+          <p:nvPr/>
+        </p:nvSpPr>
+        <p:spPr>
+          <a:xfrm>
+            <a:off x="6787461" y="1921229"/>
+            <a:ext cx="5116757" cy="4395969"/>
+          </a:xfrm>
+          <a:prstGeom prst="rect">
+            <a:avLst/>
+          </a:prstGeom>
+        </p:spPr>
+        <p:txBody>
+          <a:bodyPr vert="horz" lIns="91440" tIns="45720" rIns="91440" bIns="45720" rtlCol="0">
+            <a:normAutofit fontScale="92500" lnSpcReduction="20000"/>
+          </a:bodyPr>
+          <a:lstStyle>
+            <a:lvl1pPr marL="228600" indent="-228600" algn="l" defTabSz="914400" rtl="0" eaLnBrk="1" latinLnBrk="0" hangingPunct="1">
+              <a:lnSpc>
+                <a:spcPct val="90000"/>
+              </a:lnSpc>
+              <a:spcBef>
+                <a:spcPts val="1000"/>
+              </a:spcBef>
+              <a:buFont typeface="Arial" panose="020B0604020202020204" pitchFamily="34" charset="0"/>
+              <a:buChar char="•"/>
+              <a:defRPr sz="2800" kern="1200">
+                <a:solidFill>
+                  <a:schemeClr val="tx1"/>
+                </a:solidFill>
+                <a:latin typeface="+mn-lt"/>
+                <a:ea typeface="+mn-ea"/>
+                <a:cs typeface="+mn-cs"/>
+              </a:defRPr>
+            </a:lvl1pPr>
+            <a:lvl2pPr marL="685800" indent="-228600" algn="l" defTabSz="914400" rtl="0" eaLnBrk="1" latinLnBrk="0" hangingPunct="1">
+              <a:lnSpc>
+                <a:spcPct val="90000"/>
+              </a:lnSpc>
+              <a:spcBef>
+                <a:spcPts val="500"/>
+              </a:spcBef>
+              <a:buFont typeface="Arial" panose="020B0604020202020204" pitchFamily="34" charset="0"/>
+              <a:buChar char="•"/>
+              <a:defRPr sz="2400" kern="1200">
+                <a:solidFill>
+                  <a:schemeClr val="tx1"/>
+                </a:solidFill>
+                <a:latin typeface="+mn-lt"/>
+                <a:ea typeface="+mn-ea"/>
+                <a:cs typeface="+mn-cs"/>
+              </a:defRPr>
+            </a:lvl2pPr>
+            <a:lvl3pPr marL="1143000" indent="-228600" algn="l" defTabSz="914400" rtl="0" eaLnBrk="1" latinLnBrk="0" hangingPunct="1">
+              <a:lnSpc>
+                <a:spcPct val="90000"/>
+              </a:lnSpc>
+              <a:spcBef>
+                <a:spcPts val="500"/>
+              </a:spcBef>
+              <a:buFont typeface="Arial" panose="020B0604020202020204" pitchFamily="34" charset="0"/>
+              <a:buChar char="•"/>
+              <a:defRPr sz="2000" kern="1200">
+                <a:solidFill>
+                  <a:schemeClr val="tx1"/>
+                </a:solidFill>
+                <a:latin typeface="+mn-lt"/>
+                <a:ea typeface="+mn-ea"/>
+                <a:cs typeface="+mn-cs"/>
+              </a:defRPr>
+            </a:lvl3pPr>
+            <a:lvl4pPr marL="1600200" indent="-228600" algn="l" defTabSz="914400" rtl="0" eaLnBrk="1" latinLnBrk="0" hangingPunct="1">
+              <a:lnSpc>
+                <a:spcPct val="90000"/>
+              </a:lnSpc>
+              <a:spcBef>
+                <a:spcPts val="500"/>
+              </a:spcBef>
+              <a:buFont typeface="Arial" panose="020B0604020202020204" pitchFamily="34" charset="0"/>
+              <a:buChar char="•"/>
+              <a:defRPr sz="1800" kern="1200">
+                <a:solidFill>
+                  <a:schemeClr val="tx1"/>
+                </a:solidFill>
+                <a:latin typeface="+mn-lt"/>
+                <a:ea typeface="+mn-ea"/>
+                <a:cs typeface="+mn-cs"/>
+              </a:defRPr>
+            </a:lvl4pPr>
+            <a:lvl5pPr marL="2057400" indent="-228600" algn="l" defTabSz="914400" rtl="0" eaLnBrk="1" latinLnBrk="0" hangingPunct="1">
+              <a:lnSpc>
+                <a:spcPct val="90000"/>
+              </a:lnSpc>
+              <a:spcBef>
+                <a:spcPts val="500"/>
+              </a:spcBef>
+              <a:buFont typeface="Arial" panose="020B0604020202020204" pitchFamily="34" charset="0"/>
+              <a:buChar char="•"/>
+              <a:defRPr sz="1800" kern="1200">
+                <a:solidFill>
+                  <a:schemeClr val="tx1"/>
+                </a:solidFill>
+                <a:latin typeface="+mn-lt"/>
+                <a:ea typeface="+mn-ea"/>
+                <a:cs typeface="+mn-cs"/>
+              </a:defRPr>
+            </a:lvl5pPr>
+            <a:lvl6pPr marL="2514600" indent="-228600" algn="l" defTabSz="914400" rtl="0" eaLnBrk="1" latinLnBrk="0" hangingPunct="1">
+              <a:lnSpc>
+                <a:spcPct val="90000"/>
+              </a:lnSpc>
+              <a:spcBef>
+                <a:spcPts val="500"/>
+              </a:spcBef>
+              <a:buFont typeface="Arial" panose="020B0604020202020204" pitchFamily="34" charset="0"/>
+              <a:buChar char="•"/>
+              <a:defRPr sz="1800" kern="1200">
+                <a:solidFill>
+                  <a:schemeClr val="tx1"/>
+                </a:solidFill>
+                <a:latin typeface="+mn-lt"/>
+                <a:ea typeface="+mn-ea"/>
+                <a:cs typeface="+mn-cs"/>
+              </a:defRPr>
+            </a:lvl6pPr>
+            <a:lvl7pPr marL="2971800" indent="-228600" algn="l" defTabSz="914400" rtl="0" eaLnBrk="1" latinLnBrk="0" hangingPunct="1">
+              <a:lnSpc>
+                <a:spcPct val="90000"/>
+              </a:lnSpc>
+              <a:spcBef>
+                <a:spcPts val="500"/>
+              </a:spcBef>
+              <a:buFont typeface="Arial" panose="020B0604020202020204" pitchFamily="34" charset="0"/>
+              <a:buChar char="•"/>
+              <a:defRPr sz="1800" kern="1200">
+                <a:solidFill>
+                  <a:schemeClr val="tx1"/>
+                </a:solidFill>
+                <a:latin typeface="+mn-lt"/>
+                <a:ea typeface="+mn-ea"/>
+                <a:cs typeface="+mn-cs"/>
+              </a:defRPr>
+            </a:lvl7pPr>
+            <a:lvl8pPr marL="3429000" indent="-228600" algn="l" defTabSz="914400" rtl="0" eaLnBrk="1" latinLnBrk="0" hangingPunct="1">
+              <a:lnSpc>
+                <a:spcPct val="90000"/>
+              </a:lnSpc>
+              <a:spcBef>
+                <a:spcPts val="500"/>
+              </a:spcBef>
+              <a:buFont typeface="Arial" panose="020B0604020202020204" pitchFamily="34" charset="0"/>
+              <a:buChar char="•"/>
+              <a:defRPr sz="1800" kern="1200">
+                <a:solidFill>
+                  <a:schemeClr val="tx1"/>
+                </a:solidFill>
+                <a:latin typeface="+mn-lt"/>
+                <a:ea typeface="+mn-ea"/>
+                <a:cs typeface="+mn-cs"/>
+              </a:defRPr>
+            </a:lvl8pPr>
+            <a:lvl9pPr marL="3886200" indent="-228600" algn="l" defTabSz="914400" rtl="0" eaLnBrk="1" latinLnBrk="0" hangingPunct="1">
+              <a:lnSpc>
+                <a:spcPct val="90000"/>
+              </a:lnSpc>
+              <a:spcBef>
+                <a:spcPts val="500"/>
+              </a:spcBef>
+              <a:buFont typeface="Arial" panose="020B0604020202020204" pitchFamily="34" charset="0"/>
+              <a:buChar char="•"/>
+              <a:defRPr sz="1800" kern="1200">
+                <a:solidFill>
+                  <a:schemeClr val="tx1"/>
+                </a:solidFill>
+                <a:latin typeface="+mn-lt"/>
+                <a:ea typeface="+mn-ea"/>
+                <a:cs typeface="+mn-cs"/>
+              </a:defRPr>
+            </a:lvl9pPr>
+          </a:lstStyle>
+          <a:p>
+            <a:pPr marL="0" indent="0">
+              <a:buFont typeface="Arial" panose="020B0604020202020204" pitchFamily="34" charset="0"/>
+              <a:buNone/>
+            </a:pPr>
+            <a:r>
+              <a:rPr lang="en-US" dirty="0"/>
+              <a:t>Is this diagram representative of today’s process?</a:t>
+            </a:r>
+          </a:p>
+          <a:p>
+            <a:r>
+              <a:rPr lang="en-US" dirty="0"/>
+              <a:t>Perhaps or perhaps not? </a:t>
+            </a:r>
+          </a:p>
+          <a:p>
+            <a:pPr marL="914400" lvl="1" indent="-457200">
+              <a:buFont typeface="+mj-lt"/>
+              <a:buAutoNum type="arabicPeriod"/>
+            </a:pPr>
+            <a:r>
+              <a:rPr lang="en-US" dirty="0"/>
+              <a:t>Must have a clear idea of goal!</a:t>
+            </a:r>
+          </a:p>
+          <a:p>
+            <a:pPr marL="914400" lvl="1" indent="-457200">
+              <a:buFont typeface="+mj-lt"/>
+              <a:buAutoNum type="arabicPeriod"/>
+            </a:pPr>
+            <a:r>
+              <a:rPr lang="en-US" dirty="0"/>
+              <a:t>Multiple complex data sources</a:t>
+            </a:r>
+          </a:p>
+          <a:p>
+            <a:pPr marL="914400" lvl="1" indent="-457200">
+              <a:buFont typeface="+mj-lt"/>
+              <a:buAutoNum type="arabicPeriod"/>
+            </a:pPr>
+            <a:r>
+              <a:rPr lang="en-US" dirty="0"/>
+              <a:t>Need to perform in-depth exploration of data and inferences at every step!!</a:t>
+            </a:r>
+          </a:p>
+          <a:p>
+            <a:r>
+              <a:rPr lang="en-US" dirty="0"/>
+              <a:t>KDD is an iterative process</a:t>
+            </a:r>
+          </a:p>
+          <a:p>
+            <a:pPr lvl="1"/>
+            <a:r>
+              <a:rPr lang="en-US" sz="2800" dirty="0"/>
+              <a:t>The results of one step informs updates to previous steps  </a:t>
+            </a:r>
+          </a:p>
+          <a:p>
+            <a:pPr lvl="1"/>
+            <a:r>
+              <a:rPr lang="en-US" sz="2800" dirty="0"/>
+              <a:t>Process is a series of overlapping cycles </a:t>
+            </a:r>
+          </a:p>
+        </p:txBody>
+      </p:sp>
+    </p:spTree>
+    <p:extLst>
+      <p:ext uri="{BB962C8B-B14F-4D97-AF65-F5344CB8AC3E}">
+        <p14:creationId xmlns:p14="http://schemas.microsoft.com/office/powerpoint/2010/main" val="2657309543"/>
+      </p:ext>
+    </p:extLst>
+  </p:cSld>
+  <p:clrMapOvr>
+    <a:masterClrMapping/>
+  </p:clrMapOvr>
+  <p:timing>
+    <p:tnLst>
+      <p:par>
+        <p:cTn id="1" dur="indefinite" restart="never" nodeType="tmRoot">
+          <p:childTnLst>
+            <p:seq concurrent="1" nextAc="seek">
+              <p:cTn id="2" dur="indefinite" nodeType="mainSeq">
+                <p:childTnLst>
+                  <p:par>
+                    <p:cTn id="3" fill="hold">
+                      <p:stCondLst>
+                        <p:cond delay="indefinite"/>
+                      </p:stCondLst>
+                      <p:childTnLst>
+                        <p:par>
+                          <p:cTn id="4" fill="hold">
+                            <p:stCondLst>
+                              <p:cond delay="0"/>
+                            </p:stCondLst>
+                            <p:childTnLst>
+                              <p:par>
+                                <p:cTn id="5" presetID="1" presetClass="entr" presetSubtype="0" fill="hold" nodeType="clickEffect">
+                                  <p:stCondLst>
+                                    <p:cond delay="0"/>
+                                  </p:stCondLst>
+                                  <p:childTnLst>
+                                    <p:set>
+                                      <p:cBhvr>
+                                        <p:cTn id="6" dur="1" fill="hold">
+                                          <p:stCondLst>
+                                            <p:cond delay="0"/>
+                                          </p:stCondLst>
+                                        </p:cTn>
+                                        <p:tgtEl>
+                                          <p:spTgt spid="5">
+                                            <p:txEl>
+                                              <p:pRg st="1" end="1"/>
+                                            </p:txEl>
+                                          </p:spTgt>
+                                        </p:tgtEl>
+                                        <p:attrNameLst>
+                                          <p:attrName>style.visibility</p:attrName>
+                                        </p:attrNameLst>
+                                      </p:cBhvr>
+                                      <p:to>
+                                        <p:strVal val="visible"/>
+                                      </p:to>
+                                    </p:set>
+                                  </p:childTnLst>
+                                </p:cTn>
+                              </p:par>
+                            </p:childTnLst>
+                          </p:cTn>
+                        </p:par>
+                      </p:childTnLst>
+                    </p:cTn>
+                  </p:par>
+                  <p:par>
+                    <p:cTn id="7" fill="hold">
+                      <p:stCondLst>
+                        <p:cond delay="indefinite"/>
+                      </p:stCondLst>
+                      <p:childTnLst>
+                        <p:par>
+                          <p:cTn id="8" fill="hold">
+                            <p:stCondLst>
+                              <p:cond delay="0"/>
+                            </p:stCondLst>
+                            <p:childTnLst>
+                              <p:par>
+                                <p:cTn id="9" presetID="1" presetClass="entr" presetSubtype="0" fill="hold" nodeType="clickEffect">
+                                  <p:stCondLst>
+                                    <p:cond delay="0"/>
+                                  </p:stCondLst>
+                                  <p:childTnLst>
+                                    <p:set>
+                                      <p:cBhvr>
+                                        <p:cTn id="10" dur="1" fill="hold">
+                                          <p:stCondLst>
+                                            <p:cond delay="0"/>
+                                          </p:stCondLst>
+                                        </p:cTn>
+                                        <p:tgtEl>
+                                          <p:spTgt spid="5">
+                                            <p:txEl>
+                                              <p:pRg st="2" end="2"/>
+                                            </p:txEl>
+                                          </p:spTgt>
+                                        </p:tgtEl>
+                                        <p:attrNameLst>
+                                          <p:attrName>style.visibility</p:attrName>
+                                        </p:attrNameLst>
+                                      </p:cBhvr>
+                                      <p:to>
+                                        <p:strVal val="visible"/>
+                                      </p:to>
+                                    </p:set>
+                                  </p:childTnLst>
+                                </p:cTn>
+                              </p:par>
+                            </p:childTnLst>
+                          </p:cTn>
+                        </p:par>
+                      </p:childTnLst>
+                    </p:cTn>
+                  </p:par>
+                  <p:par>
+                    <p:cTn id="11" fill="hold">
+                      <p:stCondLst>
+                        <p:cond delay="indefinite"/>
+                      </p:stCondLst>
+                      <p:childTnLst>
+                        <p:par>
+                          <p:cTn id="12" fill="hold">
+                            <p:stCondLst>
+                              <p:cond delay="0"/>
+                            </p:stCondLst>
+                            <p:childTnLst>
+                              <p:par>
+                                <p:cTn id="13" presetID="1" presetClass="entr" presetSubtype="0" fill="hold" nodeType="clickEffect">
+                                  <p:stCondLst>
+                                    <p:cond delay="0"/>
+                                  </p:stCondLst>
+                                  <p:childTnLst>
+                                    <p:set>
+                                      <p:cBhvr>
+                                        <p:cTn id="14" dur="1" fill="hold">
+                                          <p:stCondLst>
+                                            <p:cond delay="0"/>
+                                          </p:stCondLst>
+                                        </p:cTn>
+                                        <p:tgtEl>
+                                          <p:spTgt spid="5">
+                                            <p:txEl>
+                                              <p:pRg st="3" end="3"/>
+                                            </p:txEl>
+                                          </p:spTgt>
+                                        </p:tgtEl>
+                                        <p:attrNameLst>
+                                          <p:attrName>style.visibility</p:attrName>
+                                        </p:attrNameLst>
+                                      </p:cBhvr>
+                                      <p:to>
+                                        <p:strVal val="visible"/>
+                                      </p:to>
+                                    </p:set>
+                                  </p:childTnLst>
+                                </p:cTn>
+                              </p:par>
+                            </p:childTnLst>
+                          </p:cTn>
+                        </p:par>
+                      </p:childTnLst>
+                    </p:cTn>
+                  </p:par>
+                  <p:par>
+                    <p:cTn id="15" fill="hold">
+                      <p:stCondLst>
+                        <p:cond delay="indefinite"/>
+                      </p:stCondLst>
+                      <p:childTnLst>
+                        <p:par>
+                          <p:cTn id="16" fill="hold">
+                            <p:stCondLst>
+                              <p:cond delay="0"/>
+                            </p:stCondLst>
+                            <p:childTnLst>
+                              <p:par>
+                                <p:cTn id="17" presetID="1" presetClass="entr" presetSubtype="0" fill="hold" nodeType="clickEffect">
+                                  <p:stCondLst>
+                                    <p:cond delay="0"/>
+                                  </p:stCondLst>
+                                  <p:childTnLst>
+                                    <p:set>
+                                      <p:cBhvr>
+                                        <p:cTn id="18" dur="1" fill="hold">
+                                          <p:stCondLst>
+                                            <p:cond delay="0"/>
+                                          </p:stCondLst>
+                                        </p:cTn>
+                                        <p:tgtEl>
+                                          <p:spTgt spid="5">
+                                            <p:txEl>
+                                              <p:pRg st="4" end="4"/>
+                                            </p:txEl>
+                                          </p:spTgt>
+                                        </p:tgtEl>
+                                        <p:attrNameLst>
+                                          <p:attrName>style.visibility</p:attrName>
+                                        </p:attrNameLst>
+                                      </p:cBhvr>
+                                      <p:to>
+                                        <p:strVal val="visible"/>
+                                      </p:to>
+                                    </p:set>
+                                  </p:childTnLst>
+                                </p:cTn>
+                              </p:par>
+                            </p:childTnLst>
+                          </p:cTn>
+                        </p:par>
+                      </p:childTnLst>
+                    </p:cTn>
+                  </p:par>
+                  <p:par>
+                    <p:cTn id="19" fill="hold">
+                      <p:stCondLst>
+                        <p:cond delay="indefinite"/>
+                      </p:stCondLst>
+                      <p:childTnLst>
+                        <p:par>
+                          <p:cTn id="20" fill="hold">
+                            <p:stCondLst>
+                              <p:cond delay="0"/>
+                            </p:stCondLst>
+                            <p:childTnLst>
+                              <p:par>
+                                <p:cTn id="21" presetID="1" presetClass="entr" presetSubtype="0" fill="hold" nodeType="clickEffect">
+                                  <p:stCondLst>
+                                    <p:cond delay="0"/>
+                                  </p:stCondLst>
+                                  <p:childTnLst>
+                                    <p:set>
+                                      <p:cBhvr>
+                                        <p:cTn id="22" dur="1" fill="hold">
+                                          <p:stCondLst>
+                                            <p:cond delay="0"/>
+                                          </p:stCondLst>
+                                        </p:cTn>
+                                        <p:tgtEl>
+                                          <p:spTgt spid="5">
+                                            <p:txEl>
+                                              <p:pRg st="5" end="5"/>
+                                            </p:txEl>
+                                          </p:spTgt>
+                                        </p:tgtEl>
+                                        <p:attrNameLst>
+                                          <p:attrName>style.visibility</p:attrName>
+                                        </p:attrNameLst>
+                                      </p:cBhvr>
+                                      <p:to>
+                                        <p:strVal val="visible"/>
+                                      </p:to>
+                                    </p:set>
+                                  </p:childTnLst>
+                                </p:cTn>
+                              </p:par>
+                              <p:par>
+                                <p:cTn id="23" presetID="1" presetClass="entr" presetSubtype="0" fill="hold" nodeType="withEffect">
+                                  <p:stCondLst>
+                                    <p:cond delay="0"/>
+                                  </p:stCondLst>
+                                  <p:childTnLst>
+                                    <p:set>
+                                      <p:cBhvr>
+                                        <p:cTn id="24" dur="1" fill="hold">
+                                          <p:stCondLst>
+                                            <p:cond delay="0"/>
+                                          </p:stCondLst>
+                                        </p:cTn>
+                                        <p:tgtEl>
+                                          <p:spTgt spid="5">
+                                            <p:txEl>
+                                              <p:pRg st="6" end="6"/>
+                                            </p:txEl>
+                                          </p:spTgt>
+                                        </p:tgtEl>
+                                        <p:attrNameLst>
+                                          <p:attrName>style.visibility</p:attrName>
+                                        </p:attrNameLst>
+                                      </p:cBhvr>
+                                      <p:to>
+                                        <p:strVal val="visible"/>
+                                      </p:to>
+                                    </p:set>
+                                  </p:childTnLst>
+                                </p:cTn>
+                              </p:par>
+                              <p:par>
+                                <p:cTn id="25" presetID="1" presetClass="entr" presetSubtype="0" fill="hold" nodeType="withEffect">
+                                  <p:stCondLst>
+                                    <p:cond delay="0"/>
+                                  </p:stCondLst>
+                                  <p:childTnLst>
+                                    <p:set>
+                                      <p:cBhvr>
+                                        <p:cTn id="26" dur="1" fill="hold">
+                                          <p:stCondLst>
+                                            <p:cond delay="0"/>
+                                          </p:stCondLst>
+                                        </p:cTn>
+                                        <p:tgtEl>
+                                          <p:spTgt spid="5">
+                                            <p:txEl>
+                                              <p:pRg st="7" end="7"/>
+                                            </p:txEl>
+                                          </p:spTgt>
+                                        </p:tgtEl>
+                                        <p:attrNameLst>
+                                          <p:attrName>style.visibility</p:attrName>
+                                        </p:attrNameLst>
+                                      </p:cBhvr>
+                                      <p:to>
+                                        <p:strVal val="visible"/>
+                                      </p:to>
+                                    </p:set>
+                                  </p:childTnLst>
+                                </p:cTn>
+                              </p:par>
+                            </p:childTnLst>
+                          </p:cTn>
+                        </p:par>
+                      </p:childTnLst>
+                    </p:cTn>
+                  </p:par>
+                </p:childTnLst>
+              </p:cTn>
+              <p:prevCondLst>
+                <p:cond evt="onPrev" delay="0">
+                  <p:tgtEl>
+                    <p:sldTgt/>
+                  </p:tgtEl>
+                </p:cond>
+              </p:prevCondLst>
+              <p:nextCondLst>
+                <p:cond evt="onNext" delay="0">
+                  <p:tgtEl>
+                    <p:sldTgt/>
+                  </p:tgtEl>
+                </p:cond>
+              </p:nextCondLst>
+            </p:seq>
+          </p:childTnLst>
+        </p:cTn>
+      </p:par>
+    </p:tnLst>
+  </p:timing>
+</p:sld>
+</file>
+
+<file path=ppt/slides/slide60.xml><?xml version="1.0" encoding="utf-8"?>
 <p:sld xmlns:a="http://schemas.openxmlformats.org/drawingml/2006/main" xmlns:r="http://schemas.openxmlformats.org/officeDocument/2006/relationships" xmlns:p="http://schemas.openxmlformats.org/presentationml/2006/main">
   <p:cSld>
     <p:spTree>
@@ -40103,757 +41033,7 @@
 </p:sld>
 </file>
 
-<file path=ppt/slides/slide6.xml><?xml version="1.0" encoding="utf-8"?>
-<p:sld xmlns:a="http://schemas.openxmlformats.org/drawingml/2006/main" xmlns:r="http://schemas.openxmlformats.org/officeDocument/2006/relationships" xmlns:p="http://schemas.openxmlformats.org/presentationml/2006/main">
-  <p:cSld>
-    <p:spTree>
-      <p:nvGrpSpPr>
-        <p:cNvPr id="1" name=""/>
-        <p:cNvGrpSpPr/>
-        <p:nvPr/>
-      </p:nvGrpSpPr>
-      <p:grpSpPr>
-        <a:xfrm>
-          <a:off x="0" y="0"/>
-          <a:ext cx="0" cy="0"/>
-          <a:chOff x="0" y="0"/>
-          <a:chExt cx="0" cy="0"/>
-        </a:xfrm>
-      </p:grpSpPr>
-      <p:sp>
-        <p:nvSpPr>
-          <p:cNvPr id="3" name="Content Placeholder 2">
-            <a:extLst>
-              <a:ext uri="{FF2B5EF4-FFF2-40B4-BE49-F238E27FC236}">
-                <a16:creationId xmlns:a16="http://schemas.microsoft.com/office/drawing/2014/main" id="{258E6AF3-7615-4BD1-878E-A94C93E98F90}"/>
-              </a:ext>
-            </a:extLst>
-          </p:cNvPr>
-          <p:cNvSpPr>
-            <a:spLocks noGrp="1"/>
-          </p:cNvSpPr>
-          <p:nvPr>
-            <p:ph idx="1"/>
-          </p:nvPr>
-        </p:nvSpPr>
-        <p:spPr>
-          <a:xfrm>
-            <a:off x="838200" y="1217458"/>
-            <a:ext cx="10515600" cy="485939"/>
-          </a:xfrm>
-        </p:spPr>
-        <p:txBody>
-          <a:bodyPr>
-            <a:normAutofit fontScale="92500" lnSpcReduction="10000"/>
-          </a:bodyPr>
-          <a:lstStyle/>
-          <a:p>
-            <a:pPr marL="0" indent="0">
-              <a:buNone/>
-            </a:pPr>
-            <a:r>
-              <a:rPr lang="en-US" sz="3200" dirty="0"/>
-              <a:t>What is the KDD process?   </a:t>
-            </a:r>
-          </a:p>
-        </p:txBody>
-      </p:sp>
-      <p:sp>
-        <p:nvSpPr>
-          <p:cNvPr id="6" name="Title 1">
-            <a:extLst>
-              <a:ext uri="{FF2B5EF4-FFF2-40B4-BE49-F238E27FC236}">
-                <a16:creationId xmlns:a16="http://schemas.microsoft.com/office/drawing/2014/main" id="{CD29F70F-B868-451B-A65D-8721F4C7A2D9}"/>
-              </a:ext>
-            </a:extLst>
-          </p:cNvPr>
-          <p:cNvSpPr txBox="1">
-            <a:spLocks/>
-          </p:cNvSpPr>
-          <p:nvPr/>
-        </p:nvSpPr>
-        <p:spPr>
-          <a:xfrm>
-            <a:off x="838200" y="-635"/>
-            <a:ext cx="10515600" cy="1325563"/>
-          </a:xfrm>
-          <a:prstGeom prst="rect">
-            <a:avLst/>
-          </a:prstGeom>
-        </p:spPr>
-        <p:txBody>
-          <a:bodyPr vert="horz" lIns="91440" tIns="45720" rIns="91440" bIns="45720" rtlCol="0" anchor="ctr">
-            <a:normAutofit/>
-          </a:bodyPr>
-          <a:lstStyle>
-            <a:lvl1pPr algn="l" defTabSz="914400" rtl="0" eaLnBrk="1" latinLnBrk="0" hangingPunct="1">
-              <a:lnSpc>
-                <a:spcPct val="90000"/>
-              </a:lnSpc>
-              <a:spcBef>
-                <a:spcPct val="0"/>
-              </a:spcBef>
-              <a:buNone/>
-              <a:defRPr sz="4400" kern="1200">
-                <a:solidFill>
-                  <a:schemeClr val="tx1"/>
-                </a:solidFill>
-                <a:latin typeface="+mj-lt"/>
-                <a:ea typeface="+mj-ea"/>
-                <a:cs typeface="+mj-cs"/>
-              </a:defRPr>
-            </a:lvl1pPr>
-          </a:lstStyle>
-          <a:p>
-            <a:r>
-              <a:rPr lang="en-US" dirty="0">
-                <a:latin typeface="+mn-lt"/>
-              </a:rPr>
-              <a:t>KDD process</a:t>
-            </a:r>
-          </a:p>
-        </p:txBody>
-      </p:sp>
-      <p:pic>
-        <p:nvPicPr>
-          <p:cNvPr id="4" name="Picture 3">
-            <a:extLst>
-              <a:ext uri="{FF2B5EF4-FFF2-40B4-BE49-F238E27FC236}">
-                <a16:creationId xmlns:a16="http://schemas.microsoft.com/office/drawing/2014/main" id="{41A10601-345E-4A04-878A-28FFF71506B5}"/>
-              </a:ext>
-            </a:extLst>
-          </p:cNvPr>
-          <p:cNvPicPr>
-            <a:picLocks noChangeAspect="1"/>
-          </p:cNvPicPr>
-          <p:nvPr/>
-        </p:nvPicPr>
-        <p:blipFill>
-          <a:blip r:embed="rId2"/>
-          <a:stretch>
-            <a:fillRect/>
-          </a:stretch>
-        </p:blipFill>
-        <p:spPr>
-          <a:xfrm>
-            <a:off x="376610" y="2168435"/>
-            <a:ext cx="6121998" cy="3176886"/>
-          </a:xfrm>
-          <a:prstGeom prst="rect">
-            <a:avLst/>
-          </a:prstGeom>
-        </p:spPr>
-      </p:pic>
-      <p:sp>
-        <p:nvSpPr>
-          <p:cNvPr id="5" name="Content Placeholder 2">
-            <a:extLst>
-              <a:ext uri="{FF2B5EF4-FFF2-40B4-BE49-F238E27FC236}">
-                <a16:creationId xmlns:a16="http://schemas.microsoft.com/office/drawing/2014/main" id="{DBC99F37-3CFD-4C3B-8CF6-AEDE11B202D2}"/>
-              </a:ext>
-            </a:extLst>
-          </p:cNvPr>
-          <p:cNvSpPr txBox="1">
-            <a:spLocks/>
-          </p:cNvSpPr>
-          <p:nvPr/>
-        </p:nvSpPr>
-        <p:spPr>
-          <a:xfrm>
-            <a:off x="6787461" y="1921229"/>
-            <a:ext cx="5116757" cy="4395969"/>
-          </a:xfrm>
-          <a:prstGeom prst="rect">
-            <a:avLst/>
-          </a:prstGeom>
-        </p:spPr>
-        <p:txBody>
-          <a:bodyPr vert="horz" lIns="91440" tIns="45720" rIns="91440" bIns="45720" rtlCol="0">
-            <a:normAutofit fontScale="92500" lnSpcReduction="20000"/>
-          </a:bodyPr>
-          <a:lstStyle>
-            <a:lvl1pPr marL="228600" indent="-228600" algn="l" defTabSz="914400" rtl="0" eaLnBrk="1" latinLnBrk="0" hangingPunct="1">
-              <a:lnSpc>
-                <a:spcPct val="90000"/>
-              </a:lnSpc>
-              <a:spcBef>
-                <a:spcPts val="1000"/>
-              </a:spcBef>
-              <a:buFont typeface="Arial" panose="020B0604020202020204" pitchFamily="34" charset="0"/>
-              <a:buChar char="•"/>
-              <a:defRPr sz="2800" kern="1200">
-                <a:solidFill>
-                  <a:schemeClr val="tx1"/>
-                </a:solidFill>
-                <a:latin typeface="+mn-lt"/>
-                <a:ea typeface="+mn-ea"/>
-                <a:cs typeface="+mn-cs"/>
-              </a:defRPr>
-            </a:lvl1pPr>
-            <a:lvl2pPr marL="685800" indent="-228600" algn="l" defTabSz="914400" rtl="0" eaLnBrk="1" latinLnBrk="0" hangingPunct="1">
-              <a:lnSpc>
-                <a:spcPct val="90000"/>
-              </a:lnSpc>
-              <a:spcBef>
-                <a:spcPts val="500"/>
-              </a:spcBef>
-              <a:buFont typeface="Arial" panose="020B0604020202020204" pitchFamily="34" charset="0"/>
-              <a:buChar char="•"/>
-              <a:defRPr sz="2400" kern="1200">
-                <a:solidFill>
-                  <a:schemeClr val="tx1"/>
-                </a:solidFill>
-                <a:latin typeface="+mn-lt"/>
-                <a:ea typeface="+mn-ea"/>
-                <a:cs typeface="+mn-cs"/>
-              </a:defRPr>
-            </a:lvl2pPr>
-            <a:lvl3pPr marL="1143000" indent="-228600" algn="l" defTabSz="914400" rtl="0" eaLnBrk="1" latinLnBrk="0" hangingPunct="1">
-              <a:lnSpc>
-                <a:spcPct val="90000"/>
-              </a:lnSpc>
-              <a:spcBef>
-                <a:spcPts val="500"/>
-              </a:spcBef>
-              <a:buFont typeface="Arial" panose="020B0604020202020204" pitchFamily="34" charset="0"/>
-              <a:buChar char="•"/>
-              <a:defRPr sz="2000" kern="1200">
-                <a:solidFill>
-                  <a:schemeClr val="tx1"/>
-                </a:solidFill>
-                <a:latin typeface="+mn-lt"/>
-                <a:ea typeface="+mn-ea"/>
-                <a:cs typeface="+mn-cs"/>
-              </a:defRPr>
-            </a:lvl3pPr>
-            <a:lvl4pPr marL="1600200" indent="-228600" algn="l" defTabSz="914400" rtl="0" eaLnBrk="1" latinLnBrk="0" hangingPunct="1">
-              <a:lnSpc>
-                <a:spcPct val="90000"/>
-              </a:lnSpc>
-              <a:spcBef>
-                <a:spcPts val="500"/>
-              </a:spcBef>
-              <a:buFont typeface="Arial" panose="020B0604020202020204" pitchFamily="34" charset="0"/>
-              <a:buChar char="•"/>
-              <a:defRPr sz="1800" kern="1200">
-                <a:solidFill>
-                  <a:schemeClr val="tx1"/>
-                </a:solidFill>
-                <a:latin typeface="+mn-lt"/>
-                <a:ea typeface="+mn-ea"/>
-                <a:cs typeface="+mn-cs"/>
-              </a:defRPr>
-            </a:lvl4pPr>
-            <a:lvl5pPr marL="2057400" indent="-228600" algn="l" defTabSz="914400" rtl="0" eaLnBrk="1" latinLnBrk="0" hangingPunct="1">
-              <a:lnSpc>
-                <a:spcPct val="90000"/>
-              </a:lnSpc>
-              <a:spcBef>
-                <a:spcPts val="500"/>
-              </a:spcBef>
-              <a:buFont typeface="Arial" panose="020B0604020202020204" pitchFamily="34" charset="0"/>
-              <a:buChar char="•"/>
-              <a:defRPr sz="1800" kern="1200">
-                <a:solidFill>
-                  <a:schemeClr val="tx1"/>
-                </a:solidFill>
-                <a:latin typeface="+mn-lt"/>
-                <a:ea typeface="+mn-ea"/>
-                <a:cs typeface="+mn-cs"/>
-              </a:defRPr>
-            </a:lvl5pPr>
-            <a:lvl6pPr marL="2514600" indent="-228600" algn="l" defTabSz="914400" rtl="0" eaLnBrk="1" latinLnBrk="0" hangingPunct="1">
-              <a:lnSpc>
-                <a:spcPct val="90000"/>
-              </a:lnSpc>
-              <a:spcBef>
-                <a:spcPts val="500"/>
-              </a:spcBef>
-              <a:buFont typeface="Arial" panose="020B0604020202020204" pitchFamily="34" charset="0"/>
-              <a:buChar char="•"/>
-              <a:defRPr sz="1800" kern="1200">
-                <a:solidFill>
-                  <a:schemeClr val="tx1"/>
-                </a:solidFill>
-                <a:latin typeface="+mn-lt"/>
-                <a:ea typeface="+mn-ea"/>
-                <a:cs typeface="+mn-cs"/>
-              </a:defRPr>
-            </a:lvl6pPr>
-            <a:lvl7pPr marL="2971800" indent="-228600" algn="l" defTabSz="914400" rtl="0" eaLnBrk="1" latinLnBrk="0" hangingPunct="1">
-              <a:lnSpc>
-                <a:spcPct val="90000"/>
-              </a:lnSpc>
-              <a:spcBef>
-                <a:spcPts val="500"/>
-              </a:spcBef>
-              <a:buFont typeface="Arial" panose="020B0604020202020204" pitchFamily="34" charset="0"/>
-              <a:buChar char="•"/>
-              <a:defRPr sz="1800" kern="1200">
-                <a:solidFill>
-                  <a:schemeClr val="tx1"/>
-                </a:solidFill>
-                <a:latin typeface="+mn-lt"/>
-                <a:ea typeface="+mn-ea"/>
-                <a:cs typeface="+mn-cs"/>
-              </a:defRPr>
-            </a:lvl7pPr>
-            <a:lvl8pPr marL="3429000" indent="-228600" algn="l" defTabSz="914400" rtl="0" eaLnBrk="1" latinLnBrk="0" hangingPunct="1">
-              <a:lnSpc>
-                <a:spcPct val="90000"/>
-              </a:lnSpc>
-              <a:spcBef>
-                <a:spcPts val="500"/>
-              </a:spcBef>
-              <a:buFont typeface="Arial" panose="020B0604020202020204" pitchFamily="34" charset="0"/>
-              <a:buChar char="•"/>
-              <a:defRPr sz="1800" kern="1200">
-                <a:solidFill>
-                  <a:schemeClr val="tx1"/>
-                </a:solidFill>
-                <a:latin typeface="+mn-lt"/>
-                <a:ea typeface="+mn-ea"/>
-                <a:cs typeface="+mn-cs"/>
-              </a:defRPr>
-            </a:lvl8pPr>
-            <a:lvl9pPr marL="3886200" indent="-228600" algn="l" defTabSz="914400" rtl="0" eaLnBrk="1" latinLnBrk="0" hangingPunct="1">
-              <a:lnSpc>
-                <a:spcPct val="90000"/>
-              </a:lnSpc>
-              <a:spcBef>
-                <a:spcPts val="500"/>
-              </a:spcBef>
-              <a:buFont typeface="Arial" panose="020B0604020202020204" pitchFamily="34" charset="0"/>
-              <a:buChar char="•"/>
-              <a:defRPr sz="1800" kern="1200">
-                <a:solidFill>
-                  <a:schemeClr val="tx1"/>
-                </a:solidFill>
-                <a:latin typeface="+mn-lt"/>
-                <a:ea typeface="+mn-ea"/>
-                <a:cs typeface="+mn-cs"/>
-              </a:defRPr>
-            </a:lvl9pPr>
-          </a:lstStyle>
-          <a:p>
-            <a:pPr marL="0" indent="0">
-              <a:buFont typeface="Arial" panose="020B0604020202020204" pitchFamily="34" charset="0"/>
-              <a:buNone/>
-            </a:pPr>
-            <a:r>
-              <a:rPr lang="en-US" dirty="0"/>
-              <a:t>Is this diagram representative of today’s process?</a:t>
-            </a:r>
-          </a:p>
-          <a:p>
-            <a:r>
-              <a:rPr lang="en-US" dirty="0"/>
-              <a:t>Perhaps or perhaps not? </a:t>
-            </a:r>
-          </a:p>
-          <a:p>
-            <a:pPr marL="914400" lvl="1" indent="-457200">
-              <a:buFont typeface="+mj-lt"/>
-              <a:buAutoNum type="arabicPeriod"/>
-            </a:pPr>
-            <a:r>
-              <a:rPr lang="en-US" dirty="0"/>
-              <a:t>Must have a clear idea of goal!</a:t>
-            </a:r>
-          </a:p>
-          <a:p>
-            <a:pPr marL="914400" lvl="1" indent="-457200">
-              <a:buFont typeface="+mj-lt"/>
-              <a:buAutoNum type="arabicPeriod"/>
-            </a:pPr>
-            <a:r>
-              <a:rPr lang="en-US" dirty="0"/>
-              <a:t>Multiple complex data sources</a:t>
-            </a:r>
-          </a:p>
-          <a:p>
-            <a:pPr marL="914400" lvl="1" indent="-457200">
-              <a:buFont typeface="+mj-lt"/>
-              <a:buAutoNum type="arabicPeriod"/>
-            </a:pPr>
-            <a:r>
-              <a:rPr lang="en-US" dirty="0"/>
-              <a:t>Need to perform in-depth exploration of data and inferences at every step!!</a:t>
-            </a:r>
-          </a:p>
-          <a:p>
-            <a:r>
-              <a:rPr lang="en-US" dirty="0"/>
-              <a:t>KDD is an iterative process</a:t>
-            </a:r>
-          </a:p>
-          <a:p>
-            <a:pPr lvl="1"/>
-            <a:r>
-              <a:rPr lang="en-US" sz="2800" dirty="0"/>
-              <a:t>The results of one step informs updates to previous steps  </a:t>
-            </a:r>
-          </a:p>
-          <a:p>
-            <a:pPr lvl="1"/>
-            <a:r>
-              <a:rPr lang="en-US" sz="2800" dirty="0"/>
-              <a:t>Process is a series of overlapping cycles </a:t>
-            </a:r>
-          </a:p>
-        </p:txBody>
-      </p:sp>
-    </p:spTree>
-    <p:extLst>
-      <p:ext uri="{BB962C8B-B14F-4D97-AF65-F5344CB8AC3E}">
-        <p14:creationId xmlns:p14="http://schemas.microsoft.com/office/powerpoint/2010/main" val="2657309543"/>
-      </p:ext>
-    </p:extLst>
-  </p:cSld>
-  <p:clrMapOvr>
-    <a:masterClrMapping/>
-  </p:clrMapOvr>
-  <p:timing>
-    <p:tnLst>
-      <p:par>
-        <p:cTn id="1" dur="indefinite" restart="never" nodeType="tmRoot">
-          <p:childTnLst>
-            <p:seq concurrent="1" nextAc="seek">
-              <p:cTn id="2" dur="indefinite" nodeType="mainSeq">
-                <p:childTnLst>
-                  <p:par>
-                    <p:cTn id="3" fill="hold">
-                      <p:stCondLst>
-                        <p:cond delay="indefinite"/>
-                      </p:stCondLst>
-                      <p:childTnLst>
-                        <p:par>
-                          <p:cTn id="4" fill="hold">
-                            <p:stCondLst>
-                              <p:cond delay="0"/>
-                            </p:stCondLst>
-                            <p:childTnLst>
-                              <p:par>
-                                <p:cTn id="5" presetID="1" presetClass="entr" presetSubtype="0" fill="hold" nodeType="clickEffect">
-                                  <p:stCondLst>
-                                    <p:cond delay="0"/>
-                                  </p:stCondLst>
-                                  <p:childTnLst>
-                                    <p:set>
-                                      <p:cBhvr>
-                                        <p:cTn id="6" dur="1" fill="hold">
-                                          <p:stCondLst>
-                                            <p:cond delay="0"/>
-                                          </p:stCondLst>
-                                        </p:cTn>
-                                        <p:tgtEl>
-                                          <p:spTgt spid="5">
-                                            <p:txEl>
-                                              <p:pRg st="1" end="1"/>
-                                            </p:txEl>
-                                          </p:spTgt>
-                                        </p:tgtEl>
-                                        <p:attrNameLst>
-                                          <p:attrName>style.visibility</p:attrName>
-                                        </p:attrNameLst>
-                                      </p:cBhvr>
-                                      <p:to>
-                                        <p:strVal val="visible"/>
-                                      </p:to>
-                                    </p:set>
-                                  </p:childTnLst>
-                                </p:cTn>
-                              </p:par>
-                            </p:childTnLst>
-                          </p:cTn>
-                        </p:par>
-                      </p:childTnLst>
-                    </p:cTn>
-                  </p:par>
-                  <p:par>
-                    <p:cTn id="7" fill="hold">
-                      <p:stCondLst>
-                        <p:cond delay="indefinite"/>
-                      </p:stCondLst>
-                      <p:childTnLst>
-                        <p:par>
-                          <p:cTn id="8" fill="hold">
-                            <p:stCondLst>
-                              <p:cond delay="0"/>
-                            </p:stCondLst>
-                            <p:childTnLst>
-                              <p:par>
-                                <p:cTn id="9" presetID="1" presetClass="entr" presetSubtype="0" fill="hold" nodeType="clickEffect">
-                                  <p:stCondLst>
-                                    <p:cond delay="0"/>
-                                  </p:stCondLst>
-                                  <p:childTnLst>
-                                    <p:set>
-                                      <p:cBhvr>
-                                        <p:cTn id="10" dur="1" fill="hold">
-                                          <p:stCondLst>
-                                            <p:cond delay="0"/>
-                                          </p:stCondLst>
-                                        </p:cTn>
-                                        <p:tgtEl>
-                                          <p:spTgt spid="5">
-                                            <p:txEl>
-                                              <p:pRg st="2" end="2"/>
-                                            </p:txEl>
-                                          </p:spTgt>
-                                        </p:tgtEl>
-                                        <p:attrNameLst>
-                                          <p:attrName>style.visibility</p:attrName>
-                                        </p:attrNameLst>
-                                      </p:cBhvr>
-                                      <p:to>
-                                        <p:strVal val="visible"/>
-                                      </p:to>
-                                    </p:set>
-                                  </p:childTnLst>
-                                </p:cTn>
-                              </p:par>
-                            </p:childTnLst>
-                          </p:cTn>
-                        </p:par>
-                      </p:childTnLst>
-                    </p:cTn>
-                  </p:par>
-                  <p:par>
-                    <p:cTn id="11" fill="hold">
-                      <p:stCondLst>
-                        <p:cond delay="indefinite"/>
-                      </p:stCondLst>
-                      <p:childTnLst>
-                        <p:par>
-                          <p:cTn id="12" fill="hold">
-                            <p:stCondLst>
-                              <p:cond delay="0"/>
-                            </p:stCondLst>
-                            <p:childTnLst>
-                              <p:par>
-                                <p:cTn id="13" presetID="1" presetClass="entr" presetSubtype="0" fill="hold" nodeType="clickEffect">
-                                  <p:stCondLst>
-                                    <p:cond delay="0"/>
-                                  </p:stCondLst>
-                                  <p:childTnLst>
-                                    <p:set>
-                                      <p:cBhvr>
-                                        <p:cTn id="14" dur="1" fill="hold">
-                                          <p:stCondLst>
-                                            <p:cond delay="0"/>
-                                          </p:stCondLst>
-                                        </p:cTn>
-                                        <p:tgtEl>
-                                          <p:spTgt spid="5">
-                                            <p:txEl>
-                                              <p:pRg st="3" end="3"/>
-                                            </p:txEl>
-                                          </p:spTgt>
-                                        </p:tgtEl>
-                                        <p:attrNameLst>
-                                          <p:attrName>style.visibility</p:attrName>
-                                        </p:attrNameLst>
-                                      </p:cBhvr>
-                                      <p:to>
-                                        <p:strVal val="visible"/>
-                                      </p:to>
-                                    </p:set>
-                                  </p:childTnLst>
-                                </p:cTn>
-                              </p:par>
-                            </p:childTnLst>
-                          </p:cTn>
-                        </p:par>
-                      </p:childTnLst>
-                    </p:cTn>
-                  </p:par>
-                  <p:par>
-                    <p:cTn id="15" fill="hold">
-                      <p:stCondLst>
-                        <p:cond delay="indefinite"/>
-                      </p:stCondLst>
-                      <p:childTnLst>
-                        <p:par>
-                          <p:cTn id="16" fill="hold">
-                            <p:stCondLst>
-                              <p:cond delay="0"/>
-                            </p:stCondLst>
-                            <p:childTnLst>
-                              <p:par>
-                                <p:cTn id="17" presetID="1" presetClass="entr" presetSubtype="0" fill="hold" nodeType="clickEffect">
-                                  <p:stCondLst>
-                                    <p:cond delay="0"/>
-                                  </p:stCondLst>
-                                  <p:childTnLst>
-                                    <p:set>
-                                      <p:cBhvr>
-                                        <p:cTn id="18" dur="1" fill="hold">
-                                          <p:stCondLst>
-                                            <p:cond delay="0"/>
-                                          </p:stCondLst>
-                                        </p:cTn>
-                                        <p:tgtEl>
-                                          <p:spTgt spid="5">
-                                            <p:txEl>
-                                              <p:pRg st="4" end="4"/>
-                                            </p:txEl>
-                                          </p:spTgt>
-                                        </p:tgtEl>
-                                        <p:attrNameLst>
-                                          <p:attrName>style.visibility</p:attrName>
-                                        </p:attrNameLst>
-                                      </p:cBhvr>
-                                      <p:to>
-                                        <p:strVal val="visible"/>
-                                      </p:to>
-                                    </p:set>
-                                  </p:childTnLst>
-                                </p:cTn>
-                              </p:par>
-                            </p:childTnLst>
-                          </p:cTn>
-                        </p:par>
-                      </p:childTnLst>
-                    </p:cTn>
-                  </p:par>
-                  <p:par>
-                    <p:cTn id="19" fill="hold">
-                      <p:stCondLst>
-                        <p:cond delay="indefinite"/>
-                      </p:stCondLst>
-                      <p:childTnLst>
-                        <p:par>
-                          <p:cTn id="20" fill="hold">
-                            <p:stCondLst>
-                              <p:cond delay="0"/>
-                            </p:stCondLst>
-                            <p:childTnLst>
-                              <p:par>
-                                <p:cTn id="21" presetID="1" presetClass="entr" presetSubtype="0" fill="hold" nodeType="clickEffect">
-                                  <p:stCondLst>
-                                    <p:cond delay="0"/>
-                                  </p:stCondLst>
-                                  <p:childTnLst>
-                                    <p:set>
-                                      <p:cBhvr>
-                                        <p:cTn id="22" dur="1" fill="hold">
-                                          <p:stCondLst>
-                                            <p:cond delay="0"/>
-                                          </p:stCondLst>
-                                        </p:cTn>
-                                        <p:tgtEl>
-                                          <p:spTgt spid="5">
-                                            <p:txEl>
-                                              <p:pRg st="5" end="5"/>
-                                            </p:txEl>
-                                          </p:spTgt>
-                                        </p:tgtEl>
-                                        <p:attrNameLst>
-                                          <p:attrName>style.visibility</p:attrName>
-                                        </p:attrNameLst>
-                                      </p:cBhvr>
-                                      <p:to>
-                                        <p:strVal val="visible"/>
-                                      </p:to>
-                                    </p:set>
-                                  </p:childTnLst>
-                                </p:cTn>
-                              </p:par>
-                              <p:par>
-                                <p:cTn id="23" presetID="1" presetClass="entr" presetSubtype="0" fill="hold" nodeType="withEffect">
-                                  <p:stCondLst>
-                                    <p:cond delay="0"/>
-                                  </p:stCondLst>
-                                  <p:childTnLst>
-                                    <p:set>
-                                      <p:cBhvr>
-                                        <p:cTn id="24" dur="1" fill="hold">
-                                          <p:stCondLst>
-                                            <p:cond delay="0"/>
-                                          </p:stCondLst>
-                                        </p:cTn>
-                                        <p:tgtEl>
-                                          <p:spTgt spid="5">
-                                            <p:txEl>
-                                              <p:pRg st="6" end="6"/>
-                                            </p:txEl>
-                                          </p:spTgt>
-                                        </p:tgtEl>
-                                        <p:attrNameLst>
-                                          <p:attrName>style.visibility</p:attrName>
-                                        </p:attrNameLst>
-                                      </p:cBhvr>
-                                      <p:to>
-                                        <p:strVal val="visible"/>
-                                      </p:to>
-                                    </p:set>
-                                  </p:childTnLst>
-                                </p:cTn>
-                              </p:par>
-                              <p:par>
-                                <p:cTn id="25" presetID="1" presetClass="entr" presetSubtype="0" fill="hold" nodeType="withEffect">
-                                  <p:stCondLst>
-                                    <p:cond delay="0"/>
-                                  </p:stCondLst>
-                                  <p:childTnLst>
-                                    <p:set>
-                                      <p:cBhvr>
-                                        <p:cTn id="26" dur="1" fill="hold">
-                                          <p:stCondLst>
-                                            <p:cond delay="0"/>
-                                          </p:stCondLst>
-                                        </p:cTn>
-                                        <p:tgtEl>
-                                          <p:spTgt spid="5">
-                                            <p:txEl>
-                                              <p:pRg st="7" end="7"/>
-                                            </p:txEl>
-                                          </p:spTgt>
-                                        </p:tgtEl>
-                                        <p:attrNameLst>
-                                          <p:attrName>style.visibility</p:attrName>
-                                        </p:attrNameLst>
-                                      </p:cBhvr>
-                                      <p:to>
-                                        <p:strVal val="visible"/>
-                                      </p:to>
-                                    </p:set>
-                                  </p:childTnLst>
-                                </p:cTn>
-                              </p:par>
-                            </p:childTnLst>
-                          </p:cTn>
-                        </p:par>
-                      </p:childTnLst>
-                    </p:cTn>
-                  </p:par>
-                </p:childTnLst>
-              </p:cTn>
-              <p:prevCondLst>
-                <p:cond evt="onPrev" delay="0">
-                  <p:tgtEl>
-                    <p:sldTgt/>
-                  </p:tgtEl>
-                </p:cond>
-              </p:prevCondLst>
-              <p:nextCondLst>
-                <p:cond evt="onNext" delay="0">
-                  <p:tgtEl>
-                    <p:sldTgt/>
-                  </p:tgtEl>
-                </p:cond>
-              </p:nextCondLst>
-            </p:seq>
-          </p:childTnLst>
-        </p:cTn>
-      </p:par>
-    </p:tnLst>
-  </p:timing>
-</p:sld>
-</file>
-
-<file path=ppt/slides/slide60.xml><?xml version="1.0" encoding="utf-8"?>
+<file path=ppt/slides/slide61.xml><?xml version="1.0" encoding="utf-8"?>
 <p:sld xmlns:a="http://schemas.openxmlformats.org/drawingml/2006/main" xmlns:r="http://schemas.openxmlformats.org/officeDocument/2006/relationships" xmlns:p="http://schemas.openxmlformats.org/presentationml/2006/main">
   <p:cSld>
     <p:spTree>
@@ -41286,7 +41466,7 @@
 </p:sld>
 </file>
 
-<file path=ppt/slides/slide61.xml><?xml version="1.0" encoding="utf-8"?>
+<file path=ppt/slides/slide62.xml><?xml version="1.0" encoding="utf-8"?>
 <p:sld xmlns:a="http://schemas.openxmlformats.org/drawingml/2006/main" xmlns:r="http://schemas.openxmlformats.org/officeDocument/2006/relationships" xmlns:p="http://schemas.openxmlformats.org/presentationml/2006/main">
   <p:cSld>
     <p:spTree>
@@ -41664,7 +41844,7 @@
 </p:sld>
 </file>
 
-<file path=ppt/slides/slide62.xml><?xml version="1.0" encoding="utf-8"?>
+<file path=ppt/slides/slide63.xml><?xml version="1.0" encoding="utf-8"?>
 <p:sld xmlns:a="http://schemas.openxmlformats.org/drawingml/2006/main" xmlns:r="http://schemas.openxmlformats.org/officeDocument/2006/relationships" xmlns:p="http://schemas.openxmlformats.org/presentationml/2006/main">
   <p:cSld>
     <p:spTree>
@@ -42194,7 +42374,7 @@
 </p:sld>
 </file>
 
-<file path=ppt/slides/slide63.xml><?xml version="1.0" encoding="utf-8"?>
+<file path=ppt/slides/slide64.xml><?xml version="1.0" encoding="utf-8"?>
 <p:sld xmlns:a="http://schemas.openxmlformats.org/drawingml/2006/main" xmlns:r="http://schemas.openxmlformats.org/officeDocument/2006/relationships" xmlns:p="http://schemas.openxmlformats.org/presentationml/2006/main">
   <p:cSld>
     <p:spTree>
@@ -42254,7 +42434,7 @@
 </p:sld>
 </file>
 
-<file path=ppt/slides/slide64.xml><?xml version="1.0" encoding="utf-8"?>
+<file path=ppt/slides/slide65.xml><?xml version="1.0" encoding="utf-8"?>
 <p:sld xmlns:a="http://schemas.openxmlformats.org/drawingml/2006/main" xmlns:r="http://schemas.openxmlformats.org/officeDocument/2006/relationships" xmlns:p="http://schemas.openxmlformats.org/presentationml/2006/main">
   <p:cSld>
     <p:spTree>
@@ -42674,7 +42854,7 @@
 </p:sld>
 </file>
 
-<file path=ppt/slides/slide65.xml><?xml version="1.0" encoding="utf-8"?>
+<file path=ppt/slides/slide66.xml><?xml version="1.0" encoding="utf-8"?>
 <p:sld xmlns:a="http://schemas.openxmlformats.org/drawingml/2006/main" xmlns:r="http://schemas.openxmlformats.org/officeDocument/2006/relationships" xmlns:p="http://schemas.openxmlformats.org/presentationml/2006/main">
   <p:cSld>
     <p:spTree>
@@ -43480,7 +43660,7 @@
 </p:sld>
 </file>
 
-<file path=ppt/slides/slide66.xml><?xml version="1.0" encoding="utf-8"?>
+<file path=ppt/slides/slide67.xml><?xml version="1.0" encoding="utf-8"?>
 <p:sld xmlns:a="http://schemas.openxmlformats.org/drawingml/2006/main" xmlns:r="http://schemas.openxmlformats.org/officeDocument/2006/relationships" xmlns:p="http://schemas.openxmlformats.org/presentationml/2006/main">
   <p:cSld>
     <p:spTree>
@@ -44562,7 +44742,7 @@
 </p:sld>
 </file>
 
-<file path=ppt/slides/slide67.xml><?xml version="1.0" encoding="utf-8"?>
+<file path=ppt/slides/slide68.xml><?xml version="1.0" encoding="utf-8"?>
 <p:sld xmlns:a="http://schemas.openxmlformats.org/drawingml/2006/main" xmlns:r="http://schemas.openxmlformats.org/officeDocument/2006/relationships" xmlns:p="http://schemas.openxmlformats.org/presentationml/2006/main">
   <p:cSld>
     <p:spTree>
@@ -44716,7 +44896,7 @@
 </p:sld>
 </file>
 
-<file path=ppt/slides/slide68.xml><?xml version="1.0" encoding="utf-8"?>
+<file path=ppt/slides/slide69.xml><?xml version="1.0" encoding="utf-8"?>
 <p:sld xmlns:a="http://schemas.openxmlformats.org/drawingml/2006/main" xmlns:r="http://schemas.openxmlformats.org/officeDocument/2006/relationships" xmlns:p="http://schemas.openxmlformats.org/presentationml/2006/main">
   <p:cSld>
     <p:spTree>
@@ -45778,7 +45958,67 @@
 </p:sld>
 </file>
 
-<file path=ppt/slides/slide69.xml><?xml version="1.0" encoding="utf-8"?>
+<file path=ppt/slides/slide7.xml><?xml version="1.0" encoding="utf-8"?>
+<p:sld xmlns:a="http://schemas.openxmlformats.org/drawingml/2006/main" xmlns:r="http://schemas.openxmlformats.org/officeDocument/2006/relationships" xmlns:p="http://schemas.openxmlformats.org/presentationml/2006/main">
+  <p:cSld>
+    <p:spTree>
+      <p:nvGrpSpPr>
+        <p:cNvPr id="1" name=""/>
+        <p:cNvGrpSpPr/>
+        <p:nvPr/>
+      </p:nvGrpSpPr>
+      <p:grpSpPr>
+        <a:xfrm>
+          <a:off x="0" y="0"/>
+          <a:ext cx="0" cy="0"/>
+          <a:chOff x="0" y="0"/>
+          <a:chExt cx="0" cy="0"/>
+        </a:xfrm>
+      </p:grpSpPr>
+      <p:sp>
+        <p:nvSpPr>
+          <p:cNvPr id="2" name="Title 1">
+            <a:extLst>
+              <a:ext uri="{FF2B5EF4-FFF2-40B4-BE49-F238E27FC236}">
+                <a16:creationId xmlns:a16="http://schemas.microsoft.com/office/drawing/2014/main" id="{F8A33362-6456-0F5B-5570-FA2A30C5C24B}"/>
+              </a:ext>
+            </a:extLst>
+          </p:cNvPr>
+          <p:cNvSpPr>
+            <a:spLocks noGrp="1"/>
+          </p:cNvSpPr>
+          <p:nvPr>
+            <p:ph type="ctrTitle"/>
+          </p:nvPr>
+        </p:nvSpPr>
+        <p:spPr/>
+        <p:txBody>
+          <a:bodyPr>
+            <a:normAutofit/>
+          </a:bodyPr>
+          <a:lstStyle/>
+          <a:p>
+            <a:r>
+              <a:rPr lang="en-US" sz="4400" dirty="0"/>
+              <a:t>About This Course</a:t>
+            </a:r>
+          </a:p>
+        </p:txBody>
+      </p:sp>
+    </p:spTree>
+    <p:extLst>
+      <p:ext uri="{BB962C8B-B14F-4D97-AF65-F5344CB8AC3E}">
+        <p14:creationId xmlns:p14="http://schemas.microsoft.com/office/powerpoint/2010/main" val="88229346"/>
+      </p:ext>
+    </p:extLst>
+  </p:cSld>
+  <p:clrMapOvr>
+    <a:masterClrMapping/>
+  </p:clrMapOvr>
+</p:sld>
+</file>
+
+<file path=ppt/slides/slide70.xml><?xml version="1.0" encoding="utf-8"?>
 <p:sld xmlns:a="http://schemas.openxmlformats.org/drawingml/2006/main" xmlns:r="http://schemas.openxmlformats.org/officeDocument/2006/relationships" xmlns:p="http://schemas.openxmlformats.org/presentationml/2006/main">
   <p:cSld>
     <p:spTree>
@@ -45936,67 +46176,7 @@
 </p:sld>
 </file>
 
-<file path=ppt/slides/slide7.xml><?xml version="1.0" encoding="utf-8"?>
-<p:sld xmlns:a="http://schemas.openxmlformats.org/drawingml/2006/main" xmlns:r="http://schemas.openxmlformats.org/officeDocument/2006/relationships" xmlns:p="http://schemas.openxmlformats.org/presentationml/2006/main">
-  <p:cSld>
-    <p:spTree>
-      <p:nvGrpSpPr>
-        <p:cNvPr id="1" name=""/>
-        <p:cNvGrpSpPr/>
-        <p:nvPr/>
-      </p:nvGrpSpPr>
-      <p:grpSpPr>
-        <a:xfrm>
-          <a:off x="0" y="0"/>
-          <a:ext cx="0" cy="0"/>
-          <a:chOff x="0" y="0"/>
-          <a:chExt cx="0" cy="0"/>
-        </a:xfrm>
-      </p:grpSpPr>
-      <p:sp>
-        <p:nvSpPr>
-          <p:cNvPr id="2" name="Title 1">
-            <a:extLst>
-              <a:ext uri="{FF2B5EF4-FFF2-40B4-BE49-F238E27FC236}">
-                <a16:creationId xmlns:a16="http://schemas.microsoft.com/office/drawing/2014/main" id="{F8A33362-6456-0F5B-5570-FA2A30C5C24B}"/>
-              </a:ext>
-            </a:extLst>
-          </p:cNvPr>
-          <p:cNvSpPr>
-            <a:spLocks noGrp="1"/>
-          </p:cNvSpPr>
-          <p:nvPr>
-            <p:ph type="ctrTitle"/>
-          </p:nvPr>
-        </p:nvSpPr>
-        <p:spPr/>
-        <p:txBody>
-          <a:bodyPr>
-            <a:normAutofit/>
-          </a:bodyPr>
-          <a:lstStyle/>
-          <a:p>
-            <a:r>
-              <a:rPr lang="en-US" sz="4400" dirty="0"/>
-              <a:t>About This Course</a:t>
-            </a:r>
-          </a:p>
-        </p:txBody>
-      </p:sp>
-    </p:spTree>
-    <p:extLst>
-      <p:ext uri="{BB962C8B-B14F-4D97-AF65-F5344CB8AC3E}">
-        <p14:creationId xmlns:p14="http://schemas.microsoft.com/office/powerpoint/2010/main" val="88229346"/>
-      </p:ext>
-    </p:extLst>
-  </p:cSld>
-  <p:clrMapOvr>
-    <a:masterClrMapping/>
-  </p:clrMapOvr>
-</p:sld>
-</file>
-
-<file path=ppt/slides/slide70.xml><?xml version="1.0" encoding="utf-8"?>
+<file path=ppt/slides/slide71.xml><?xml version="1.0" encoding="utf-8"?>
 <p:sld xmlns:a="http://schemas.openxmlformats.org/drawingml/2006/main" xmlns:r="http://schemas.openxmlformats.org/officeDocument/2006/relationships" xmlns:p="http://schemas.openxmlformats.org/presentationml/2006/main">
   <p:cSld>
     <p:spTree>

</xml_diff>

<commit_message>
Small corrections to slides
</commit_message>
<xml_diff>
--- a/slides/1_Introduction.pptx
+++ b/slides/1_Introduction.pptx
@@ -17,7 +17,7 @@
     <p:sldId id="712" r:id="rId8"/>
     <p:sldId id="288" r:id="rId9"/>
     <p:sldId id="732" r:id="rId10"/>
-    <p:sldId id="452" r:id="rId11"/>
+    <p:sldId id="733" r:id="rId11"/>
     <p:sldId id="724" r:id="rId12"/>
     <p:sldId id="397" r:id="rId13"/>
     <p:sldId id="723" r:id="rId14"/>
@@ -267,7 +267,7 @@
           <a:p>
             <a:fld id="{2F3ABF1A-8818-4472-8518-E71DC7B5D2F7}" type="datetimeFigureOut">
               <a:rPr lang="en-US" smtClean="0"/>
-              <a:t>9/1/2025</a:t>
+              <a:t>9/2/2025</a:t>
             </a:fld>
             <a:endParaRPr lang="en-US"/>
           </a:p>
@@ -1287,7 +1287,7 @@
           <a:p>
             <a:fld id="{6E4A31BF-7266-4BEB-918B-ADC21C630A6F}" type="datetimeFigureOut">
               <a:rPr lang="en-US" smtClean="0"/>
-              <a:t>9/1/2025</a:t>
+              <a:t>9/2/2025</a:t>
             </a:fld>
             <a:endParaRPr lang="en-US"/>
           </a:p>
@@ -1485,7 +1485,7 @@
           <a:p>
             <a:fld id="{6E4A31BF-7266-4BEB-918B-ADC21C630A6F}" type="datetimeFigureOut">
               <a:rPr lang="en-US" smtClean="0"/>
-              <a:t>9/1/2025</a:t>
+              <a:t>9/2/2025</a:t>
             </a:fld>
             <a:endParaRPr lang="en-US"/>
           </a:p>
@@ -1693,7 +1693,7 @@
           <a:p>
             <a:fld id="{6E4A31BF-7266-4BEB-918B-ADC21C630A6F}" type="datetimeFigureOut">
               <a:rPr lang="en-US" smtClean="0"/>
-              <a:t>9/1/2025</a:t>
+              <a:t>9/2/2025</a:t>
             </a:fld>
             <a:endParaRPr lang="en-US"/>
           </a:p>
@@ -1891,7 +1891,7 @@
           <a:p>
             <a:fld id="{6E4A31BF-7266-4BEB-918B-ADC21C630A6F}" type="datetimeFigureOut">
               <a:rPr lang="en-US" smtClean="0"/>
-              <a:t>9/1/2025</a:t>
+              <a:t>9/2/2025</a:t>
             </a:fld>
             <a:endParaRPr lang="en-US"/>
           </a:p>
@@ -2166,7 +2166,7 @@
           <a:p>
             <a:fld id="{6E4A31BF-7266-4BEB-918B-ADC21C630A6F}" type="datetimeFigureOut">
               <a:rPr lang="en-US" smtClean="0"/>
-              <a:t>9/1/2025</a:t>
+              <a:t>9/2/2025</a:t>
             </a:fld>
             <a:endParaRPr lang="en-US"/>
           </a:p>
@@ -2431,7 +2431,7 @@
           <a:p>
             <a:fld id="{6E4A31BF-7266-4BEB-918B-ADC21C630A6F}" type="datetimeFigureOut">
               <a:rPr lang="en-US" smtClean="0"/>
-              <a:t>9/1/2025</a:t>
+              <a:t>9/2/2025</a:t>
             </a:fld>
             <a:endParaRPr lang="en-US"/>
           </a:p>
@@ -2843,7 +2843,7 @@
           <a:p>
             <a:fld id="{6E4A31BF-7266-4BEB-918B-ADC21C630A6F}" type="datetimeFigureOut">
               <a:rPr lang="en-US" smtClean="0"/>
-              <a:t>9/1/2025</a:t>
+              <a:t>9/2/2025</a:t>
             </a:fld>
             <a:endParaRPr lang="en-US"/>
           </a:p>
@@ -2984,7 +2984,7 @@
           <a:p>
             <a:fld id="{6E4A31BF-7266-4BEB-918B-ADC21C630A6F}" type="datetimeFigureOut">
               <a:rPr lang="en-US" smtClean="0"/>
-              <a:t>9/1/2025</a:t>
+              <a:t>9/2/2025</a:t>
             </a:fld>
             <a:endParaRPr lang="en-US"/>
           </a:p>
@@ -3097,7 +3097,7 @@
           <a:p>
             <a:fld id="{6E4A31BF-7266-4BEB-918B-ADC21C630A6F}" type="datetimeFigureOut">
               <a:rPr lang="en-US" smtClean="0"/>
-              <a:t>9/1/2025</a:t>
+              <a:t>9/2/2025</a:t>
             </a:fld>
             <a:endParaRPr lang="en-US"/>
           </a:p>
@@ -3408,7 +3408,7 @@
           <a:p>
             <a:fld id="{6E4A31BF-7266-4BEB-918B-ADC21C630A6F}" type="datetimeFigureOut">
               <a:rPr lang="en-US" smtClean="0"/>
-              <a:t>9/1/2025</a:t>
+              <a:t>9/2/2025</a:t>
             </a:fld>
             <a:endParaRPr lang="en-US"/>
           </a:p>
@@ -3696,7 +3696,7 @@
           <a:p>
             <a:fld id="{6E4A31BF-7266-4BEB-918B-ADC21C630A6F}" type="datetimeFigureOut">
               <a:rPr lang="en-US" smtClean="0"/>
-              <a:t>9/1/2025</a:t>
+              <a:t>9/2/2025</a:t>
             </a:fld>
             <a:endParaRPr lang="en-US"/>
           </a:p>
@@ -3937,7 +3937,7 @@
           <a:p>
             <a:fld id="{6E4A31BF-7266-4BEB-918B-ADC21C630A6F}" type="datetimeFigureOut">
               <a:rPr lang="en-US" smtClean="0"/>
-              <a:t>9/1/2025</a:t>
+              <a:t>9/2/2025</a:t>
             </a:fld>
             <a:endParaRPr lang="en-US"/>
           </a:p>
@@ -4571,7 +4571,7 @@
           <p:cNvPr id="2" name="Title 1">
             <a:extLst>
               <a:ext uri="{FF2B5EF4-FFF2-40B4-BE49-F238E27FC236}">
-                <a16:creationId xmlns:a16="http://schemas.microsoft.com/office/drawing/2014/main" id="{2EAB3E39-E4CD-B6D2-21FE-E3DF3151138A}"/>
+                <a16:creationId xmlns:a16="http://schemas.microsoft.com/office/drawing/2014/main" id="{26597D24-DFF0-4128-2724-AA23D1E91FF3}"/>
               </a:ext>
             </a:extLst>
           </p:cNvPr>
@@ -4579,149 +4579,204 @@
             <a:spLocks noGrp="1"/>
           </p:cNvSpPr>
           <p:nvPr>
-            <p:ph type="title"/>
+            <p:ph type="ctrTitle"/>
           </p:nvPr>
         </p:nvSpPr>
-        <p:spPr/>
+        <p:spPr>
+          <a:xfrm>
+            <a:off x="280216" y="296446"/>
+            <a:ext cx="9625781" cy="796413"/>
+          </a:xfrm>
+        </p:spPr>
         <p:txBody>
           <a:bodyPr>
             <a:normAutofit/>
           </a:bodyPr>
           <a:lstStyle/>
           <a:p>
-            <a:r>
-              <a:rPr lang="en-US" sz="4000" i="0">
-                <a:solidFill>
-                  <a:srgbClr val="000000"/>
-                </a:solidFill>
-                <a:effectLst/>
-                <a:latin typeface="+mn-lt"/>
-              </a:rPr>
-              <a:t>About your TA: </a:t>
-            </a:r>
-            <a:r>
-              <a:rPr lang="en-US" sz="4000" i="0" dirty="0">
-                <a:solidFill>
-                  <a:srgbClr val="000000"/>
-                </a:solidFill>
-                <a:effectLst/>
-                <a:latin typeface="+mn-lt"/>
-              </a:rPr>
-              <a:t>George Cruz</a:t>
-            </a:r>
-            <a:br>
-              <a:rPr lang="en-US" sz="4000" b="1" i="0" dirty="0">
-                <a:solidFill>
-                  <a:srgbClr val="000000"/>
-                </a:solidFill>
-                <a:effectLst/>
-                <a:latin typeface="Gill Sans MT" panose="020B0502020104020203" pitchFamily="34" charset="0"/>
-              </a:rPr>
-            </a:br>
-            <a:endParaRPr lang="en-US" sz="4000" dirty="0"/>
+            <a:pPr algn="l"/>
+            <a:r>
+              <a:rPr lang="en-US" sz="4000" dirty="0"/>
+              <a:t>Teaching Assistant: Waree Protprommart</a:t>
+            </a:r>
           </a:p>
         </p:txBody>
       </p:sp>
       <p:sp>
         <p:nvSpPr>
-          <p:cNvPr id="3" name="Content Placeholder 2">
+          <p:cNvPr id="4" name="TextBox 3">
             <a:extLst>
               <a:ext uri="{FF2B5EF4-FFF2-40B4-BE49-F238E27FC236}">
-                <a16:creationId xmlns:a16="http://schemas.microsoft.com/office/drawing/2014/main" id="{4BA949B7-1683-2432-EC26-A7F815D02FE9}"/>
+                <a16:creationId xmlns:a16="http://schemas.microsoft.com/office/drawing/2014/main" id="{C4D01460-3AF6-B73A-91A2-A0CB1EF58CE4}"/>
               </a:ext>
             </a:extLst>
           </p:cNvPr>
-          <p:cNvSpPr>
-            <a:spLocks noGrp="1"/>
-          </p:cNvSpPr>
-          <p:nvPr>
-            <p:ph idx="1"/>
-          </p:nvPr>
+          <p:cNvSpPr txBox="1"/>
+          <p:nvPr/>
         </p:nvSpPr>
-        <p:spPr/>
+        <p:spPr>
+          <a:xfrm>
+            <a:off x="341667" y="1345984"/>
+            <a:ext cx="7231629" cy="4893647"/>
+          </a:xfrm>
+          <a:prstGeom prst="rect">
+            <a:avLst/>
+          </a:prstGeom>
+          <a:noFill/>
+        </p:spPr>
         <p:txBody>
-          <a:bodyPr>
-            <a:normAutofit/>
+          <a:bodyPr wrap="square" rtlCol="0">
+            <a:spAutoFit/>
           </a:bodyPr>
           <a:lstStyle/>
           <a:p>
-            <a:pPr algn="l"/>
-            <a:r>
-              <a:rPr lang="en-US" b="0" i="0" dirty="0">
-                <a:solidFill>
-                  <a:srgbClr val="222222"/>
-                </a:solidFill>
-                <a:effectLst/>
-                <a:latin typeface="Arial" panose="020B0604020202020204" pitchFamily="34" charset="0"/>
-              </a:rPr>
-              <a:t>MBA and DBA in Business Administration from Westcliff University in Irvine, CA</a:t>
-            </a:r>
-          </a:p>
-          <a:p>
-            <a:pPr algn="l"/>
-            <a:r>
-              <a:rPr lang="en-US" b="0" i="0" dirty="0">
-                <a:solidFill>
-                  <a:srgbClr val="222222"/>
-                </a:solidFill>
-                <a:effectLst/>
-                <a:latin typeface="Arial" panose="020B0604020202020204" pitchFamily="34" charset="0"/>
-              </a:rPr>
-              <a:t>Master of Data Science graduate from Harvard Extension School</a:t>
-            </a:r>
-          </a:p>
-          <a:p>
-            <a:pPr algn="l"/>
-            <a:r>
-              <a:rPr lang="en-US" b="0" i="0" dirty="0">
-                <a:solidFill>
-                  <a:srgbClr val="222222"/>
-                </a:solidFill>
-                <a:effectLst/>
-                <a:latin typeface="Arial" panose="020B0604020202020204" pitchFamily="34" charset="0"/>
-              </a:rPr>
-              <a:t>Worked as a Data Scientist consultant in analytics roles at Comerica Bank, Best Buy, and DirecTV</a:t>
-            </a:r>
-          </a:p>
-          <a:p>
-            <a:pPr algn="l"/>
-            <a:r>
-              <a:rPr lang="en-US" b="0" i="0" dirty="0">
-                <a:solidFill>
-                  <a:srgbClr val="222222"/>
-                </a:solidFill>
-                <a:effectLst/>
-                <a:latin typeface="Arial" panose="020B0604020202020204" pitchFamily="34" charset="0"/>
-              </a:rPr>
-              <a:t>Currently living in San Diego, California</a:t>
-            </a:r>
-          </a:p>
-          <a:p>
-            <a:pPr algn="l"/>
-            <a:r>
-              <a:rPr lang="en-US" b="0" i="0" dirty="0">
-                <a:solidFill>
-                  <a:srgbClr val="222222"/>
-                </a:solidFill>
-                <a:effectLst/>
-                <a:latin typeface="Arial" panose="020B0604020202020204" pitchFamily="34" charset="0"/>
-              </a:rPr>
-              <a:t>Loves playing basketball in my free time. </a:t>
-            </a:r>
-          </a:p>
-          <a:p>
-            <a:pPr algn="l">
+            <a:pPr marL="285750" indent="-285750">
               <a:buFont typeface="Arial" panose="020B0604020202020204" pitchFamily="34" charset="0"/>
               <a:buChar char="•"/>
             </a:pPr>
-            <a:endParaRPr lang="en-US" dirty="0"/>
+            <a:r>
+              <a:rPr lang="en-US" sz="2400" dirty="0"/>
+              <a:t>ALM Student in Data Science at HES</a:t>
+            </a:r>
+          </a:p>
+          <a:p>
+            <a:pPr marL="285750" indent="-285750">
+              <a:buFont typeface="Arial" panose="020B0604020202020204" pitchFamily="34" charset="0"/>
+              <a:buChar char="•"/>
+            </a:pPr>
+            <a:r>
+              <a:rPr lang="en-US" sz="2400" dirty="0"/>
+              <a:t>BS in Biology from Mount Saint Mary’s University</a:t>
+            </a:r>
+          </a:p>
+          <a:p>
+            <a:pPr marL="285750" indent="-285750">
+              <a:buFont typeface="Arial" panose="020B0604020202020204" pitchFamily="34" charset="0"/>
+              <a:buChar char="•"/>
+            </a:pPr>
+            <a:r>
+              <a:rPr lang="en-US" sz="2400" dirty="0"/>
+              <a:t>Disaster planning and information at the American Red Cross</a:t>
+            </a:r>
+          </a:p>
+          <a:p>
+            <a:pPr marL="285750" indent="-285750">
+              <a:buFont typeface="Arial" panose="020B0604020202020204" pitchFamily="34" charset="0"/>
+              <a:buChar char="•"/>
+            </a:pPr>
+            <a:r>
+              <a:rPr lang="en-US" sz="2400" dirty="0"/>
+              <a:t>Substitute teaching K-12 part-time for STEM subjects </a:t>
+            </a:r>
+          </a:p>
+          <a:p>
+            <a:pPr marL="285750" indent="-285750">
+              <a:buFont typeface="Arial" panose="020B0604020202020204" pitchFamily="34" charset="0"/>
+              <a:buChar char="•"/>
+            </a:pPr>
+            <a:r>
+              <a:rPr lang="en-US" sz="2400" dirty="0"/>
+              <a:t>Worked as a research technician at the California Institute of Technology</a:t>
+            </a:r>
+          </a:p>
+          <a:p>
+            <a:pPr marL="285750" indent="-285750">
+              <a:buFont typeface="Arial" panose="020B0604020202020204" pitchFamily="34" charset="0"/>
+              <a:buChar char="•"/>
+            </a:pPr>
+            <a:r>
+              <a:rPr lang="en-US" sz="2400" dirty="0"/>
+              <a:t>Interned at the UCLA School of Engineering, researching a 6-degree-of-freedom robotic arm hand signal detection.</a:t>
+            </a:r>
+          </a:p>
+          <a:p>
+            <a:pPr marL="285750" indent="-285750">
+              <a:buFont typeface="Arial" panose="020B0604020202020204" pitchFamily="34" charset="0"/>
+              <a:buChar char="•"/>
+            </a:pPr>
+            <a:r>
+              <a:rPr lang="en-US" sz="2400" dirty="0"/>
+              <a:t>Hobbies: Surfing, Hiking, Camping, Gardening, Zumba, Lying down and watching TV</a:t>
+            </a:r>
           </a:p>
         </p:txBody>
       </p:sp>
+      <p:pic>
+        <p:nvPicPr>
+          <p:cNvPr id="6" name="Picture 5" descr="A person standing next to a sign&#10;&#10;AI-generated content may be incorrect.">
+            <a:extLst>
+              <a:ext uri="{FF2B5EF4-FFF2-40B4-BE49-F238E27FC236}">
+                <a16:creationId xmlns:a16="http://schemas.microsoft.com/office/drawing/2014/main" id="{288C65B2-DBC8-4754-089E-6EDA50443613}"/>
+              </a:ext>
+            </a:extLst>
+          </p:cNvPr>
+          <p:cNvPicPr>
+            <a:picLocks noChangeAspect="1"/>
+          </p:cNvPicPr>
+          <p:nvPr/>
+        </p:nvPicPr>
+        <p:blipFill>
+          <a:blip r:embed="rId2">
+            <a:extLst>
+              <a:ext uri="{28A0092B-C50C-407E-A947-70E740481C1C}">
+                <a14:useLocalDpi xmlns:a14="http://schemas.microsoft.com/office/drawing/2010/main" val="0"/>
+              </a:ext>
+            </a:extLst>
+          </a:blip>
+          <a:stretch>
+            <a:fillRect/>
+          </a:stretch>
+        </p:blipFill>
+        <p:spPr>
+          <a:xfrm>
+            <a:off x="9146827" y="115529"/>
+            <a:ext cx="2583057" cy="3429000"/>
+          </a:xfrm>
+          <a:prstGeom prst="rect">
+            <a:avLst/>
+          </a:prstGeom>
+        </p:spPr>
+      </p:pic>
+      <p:pic>
+        <p:nvPicPr>
+          <p:cNvPr id="8" name="Picture 7" descr="A papaya tree with a white fence&#10;&#10;AI-generated content may be incorrect.">
+            <a:extLst>
+              <a:ext uri="{FF2B5EF4-FFF2-40B4-BE49-F238E27FC236}">
+                <a16:creationId xmlns:a16="http://schemas.microsoft.com/office/drawing/2014/main" id="{19B050A4-3A39-40C6-8D62-D5CF77015B90}"/>
+              </a:ext>
+            </a:extLst>
+          </p:cNvPr>
+          <p:cNvPicPr>
+            <a:picLocks noChangeAspect="1"/>
+          </p:cNvPicPr>
+          <p:nvPr/>
+        </p:nvPicPr>
+        <p:blipFill>
+          <a:blip r:embed="rId3">
+            <a:extLst>
+              <a:ext uri="{28A0092B-C50C-407E-A947-70E740481C1C}">
+                <a14:useLocalDpi xmlns:a14="http://schemas.microsoft.com/office/drawing/2010/main" val="0"/>
+              </a:ext>
+            </a:extLst>
+          </a:blip>
+          <a:stretch>
+            <a:fillRect/>
+          </a:stretch>
+        </p:blipFill>
+        <p:spPr>
+          <a:xfrm>
+            <a:off x="8076586" y="3313471"/>
+            <a:ext cx="2571750" cy="3429000"/>
+          </a:xfrm>
+          <a:prstGeom prst="rect">
+            <a:avLst/>
+          </a:prstGeom>
+        </p:spPr>
+      </p:pic>
     </p:spTree>
     <p:extLst>
       <p:ext uri="{BB962C8B-B14F-4D97-AF65-F5344CB8AC3E}">
-        <p14:creationId xmlns:p14="http://schemas.microsoft.com/office/powerpoint/2010/main" val="459279238"/>
+        <p14:creationId xmlns:p14="http://schemas.microsoft.com/office/powerpoint/2010/main" val="2046974052"/>
       </p:ext>
     </p:extLst>
   </p:cSld>
@@ -5570,26 +5625,39 @@
                                   </p:childTnLst>
                                 </p:cTn>
                               </p:par>
-                            </p:childTnLst>
-                          </p:cTn>
-                        </p:par>
-                      </p:childTnLst>
-                    </p:cTn>
-                  </p:par>
-                  <p:par>
-                    <p:cTn id="7" fill="hold">
-                      <p:stCondLst>
-                        <p:cond delay="indefinite"/>
-                      </p:stCondLst>
-                      <p:childTnLst>
-                        <p:par>
-                          <p:cTn id="8" fill="hold">
-                            <p:stCondLst>
-                              <p:cond delay="0"/>
-                            </p:stCondLst>
-                            <p:childTnLst>
                               <p:par>
-                                <p:cTn id="9" presetID="1" presetClass="entr" presetSubtype="0" fill="hold" nodeType="clickEffect">
+                                <p:cTn id="7" presetID="1" presetClass="entr" presetSubtype="0" fill="hold" nodeType="withEffect">
+                                  <p:stCondLst>
+                                    <p:cond delay="0"/>
+                                  </p:stCondLst>
+                                  <p:childTnLst>
+                                    <p:set>
+                                      <p:cBhvr>
+                                        <p:cTn id="8" dur="1" fill="hold">
+                                          <p:stCondLst>
+                                            <p:cond delay="0"/>
+                                          </p:stCondLst>
+                                        </p:cTn>
+                                        <p:tgtEl>
+                                          <p:spTgt spid="3">
+                                            <p:txEl>
+                                              <p:pRg st="2" end="2"/>
+                                            </p:txEl>
+                                          </p:spTgt>
+                                        </p:tgtEl>
+                                        <p:attrNameLst>
+                                          <p:attrName>style.visibility</p:attrName>
+                                        </p:attrNameLst>
+                                      </p:cBhvr>
+                                      <p:to>
+                                        <p:strVal val="visible"/>
+                                      </p:to>
+                                    </p:set>
+                                  </p:childTnLst>
+                                </p:cTn>
+                              </p:par>
+                              <p:par>
+                                <p:cTn id="9" presetID="1" presetClass="entr" presetSubtype="0" fill="hold" nodeType="withEffect">
                                   <p:stCondLst>
                                     <p:cond delay="0"/>
                                   </p:stCondLst>
@@ -5604,7 +5672,7 @@
                                         <p:tgtEl>
                                           <p:spTgt spid="3">
                                             <p:txEl>
-                                              <p:pRg st="2" end="2"/>
+                                              <p:pRg st="3" end="3"/>
                                             </p:txEl>
                                           </p:spTgt>
                                         </p:tgtEl>
@@ -5653,55 +5721,6 @@
                                         <p:tgtEl>
                                           <p:spTgt spid="3">
                                             <p:txEl>
-                                              <p:pRg st="3" end="3"/>
-                                            </p:txEl>
-                                          </p:spTgt>
-                                        </p:tgtEl>
-                                        <p:attrNameLst>
-                                          <p:attrName>style.visibility</p:attrName>
-                                        </p:attrNameLst>
-                                      </p:cBhvr>
-                                      <p:to>
-                                        <p:strVal val="visible"/>
-                                      </p:to>
-                                    </p:set>
-                                  </p:childTnLst>
-                                </p:cTn>
-                              </p:par>
-                            </p:childTnLst>
-                          </p:cTn>
-                        </p:par>
-                      </p:childTnLst>
-                    </p:cTn>
-                  </p:par>
-                  <p:par>
-                    <p:cTn id="15" fill="hold">
-                      <p:stCondLst>
-                        <p:cond delay="indefinite"/>
-                      </p:stCondLst>
-                      <p:childTnLst>
-                        <p:par>
-                          <p:cTn id="16" fill="hold">
-                            <p:stCondLst>
-                              <p:cond delay="0"/>
-                            </p:stCondLst>
-                            <p:childTnLst>
-                              <p:par>
-                                <p:cTn id="17" presetID="1" presetClass="entr" presetSubtype="0" fill="hold" nodeType="clickEffect">
-                                  <p:stCondLst>
-                                    <p:cond delay="0"/>
-                                  </p:stCondLst>
-                                  <p:childTnLst>
-                                    <p:set>
-                                      <p:cBhvr>
-                                        <p:cTn id="18" dur="1" fill="hold">
-                                          <p:stCondLst>
-                                            <p:cond delay="0"/>
-                                          </p:stCondLst>
-                                        </p:cTn>
-                                        <p:tgtEl>
-                                          <p:spTgt spid="3">
-                                            <p:txEl>
                                               <p:pRg st="4" end="4"/>
                                             </p:txEl>
                                           </p:spTgt>
@@ -5717,33 +5736,15 @@
                                   </p:childTnLst>
                                 </p:cTn>
                               </p:par>
-                            </p:childTnLst>
-                          </p:cTn>
-                        </p:par>
-                      </p:childTnLst>
-                    </p:cTn>
-                  </p:par>
-                  <p:par>
-                    <p:cTn id="19" fill="hold">
-                      <p:stCondLst>
-                        <p:cond delay="indefinite"/>
-                      </p:stCondLst>
-                      <p:childTnLst>
-                        <p:par>
-                          <p:cTn id="20" fill="hold">
-                            <p:stCondLst>
-                              <p:cond delay="0"/>
-                            </p:stCondLst>
-                            <p:childTnLst>
                               <p:par>
-                                <p:cTn id="21" presetID="1" presetClass="entr" presetSubtype="0" fill="hold" nodeType="clickEffect">
+                                <p:cTn id="15" presetID="1" presetClass="entr" presetSubtype="0" fill="hold" nodeType="withEffect">
                                   <p:stCondLst>
                                     <p:cond delay="0"/>
                                   </p:stCondLst>
                                   <p:childTnLst>
                                     <p:set>
                                       <p:cBhvr>
-                                        <p:cTn id="22" dur="1" fill="hold">
+                                        <p:cTn id="16" dur="1" fill="hold">
                                           <p:stCondLst>
                                             <p:cond delay="0"/>
                                           </p:stCondLst>
@@ -5767,14 +5768,14 @@
                                 </p:cTn>
                               </p:par>
                               <p:par>
-                                <p:cTn id="23" presetID="1" presetClass="entr" presetSubtype="0" fill="hold" nodeType="withEffect">
+                                <p:cTn id="17" presetID="1" presetClass="entr" presetSubtype="0" fill="hold" nodeType="withEffect">
                                   <p:stCondLst>
                                     <p:cond delay="0"/>
                                   </p:stCondLst>
                                   <p:childTnLst>
                                     <p:set>
                                       <p:cBhvr>
-                                        <p:cTn id="24" dur="1" fill="hold">
+                                        <p:cTn id="18" dur="1" fill="hold">
                                           <p:stCondLst>
                                             <p:cond delay="0"/>
                                           </p:stCondLst>
@@ -5798,14 +5799,14 @@
                                 </p:cTn>
                               </p:par>
                               <p:par>
-                                <p:cTn id="25" presetID="1" presetClass="entr" presetSubtype="0" fill="hold" nodeType="withEffect">
+                                <p:cTn id="19" presetID="1" presetClass="entr" presetSubtype="0" fill="hold" nodeType="withEffect">
                                   <p:stCondLst>
                                     <p:cond delay="0"/>
                                   </p:stCondLst>
                                   <p:childTnLst>
                                     <p:set>
                                       <p:cBhvr>
-                                        <p:cTn id="26" dur="1" fill="hold">
+                                        <p:cTn id="20" dur="1" fill="hold">
                                           <p:stCondLst>
                                             <p:cond delay="0"/>
                                           </p:stCondLst>
@@ -5835,26 +5836,26 @@
                     </p:cTn>
                   </p:par>
                   <p:par>
-                    <p:cTn id="27" fill="hold">
+                    <p:cTn id="21" fill="hold">
                       <p:stCondLst>
                         <p:cond delay="indefinite"/>
                       </p:stCondLst>
                       <p:childTnLst>
                         <p:par>
-                          <p:cTn id="28" fill="hold">
+                          <p:cTn id="22" fill="hold">
                             <p:stCondLst>
                               <p:cond delay="0"/>
                             </p:stCondLst>
                             <p:childTnLst>
                               <p:par>
-                                <p:cTn id="29" presetID="1" presetClass="entr" presetSubtype="0" fill="hold" nodeType="clickEffect">
+                                <p:cTn id="23" presetID="1" presetClass="entr" presetSubtype="0" fill="hold" nodeType="clickEffect">
                                   <p:stCondLst>
                                     <p:cond delay="0"/>
                                   </p:stCondLst>
                                   <p:childTnLst>
                                     <p:set>
                                       <p:cBhvr>
-                                        <p:cTn id="30" dur="1" fill="hold">
+                                        <p:cTn id="24" dur="1" fill="hold">
                                           <p:stCondLst>
                                             <p:cond delay="0"/>
                                           </p:stCondLst>
@@ -5884,26 +5885,26 @@
                     </p:cTn>
                   </p:par>
                   <p:par>
-                    <p:cTn id="31" fill="hold">
+                    <p:cTn id="25" fill="hold">
                       <p:stCondLst>
                         <p:cond delay="indefinite"/>
                       </p:stCondLst>
                       <p:childTnLst>
                         <p:par>
-                          <p:cTn id="32" fill="hold">
+                          <p:cTn id="26" fill="hold">
                             <p:stCondLst>
                               <p:cond delay="0"/>
                             </p:stCondLst>
                             <p:childTnLst>
                               <p:par>
-                                <p:cTn id="33" presetID="1" presetClass="entr" presetSubtype="0" fill="hold" nodeType="clickEffect">
+                                <p:cTn id="27" presetID="1" presetClass="entr" presetSubtype="0" fill="hold" nodeType="clickEffect">
                                   <p:stCondLst>
                                     <p:cond delay="0"/>
                                   </p:stCondLst>
                                   <p:childTnLst>
                                     <p:set>
                                       <p:cBhvr>
-                                        <p:cTn id="34" dur="1" fill="hold">
+                                        <p:cTn id="28" dur="1" fill="hold">
                                           <p:stCondLst>
                                             <p:cond delay="0"/>
                                           </p:stCondLst>
@@ -5933,26 +5934,26 @@
                     </p:cTn>
                   </p:par>
                   <p:par>
-                    <p:cTn id="35" fill="hold">
+                    <p:cTn id="29" fill="hold">
                       <p:stCondLst>
                         <p:cond delay="indefinite"/>
                       </p:stCondLst>
                       <p:childTnLst>
                         <p:par>
-                          <p:cTn id="36" fill="hold">
+                          <p:cTn id="30" fill="hold">
                             <p:stCondLst>
                               <p:cond delay="0"/>
                             </p:stCondLst>
                             <p:childTnLst>
                               <p:par>
-                                <p:cTn id="37" presetID="1" presetClass="entr" presetSubtype="0" fill="hold" nodeType="clickEffect">
+                                <p:cTn id="31" presetID="1" presetClass="entr" presetSubtype="0" fill="hold" nodeType="clickEffect">
                                   <p:stCondLst>
                                     <p:cond delay="0"/>
                                   </p:stCondLst>
                                   <p:childTnLst>
                                     <p:set>
                                       <p:cBhvr>
-                                        <p:cTn id="38" dur="1" fill="hold">
+                                        <p:cTn id="32" dur="1" fill="hold">
                                           <p:stCondLst>
                                             <p:cond delay="0"/>
                                           </p:stCondLst>
@@ -5976,14 +5977,14 @@
                                 </p:cTn>
                               </p:par>
                               <p:par>
-                                <p:cTn id="39" presetID="1" presetClass="entr" presetSubtype="0" fill="hold" nodeType="withEffect">
+                                <p:cTn id="33" presetID="1" presetClass="entr" presetSubtype="0" fill="hold" nodeType="withEffect">
                                   <p:stCondLst>
                                     <p:cond delay="0"/>
                                   </p:stCondLst>
                                   <p:childTnLst>
                                     <p:set>
                                       <p:cBhvr>
-                                        <p:cTn id="40" dur="1" fill="hold">
+                                        <p:cTn id="34" dur="1" fill="hold">
                                           <p:stCondLst>
                                             <p:cond delay="0"/>
                                           </p:stCondLst>
@@ -12225,6 +12226,24 @@
                   <a:srgbClr val="5E5E5E"/>
                 </a:solidFill>
                 <a:effectLst/>
+                <a:latin typeface="Google Sans"/>
+              </a:rPr>
+              <a:t>edu</a:t>
+            </a:r>
+            <a:r>
+              <a:rPr lang="en-US" dirty="0">
+                <a:solidFill>
+                  <a:srgbClr val="5E5E5E"/>
+                </a:solidFill>
+                <a:latin typeface="Google Sans"/>
+              </a:rPr>
+              <a:t>, or wap185 at g dot Harvard dot </a:t>
+            </a:r>
+            <a:r>
+              <a:rPr lang="en-US" dirty="0" err="1">
+                <a:solidFill>
+                  <a:srgbClr val="5E5E5E"/>
+                </a:solidFill>
                 <a:latin typeface="Google Sans"/>
               </a:rPr>
               <a:t>edu</a:t>
@@ -19718,6 +19737,294 @@
   <p:clrMapOvr>
     <a:masterClrMapping/>
   </p:clrMapOvr>
+  <p:timing>
+    <p:tnLst>
+      <p:par>
+        <p:cTn id="1" dur="indefinite" restart="never" nodeType="tmRoot">
+          <p:childTnLst>
+            <p:seq concurrent="1" nextAc="seek">
+              <p:cTn id="2" dur="indefinite" nodeType="mainSeq">
+                <p:childTnLst>
+                  <p:par>
+                    <p:cTn id="3" fill="hold">
+                      <p:stCondLst>
+                        <p:cond delay="indefinite"/>
+                      </p:stCondLst>
+                      <p:childTnLst>
+                        <p:par>
+                          <p:cTn id="4" fill="hold">
+                            <p:stCondLst>
+                              <p:cond delay="0"/>
+                            </p:stCondLst>
+                            <p:childTnLst>
+                              <p:par>
+                                <p:cTn id="5" presetID="1" presetClass="entr" presetSubtype="0" fill="hold" nodeType="clickEffect">
+                                  <p:stCondLst>
+                                    <p:cond delay="0"/>
+                                  </p:stCondLst>
+                                  <p:childTnLst>
+                                    <p:set>
+                                      <p:cBhvr>
+                                        <p:cTn id="6" dur="1" fill="hold">
+                                          <p:stCondLst>
+                                            <p:cond delay="0"/>
+                                          </p:stCondLst>
+                                        </p:cTn>
+                                        <p:tgtEl>
+                                          <p:spTgt spid="3">
+                                            <p:txEl>
+                                              <p:pRg st="1" end="1"/>
+                                            </p:txEl>
+                                          </p:spTgt>
+                                        </p:tgtEl>
+                                        <p:attrNameLst>
+                                          <p:attrName>style.visibility</p:attrName>
+                                        </p:attrNameLst>
+                                      </p:cBhvr>
+                                      <p:to>
+                                        <p:strVal val="visible"/>
+                                      </p:to>
+                                    </p:set>
+                                  </p:childTnLst>
+                                </p:cTn>
+                              </p:par>
+                            </p:childTnLst>
+                          </p:cTn>
+                        </p:par>
+                      </p:childTnLst>
+                    </p:cTn>
+                  </p:par>
+                  <p:par>
+                    <p:cTn id="7" fill="hold">
+                      <p:stCondLst>
+                        <p:cond delay="indefinite"/>
+                      </p:stCondLst>
+                      <p:childTnLst>
+                        <p:par>
+                          <p:cTn id="8" fill="hold">
+                            <p:stCondLst>
+                              <p:cond delay="0"/>
+                            </p:stCondLst>
+                            <p:childTnLst>
+                              <p:par>
+                                <p:cTn id="9" presetID="1" presetClass="entr" presetSubtype="0" fill="hold" nodeType="clickEffect">
+                                  <p:stCondLst>
+                                    <p:cond delay="0"/>
+                                  </p:stCondLst>
+                                  <p:childTnLst>
+                                    <p:set>
+                                      <p:cBhvr>
+                                        <p:cTn id="10" dur="1" fill="hold">
+                                          <p:stCondLst>
+                                            <p:cond delay="0"/>
+                                          </p:stCondLst>
+                                        </p:cTn>
+                                        <p:tgtEl>
+                                          <p:spTgt spid="3">
+                                            <p:txEl>
+                                              <p:pRg st="2" end="2"/>
+                                            </p:txEl>
+                                          </p:spTgt>
+                                        </p:tgtEl>
+                                        <p:attrNameLst>
+                                          <p:attrName>style.visibility</p:attrName>
+                                        </p:attrNameLst>
+                                      </p:cBhvr>
+                                      <p:to>
+                                        <p:strVal val="visible"/>
+                                      </p:to>
+                                    </p:set>
+                                  </p:childTnLst>
+                                </p:cTn>
+                              </p:par>
+                            </p:childTnLst>
+                          </p:cTn>
+                        </p:par>
+                      </p:childTnLst>
+                    </p:cTn>
+                  </p:par>
+                  <p:par>
+                    <p:cTn id="11" fill="hold">
+                      <p:stCondLst>
+                        <p:cond delay="indefinite"/>
+                      </p:stCondLst>
+                      <p:childTnLst>
+                        <p:par>
+                          <p:cTn id="12" fill="hold">
+                            <p:stCondLst>
+                              <p:cond delay="0"/>
+                            </p:stCondLst>
+                            <p:childTnLst>
+                              <p:par>
+                                <p:cTn id="13" presetID="1" presetClass="entr" presetSubtype="0" fill="hold" nodeType="clickEffect">
+                                  <p:stCondLst>
+                                    <p:cond delay="0"/>
+                                  </p:stCondLst>
+                                  <p:childTnLst>
+                                    <p:set>
+                                      <p:cBhvr>
+                                        <p:cTn id="14" dur="1" fill="hold">
+                                          <p:stCondLst>
+                                            <p:cond delay="0"/>
+                                          </p:stCondLst>
+                                        </p:cTn>
+                                        <p:tgtEl>
+                                          <p:spTgt spid="3">
+                                            <p:txEl>
+                                              <p:pRg st="3" end="3"/>
+                                            </p:txEl>
+                                          </p:spTgt>
+                                        </p:tgtEl>
+                                        <p:attrNameLst>
+                                          <p:attrName>style.visibility</p:attrName>
+                                        </p:attrNameLst>
+                                      </p:cBhvr>
+                                      <p:to>
+                                        <p:strVal val="visible"/>
+                                      </p:to>
+                                    </p:set>
+                                  </p:childTnLst>
+                                </p:cTn>
+                              </p:par>
+                              <p:par>
+                                <p:cTn id="15" presetID="1" presetClass="entr" presetSubtype="0" fill="hold" nodeType="withEffect">
+                                  <p:stCondLst>
+                                    <p:cond delay="0"/>
+                                  </p:stCondLst>
+                                  <p:childTnLst>
+                                    <p:set>
+                                      <p:cBhvr>
+                                        <p:cTn id="16" dur="1" fill="hold">
+                                          <p:stCondLst>
+                                            <p:cond delay="0"/>
+                                          </p:stCondLst>
+                                        </p:cTn>
+                                        <p:tgtEl>
+                                          <p:spTgt spid="3">
+                                            <p:txEl>
+                                              <p:pRg st="4" end="4"/>
+                                            </p:txEl>
+                                          </p:spTgt>
+                                        </p:tgtEl>
+                                        <p:attrNameLst>
+                                          <p:attrName>style.visibility</p:attrName>
+                                        </p:attrNameLst>
+                                      </p:cBhvr>
+                                      <p:to>
+                                        <p:strVal val="visible"/>
+                                      </p:to>
+                                    </p:set>
+                                  </p:childTnLst>
+                                </p:cTn>
+                              </p:par>
+                            </p:childTnLst>
+                          </p:cTn>
+                        </p:par>
+                      </p:childTnLst>
+                    </p:cTn>
+                  </p:par>
+                  <p:par>
+                    <p:cTn id="17" fill="hold">
+                      <p:stCondLst>
+                        <p:cond delay="indefinite"/>
+                      </p:stCondLst>
+                      <p:childTnLst>
+                        <p:par>
+                          <p:cTn id="18" fill="hold">
+                            <p:stCondLst>
+                              <p:cond delay="0"/>
+                            </p:stCondLst>
+                            <p:childTnLst>
+                              <p:par>
+                                <p:cTn id="19" presetID="1" presetClass="entr" presetSubtype="0" fill="hold" nodeType="clickEffect">
+                                  <p:stCondLst>
+                                    <p:cond delay="0"/>
+                                  </p:stCondLst>
+                                  <p:childTnLst>
+                                    <p:set>
+                                      <p:cBhvr>
+                                        <p:cTn id="20" dur="1" fill="hold">
+                                          <p:stCondLst>
+                                            <p:cond delay="0"/>
+                                          </p:stCondLst>
+                                        </p:cTn>
+                                        <p:tgtEl>
+                                          <p:spTgt spid="3">
+                                            <p:txEl>
+                                              <p:pRg st="5" end="5"/>
+                                            </p:txEl>
+                                          </p:spTgt>
+                                        </p:tgtEl>
+                                        <p:attrNameLst>
+                                          <p:attrName>style.visibility</p:attrName>
+                                        </p:attrNameLst>
+                                      </p:cBhvr>
+                                      <p:to>
+                                        <p:strVal val="visible"/>
+                                      </p:to>
+                                    </p:set>
+                                  </p:childTnLst>
+                                </p:cTn>
+                              </p:par>
+                              <p:par>
+                                <p:cTn id="21" presetID="1" presetClass="entr" presetSubtype="0" fill="hold" nodeType="withEffect">
+                                  <p:stCondLst>
+                                    <p:cond delay="0"/>
+                                  </p:stCondLst>
+                                  <p:childTnLst>
+                                    <p:set>
+                                      <p:cBhvr>
+                                        <p:cTn id="22" dur="1" fill="hold">
+                                          <p:stCondLst>
+                                            <p:cond delay="0"/>
+                                          </p:stCondLst>
+                                        </p:cTn>
+                                        <p:tgtEl>
+                                          <p:spTgt spid="3">
+                                            <p:txEl>
+                                              <p:pRg st="7" end="7"/>
+                                            </p:txEl>
+                                          </p:spTgt>
+                                        </p:tgtEl>
+                                        <p:attrNameLst>
+                                          <p:attrName>style.visibility</p:attrName>
+                                        </p:attrNameLst>
+                                      </p:cBhvr>
+                                      <p:to>
+                                        <p:strVal val="visible"/>
+                                      </p:to>
+                                    </p:set>
+                                  </p:childTnLst>
+                                </p:cTn>
+                              </p:par>
+                            </p:childTnLst>
+                          </p:cTn>
+                        </p:par>
+                      </p:childTnLst>
+                    </p:cTn>
+                  </p:par>
+                </p:childTnLst>
+              </p:cTn>
+              <p:prevCondLst>
+                <p:cond evt="onPrev" delay="0">
+                  <p:tgtEl>
+                    <p:sldTgt/>
+                  </p:tgtEl>
+                </p:cond>
+              </p:prevCondLst>
+              <p:nextCondLst>
+                <p:cond evt="onNext" delay="0">
+                  <p:tgtEl>
+                    <p:sldTgt/>
+                  </p:tgtEl>
+                </p:cond>
+              </p:nextCondLst>
+            </p:seq>
+          </p:childTnLst>
+        </p:cTn>
+      </p:par>
+    </p:tnLst>
+  </p:timing>
 </p:sld>
 </file>
 
@@ -19797,15 +20104,7 @@
             </a:r>
             <a:r>
               <a:rPr lang="en-US" dirty="0"/>
-              <a:t>compute a sequence of address values for access </a:t>
-            </a:r>
-            <a:r>
-              <a:rPr lang="en-US"/>
-              <a:t>to buckets of </a:t>
-            </a:r>
-            <a:r>
-              <a:rPr lang="en-US" dirty="0"/>
-              <a:t>data tables. </a:t>
+              <a:t>compute a sequence of address values for access to buckets of data tables. </a:t>
             </a:r>
           </a:p>
           <a:p>
@@ -19897,6 +20196,232 @@
   <p:clrMapOvr>
     <a:masterClrMapping/>
   </p:clrMapOvr>
+  <p:timing>
+    <p:tnLst>
+      <p:par>
+        <p:cTn id="1" dur="indefinite" restart="never" nodeType="tmRoot">
+          <p:childTnLst>
+            <p:seq concurrent="1" nextAc="seek">
+              <p:cTn id="2" dur="indefinite" nodeType="mainSeq">
+                <p:childTnLst>
+                  <p:par>
+                    <p:cTn id="3" fill="hold">
+                      <p:stCondLst>
+                        <p:cond delay="indefinite"/>
+                      </p:stCondLst>
+                      <p:childTnLst>
+                        <p:par>
+                          <p:cTn id="4" fill="hold">
+                            <p:stCondLst>
+                              <p:cond delay="0"/>
+                            </p:stCondLst>
+                            <p:childTnLst>
+                              <p:par>
+                                <p:cTn id="5" presetID="1" presetClass="entr" presetSubtype="0" fill="hold" nodeType="clickEffect">
+                                  <p:stCondLst>
+                                    <p:cond delay="0"/>
+                                  </p:stCondLst>
+                                  <p:childTnLst>
+                                    <p:set>
+                                      <p:cBhvr>
+                                        <p:cTn id="6" dur="1" fill="hold">
+                                          <p:stCondLst>
+                                            <p:cond delay="0"/>
+                                          </p:stCondLst>
+                                        </p:cTn>
+                                        <p:tgtEl>
+                                          <p:spTgt spid="3">
+                                            <p:txEl>
+                                              <p:pRg st="1" end="1"/>
+                                            </p:txEl>
+                                          </p:spTgt>
+                                        </p:tgtEl>
+                                        <p:attrNameLst>
+                                          <p:attrName>style.visibility</p:attrName>
+                                        </p:attrNameLst>
+                                      </p:cBhvr>
+                                      <p:to>
+                                        <p:strVal val="visible"/>
+                                      </p:to>
+                                    </p:set>
+                                  </p:childTnLst>
+                                </p:cTn>
+                              </p:par>
+                            </p:childTnLst>
+                          </p:cTn>
+                        </p:par>
+                      </p:childTnLst>
+                    </p:cTn>
+                  </p:par>
+                  <p:par>
+                    <p:cTn id="7" fill="hold">
+                      <p:stCondLst>
+                        <p:cond delay="indefinite"/>
+                      </p:stCondLst>
+                      <p:childTnLst>
+                        <p:par>
+                          <p:cTn id="8" fill="hold">
+                            <p:stCondLst>
+                              <p:cond delay="0"/>
+                            </p:stCondLst>
+                            <p:childTnLst>
+                              <p:par>
+                                <p:cTn id="9" presetID="1" presetClass="entr" presetSubtype="0" fill="hold" nodeType="clickEffect">
+                                  <p:stCondLst>
+                                    <p:cond delay="0"/>
+                                  </p:stCondLst>
+                                  <p:childTnLst>
+                                    <p:set>
+                                      <p:cBhvr>
+                                        <p:cTn id="10" dur="1" fill="hold">
+                                          <p:stCondLst>
+                                            <p:cond delay="0"/>
+                                          </p:stCondLst>
+                                        </p:cTn>
+                                        <p:tgtEl>
+                                          <p:spTgt spid="3">
+                                            <p:txEl>
+                                              <p:pRg st="2" end="2"/>
+                                            </p:txEl>
+                                          </p:spTgt>
+                                        </p:tgtEl>
+                                        <p:attrNameLst>
+                                          <p:attrName>style.visibility</p:attrName>
+                                        </p:attrNameLst>
+                                      </p:cBhvr>
+                                      <p:to>
+                                        <p:strVal val="visible"/>
+                                      </p:to>
+                                    </p:set>
+                                  </p:childTnLst>
+                                </p:cTn>
+                              </p:par>
+                            </p:childTnLst>
+                          </p:cTn>
+                        </p:par>
+                      </p:childTnLst>
+                    </p:cTn>
+                  </p:par>
+                  <p:par>
+                    <p:cTn id="11" fill="hold">
+                      <p:stCondLst>
+                        <p:cond delay="indefinite"/>
+                      </p:stCondLst>
+                      <p:childTnLst>
+                        <p:par>
+                          <p:cTn id="12" fill="hold">
+                            <p:stCondLst>
+                              <p:cond delay="0"/>
+                            </p:stCondLst>
+                            <p:childTnLst>
+                              <p:par>
+                                <p:cTn id="13" presetID="1" presetClass="entr" presetSubtype="0" fill="hold" nodeType="clickEffect">
+                                  <p:stCondLst>
+                                    <p:cond delay="0"/>
+                                  </p:stCondLst>
+                                  <p:childTnLst>
+                                    <p:set>
+                                      <p:cBhvr>
+                                        <p:cTn id="14" dur="1" fill="hold">
+                                          <p:stCondLst>
+                                            <p:cond delay="0"/>
+                                          </p:stCondLst>
+                                        </p:cTn>
+                                        <p:tgtEl>
+                                          <p:spTgt spid="3">
+                                            <p:txEl>
+                                              <p:pRg st="3" end="3"/>
+                                            </p:txEl>
+                                          </p:spTgt>
+                                        </p:tgtEl>
+                                        <p:attrNameLst>
+                                          <p:attrName>style.visibility</p:attrName>
+                                        </p:attrNameLst>
+                                      </p:cBhvr>
+                                      <p:to>
+                                        <p:strVal val="visible"/>
+                                      </p:to>
+                                    </p:set>
+                                  </p:childTnLst>
+                                </p:cTn>
+                              </p:par>
+                            </p:childTnLst>
+                          </p:cTn>
+                        </p:par>
+                      </p:childTnLst>
+                    </p:cTn>
+                  </p:par>
+                  <p:par>
+                    <p:cTn id="15" fill="hold">
+                      <p:stCondLst>
+                        <p:cond delay="indefinite"/>
+                      </p:stCondLst>
+                      <p:childTnLst>
+                        <p:par>
+                          <p:cTn id="16" fill="hold">
+                            <p:stCondLst>
+                              <p:cond delay="0"/>
+                            </p:stCondLst>
+                            <p:childTnLst>
+                              <p:par>
+                                <p:cTn id="17" presetID="1" presetClass="entr" presetSubtype="0" fill="hold" nodeType="clickEffect">
+                                  <p:stCondLst>
+                                    <p:cond delay="0"/>
+                                  </p:stCondLst>
+                                  <p:childTnLst>
+                                    <p:set>
+                                      <p:cBhvr>
+                                        <p:cTn id="18" dur="1" fill="hold">
+                                          <p:stCondLst>
+                                            <p:cond delay="0"/>
+                                          </p:stCondLst>
+                                        </p:cTn>
+                                        <p:tgtEl>
+                                          <p:spTgt spid="3">
+                                            <p:txEl>
+                                              <p:pRg st="4" end="4"/>
+                                            </p:txEl>
+                                          </p:spTgt>
+                                        </p:tgtEl>
+                                        <p:attrNameLst>
+                                          <p:attrName>style.visibility</p:attrName>
+                                        </p:attrNameLst>
+                                      </p:cBhvr>
+                                      <p:to>
+                                        <p:strVal val="visible"/>
+                                      </p:to>
+                                    </p:set>
+                                  </p:childTnLst>
+                                </p:cTn>
+                              </p:par>
+                            </p:childTnLst>
+                          </p:cTn>
+                        </p:par>
+                      </p:childTnLst>
+                    </p:cTn>
+                  </p:par>
+                </p:childTnLst>
+              </p:cTn>
+              <p:prevCondLst>
+                <p:cond evt="onPrev" delay="0">
+                  <p:tgtEl>
+                    <p:sldTgt/>
+                  </p:tgtEl>
+                </p:cond>
+              </p:prevCondLst>
+              <p:nextCondLst>
+                <p:cond evt="onNext" delay="0">
+                  <p:tgtEl>
+                    <p:sldTgt/>
+                  </p:tgtEl>
+                </p:cond>
+              </p:nextCondLst>
+            </p:seq>
+          </p:childTnLst>
+        </p:cTn>
+      </p:par>
+    </p:tnLst>
+  </p:timing>
 </p:sld>
 </file>
 
@@ -27820,8 +28345,8 @@
           <a:chExt cx="0" cy="0"/>
         </a:xfrm>
       </p:grpSpPr>
-      <mc:AlternateContent xmlns:mc="http://schemas.openxmlformats.org/markup-compatibility/2006" xmlns:a14="http://schemas.microsoft.com/office/drawing/2010/main">
-        <mc:Choice Requires="a14">
+      <mc:AlternateContent xmlns:mc="http://schemas.openxmlformats.org/markup-compatibility/2006">
+        <mc:Choice xmlns:a14="http://schemas.microsoft.com/office/drawing/2010/main" Requires="a14">
           <p:sp>
             <p:nvSpPr>
               <p:cNvPr id="3" name="Content Placeholder 2">
@@ -28020,6 +28545,12 @@
                         </m:e>
                       </m:d>
                       <m:r>
+                        <a:rPr lang="en-US" sz="3000" b="0" i="1" smtClean="0">
+                          <a:latin typeface="Cambria Math" panose="02040503050406030204" pitchFamily="18" charset="0"/>
+                        </a:rPr>
+                        <m:t> </m:t>
+                      </m:r>
+                      <m:r>
                         <a:rPr lang="en-US" sz="3000" i="1" smtClean="0">
                           <a:latin typeface="Cambria Math" panose="02040503050406030204" pitchFamily="18" charset="0"/>
                         </a:rPr>
@@ -28210,7 +28741,7 @@
             </p:txBody>
           </p:sp>
         </mc:Choice>
-        <mc:Fallback xmlns="">
+        <mc:Fallback>
           <p:sp>
             <p:nvSpPr>
               <p:cNvPr id="3" name="Content Placeholder 2">
@@ -28346,8 +28877,8 @@
           <a:chExt cx="0" cy="0"/>
         </a:xfrm>
       </p:grpSpPr>
-      <mc:AlternateContent xmlns:mc="http://schemas.openxmlformats.org/markup-compatibility/2006" xmlns:a14="http://schemas.microsoft.com/office/drawing/2010/main">
-        <mc:Choice Requires="a14">
+      <mc:AlternateContent xmlns:mc="http://schemas.openxmlformats.org/markup-compatibility/2006">
+        <mc:Choice xmlns:a14="http://schemas.microsoft.com/office/drawing/2010/main" Requires="a14">
           <p:sp>
             <p:nvSpPr>
               <p:cNvPr id="3" name="Content Placeholder 2">
@@ -28543,6 +29074,12 @@
                           </m:r>
                         </m:e>
                       </m:d>
+                      <m:r>
+                        <a:rPr lang="en-US" sz="3000" b="0" i="1" smtClean="0">
+                          <a:latin typeface="Cambria Math" panose="02040503050406030204" pitchFamily="18" charset="0"/>
+                        </a:rPr>
+                        <m:t> </m:t>
+                      </m:r>
                       <m:r>
                         <a:rPr lang="en-US" sz="3000" i="1" smtClean="0">
                           <a:latin typeface="Cambria Math" panose="02040503050406030204" pitchFamily="18" charset="0"/>
@@ -29044,7 +29581,7 @@
             </p:txBody>
           </p:sp>
         </mc:Choice>
-        <mc:Fallback xmlns="">
+        <mc:Fallback>
           <p:sp>
             <p:nvSpPr>
               <p:cNvPr id="3" name="Content Placeholder 2">
@@ -29190,7 +29727,7 @@
                                         <p:tgtEl>
                                           <p:spTgt spid="3">
                                             <p:txEl>
-                                              <p:pRg st="3" end="3"/>
+                                              <p:pRg st="1" end="1"/>
                                             </p:txEl>
                                           </p:spTgt>
                                         </p:tgtEl>
@@ -29221,7 +29758,7 @@
                                         <p:tgtEl>
                                           <p:spTgt spid="3">
                                             <p:txEl>
-                                              <p:pRg st="4" end="4"/>
+                                              <p:pRg st="2" end="2"/>
                                             </p:txEl>
                                           </p:spTgt>
                                         </p:tgtEl>
@@ -29270,7 +29807,7 @@
                                         <p:tgtEl>
                                           <p:spTgt spid="3">
                                             <p:txEl>
-                                              <p:pRg st="5" end="5"/>
+                                              <p:pRg st="3" end="3"/>
                                             </p:txEl>
                                           </p:spTgt>
                                         </p:tgtEl>
@@ -29301,6 +29838,86 @@
                                         <p:tgtEl>
                                           <p:spTgt spid="3">
                                             <p:txEl>
+                                              <p:pRg st="4" end="4"/>
+                                            </p:txEl>
+                                          </p:spTgt>
+                                        </p:tgtEl>
+                                        <p:attrNameLst>
+                                          <p:attrName>style.visibility</p:attrName>
+                                        </p:attrNameLst>
+                                      </p:cBhvr>
+                                      <p:to>
+                                        <p:strVal val="visible"/>
+                                      </p:to>
+                                    </p:set>
+                                  </p:childTnLst>
+                                </p:cTn>
+                              </p:par>
+                            </p:childTnLst>
+                          </p:cTn>
+                        </p:par>
+                      </p:childTnLst>
+                    </p:cTn>
+                  </p:par>
+                  <p:par>
+                    <p:cTn id="15" fill="hold">
+                      <p:stCondLst>
+                        <p:cond delay="indefinite"/>
+                      </p:stCondLst>
+                      <p:childTnLst>
+                        <p:par>
+                          <p:cTn id="16" fill="hold">
+                            <p:stCondLst>
+                              <p:cond delay="0"/>
+                            </p:stCondLst>
+                            <p:childTnLst>
+                              <p:par>
+                                <p:cTn id="17" presetID="1" presetClass="entr" presetSubtype="0" fill="hold" nodeType="clickEffect">
+                                  <p:stCondLst>
+                                    <p:cond delay="0"/>
+                                  </p:stCondLst>
+                                  <p:childTnLst>
+                                    <p:set>
+                                      <p:cBhvr>
+                                        <p:cTn id="18" dur="1" fill="hold">
+                                          <p:stCondLst>
+                                            <p:cond delay="0"/>
+                                          </p:stCondLst>
+                                        </p:cTn>
+                                        <p:tgtEl>
+                                          <p:spTgt spid="3">
+                                            <p:txEl>
+                                              <p:pRg st="5" end="5"/>
+                                            </p:txEl>
+                                          </p:spTgt>
+                                        </p:tgtEl>
+                                        <p:attrNameLst>
+                                          <p:attrName>style.visibility</p:attrName>
+                                        </p:attrNameLst>
+                                      </p:cBhvr>
+                                      <p:to>
+                                        <p:strVal val="visible"/>
+                                      </p:to>
+                                    </p:set>
+                                  </p:childTnLst>
+                                </p:cTn>
+                              </p:par>
+                              <p:par>
+                                <p:cTn id="19" presetID="1" presetClass="entr" presetSubtype="0" fill="hold" nodeType="withEffect">
+                                  <p:stCondLst>
+                                    <p:cond delay="0"/>
+                                  </p:stCondLst>
+                                  <p:childTnLst>
+                                    <p:set>
+                                      <p:cBhvr>
+                                        <p:cTn id="20" dur="1" fill="hold">
+                                          <p:stCondLst>
+                                            <p:cond delay="0"/>
+                                          </p:stCondLst>
+                                        </p:cTn>
+                                        <p:tgtEl>
+                                          <p:spTgt spid="3">
+                                            <p:txEl>
                                               <p:pRg st="7" end="7"/>
                                             </p:txEl>
                                           </p:spTgt>
@@ -29317,14 +29934,14 @@
                                 </p:cTn>
                               </p:par>
                               <p:par>
-                                <p:cTn id="15" presetID="1" presetClass="entr" presetSubtype="0" fill="hold" nodeType="withEffect">
+                                <p:cTn id="21" presetID="1" presetClass="entr" presetSubtype="0" fill="hold" nodeType="withEffect">
                                   <p:stCondLst>
                                     <p:cond delay="0"/>
                                   </p:stCondLst>
                                   <p:childTnLst>
                                     <p:set>
                                       <p:cBhvr>
-                                        <p:cTn id="16" dur="1" fill="hold">
+                                        <p:cTn id="22" dur="1" fill="hold">
                                           <p:stCondLst>
                                             <p:cond delay="0"/>
                                           </p:stCondLst>
@@ -29865,6 +30482,485 @@
   <p:clrMapOvr>
     <a:masterClrMapping/>
   </p:clrMapOvr>
+  <p:timing>
+    <p:tnLst>
+      <p:par>
+        <p:cTn id="1" dur="indefinite" restart="never" nodeType="tmRoot">
+          <p:childTnLst>
+            <p:seq concurrent="1" nextAc="seek">
+              <p:cTn id="2" dur="indefinite" nodeType="mainSeq">
+                <p:childTnLst>
+                  <p:par>
+                    <p:cTn id="3" fill="hold">
+                      <p:stCondLst>
+                        <p:cond delay="indefinite"/>
+                      </p:stCondLst>
+                      <p:childTnLst>
+                        <p:par>
+                          <p:cTn id="4" fill="hold">
+                            <p:stCondLst>
+                              <p:cond delay="0"/>
+                            </p:stCondLst>
+                            <p:childTnLst>
+                              <p:par>
+                                <p:cTn id="5" presetID="1" presetClass="entr" presetSubtype="0" fill="hold" nodeType="clickEffect">
+                                  <p:stCondLst>
+                                    <p:cond delay="0"/>
+                                  </p:stCondLst>
+                                  <p:childTnLst>
+                                    <p:set>
+                                      <p:cBhvr>
+                                        <p:cTn id="6" dur="1" fill="hold">
+                                          <p:stCondLst>
+                                            <p:cond delay="0"/>
+                                          </p:stCondLst>
+                                        </p:cTn>
+                                        <p:tgtEl>
+                                          <p:spTgt spid="3">
+                                            <p:txEl>
+                                              <p:pRg st="1" end="1"/>
+                                            </p:txEl>
+                                          </p:spTgt>
+                                        </p:tgtEl>
+                                        <p:attrNameLst>
+                                          <p:attrName>style.visibility</p:attrName>
+                                        </p:attrNameLst>
+                                      </p:cBhvr>
+                                      <p:to>
+                                        <p:strVal val="visible"/>
+                                      </p:to>
+                                    </p:set>
+                                  </p:childTnLst>
+                                </p:cTn>
+                              </p:par>
+                            </p:childTnLst>
+                          </p:cTn>
+                        </p:par>
+                      </p:childTnLst>
+                    </p:cTn>
+                  </p:par>
+                  <p:par>
+                    <p:cTn id="7" fill="hold">
+                      <p:stCondLst>
+                        <p:cond delay="indefinite"/>
+                      </p:stCondLst>
+                      <p:childTnLst>
+                        <p:par>
+                          <p:cTn id="8" fill="hold">
+                            <p:stCondLst>
+                              <p:cond delay="0"/>
+                            </p:stCondLst>
+                            <p:childTnLst>
+                              <p:par>
+                                <p:cTn id="9" presetID="1" presetClass="entr" presetSubtype="0" fill="hold" nodeType="clickEffect">
+                                  <p:stCondLst>
+                                    <p:cond delay="0"/>
+                                  </p:stCondLst>
+                                  <p:childTnLst>
+                                    <p:set>
+                                      <p:cBhvr>
+                                        <p:cTn id="10" dur="1" fill="hold">
+                                          <p:stCondLst>
+                                            <p:cond delay="0"/>
+                                          </p:stCondLst>
+                                        </p:cTn>
+                                        <p:tgtEl>
+                                          <p:spTgt spid="3">
+                                            <p:txEl>
+                                              <p:pRg st="2" end="2"/>
+                                            </p:txEl>
+                                          </p:spTgt>
+                                        </p:tgtEl>
+                                        <p:attrNameLst>
+                                          <p:attrName>style.visibility</p:attrName>
+                                        </p:attrNameLst>
+                                      </p:cBhvr>
+                                      <p:to>
+                                        <p:strVal val="visible"/>
+                                      </p:to>
+                                    </p:set>
+                                  </p:childTnLst>
+                                </p:cTn>
+                              </p:par>
+                            </p:childTnLst>
+                          </p:cTn>
+                        </p:par>
+                      </p:childTnLst>
+                    </p:cTn>
+                  </p:par>
+                  <p:par>
+                    <p:cTn id="11" fill="hold">
+                      <p:stCondLst>
+                        <p:cond delay="indefinite"/>
+                      </p:stCondLst>
+                      <p:childTnLst>
+                        <p:par>
+                          <p:cTn id="12" fill="hold">
+                            <p:stCondLst>
+                              <p:cond delay="0"/>
+                            </p:stCondLst>
+                            <p:childTnLst>
+                              <p:par>
+                                <p:cTn id="13" presetID="1" presetClass="entr" presetSubtype="0" fill="hold" nodeType="clickEffect">
+                                  <p:stCondLst>
+                                    <p:cond delay="0"/>
+                                  </p:stCondLst>
+                                  <p:childTnLst>
+                                    <p:set>
+                                      <p:cBhvr>
+                                        <p:cTn id="14" dur="1" fill="hold">
+                                          <p:stCondLst>
+                                            <p:cond delay="0"/>
+                                          </p:stCondLst>
+                                        </p:cTn>
+                                        <p:tgtEl>
+                                          <p:spTgt spid="3">
+                                            <p:txEl>
+                                              <p:pRg st="3" end="3"/>
+                                            </p:txEl>
+                                          </p:spTgt>
+                                        </p:tgtEl>
+                                        <p:attrNameLst>
+                                          <p:attrName>style.visibility</p:attrName>
+                                        </p:attrNameLst>
+                                      </p:cBhvr>
+                                      <p:to>
+                                        <p:strVal val="visible"/>
+                                      </p:to>
+                                    </p:set>
+                                  </p:childTnLst>
+                                </p:cTn>
+                              </p:par>
+                              <p:par>
+                                <p:cTn id="15" presetID="1" presetClass="entr" presetSubtype="0" fill="hold" nodeType="withEffect">
+                                  <p:stCondLst>
+                                    <p:cond delay="0"/>
+                                  </p:stCondLst>
+                                  <p:childTnLst>
+                                    <p:set>
+                                      <p:cBhvr>
+                                        <p:cTn id="16" dur="1" fill="hold">
+                                          <p:stCondLst>
+                                            <p:cond delay="0"/>
+                                          </p:stCondLst>
+                                        </p:cTn>
+                                        <p:tgtEl>
+                                          <p:spTgt spid="3">
+                                            <p:txEl>
+                                              <p:pRg st="4" end="4"/>
+                                            </p:txEl>
+                                          </p:spTgt>
+                                        </p:tgtEl>
+                                        <p:attrNameLst>
+                                          <p:attrName>style.visibility</p:attrName>
+                                        </p:attrNameLst>
+                                      </p:cBhvr>
+                                      <p:to>
+                                        <p:strVal val="visible"/>
+                                      </p:to>
+                                    </p:set>
+                                  </p:childTnLst>
+                                </p:cTn>
+                              </p:par>
+                            </p:childTnLst>
+                          </p:cTn>
+                        </p:par>
+                      </p:childTnLst>
+                    </p:cTn>
+                  </p:par>
+                  <p:par>
+                    <p:cTn id="17" fill="hold">
+                      <p:stCondLst>
+                        <p:cond delay="indefinite"/>
+                      </p:stCondLst>
+                      <p:childTnLst>
+                        <p:par>
+                          <p:cTn id="18" fill="hold">
+                            <p:stCondLst>
+                              <p:cond delay="0"/>
+                            </p:stCondLst>
+                            <p:childTnLst>
+                              <p:par>
+                                <p:cTn id="19" presetID="1" presetClass="entr" presetSubtype="0" fill="hold" nodeType="clickEffect">
+                                  <p:stCondLst>
+                                    <p:cond delay="0"/>
+                                  </p:stCondLst>
+                                  <p:childTnLst>
+                                    <p:set>
+                                      <p:cBhvr>
+                                        <p:cTn id="20" dur="1" fill="hold">
+                                          <p:stCondLst>
+                                            <p:cond delay="0"/>
+                                          </p:stCondLst>
+                                        </p:cTn>
+                                        <p:tgtEl>
+                                          <p:spTgt spid="3">
+                                            <p:txEl>
+                                              <p:pRg st="5" end="5"/>
+                                            </p:txEl>
+                                          </p:spTgt>
+                                        </p:tgtEl>
+                                        <p:attrNameLst>
+                                          <p:attrName>style.visibility</p:attrName>
+                                        </p:attrNameLst>
+                                      </p:cBhvr>
+                                      <p:to>
+                                        <p:strVal val="visible"/>
+                                      </p:to>
+                                    </p:set>
+                                  </p:childTnLst>
+                                </p:cTn>
+                              </p:par>
+                            </p:childTnLst>
+                          </p:cTn>
+                        </p:par>
+                      </p:childTnLst>
+                    </p:cTn>
+                  </p:par>
+                  <p:par>
+                    <p:cTn id="21" fill="hold">
+                      <p:stCondLst>
+                        <p:cond delay="indefinite"/>
+                      </p:stCondLst>
+                      <p:childTnLst>
+                        <p:par>
+                          <p:cTn id="22" fill="hold">
+                            <p:stCondLst>
+                              <p:cond delay="0"/>
+                            </p:stCondLst>
+                            <p:childTnLst>
+                              <p:par>
+                                <p:cTn id="23" presetID="1" presetClass="entr" presetSubtype="0" fill="hold" nodeType="clickEffect">
+                                  <p:stCondLst>
+                                    <p:cond delay="0"/>
+                                  </p:stCondLst>
+                                  <p:childTnLst>
+                                    <p:set>
+                                      <p:cBhvr>
+                                        <p:cTn id="24" dur="1" fill="hold">
+                                          <p:stCondLst>
+                                            <p:cond delay="0"/>
+                                          </p:stCondLst>
+                                        </p:cTn>
+                                        <p:tgtEl>
+                                          <p:spTgt spid="3">
+                                            <p:txEl>
+                                              <p:pRg st="6" end="6"/>
+                                            </p:txEl>
+                                          </p:spTgt>
+                                        </p:tgtEl>
+                                        <p:attrNameLst>
+                                          <p:attrName>style.visibility</p:attrName>
+                                        </p:attrNameLst>
+                                      </p:cBhvr>
+                                      <p:to>
+                                        <p:strVal val="visible"/>
+                                      </p:to>
+                                    </p:set>
+                                  </p:childTnLst>
+                                </p:cTn>
+                              </p:par>
+                              <p:par>
+                                <p:cTn id="25" presetID="1" presetClass="entr" presetSubtype="0" fill="hold" nodeType="withEffect">
+                                  <p:stCondLst>
+                                    <p:cond delay="0"/>
+                                  </p:stCondLst>
+                                  <p:childTnLst>
+                                    <p:set>
+                                      <p:cBhvr>
+                                        <p:cTn id="26" dur="1" fill="hold">
+                                          <p:stCondLst>
+                                            <p:cond delay="0"/>
+                                          </p:stCondLst>
+                                        </p:cTn>
+                                        <p:tgtEl>
+                                          <p:spTgt spid="3">
+                                            <p:txEl>
+                                              <p:pRg st="7" end="7"/>
+                                            </p:txEl>
+                                          </p:spTgt>
+                                        </p:tgtEl>
+                                        <p:attrNameLst>
+                                          <p:attrName>style.visibility</p:attrName>
+                                        </p:attrNameLst>
+                                      </p:cBhvr>
+                                      <p:to>
+                                        <p:strVal val="visible"/>
+                                      </p:to>
+                                    </p:set>
+                                  </p:childTnLst>
+                                </p:cTn>
+                              </p:par>
+                            </p:childTnLst>
+                          </p:cTn>
+                        </p:par>
+                      </p:childTnLst>
+                    </p:cTn>
+                  </p:par>
+                  <p:par>
+                    <p:cTn id="27" fill="hold">
+                      <p:stCondLst>
+                        <p:cond delay="indefinite"/>
+                      </p:stCondLst>
+                      <p:childTnLst>
+                        <p:par>
+                          <p:cTn id="28" fill="hold">
+                            <p:stCondLst>
+                              <p:cond delay="0"/>
+                            </p:stCondLst>
+                            <p:childTnLst>
+                              <p:par>
+                                <p:cTn id="29" presetID="1" presetClass="entr" presetSubtype="0" fill="hold" nodeType="clickEffect">
+                                  <p:stCondLst>
+                                    <p:cond delay="0"/>
+                                  </p:stCondLst>
+                                  <p:childTnLst>
+                                    <p:set>
+                                      <p:cBhvr>
+                                        <p:cTn id="30" dur="1" fill="hold">
+                                          <p:stCondLst>
+                                            <p:cond delay="0"/>
+                                          </p:stCondLst>
+                                        </p:cTn>
+                                        <p:tgtEl>
+                                          <p:spTgt spid="3">
+                                            <p:txEl>
+                                              <p:pRg st="8" end="8"/>
+                                            </p:txEl>
+                                          </p:spTgt>
+                                        </p:tgtEl>
+                                        <p:attrNameLst>
+                                          <p:attrName>style.visibility</p:attrName>
+                                        </p:attrNameLst>
+                                      </p:cBhvr>
+                                      <p:to>
+                                        <p:strVal val="visible"/>
+                                      </p:to>
+                                    </p:set>
+                                  </p:childTnLst>
+                                </p:cTn>
+                              </p:par>
+                              <p:par>
+                                <p:cTn id="31" presetID="1" presetClass="entr" presetSubtype="0" fill="hold" nodeType="withEffect">
+                                  <p:stCondLst>
+                                    <p:cond delay="0"/>
+                                  </p:stCondLst>
+                                  <p:childTnLst>
+                                    <p:set>
+                                      <p:cBhvr>
+                                        <p:cTn id="32" dur="1" fill="hold">
+                                          <p:stCondLst>
+                                            <p:cond delay="0"/>
+                                          </p:stCondLst>
+                                        </p:cTn>
+                                        <p:tgtEl>
+                                          <p:spTgt spid="3">
+                                            <p:txEl>
+                                              <p:pRg st="9" end="9"/>
+                                            </p:txEl>
+                                          </p:spTgt>
+                                        </p:tgtEl>
+                                        <p:attrNameLst>
+                                          <p:attrName>style.visibility</p:attrName>
+                                        </p:attrNameLst>
+                                      </p:cBhvr>
+                                      <p:to>
+                                        <p:strVal val="visible"/>
+                                      </p:to>
+                                    </p:set>
+                                  </p:childTnLst>
+                                </p:cTn>
+                              </p:par>
+                              <p:par>
+                                <p:cTn id="33" presetID="1" presetClass="entr" presetSubtype="0" fill="hold" nodeType="withEffect">
+                                  <p:stCondLst>
+                                    <p:cond delay="0"/>
+                                  </p:stCondLst>
+                                  <p:childTnLst>
+                                    <p:set>
+                                      <p:cBhvr>
+                                        <p:cTn id="34" dur="1" fill="hold">
+                                          <p:stCondLst>
+                                            <p:cond delay="0"/>
+                                          </p:stCondLst>
+                                        </p:cTn>
+                                        <p:tgtEl>
+                                          <p:spTgt spid="3">
+                                            <p:txEl>
+                                              <p:pRg st="10" end="10"/>
+                                            </p:txEl>
+                                          </p:spTgt>
+                                        </p:tgtEl>
+                                        <p:attrNameLst>
+                                          <p:attrName>style.visibility</p:attrName>
+                                        </p:attrNameLst>
+                                      </p:cBhvr>
+                                      <p:to>
+                                        <p:strVal val="visible"/>
+                                      </p:to>
+                                    </p:set>
+                                  </p:childTnLst>
+                                </p:cTn>
+                              </p:par>
+                              <p:par>
+                                <p:cTn id="35" presetID="1" presetClass="entr" presetSubtype="0" fill="hold" nodeType="withEffect">
+                                  <p:stCondLst>
+                                    <p:cond delay="0"/>
+                                  </p:stCondLst>
+                                  <p:childTnLst>
+                                    <p:set>
+                                      <p:cBhvr>
+                                        <p:cTn id="36" dur="1" fill="hold">
+                                          <p:stCondLst>
+                                            <p:cond delay="0"/>
+                                          </p:stCondLst>
+                                        </p:cTn>
+                                        <p:tgtEl>
+                                          <p:spTgt spid="3">
+                                            <p:txEl>
+                                              <p:pRg st="11" end="11"/>
+                                            </p:txEl>
+                                          </p:spTgt>
+                                        </p:tgtEl>
+                                        <p:attrNameLst>
+                                          <p:attrName>style.visibility</p:attrName>
+                                        </p:attrNameLst>
+                                      </p:cBhvr>
+                                      <p:to>
+                                        <p:strVal val="visible"/>
+                                      </p:to>
+                                    </p:set>
+                                  </p:childTnLst>
+                                </p:cTn>
+                              </p:par>
+                            </p:childTnLst>
+                          </p:cTn>
+                        </p:par>
+                      </p:childTnLst>
+                    </p:cTn>
+                  </p:par>
+                </p:childTnLst>
+              </p:cTn>
+              <p:prevCondLst>
+                <p:cond evt="onPrev" delay="0">
+                  <p:tgtEl>
+                    <p:sldTgt/>
+                  </p:tgtEl>
+                </p:cond>
+              </p:prevCondLst>
+              <p:nextCondLst>
+                <p:cond evt="onNext" delay="0">
+                  <p:tgtEl>
+                    <p:sldTgt/>
+                  </p:tgtEl>
+                </p:cond>
+              </p:nextCondLst>
+            </p:seq>
+          </p:childTnLst>
+        </p:cTn>
+      </p:par>
+    </p:tnLst>
+  </p:timing>
 </p:sld>
 </file>
 
@@ -30308,6 +31404,33 @@
                                   </p:childTnLst>
                                 </p:cTn>
                               </p:par>
+                              <p:par>
+                                <p:cTn id="13" presetID="1" presetClass="entr" presetSubtype="0" fill="hold" grpId="0" nodeType="withEffect">
+                                  <p:stCondLst>
+                                    <p:cond delay="0"/>
+                                  </p:stCondLst>
+                                  <p:childTnLst>
+                                    <p:set>
+                                      <p:cBhvr>
+                                        <p:cTn id="14" dur="1" fill="hold">
+                                          <p:stCondLst>
+                                            <p:cond delay="0"/>
+                                          </p:stCondLst>
+                                        </p:cTn>
+                                        <p:tgtEl>
+                                          <p:spTgt spid="5"/>
+                                        </p:tgtEl>
+                                        <p:attrNameLst>
+                                          <p:attrName>style.visibility</p:attrName>
+                                        </p:attrNameLst>
+                                      </p:cBhvr>
+                                      <p:to>
+                                        <p:strVal val="visible"/>
+                                      </p:to>
+                                    </p:set>
+                                  </p:childTnLst>
+                                </p:cTn>
+                              </p:par>
                             </p:childTnLst>
                           </p:cTn>
                         </p:par>
@@ -30315,26 +31438,26 @@
                     </p:cTn>
                   </p:par>
                   <p:par>
-                    <p:cTn id="13" fill="hold">
+                    <p:cTn id="15" fill="hold">
                       <p:stCondLst>
                         <p:cond delay="indefinite"/>
                       </p:stCondLst>
                       <p:childTnLst>
                         <p:par>
-                          <p:cTn id="14" fill="hold">
+                          <p:cTn id="16" fill="hold">
                             <p:stCondLst>
                               <p:cond delay="0"/>
                             </p:stCondLst>
                             <p:childTnLst>
                               <p:par>
-                                <p:cTn id="15" presetID="1" presetClass="entr" presetSubtype="0" fill="hold" nodeType="clickEffect">
+                                <p:cTn id="17" presetID="1" presetClass="entr" presetSubtype="0" fill="hold" nodeType="clickEffect">
                                   <p:stCondLst>
                                     <p:cond delay="0"/>
                                   </p:stCondLst>
                                   <p:childTnLst>
                                     <p:set>
                                       <p:cBhvr>
-                                        <p:cTn id="16" dur="1" fill="hold">
+                                        <p:cTn id="18" dur="1" fill="hold">
                                           <p:stCondLst>
                                             <p:cond delay="0"/>
                                           </p:stCondLst>
@@ -30364,26 +31487,26 @@
                     </p:cTn>
                   </p:par>
                   <p:par>
-                    <p:cTn id="17" fill="hold">
+                    <p:cTn id="19" fill="hold">
                       <p:stCondLst>
                         <p:cond delay="indefinite"/>
                       </p:stCondLst>
                       <p:childTnLst>
                         <p:par>
-                          <p:cTn id="18" fill="hold">
+                          <p:cTn id="20" fill="hold">
                             <p:stCondLst>
                               <p:cond delay="0"/>
                             </p:stCondLst>
                             <p:childTnLst>
                               <p:par>
-                                <p:cTn id="19" presetID="1" presetClass="entr" presetSubtype="0" fill="hold" nodeType="clickEffect">
+                                <p:cTn id="21" presetID="1" presetClass="entr" presetSubtype="0" fill="hold" nodeType="clickEffect">
                                   <p:stCondLst>
                                     <p:cond delay="0"/>
                                   </p:stCondLst>
                                   <p:childTnLst>
                                     <p:set>
                                       <p:cBhvr>
-                                        <p:cTn id="20" dur="1" fill="hold">
+                                        <p:cTn id="22" dur="1" fill="hold">
                                           <p:stCondLst>
                                             <p:cond delay="0"/>
                                           </p:stCondLst>
@@ -30433,6 +31556,9 @@
         </p:cTn>
       </p:par>
     </p:tnLst>
+    <p:bldLst>
+      <p:bldP spid="5" grpId="0"/>
+    </p:bldLst>
   </p:timing>
 </p:sld>
 </file>

</xml_diff>